<commit_message>
Added ground vias for added isolation in substrate, worked on schematic review 1 powerpoint
</commit_message>
<xml_diff>
--- a/Documentation/Schematic Review 1.pptx
+++ b/Documentation/Schematic Review 1.pptx
@@ -7,6 +7,10 @@
   <p:sldIdLst>
     <p:sldId id="256" r:id="rId2"/>
     <p:sldId id="257" r:id="rId3"/>
+    <p:sldId id="258" r:id="rId4"/>
+    <p:sldId id="259" r:id="rId5"/>
+    <p:sldId id="261" r:id="rId6"/>
+    <p:sldId id="260" r:id="rId7"/>
   </p:sldIdLst>
   <p:sldSz cx="12192000" cy="6858000"/>
   <p:notesSz cx="6858000" cy="9144000"/>
@@ -105,6 +109,11 @@
       </a:defRPr>
     </a:lvl9pPr>
   </p:defaultTextStyle>
+  <p:extLst>
+    <p:ext uri="{EFAFB233-063F-42B5-8137-9DF3F51BA10A}">
+      <p15:sldGuideLst xmlns:p15="http://schemas.microsoft.com/office/powerpoint/2012/main"/>
+    </p:ext>
+  </p:extLst>
 </p:presentation>
 </file>
 
@@ -255,7 +264,7 @@
           <a:p>
             <a:fld id="{67A852C0-EA74-4E50-8184-272026F38F49}" type="datetimeFigureOut">
               <a:rPr lang="en-US" smtClean="0"/>
-              <a:t>9/15/2022</a:t>
+              <a:t>9/17/2022</a:t>
             </a:fld>
             <a:endParaRPr lang="en-US"/>
           </a:p>
@@ -453,7 +462,7 @@
           <a:p>
             <a:fld id="{67A852C0-EA74-4E50-8184-272026F38F49}" type="datetimeFigureOut">
               <a:rPr lang="en-US" smtClean="0"/>
-              <a:t>9/15/2022</a:t>
+              <a:t>9/17/2022</a:t>
             </a:fld>
             <a:endParaRPr lang="en-US"/>
           </a:p>
@@ -661,7 +670,7 @@
           <a:p>
             <a:fld id="{67A852C0-EA74-4E50-8184-272026F38F49}" type="datetimeFigureOut">
               <a:rPr lang="en-US" smtClean="0"/>
-              <a:t>9/15/2022</a:t>
+              <a:t>9/17/2022</a:t>
             </a:fld>
             <a:endParaRPr lang="en-US"/>
           </a:p>
@@ -859,7 +868,7 @@
           <a:p>
             <a:fld id="{67A852C0-EA74-4E50-8184-272026F38F49}" type="datetimeFigureOut">
               <a:rPr lang="en-US" smtClean="0"/>
-              <a:t>9/15/2022</a:t>
+              <a:t>9/17/2022</a:t>
             </a:fld>
             <a:endParaRPr lang="en-US"/>
           </a:p>
@@ -1134,7 +1143,7 @@
           <a:p>
             <a:fld id="{67A852C0-EA74-4E50-8184-272026F38F49}" type="datetimeFigureOut">
               <a:rPr lang="en-US" smtClean="0"/>
-              <a:t>9/15/2022</a:t>
+              <a:t>9/17/2022</a:t>
             </a:fld>
             <a:endParaRPr lang="en-US"/>
           </a:p>
@@ -1399,7 +1408,7 @@
           <a:p>
             <a:fld id="{67A852C0-EA74-4E50-8184-272026F38F49}" type="datetimeFigureOut">
               <a:rPr lang="en-US" smtClean="0"/>
-              <a:t>9/15/2022</a:t>
+              <a:t>9/17/2022</a:t>
             </a:fld>
             <a:endParaRPr lang="en-US"/>
           </a:p>
@@ -1811,7 +1820,7 @@
           <a:p>
             <a:fld id="{67A852C0-EA74-4E50-8184-272026F38F49}" type="datetimeFigureOut">
               <a:rPr lang="en-US" smtClean="0"/>
-              <a:t>9/15/2022</a:t>
+              <a:t>9/17/2022</a:t>
             </a:fld>
             <a:endParaRPr lang="en-US"/>
           </a:p>
@@ -1952,7 +1961,7 @@
           <a:p>
             <a:fld id="{67A852C0-EA74-4E50-8184-272026F38F49}" type="datetimeFigureOut">
               <a:rPr lang="en-US" smtClean="0"/>
-              <a:t>9/15/2022</a:t>
+              <a:t>9/17/2022</a:t>
             </a:fld>
             <a:endParaRPr lang="en-US"/>
           </a:p>
@@ -2065,7 +2074,7 @@
           <a:p>
             <a:fld id="{67A852C0-EA74-4E50-8184-272026F38F49}" type="datetimeFigureOut">
               <a:rPr lang="en-US" smtClean="0"/>
-              <a:t>9/15/2022</a:t>
+              <a:t>9/17/2022</a:t>
             </a:fld>
             <a:endParaRPr lang="en-US"/>
           </a:p>
@@ -2376,7 +2385,7 @@
           <a:p>
             <a:fld id="{67A852C0-EA74-4E50-8184-272026F38F49}" type="datetimeFigureOut">
               <a:rPr lang="en-US" smtClean="0"/>
-              <a:t>9/15/2022</a:t>
+              <a:t>9/17/2022</a:t>
             </a:fld>
             <a:endParaRPr lang="en-US"/>
           </a:p>
@@ -2664,7 +2673,7 @@
           <a:p>
             <a:fld id="{67A852C0-EA74-4E50-8184-272026F38F49}" type="datetimeFigureOut">
               <a:rPr lang="en-US" smtClean="0"/>
-              <a:t>9/15/2022</a:t>
+              <a:t>9/17/2022</a:t>
             </a:fld>
             <a:endParaRPr lang="en-US"/>
           </a:p>
@@ -2905,7 +2914,7 @@
           <a:p>
             <a:fld id="{67A852C0-EA74-4E50-8184-272026F38F49}" type="datetimeFigureOut">
               <a:rPr lang="en-US" smtClean="0"/>
-              <a:t>9/15/2022</a:t>
+              <a:t>9/17/2022</a:t>
             </a:fld>
             <a:endParaRPr lang="en-US"/>
           </a:p>
@@ -3468,6 +3477,4249 @@
 </p:sld>
 </file>
 
+<file path=ppt/slides/slide3.xml><?xml version="1.0" encoding="utf-8"?>
+<p:sld xmlns:a="http://schemas.openxmlformats.org/drawingml/2006/main" xmlns:r="http://schemas.openxmlformats.org/officeDocument/2006/relationships" xmlns:p="http://schemas.openxmlformats.org/presentationml/2006/main">
+  <p:cSld>
+    <p:bg>
+      <p:bgPr>
+        <a:solidFill>
+          <a:schemeClr val="bg1"/>
+        </a:solidFill>
+        <a:effectLst/>
+      </p:bgPr>
+    </p:bg>
+    <p:spTree>
+      <p:nvGrpSpPr>
+        <p:cNvPr id="1" name=""/>
+        <p:cNvGrpSpPr/>
+        <p:nvPr/>
+      </p:nvGrpSpPr>
+      <p:grpSpPr>
+        <a:xfrm>
+          <a:off x="0" y="0"/>
+          <a:ext cx="0" cy="0"/>
+          <a:chOff x="0" y="0"/>
+          <a:chExt cx="0" cy="0"/>
+        </a:xfrm>
+      </p:grpSpPr>
+      <p:sp useBgFill="1">
+        <p:nvSpPr>
+          <p:cNvPr id="27" name="Rectangle 26">
+            <a:extLst>
+              <a:ext uri="{FF2B5EF4-FFF2-40B4-BE49-F238E27FC236}">
+                <a16:creationId xmlns:a16="http://schemas.microsoft.com/office/drawing/2014/main" id="{904DCDEA-60EE-4FBF-B515-F83D82F966F7}"/>
+              </a:ext>
+              <a:ext uri="{C183D7F6-B498-43B3-948B-1728B52AA6E4}">
+                <adec:decorative xmlns:adec="http://schemas.microsoft.com/office/drawing/2017/decorative" val="1"/>
+              </a:ext>
+            </a:extLst>
+          </p:cNvPr>
+          <p:cNvSpPr>
+            <a:spLocks noGrp="1" noRot="1" noChangeAspect="1" noMove="1" noResize="1" noEditPoints="1" noAdjustHandles="1" noChangeArrowheads="1" noChangeShapeType="1" noTextEdit="1"/>
+          </p:cNvSpPr>
+          <p:nvPr>
+            <p:extLst>
+              <p:ext uri="{386F3935-93C4-4BCD-93E2-E3B085C9AB24}">
+                <p16:designElem xmlns:p16="http://schemas.microsoft.com/office/powerpoint/2015/main" val="1"/>
+              </p:ext>
+            </p:extLst>
+          </p:nvPr>
+        </p:nvSpPr>
+        <p:spPr>
+          <a:xfrm>
+            <a:off x="2" y="0"/>
+            <a:ext cx="12191996" cy="6858000"/>
+          </a:xfrm>
+          <a:prstGeom prst="rect">
+            <a:avLst/>
+          </a:prstGeom>
+          <a:ln>
+            <a:noFill/>
+          </a:ln>
+        </p:spPr>
+        <p:style>
+          <a:lnRef idx="2">
+            <a:schemeClr val="accent1">
+              <a:shade val="50000"/>
+            </a:schemeClr>
+          </a:lnRef>
+          <a:fillRef idx="1">
+            <a:schemeClr val="accent1"/>
+          </a:fillRef>
+          <a:effectRef idx="0">
+            <a:schemeClr val="accent1"/>
+          </a:effectRef>
+          <a:fontRef idx="minor">
+            <a:schemeClr val="lt1"/>
+          </a:fontRef>
+        </p:style>
+        <p:txBody>
+          <a:bodyPr rtlCol="0" anchor="ctr"/>
+          <a:lstStyle/>
+          <a:p>
+            <a:pPr algn="ctr"/>
+            <a:endParaRPr lang="en-US"/>
+          </a:p>
+        </p:txBody>
+      </p:sp>
+      <p:pic>
+        <p:nvPicPr>
+          <p:cNvPr id="7" name="Picture 6" descr="A screenshot of a video game&#10;&#10;Description automatically generated">
+            <a:extLst>
+              <a:ext uri="{FF2B5EF4-FFF2-40B4-BE49-F238E27FC236}">
+                <a16:creationId xmlns:a16="http://schemas.microsoft.com/office/drawing/2014/main" id="{06045D61-160B-4E5C-808F-C89EC206D5FE}"/>
+              </a:ext>
+            </a:extLst>
+          </p:cNvPr>
+          <p:cNvPicPr>
+            <a:picLocks noChangeAspect="1"/>
+          </p:cNvPicPr>
+          <p:nvPr/>
+        </p:nvPicPr>
+        <p:blipFill rotWithShape="1">
+          <a:blip r:embed="rId2"/>
+          <a:srcRect l="5" r="6018" b="2"/>
+          <a:stretch/>
+        </p:blipFill>
+        <p:spPr>
+          <a:xfrm>
+            <a:off x="4426858" y="3429004"/>
+            <a:ext cx="7765144" cy="3428999"/>
+          </a:xfrm>
+          <a:prstGeom prst="rect">
+            <a:avLst/>
+          </a:prstGeom>
+        </p:spPr>
+      </p:pic>
+      <p:pic>
+        <p:nvPicPr>
+          <p:cNvPr id="9" name="Picture 8" descr="A screenshot of a video game&#10;&#10;Description automatically generated">
+            <a:extLst>
+              <a:ext uri="{FF2B5EF4-FFF2-40B4-BE49-F238E27FC236}">
+                <a16:creationId xmlns:a16="http://schemas.microsoft.com/office/drawing/2014/main" id="{2B0540FC-8C17-4209-B11A-C40DB095F2DA}"/>
+              </a:ext>
+            </a:extLst>
+          </p:cNvPr>
+          <p:cNvPicPr>
+            <a:picLocks noChangeAspect="1"/>
+          </p:cNvPicPr>
+          <p:nvPr/>
+        </p:nvPicPr>
+        <p:blipFill rotWithShape="1">
+          <a:blip r:embed="rId3"/>
+          <a:srcRect r="6168" b="-1"/>
+          <a:stretch/>
+        </p:blipFill>
+        <p:spPr>
+          <a:xfrm>
+            <a:off x="4426853" y="-3"/>
+            <a:ext cx="7765146" cy="3434400"/>
+          </a:xfrm>
+          <a:prstGeom prst="rect">
+            <a:avLst/>
+          </a:prstGeom>
+        </p:spPr>
+      </p:pic>
+      <p:sp>
+        <p:nvSpPr>
+          <p:cNvPr id="29" name="Freeform: Shape 28">
+            <a:extLst>
+              <a:ext uri="{FF2B5EF4-FFF2-40B4-BE49-F238E27FC236}">
+                <a16:creationId xmlns:a16="http://schemas.microsoft.com/office/drawing/2014/main" id="{34D94F3A-BF39-47F6-9AAA-3C61AF7E05B1}"/>
+              </a:ext>
+              <a:ext uri="{C183D7F6-B498-43B3-948B-1728B52AA6E4}">
+                <adec:decorative xmlns:adec="http://schemas.microsoft.com/office/drawing/2017/decorative" val="1"/>
+              </a:ext>
+            </a:extLst>
+          </p:cNvPr>
+          <p:cNvSpPr>
+            <a:spLocks noGrp="1" noRot="1" noChangeAspect="1" noMove="1" noResize="1" noEditPoints="1" noAdjustHandles="1" noChangeArrowheads="1" noChangeShapeType="1" noTextEdit="1"/>
+          </p:cNvSpPr>
+          <p:nvPr>
+            <p:extLst>
+              <p:ext uri="{386F3935-93C4-4BCD-93E2-E3B085C9AB24}">
+                <p16:designElem xmlns:p16="http://schemas.microsoft.com/office/powerpoint/2015/main" val="1"/>
+              </p:ext>
+            </p:extLst>
+          </p:nvPr>
+        </p:nvSpPr>
+        <p:spPr>
+          <a:xfrm flipH="1">
+            <a:off x="0" y="0"/>
+            <a:ext cx="4838076" cy="6858000"/>
+          </a:xfrm>
+          <a:custGeom>
+            <a:avLst/>
+            <a:gdLst>
+              <a:gd name="connsiteX0" fmla="*/ 4838076 w 4838076"/>
+              <a:gd name="connsiteY0" fmla="*/ 0 h 6858000"/>
+              <a:gd name="connsiteX1" fmla="*/ 4417162 w 4838076"/>
+              <a:gd name="connsiteY1" fmla="*/ 0 h 6858000"/>
+              <a:gd name="connsiteX2" fmla="*/ 3459219 w 4838076"/>
+              <a:gd name="connsiteY2" fmla="*/ 0 h 6858000"/>
+              <a:gd name="connsiteX3" fmla="*/ 334174 w 4838076"/>
+              <a:gd name="connsiteY3" fmla="*/ 0 h 6858000"/>
+              <a:gd name="connsiteX4" fmla="*/ 334173 w 4838076"/>
+              <a:gd name="connsiteY4" fmla="*/ 0 h 6858000"/>
+              <a:gd name="connsiteX5" fmla="*/ 189795 w 4838076"/>
+              <a:gd name="connsiteY5" fmla="*/ 0 h 6858000"/>
+              <a:gd name="connsiteX6" fmla="*/ 184756 w 4838076"/>
+              <a:gd name="connsiteY6" fmla="*/ 66675 h 6858000"/>
+              <a:gd name="connsiteX7" fmla="*/ 176358 w 4838076"/>
+              <a:gd name="connsiteY7" fmla="*/ 122237 h 6858000"/>
+              <a:gd name="connsiteX8" fmla="*/ 166281 w 4838076"/>
+              <a:gd name="connsiteY8" fmla="*/ 174625 h 6858000"/>
+              <a:gd name="connsiteX9" fmla="*/ 149485 w 4838076"/>
+              <a:gd name="connsiteY9" fmla="*/ 217487 h 6858000"/>
+              <a:gd name="connsiteX10" fmla="*/ 132689 w 4838076"/>
+              <a:gd name="connsiteY10" fmla="*/ 260350 h 6858000"/>
+              <a:gd name="connsiteX11" fmla="*/ 112534 w 4838076"/>
+              <a:gd name="connsiteY11" fmla="*/ 296862 h 6858000"/>
+              <a:gd name="connsiteX12" fmla="*/ 92379 w 4838076"/>
+              <a:gd name="connsiteY12" fmla="*/ 334962 h 6858000"/>
+              <a:gd name="connsiteX13" fmla="*/ 73903 w 4838076"/>
+              <a:gd name="connsiteY13" fmla="*/ 369887 h 6858000"/>
+              <a:gd name="connsiteX14" fmla="*/ 55427 w 4838076"/>
+              <a:gd name="connsiteY14" fmla="*/ 409575 h 6858000"/>
+              <a:gd name="connsiteX15" fmla="*/ 38632 w 4838076"/>
+              <a:gd name="connsiteY15" fmla="*/ 450850 h 6858000"/>
+              <a:gd name="connsiteX16" fmla="*/ 23515 w 4838076"/>
+              <a:gd name="connsiteY16" fmla="*/ 496887 h 6858000"/>
+              <a:gd name="connsiteX17" fmla="*/ 11758 w 4838076"/>
+              <a:gd name="connsiteY17" fmla="*/ 546100 h 6858000"/>
+              <a:gd name="connsiteX18" fmla="*/ 3359 w 4838076"/>
+              <a:gd name="connsiteY18" fmla="*/ 606425 h 6858000"/>
+              <a:gd name="connsiteX19" fmla="*/ 0 w 4838076"/>
+              <a:gd name="connsiteY19" fmla="*/ 673100 h 6858000"/>
+              <a:gd name="connsiteX20" fmla="*/ 3359 w 4838076"/>
+              <a:gd name="connsiteY20" fmla="*/ 744537 h 6858000"/>
+              <a:gd name="connsiteX21" fmla="*/ 11758 w 4838076"/>
+              <a:gd name="connsiteY21" fmla="*/ 801687 h 6858000"/>
+              <a:gd name="connsiteX22" fmla="*/ 23515 w 4838076"/>
+              <a:gd name="connsiteY22" fmla="*/ 854075 h 6858000"/>
+              <a:gd name="connsiteX23" fmla="*/ 38632 w 4838076"/>
+              <a:gd name="connsiteY23" fmla="*/ 901700 h 6858000"/>
+              <a:gd name="connsiteX24" fmla="*/ 55427 w 4838076"/>
+              <a:gd name="connsiteY24" fmla="*/ 942975 h 6858000"/>
+              <a:gd name="connsiteX25" fmla="*/ 75583 w 4838076"/>
+              <a:gd name="connsiteY25" fmla="*/ 981075 h 6858000"/>
+              <a:gd name="connsiteX26" fmla="*/ 95738 w 4838076"/>
+              <a:gd name="connsiteY26" fmla="*/ 1017587 h 6858000"/>
+              <a:gd name="connsiteX27" fmla="*/ 115893 w 4838076"/>
+              <a:gd name="connsiteY27" fmla="*/ 1055687 h 6858000"/>
+              <a:gd name="connsiteX28" fmla="*/ 134368 w 4838076"/>
+              <a:gd name="connsiteY28" fmla="*/ 1095375 h 6858000"/>
+              <a:gd name="connsiteX29" fmla="*/ 152844 w 4838076"/>
+              <a:gd name="connsiteY29" fmla="*/ 1136650 h 6858000"/>
+              <a:gd name="connsiteX30" fmla="*/ 167960 w 4838076"/>
+              <a:gd name="connsiteY30" fmla="*/ 1182687 h 6858000"/>
+              <a:gd name="connsiteX31" fmla="*/ 178038 w 4838076"/>
+              <a:gd name="connsiteY31" fmla="*/ 1235075 h 6858000"/>
+              <a:gd name="connsiteX32" fmla="*/ 188115 w 4838076"/>
+              <a:gd name="connsiteY32" fmla="*/ 1295400 h 6858000"/>
+              <a:gd name="connsiteX33" fmla="*/ 189795 w 4838076"/>
+              <a:gd name="connsiteY33" fmla="*/ 1363662 h 6858000"/>
+              <a:gd name="connsiteX34" fmla="*/ 188115 w 4838076"/>
+              <a:gd name="connsiteY34" fmla="*/ 1431925 h 6858000"/>
+              <a:gd name="connsiteX35" fmla="*/ 178038 w 4838076"/>
+              <a:gd name="connsiteY35" fmla="*/ 1492250 h 6858000"/>
+              <a:gd name="connsiteX36" fmla="*/ 167960 w 4838076"/>
+              <a:gd name="connsiteY36" fmla="*/ 1544637 h 6858000"/>
+              <a:gd name="connsiteX37" fmla="*/ 152844 w 4838076"/>
+              <a:gd name="connsiteY37" fmla="*/ 1589087 h 6858000"/>
+              <a:gd name="connsiteX38" fmla="*/ 134368 w 4838076"/>
+              <a:gd name="connsiteY38" fmla="*/ 1631950 h 6858000"/>
+              <a:gd name="connsiteX39" fmla="*/ 115893 w 4838076"/>
+              <a:gd name="connsiteY39" fmla="*/ 1671637 h 6858000"/>
+              <a:gd name="connsiteX40" fmla="*/ 95738 w 4838076"/>
+              <a:gd name="connsiteY40" fmla="*/ 1708150 h 6858000"/>
+              <a:gd name="connsiteX41" fmla="*/ 75583 w 4838076"/>
+              <a:gd name="connsiteY41" fmla="*/ 1743075 h 6858000"/>
+              <a:gd name="connsiteX42" fmla="*/ 55427 w 4838076"/>
+              <a:gd name="connsiteY42" fmla="*/ 1782762 h 6858000"/>
+              <a:gd name="connsiteX43" fmla="*/ 38632 w 4838076"/>
+              <a:gd name="connsiteY43" fmla="*/ 1824037 h 6858000"/>
+              <a:gd name="connsiteX44" fmla="*/ 23515 w 4838076"/>
+              <a:gd name="connsiteY44" fmla="*/ 1870075 h 6858000"/>
+              <a:gd name="connsiteX45" fmla="*/ 11758 w 4838076"/>
+              <a:gd name="connsiteY45" fmla="*/ 1922462 h 6858000"/>
+              <a:gd name="connsiteX46" fmla="*/ 3359 w 4838076"/>
+              <a:gd name="connsiteY46" fmla="*/ 1982787 h 6858000"/>
+              <a:gd name="connsiteX47" fmla="*/ 0 w 4838076"/>
+              <a:gd name="connsiteY47" fmla="*/ 2051050 h 6858000"/>
+              <a:gd name="connsiteX48" fmla="*/ 3359 w 4838076"/>
+              <a:gd name="connsiteY48" fmla="*/ 2119312 h 6858000"/>
+              <a:gd name="connsiteX49" fmla="*/ 11758 w 4838076"/>
+              <a:gd name="connsiteY49" fmla="*/ 2179637 h 6858000"/>
+              <a:gd name="connsiteX50" fmla="*/ 23515 w 4838076"/>
+              <a:gd name="connsiteY50" fmla="*/ 2232025 h 6858000"/>
+              <a:gd name="connsiteX51" fmla="*/ 38632 w 4838076"/>
+              <a:gd name="connsiteY51" fmla="*/ 2278062 h 6858000"/>
+              <a:gd name="connsiteX52" fmla="*/ 55427 w 4838076"/>
+              <a:gd name="connsiteY52" fmla="*/ 2319337 h 6858000"/>
+              <a:gd name="connsiteX53" fmla="*/ 75583 w 4838076"/>
+              <a:gd name="connsiteY53" fmla="*/ 2359025 h 6858000"/>
+              <a:gd name="connsiteX54" fmla="*/ 95738 w 4838076"/>
+              <a:gd name="connsiteY54" fmla="*/ 2395537 h 6858000"/>
+              <a:gd name="connsiteX55" fmla="*/ 115893 w 4838076"/>
+              <a:gd name="connsiteY55" fmla="*/ 2433637 h 6858000"/>
+              <a:gd name="connsiteX56" fmla="*/ 134368 w 4838076"/>
+              <a:gd name="connsiteY56" fmla="*/ 2471737 h 6858000"/>
+              <a:gd name="connsiteX57" fmla="*/ 152844 w 4838076"/>
+              <a:gd name="connsiteY57" fmla="*/ 2513012 h 6858000"/>
+              <a:gd name="connsiteX58" fmla="*/ 167960 w 4838076"/>
+              <a:gd name="connsiteY58" fmla="*/ 2560637 h 6858000"/>
+              <a:gd name="connsiteX59" fmla="*/ 178038 w 4838076"/>
+              <a:gd name="connsiteY59" fmla="*/ 2613025 h 6858000"/>
+              <a:gd name="connsiteX60" fmla="*/ 188115 w 4838076"/>
+              <a:gd name="connsiteY60" fmla="*/ 2671762 h 6858000"/>
+              <a:gd name="connsiteX61" fmla="*/ 189795 w 4838076"/>
+              <a:gd name="connsiteY61" fmla="*/ 2741612 h 6858000"/>
+              <a:gd name="connsiteX62" fmla="*/ 188115 w 4838076"/>
+              <a:gd name="connsiteY62" fmla="*/ 2809875 h 6858000"/>
+              <a:gd name="connsiteX63" fmla="*/ 178038 w 4838076"/>
+              <a:gd name="connsiteY63" fmla="*/ 2868612 h 6858000"/>
+              <a:gd name="connsiteX64" fmla="*/ 167960 w 4838076"/>
+              <a:gd name="connsiteY64" fmla="*/ 2922587 h 6858000"/>
+              <a:gd name="connsiteX65" fmla="*/ 152844 w 4838076"/>
+              <a:gd name="connsiteY65" fmla="*/ 2967037 h 6858000"/>
+              <a:gd name="connsiteX66" fmla="*/ 134368 w 4838076"/>
+              <a:gd name="connsiteY66" fmla="*/ 3009900 h 6858000"/>
+              <a:gd name="connsiteX67" fmla="*/ 115893 w 4838076"/>
+              <a:gd name="connsiteY67" fmla="*/ 3046412 h 6858000"/>
+              <a:gd name="connsiteX68" fmla="*/ 95738 w 4838076"/>
+              <a:gd name="connsiteY68" fmla="*/ 3084512 h 6858000"/>
+              <a:gd name="connsiteX69" fmla="*/ 75583 w 4838076"/>
+              <a:gd name="connsiteY69" fmla="*/ 3121025 h 6858000"/>
+              <a:gd name="connsiteX70" fmla="*/ 55427 w 4838076"/>
+              <a:gd name="connsiteY70" fmla="*/ 3160712 h 6858000"/>
+              <a:gd name="connsiteX71" fmla="*/ 38632 w 4838076"/>
+              <a:gd name="connsiteY71" fmla="*/ 3201987 h 6858000"/>
+              <a:gd name="connsiteX72" fmla="*/ 23515 w 4838076"/>
+              <a:gd name="connsiteY72" fmla="*/ 3248025 h 6858000"/>
+              <a:gd name="connsiteX73" fmla="*/ 11758 w 4838076"/>
+              <a:gd name="connsiteY73" fmla="*/ 3300412 h 6858000"/>
+              <a:gd name="connsiteX74" fmla="*/ 3359 w 4838076"/>
+              <a:gd name="connsiteY74" fmla="*/ 3360737 h 6858000"/>
+              <a:gd name="connsiteX75" fmla="*/ 0 w 4838076"/>
+              <a:gd name="connsiteY75" fmla="*/ 3427412 h 6858000"/>
+              <a:gd name="connsiteX76" fmla="*/ 3359 w 4838076"/>
+              <a:gd name="connsiteY76" fmla="*/ 3497262 h 6858000"/>
+              <a:gd name="connsiteX77" fmla="*/ 11758 w 4838076"/>
+              <a:gd name="connsiteY77" fmla="*/ 3557587 h 6858000"/>
+              <a:gd name="connsiteX78" fmla="*/ 23515 w 4838076"/>
+              <a:gd name="connsiteY78" fmla="*/ 3609975 h 6858000"/>
+              <a:gd name="connsiteX79" fmla="*/ 38632 w 4838076"/>
+              <a:gd name="connsiteY79" fmla="*/ 3656012 h 6858000"/>
+              <a:gd name="connsiteX80" fmla="*/ 55427 w 4838076"/>
+              <a:gd name="connsiteY80" fmla="*/ 3697287 h 6858000"/>
+              <a:gd name="connsiteX81" fmla="*/ 75583 w 4838076"/>
+              <a:gd name="connsiteY81" fmla="*/ 3736975 h 6858000"/>
+              <a:gd name="connsiteX82" fmla="*/ 115893 w 4838076"/>
+              <a:gd name="connsiteY82" fmla="*/ 3811587 h 6858000"/>
+              <a:gd name="connsiteX83" fmla="*/ 134368 w 4838076"/>
+              <a:gd name="connsiteY83" fmla="*/ 3848100 h 6858000"/>
+              <a:gd name="connsiteX84" fmla="*/ 152844 w 4838076"/>
+              <a:gd name="connsiteY84" fmla="*/ 3890962 h 6858000"/>
+              <a:gd name="connsiteX85" fmla="*/ 167960 w 4838076"/>
+              <a:gd name="connsiteY85" fmla="*/ 3935412 h 6858000"/>
+              <a:gd name="connsiteX86" fmla="*/ 178038 w 4838076"/>
+              <a:gd name="connsiteY86" fmla="*/ 3987800 h 6858000"/>
+              <a:gd name="connsiteX87" fmla="*/ 188115 w 4838076"/>
+              <a:gd name="connsiteY87" fmla="*/ 4048125 h 6858000"/>
+              <a:gd name="connsiteX88" fmla="*/ 189795 w 4838076"/>
+              <a:gd name="connsiteY88" fmla="*/ 4116387 h 6858000"/>
+              <a:gd name="connsiteX89" fmla="*/ 188115 w 4838076"/>
+              <a:gd name="connsiteY89" fmla="*/ 4186237 h 6858000"/>
+              <a:gd name="connsiteX90" fmla="*/ 178038 w 4838076"/>
+              <a:gd name="connsiteY90" fmla="*/ 4244975 h 6858000"/>
+              <a:gd name="connsiteX91" fmla="*/ 167960 w 4838076"/>
+              <a:gd name="connsiteY91" fmla="*/ 4297362 h 6858000"/>
+              <a:gd name="connsiteX92" fmla="*/ 152844 w 4838076"/>
+              <a:gd name="connsiteY92" fmla="*/ 4343400 h 6858000"/>
+              <a:gd name="connsiteX93" fmla="*/ 134368 w 4838076"/>
+              <a:gd name="connsiteY93" fmla="*/ 4386262 h 6858000"/>
+              <a:gd name="connsiteX94" fmla="*/ 115893 w 4838076"/>
+              <a:gd name="connsiteY94" fmla="*/ 4424362 h 6858000"/>
+              <a:gd name="connsiteX95" fmla="*/ 75583 w 4838076"/>
+              <a:gd name="connsiteY95" fmla="*/ 4498975 h 6858000"/>
+              <a:gd name="connsiteX96" fmla="*/ 55427 w 4838076"/>
+              <a:gd name="connsiteY96" fmla="*/ 4537075 h 6858000"/>
+              <a:gd name="connsiteX97" fmla="*/ 38632 w 4838076"/>
+              <a:gd name="connsiteY97" fmla="*/ 4579937 h 6858000"/>
+              <a:gd name="connsiteX98" fmla="*/ 23515 w 4838076"/>
+              <a:gd name="connsiteY98" fmla="*/ 4625975 h 6858000"/>
+              <a:gd name="connsiteX99" fmla="*/ 11758 w 4838076"/>
+              <a:gd name="connsiteY99" fmla="*/ 4678362 h 6858000"/>
+              <a:gd name="connsiteX100" fmla="*/ 3359 w 4838076"/>
+              <a:gd name="connsiteY100" fmla="*/ 4738687 h 6858000"/>
+              <a:gd name="connsiteX101" fmla="*/ 0 w 4838076"/>
+              <a:gd name="connsiteY101" fmla="*/ 4806950 h 6858000"/>
+              <a:gd name="connsiteX102" fmla="*/ 3359 w 4838076"/>
+              <a:gd name="connsiteY102" fmla="*/ 4875212 h 6858000"/>
+              <a:gd name="connsiteX103" fmla="*/ 11758 w 4838076"/>
+              <a:gd name="connsiteY103" fmla="*/ 4935537 h 6858000"/>
+              <a:gd name="connsiteX104" fmla="*/ 23515 w 4838076"/>
+              <a:gd name="connsiteY104" fmla="*/ 4987925 h 6858000"/>
+              <a:gd name="connsiteX105" fmla="*/ 38632 w 4838076"/>
+              <a:gd name="connsiteY105" fmla="*/ 5033962 h 6858000"/>
+              <a:gd name="connsiteX106" fmla="*/ 55427 w 4838076"/>
+              <a:gd name="connsiteY106" fmla="*/ 5075237 h 6858000"/>
+              <a:gd name="connsiteX107" fmla="*/ 75583 w 4838076"/>
+              <a:gd name="connsiteY107" fmla="*/ 5114925 h 6858000"/>
+              <a:gd name="connsiteX108" fmla="*/ 95738 w 4838076"/>
+              <a:gd name="connsiteY108" fmla="*/ 5149850 h 6858000"/>
+              <a:gd name="connsiteX109" fmla="*/ 115893 w 4838076"/>
+              <a:gd name="connsiteY109" fmla="*/ 5186362 h 6858000"/>
+              <a:gd name="connsiteX110" fmla="*/ 134368 w 4838076"/>
+              <a:gd name="connsiteY110" fmla="*/ 5226050 h 6858000"/>
+              <a:gd name="connsiteX111" fmla="*/ 152844 w 4838076"/>
+              <a:gd name="connsiteY111" fmla="*/ 5268912 h 6858000"/>
+              <a:gd name="connsiteX112" fmla="*/ 167960 w 4838076"/>
+              <a:gd name="connsiteY112" fmla="*/ 5313362 h 6858000"/>
+              <a:gd name="connsiteX113" fmla="*/ 178038 w 4838076"/>
+              <a:gd name="connsiteY113" fmla="*/ 5365750 h 6858000"/>
+              <a:gd name="connsiteX114" fmla="*/ 188115 w 4838076"/>
+              <a:gd name="connsiteY114" fmla="*/ 5426075 h 6858000"/>
+              <a:gd name="connsiteX115" fmla="*/ 189795 w 4838076"/>
+              <a:gd name="connsiteY115" fmla="*/ 5494337 h 6858000"/>
+              <a:gd name="connsiteX116" fmla="*/ 188115 w 4838076"/>
+              <a:gd name="connsiteY116" fmla="*/ 5562600 h 6858000"/>
+              <a:gd name="connsiteX117" fmla="*/ 178038 w 4838076"/>
+              <a:gd name="connsiteY117" fmla="*/ 5622925 h 6858000"/>
+              <a:gd name="connsiteX118" fmla="*/ 167960 w 4838076"/>
+              <a:gd name="connsiteY118" fmla="*/ 5675312 h 6858000"/>
+              <a:gd name="connsiteX119" fmla="*/ 152844 w 4838076"/>
+              <a:gd name="connsiteY119" fmla="*/ 5721350 h 6858000"/>
+              <a:gd name="connsiteX120" fmla="*/ 134368 w 4838076"/>
+              <a:gd name="connsiteY120" fmla="*/ 5762625 h 6858000"/>
+              <a:gd name="connsiteX121" fmla="*/ 115893 w 4838076"/>
+              <a:gd name="connsiteY121" fmla="*/ 5802312 h 6858000"/>
+              <a:gd name="connsiteX122" fmla="*/ 95738 w 4838076"/>
+              <a:gd name="connsiteY122" fmla="*/ 5840412 h 6858000"/>
+              <a:gd name="connsiteX123" fmla="*/ 75583 w 4838076"/>
+              <a:gd name="connsiteY123" fmla="*/ 5876925 h 6858000"/>
+              <a:gd name="connsiteX124" fmla="*/ 55427 w 4838076"/>
+              <a:gd name="connsiteY124" fmla="*/ 5915025 h 6858000"/>
+              <a:gd name="connsiteX125" fmla="*/ 38632 w 4838076"/>
+              <a:gd name="connsiteY125" fmla="*/ 5956300 h 6858000"/>
+              <a:gd name="connsiteX126" fmla="*/ 23515 w 4838076"/>
+              <a:gd name="connsiteY126" fmla="*/ 6003925 h 6858000"/>
+              <a:gd name="connsiteX127" fmla="*/ 11758 w 4838076"/>
+              <a:gd name="connsiteY127" fmla="*/ 6056312 h 6858000"/>
+              <a:gd name="connsiteX128" fmla="*/ 3359 w 4838076"/>
+              <a:gd name="connsiteY128" fmla="*/ 6113462 h 6858000"/>
+              <a:gd name="connsiteX129" fmla="*/ 0 w 4838076"/>
+              <a:gd name="connsiteY129" fmla="*/ 6183312 h 6858000"/>
+              <a:gd name="connsiteX130" fmla="*/ 3359 w 4838076"/>
+              <a:gd name="connsiteY130" fmla="*/ 6251575 h 6858000"/>
+              <a:gd name="connsiteX131" fmla="*/ 11758 w 4838076"/>
+              <a:gd name="connsiteY131" fmla="*/ 6311900 h 6858000"/>
+              <a:gd name="connsiteX132" fmla="*/ 23515 w 4838076"/>
+              <a:gd name="connsiteY132" fmla="*/ 6361112 h 6858000"/>
+              <a:gd name="connsiteX133" fmla="*/ 38632 w 4838076"/>
+              <a:gd name="connsiteY133" fmla="*/ 6407150 h 6858000"/>
+              <a:gd name="connsiteX134" fmla="*/ 55427 w 4838076"/>
+              <a:gd name="connsiteY134" fmla="*/ 6448425 h 6858000"/>
+              <a:gd name="connsiteX135" fmla="*/ 73903 w 4838076"/>
+              <a:gd name="connsiteY135" fmla="*/ 6488112 h 6858000"/>
+              <a:gd name="connsiteX136" fmla="*/ 92379 w 4838076"/>
+              <a:gd name="connsiteY136" fmla="*/ 6523037 h 6858000"/>
+              <a:gd name="connsiteX137" fmla="*/ 112534 w 4838076"/>
+              <a:gd name="connsiteY137" fmla="*/ 6561137 h 6858000"/>
+              <a:gd name="connsiteX138" fmla="*/ 132689 w 4838076"/>
+              <a:gd name="connsiteY138" fmla="*/ 6597650 h 6858000"/>
+              <a:gd name="connsiteX139" fmla="*/ 149485 w 4838076"/>
+              <a:gd name="connsiteY139" fmla="*/ 6640512 h 6858000"/>
+              <a:gd name="connsiteX140" fmla="*/ 166281 w 4838076"/>
+              <a:gd name="connsiteY140" fmla="*/ 6683375 h 6858000"/>
+              <a:gd name="connsiteX141" fmla="*/ 176358 w 4838076"/>
+              <a:gd name="connsiteY141" fmla="*/ 6735762 h 6858000"/>
+              <a:gd name="connsiteX142" fmla="*/ 184756 w 4838076"/>
+              <a:gd name="connsiteY142" fmla="*/ 6791325 h 6858000"/>
+              <a:gd name="connsiteX143" fmla="*/ 189795 w 4838076"/>
+              <a:gd name="connsiteY143" fmla="*/ 6858000 h 6858000"/>
+              <a:gd name="connsiteX144" fmla="*/ 334173 w 4838076"/>
+              <a:gd name="connsiteY144" fmla="*/ 6858000 h 6858000"/>
+              <a:gd name="connsiteX145" fmla="*/ 334174 w 4838076"/>
+              <a:gd name="connsiteY145" fmla="*/ 6858000 h 6858000"/>
+              <a:gd name="connsiteX146" fmla="*/ 3459219 w 4838076"/>
+              <a:gd name="connsiteY146" fmla="*/ 6858000 h 6858000"/>
+              <a:gd name="connsiteX147" fmla="*/ 4417162 w 4838076"/>
+              <a:gd name="connsiteY147" fmla="*/ 6858000 h 6858000"/>
+              <a:gd name="connsiteX148" fmla="*/ 4838076 w 4838076"/>
+              <a:gd name="connsiteY148" fmla="*/ 6858000 h 6858000"/>
+            </a:gdLst>
+            <a:ahLst/>
+            <a:cxnLst>
+              <a:cxn ang="0">
+                <a:pos x="connsiteX0" y="connsiteY0"/>
+              </a:cxn>
+              <a:cxn ang="0">
+                <a:pos x="connsiteX1" y="connsiteY1"/>
+              </a:cxn>
+              <a:cxn ang="0">
+                <a:pos x="connsiteX2" y="connsiteY2"/>
+              </a:cxn>
+              <a:cxn ang="0">
+                <a:pos x="connsiteX3" y="connsiteY3"/>
+              </a:cxn>
+              <a:cxn ang="0">
+                <a:pos x="connsiteX4" y="connsiteY4"/>
+              </a:cxn>
+              <a:cxn ang="0">
+                <a:pos x="connsiteX5" y="connsiteY5"/>
+              </a:cxn>
+              <a:cxn ang="0">
+                <a:pos x="connsiteX6" y="connsiteY6"/>
+              </a:cxn>
+              <a:cxn ang="0">
+                <a:pos x="connsiteX7" y="connsiteY7"/>
+              </a:cxn>
+              <a:cxn ang="0">
+                <a:pos x="connsiteX8" y="connsiteY8"/>
+              </a:cxn>
+              <a:cxn ang="0">
+                <a:pos x="connsiteX9" y="connsiteY9"/>
+              </a:cxn>
+              <a:cxn ang="0">
+                <a:pos x="connsiteX10" y="connsiteY10"/>
+              </a:cxn>
+              <a:cxn ang="0">
+                <a:pos x="connsiteX11" y="connsiteY11"/>
+              </a:cxn>
+              <a:cxn ang="0">
+                <a:pos x="connsiteX12" y="connsiteY12"/>
+              </a:cxn>
+              <a:cxn ang="0">
+                <a:pos x="connsiteX13" y="connsiteY13"/>
+              </a:cxn>
+              <a:cxn ang="0">
+                <a:pos x="connsiteX14" y="connsiteY14"/>
+              </a:cxn>
+              <a:cxn ang="0">
+                <a:pos x="connsiteX15" y="connsiteY15"/>
+              </a:cxn>
+              <a:cxn ang="0">
+                <a:pos x="connsiteX16" y="connsiteY16"/>
+              </a:cxn>
+              <a:cxn ang="0">
+                <a:pos x="connsiteX17" y="connsiteY17"/>
+              </a:cxn>
+              <a:cxn ang="0">
+                <a:pos x="connsiteX18" y="connsiteY18"/>
+              </a:cxn>
+              <a:cxn ang="0">
+                <a:pos x="connsiteX19" y="connsiteY19"/>
+              </a:cxn>
+              <a:cxn ang="0">
+                <a:pos x="connsiteX20" y="connsiteY20"/>
+              </a:cxn>
+              <a:cxn ang="0">
+                <a:pos x="connsiteX21" y="connsiteY21"/>
+              </a:cxn>
+              <a:cxn ang="0">
+                <a:pos x="connsiteX22" y="connsiteY22"/>
+              </a:cxn>
+              <a:cxn ang="0">
+                <a:pos x="connsiteX23" y="connsiteY23"/>
+              </a:cxn>
+              <a:cxn ang="0">
+                <a:pos x="connsiteX24" y="connsiteY24"/>
+              </a:cxn>
+              <a:cxn ang="0">
+                <a:pos x="connsiteX25" y="connsiteY25"/>
+              </a:cxn>
+              <a:cxn ang="0">
+                <a:pos x="connsiteX26" y="connsiteY26"/>
+              </a:cxn>
+              <a:cxn ang="0">
+                <a:pos x="connsiteX27" y="connsiteY27"/>
+              </a:cxn>
+              <a:cxn ang="0">
+                <a:pos x="connsiteX28" y="connsiteY28"/>
+              </a:cxn>
+              <a:cxn ang="0">
+                <a:pos x="connsiteX29" y="connsiteY29"/>
+              </a:cxn>
+              <a:cxn ang="0">
+                <a:pos x="connsiteX30" y="connsiteY30"/>
+              </a:cxn>
+              <a:cxn ang="0">
+                <a:pos x="connsiteX31" y="connsiteY31"/>
+              </a:cxn>
+              <a:cxn ang="0">
+                <a:pos x="connsiteX32" y="connsiteY32"/>
+              </a:cxn>
+              <a:cxn ang="0">
+                <a:pos x="connsiteX33" y="connsiteY33"/>
+              </a:cxn>
+              <a:cxn ang="0">
+                <a:pos x="connsiteX34" y="connsiteY34"/>
+              </a:cxn>
+              <a:cxn ang="0">
+                <a:pos x="connsiteX35" y="connsiteY35"/>
+              </a:cxn>
+              <a:cxn ang="0">
+                <a:pos x="connsiteX36" y="connsiteY36"/>
+              </a:cxn>
+              <a:cxn ang="0">
+                <a:pos x="connsiteX37" y="connsiteY37"/>
+              </a:cxn>
+              <a:cxn ang="0">
+                <a:pos x="connsiteX38" y="connsiteY38"/>
+              </a:cxn>
+              <a:cxn ang="0">
+                <a:pos x="connsiteX39" y="connsiteY39"/>
+              </a:cxn>
+              <a:cxn ang="0">
+                <a:pos x="connsiteX40" y="connsiteY40"/>
+              </a:cxn>
+              <a:cxn ang="0">
+                <a:pos x="connsiteX41" y="connsiteY41"/>
+              </a:cxn>
+              <a:cxn ang="0">
+                <a:pos x="connsiteX42" y="connsiteY42"/>
+              </a:cxn>
+              <a:cxn ang="0">
+                <a:pos x="connsiteX43" y="connsiteY43"/>
+              </a:cxn>
+              <a:cxn ang="0">
+                <a:pos x="connsiteX44" y="connsiteY44"/>
+              </a:cxn>
+              <a:cxn ang="0">
+                <a:pos x="connsiteX45" y="connsiteY45"/>
+              </a:cxn>
+              <a:cxn ang="0">
+                <a:pos x="connsiteX46" y="connsiteY46"/>
+              </a:cxn>
+              <a:cxn ang="0">
+                <a:pos x="connsiteX47" y="connsiteY47"/>
+              </a:cxn>
+              <a:cxn ang="0">
+                <a:pos x="connsiteX48" y="connsiteY48"/>
+              </a:cxn>
+              <a:cxn ang="0">
+                <a:pos x="connsiteX49" y="connsiteY49"/>
+              </a:cxn>
+              <a:cxn ang="0">
+                <a:pos x="connsiteX50" y="connsiteY50"/>
+              </a:cxn>
+              <a:cxn ang="0">
+                <a:pos x="connsiteX51" y="connsiteY51"/>
+              </a:cxn>
+              <a:cxn ang="0">
+                <a:pos x="connsiteX52" y="connsiteY52"/>
+              </a:cxn>
+              <a:cxn ang="0">
+                <a:pos x="connsiteX53" y="connsiteY53"/>
+              </a:cxn>
+              <a:cxn ang="0">
+                <a:pos x="connsiteX54" y="connsiteY54"/>
+              </a:cxn>
+              <a:cxn ang="0">
+                <a:pos x="connsiteX55" y="connsiteY55"/>
+              </a:cxn>
+              <a:cxn ang="0">
+                <a:pos x="connsiteX56" y="connsiteY56"/>
+              </a:cxn>
+              <a:cxn ang="0">
+                <a:pos x="connsiteX57" y="connsiteY57"/>
+              </a:cxn>
+              <a:cxn ang="0">
+                <a:pos x="connsiteX58" y="connsiteY58"/>
+              </a:cxn>
+              <a:cxn ang="0">
+                <a:pos x="connsiteX59" y="connsiteY59"/>
+              </a:cxn>
+              <a:cxn ang="0">
+                <a:pos x="connsiteX60" y="connsiteY60"/>
+              </a:cxn>
+              <a:cxn ang="0">
+                <a:pos x="connsiteX61" y="connsiteY61"/>
+              </a:cxn>
+              <a:cxn ang="0">
+                <a:pos x="connsiteX62" y="connsiteY62"/>
+              </a:cxn>
+              <a:cxn ang="0">
+                <a:pos x="connsiteX63" y="connsiteY63"/>
+              </a:cxn>
+              <a:cxn ang="0">
+                <a:pos x="connsiteX64" y="connsiteY64"/>
+              </a:cxn>
+              <a:cxn ang="0">
+                <a:pos x="connsiteX65" y="connsiteY65"/>
+              </a:cxn>
+              <a:cxn ang="0">
+                <a:pos x="connsiteX66" y="connsiteY66"/>
+              </a:cxn>
+              <a:cxn ang="0">
+                <a:pos x="connsiteX67" y="connsiteY67"/>
+              </a:cxn>
+              <a:cxn ang="0">
+                <a:pos x="connsiteX68" y="connsiteY68"/>
+              </a:cxn>
+              <a:cxn ang="0">
+                <a:pos x="connsiteX69" y="connsiteY69"/>
+              </a:cxn>
+              <a:cxn ang="0">
+                <a:pos x="connsiteX70" y="connsiteY70"/>
+              </a:cxn>
+              <a:cxn ang="0">
+                <a:pos x="connsiteX71" y="connsiteY71"/>
+              </a:cxn>
+              <a:cxn ang="0">
+                <a:pos x="connsiteX72" y="connsiteY72"/>
+              </a:cxn>
+              <a:cxn ang="0">
+                <a:pos x="connsiteX73" y="connsiteY73"/>
+              </a:cxn>
+              <a:cxn ang="0">
+                <a:pos x="connsiteX74" y="connsiteY74"/>
+              </a:cxn>
+              <a:cxn ang="0">
+                <a:pos x="connsiteX75" y="connsiteY75"/>
+              </a:cxn>
+              <a:cxn ang="0">
+                <a:pos x="connsiteX76" y="connsiteY76"/>
+              </a:cxn>
+              <a:cxn ang="0">
+                <a:pos x="connsiteX77" y="connsiteY77"/>
+              </a:cxn>
+              <a:cxn ang="0">
+                <a:pos x="connsiteX78" y="connsiteY78"/>
+              </a:cxn>
+              <a:cxn ang="0">
+                <a:pos x="connsiteX79" y="connsiteY79"/>
+              </a:cxn>
+              <a:cxn ang="0">
+                <a:pos x="connsiteX80" y="connsiteY80"/>
+              </a:cxn>
+              <a:cxn ang="0">
+                <a:pos x="connsiteX81" y="connsiteY81"/>
+              </a:cxn>
+              <a:cxn ang="0">
+                <a:pos x="connsiteX82" y="connsiteY82"/>
+              </a:cxn>
+              <a:cxn ang="0">
+                <a:pos x="connsiteX83" y="connsiteY83"/>
+              </a:cxn>
+              <a:cxn ang="0">
+                <a:pos x="connsiteX84" y="connsiteY84"/>
+              </a:cxn>
+              <a:cxn ang="0">
+                <a:pos x="connsiteX85" y="connsiteY85"/>
+              </a:cxn>
+              <a:cxn ang="0">
+                <a:pos x="connsiteX86" y="connsiteY86"/>
+              </a:cxn>
+              <a:cxn ang="0">
+                <a:pos x="connsiteX87" y="connsiteY87"/>
+              </a:cxn>
+              <a:cxn ang="0">
+                <a:pos x="connsiteX88" y="connsiteY88"/>
+              </a:cxn>
+              <a:cxn ang="0">
+                <a:pos x="connsiteX89" y="connsiteY89"/>
+              </a:cxn>
+              <a:cxn ang="0">
+                <a:pos x="connsiteX90" y="connsiteY90"/>
+              </a:cxn>
+              <a:cxn ang="0">
+                <a:pos x="connsiteX91" y="connsiteY91"/>
+              </a:cxn>
+              <a:cxn ang="0">
+                <a:pos x="connsiteX92" y="connsiteY92"/>
+              </a:cxn>
+              <a:cxn ang="0">
+                <a:pos x="connsiteX93" y="connsiteY93"/>
+              </a:cxn>
+              <a:cxn ang="0">
+                <a:pos x="connsiteX94" y="connsiteY94"/>
+              </a:cxn>
+              <a:cxn ang="0">
+                <a:pos x="connsiteX95" y="connsiteY95"/>
+              </a:cxn>
+              <a:cxn ang="0">
+                <a:pos x="connsiteX96" y="connsiteY96"/>
+              </a:cxn>
+              <a:cxn ang="0">
+                <a:pos x="connsiteX97" y="connsiteY97"/>
+              </a:cxn>
+              <a:cxn ang="0">
+                <a:pos x="connsiteX98" y="connsiteY98"/>
+              </a:cxn>
+              <a:cxn ang="0">
+                <a:pos x="connsiteX99" y="connsiteY99"/>
+              </a:cxn>
+              <a:cxn ang="0">
+                <a:pos x="connsiteX100" y="connsiteY100"/>
+              </a:cxn>
+              <a:cxn ang="0">
+                <a:pos x="connsiteX101" y="connsiteY101"/>
+              </a:cxn>
+              <a:cxn ang="0">
+                <a:pos x="connsiteX102" y="connsiteY102"/>
+              </a:cxn>
+              <a:cxn ang="0">
+                <a:pos x="connsiteX103" y="connsiteY103"/>
+              </a:cxn>
+              <a:cxn ang="0">
+                <a:pos x="connsiteX104" y="connsiteY104"/>
+              </a:cxn>
+              <a:cxn ang="0">
+                <a:pos x="connsiteX105" y="connsiteY105"/>
+              </a:cxn>
+              <a:cxn ang="0">
+                <a:pos x="connsiteX106" y="connsiteY106"/>
+              </a:cxn>
+              <a:cxn ang="0">
+                <a:pos x="connsiteX107" y="connsiteY107"/>
+              </a:cxn>
+              <a:cxn ang="0">
+                <a:pos x="connsiteX108" y="connsiteY108"/>
+              </a:cxn>
+              <a:cxn ang="0">
+                <a:pos x="connsiteX109" y="connsiteY109"/>
+              </a:cxn>
+              <a:cxn ang="0">
+                <a:pos x="connsiteX110" y="connsiteY110"/>
+              </a:cxn>
+              <a:cxn ang="0">
+                <a:pos x="connsiteX111" y="connsiteY111"/>
+              </a:cxn>
+              <a:cxn ang="0">
+                <a:pos x="connsiteX112" y="connsiteY112"/>
+              </a:cxn>
+              <a:cxn ang="0">
+                <a:pos x="connsiteX113" y="connsiteY113"/>
+              </a:cxn>
+              <a:cxn ang="0">
+                <a:pos x="connsiteX114" y="connsiteY114"/>
+              </a:cxn>
+              <a:cxn ang="0">
+                <a:pos x="connsiteX115" y="connsiteY115"/>
+              </a:cxn>
+              <a:cxn ang="0">
+                <a:pos x="connsiteX116" y="connsiteY116"/>
+              </a:cxn>
+              <a:cxn ang="0">
+                <a:pos x="connsiteX117" y="connsiteY117"/>
+              </a:cxn>
+              <a:cxn ang="0">
+                <a:pos x="connsiteX118" y="connsiteY118"/>
+              </a:cxn>
+              <a:cxn ang="0">
+                <a:pos x="connsiteX119" y="connsiteY119"/>
+              </a:cxn>
+              <a:cxn ang="0">
+                <a:pos x="connsiteX120" y="connsiteY120"/>
+              </a:cxn>
+              <a:cxn ang="0">
+                <a:pos x="connsiteX121" y="connsiteY121"/>
+              </a:cxn>
+              <a:cxn ang="0">
+                <a:pos x="connsiteX122" y="connsiteY122"/>
+              </a:cxn>
+              <a:cxn ang="0">
+                <a:pos x="connsiteX123" y="connsiteY123"/>
+              </a:cxn>
+              <a:cxn ang="0">
+                <a:pos x="connsiteX124" y="connsiteY124"/>
+              </a:cxn>
+              <a:cxn ang="0">
+                <a:pos x="connsiteX125" y="connsiteY125"/>
+              </a:cxn>
+              <a:cxn ang="0">
+                <a:pos x="connsiteX126" y="connsiteY126"/>
+              </a:cxn>
+              <a:cxn ang="0">
+                <a:pos x="connsiteX127" y="connsiteY127"/>
+              </a:cxn>
+              <a:cxn ang="0">
+                <a:pos x="connsiteX128" y="connsiteY128"/>
+              </a:cxn>
+              <a:cxn ang="0">
+                <a:pos x="connsiteX129" y="connsiteY129"/>
+              </a:cxn>
+              <a:cxn ang="0">
+                <a:pos x="connsiteX130" y="connsiteY130"/>
+              </a:cxn>
+              <a:cxn ang="0">
+                <a:pos x="connsiteX131" y="connsiteY131"/>
+              </a:cxn>
+              <a:cxn ang="0">
+                <a:pos x="connsiteX132" y="connsiteY132"/>
+              </a:cxn>
+              <a:cxn ang="0">
+                <a:pos x="connsiteX133" y="connsiteY133"/>
+              </a:cxn>
+              <a:cxn ang="0">
+                <a:pos x="connsiteX134" y="connsiteY134"/>
+              </a:cxn>
+              <a:cxn ang="0">
+                <a:pos x="connsiteX135" y="connsiteY135"/>
+              </a:cxn>
+              <a:cxn ang="0">
+                <a:pos x="connsiteX136" y="connsiteY136"/>
+              </a:cxn>
+              <a:cxn ang="0">
+                <a:pos x="connsiteX137" y="connsiteY137"/>
+              </a:cxn>
+              <a:cxn ang="0">
+                <a:pos x="connsiteX138" y="connsiteY138"/>
+              </a:cxn>
+              <a:cxn ang="0">
+                <a:pos x="connsiteX139" y="connsiteY139"/>
+              </a:cxn>
+              <a:cxn ang="0">
+                <a:pos x="connsiteX140" y="connsiteY140"/>
+              </a:cxn>
+              <a:cxn ang="0">
+                <a:pos x="connsiteX141" y="connsiteY141"/>
+              </a:cxn>
+              <a:cxn ang="0">
+                <a:pos x="connsiteX142" y="connsiteY142"/>
+              </a:cxn>
+              <a:cxn ang="0">
+                <a:pos x="connsiteX143" y="connsiteY143"/>
+              </a:cxn>
+              <a:cxn ang="0">
+                <a:pos x="connsiteX144" y="connsiteY144"/>
+              </a:cxn>
+              <a:cxn ang="0">
+                <a:pos x="connsiteX145" y="connsiteY145"/>
+              </a:cxn>
+              <a:cxn ang="0">
+                <a:pos x="connsiteX146" y="connsiteY146"/>
+              </a:cxn>
+              <a:cxn ang="0">
+                <a:pos x="connsiteX147" y="connsiteY147"/>
+              </a:cxn>
+              <a:cxn ang="0">
+                <a:pos x="connsiteX148" y="connsiteY148"/>
+              </a:cxn>
+            </a:cxnLst>
+            <a:rect l="l" t="t" r="r" b="b"/>
+            <a:pathLst>
+              <a:path w="4838076" h="6858000">
+                <a:moveTo>
+                  <a:pt x="4838076" y="0"/>
+                </a:moveTo>
+                <a:lnTo>
+                  <a:pt x="4417162" y="0"/>
+                </a:lnTo>
+                <a:lnTo>
+                  <a:pt x="3459219" y="0"/>
+                </a:lnTo>
+                <a:lnTo>
+                  <a:pt x="334174" y="0"/>
+                </a:lnTo>
+                <a:lnTo>
+                  <a:pt x="334173" y="0"/>
+                </a:lnTo>
+                <a:lnTo>
+                  <a:pt x="189795" y="0"/>
+                </a:lnTo>
+                <a:lnTo>
+                  <a:pt x="184756" y="66675"/>
+                </a:lnTo>
+                <a:lnTo>
+                  <a:pt x="176358" y="122237"/>
+                </a:lnTo>
+                <a:lnTo>
+                  <a:pt x="166281" y="174625"/>
+                </a:lnTo>
+                <a:lnTo>
+                  <a:pt x="149485" y="217487"/>
+                </a:lnTo>
+                <a:lnTo>
+                  <a:pt x="132689" y="260350"/>
+                </a:lnTo>
+                <a:lnTo>
+                  <a:pt x="112534" y="296862"/>
+                </a:lnTo>
+                <a:lnTo>
+                  <a:pt x="92379" y="334962"/>
+                </a:lnTo>
+                <a:lnTo>
+                  <a:pt x="73903" y="369887"/>
+                </a:lnTo>
+                <a:lnTo>
+                  <a:pt x="55427" y="409575"/>
+                </a:lnTo>
+                <a:lnTo>
+                  <a:pt x="38632" y="450850"/>
+                </a:lnTo>
+                <a:lnTo>
+                  <a:pt x="23515" y="496887"/>
+                </a:lnTo>
+                <a:lnTo>
+                  <a:pt x="11758" y="546100"/>
+                </a:lnTo>
+                <a:lnTo>
+                  <a:pt x="3359" y="606425"/>
+                </a:lnTo>
+                <a:lnTo>
+                  <a:pt x="0" y="673100"/>
+                </a:lnTo>
+                <a:lnTo>
+                  <a:pt x="3359" y="744537"/>
+                </a:lnTo>
+                <a:lnTo>
+                  <a:pt x="11758" y="801687"/>
+                </a:lnTo>
+                <a:lnTo>
+                  <a:pt x="23515" y="854075"/>
+                </a:lnTo>
+                <a:lnTo>
+                  <a:pt x="38632" y="901700"/>
+                </a:lnTo>
+                <a:lnTo>
+                  <a:pt x="55427" y="942975"/>
+                </a:lnTo>
+                <a:lnTo>
+                  <a:pt x="75583" y="981075"/>
+                </a:lnTo>
+                <a:lnTo>
+                  <a:pt x="95738" y="1017587"/>
+                </a:lnTo>
+                <a:lnTo>
+                  <a:pt x="115893" y="1055687"/>
+                </a:lnTo>
+                <a:lnTo>
+                  <a:pt x="134368" y="1095375"/>
+                </a:lnTo>
+                <a:lnTo>
+                  <a:pt x="152844" y="1136650"/>
+                </a:lnTo>
+                <a:lnTo>
+                  <a:pt x="167960" y="1182687"/>
+                </a:lnTo>
+                <a:lnTo>
+                  <a:pt x="178038" y="1235075"/>
+                </a:lnTo>
+                <a:lnTo>
+                  <a:pt x="188115" y="1295400"/>
+                </a:lnTo>
+                <a:lnTo>
+                  <a:pt x="189795" y="1363662"/>
+                </a:lnTo>
+                <a:lnTo>
+                  <a:pt x="188115" y="1431925"/>
+                </a:lnTo>
+                <a:lnTo>
+                  <a:pt x="178038" y="1492250"/>
+                </a:lnTo>
+                <a:lnTo>
+                  <a:pt x="167960" y="1544637"/>
+                </a:lnTo>
+                <a:lnTo>
+                  <a:pt x="152844" y="1589087"/>
+                </a:lnTo>
+                <a:lnTo>
+                  <a:pt x="134368" y="1631950"/>
+                </a:lnTo>
+                <a:lnTo>
+                  <a:pt x="115893" y="1671637"/>
+                </a:lnTo>
+                <a:lnTo>
+                  <a:pt x="95738" y="1708150"/>
+                </a:lnTo>
+                <a:lnTo>
+                  <a:pt x="75583" y="1743075"/>
+                </a:lnTo>
+                <a:lnTo>
+                  <a:pt x="55427" y="1782762"/>
+                </a:lnTo>
+                <a:lnTo>
+                  <a:pt x="38632" y="1824037"/>
+                </a:lnTo>
+                <a:lnTo>
+                  <a:pt x="23515" y="1870075"/>
+                </a:lnTo>
+                <a:lnTo>
+                  <a:pt x="11758" y="1922462"/>
+                </a:lnTo>
+                <a:lnTo>
+                  <a:pt x="3359" y="1982787"/>
+                </a:lnTo>
+                <a:lnTo>
+                  <a:pt x="0" y="2051050"/>
+                </a:lnTo>
+                <a:lnTo>
+                  <a:pt x="3359" y="2119312"/>
+                </a:lnTo>
+                <a:lnTo>
+                  <a:pt x="11758" y="2179637"/>
+                </a:lnTo>
+                <a:lnTo>
+                  <a:pt x="23515" y="2232025"/>
+                </a:lnTo>
+                <a:lnTo>
+                  <a:pt x="38632" y="2278062"/>
+                </a:lnTo>
+                <a:lnTo>
+                  <a:pt x="55427" y="2319337"/>
+                </a:lnTo>
+                <a:lnTo>
+                  <a:pt x="75583" y="2359025"/>
+                </a:lnTo>
+                <a:lnTo>
+                  <a:pt x="95738" y="2395537"/>
+                </a:lnTo>
+                <a:lnTo>
+                  <a:pt x="115893" y="2433637"/>
+                </a:lnTo>
+                <a:lnTo>
+                  <a:pt x="134368" y="2471737"/>
+                </a:lnTo>
+                <a:lnTo>
+                  <a:pt x="152844" y="2513012"/>
+                </a:lnTo>
+                <a:lnTo>
+                  <a:pt x="167960" y="2560637"/>
+                </a:lnTo>
+                <a:lnTo>
+                  <a:pt x="178038" y="2613025"/>
+                </a:lnTo>
+                <a:lnTo>
+                  <a:pt x="188115" y="2671762"/>
+                </a:lnTo>
+                <a:lnTo>
+                  <a:pt x="189795" y="2741612"/>
+                </a:lnTo>
+                <a:lnTo>
+                  <a:pt x="188115" y="2809875"/>
+                </a:lnTo>
+                <a:lnTo>
+                  <a:pt x="178038" y="2868612"/>
+                </a:lnTo>
+                <a:lnTo>
+                  <a:pt x="167960" y="2922587"/>
+                </a:lnTo>
+                <a:lnTo>
+                  <a:pt x="152844" y="2967037"/>
+                </a:lnTo>
+                <a:lnTo>
+                  <a:pt x="134368" y="3009900"/>
+                </a:lnTo>
+                <a:lnTo>
+                  <a:pt x="115893" y="3046412"/>
+                </a:lnTo>
+                <a:lnTo>
+                  <a:pt x="95738" y="3084512"/>
+                </a:lnTo>
+                <a:lnTo>
+                  <a:pt x="75583" y="3121025"/>
+                </a:lnTo>
+                <a:lnTo>
+                  <a:pt x="55427" y="3160712"/>
+                </a:lnTo>
+                <a:lnTo>
+                  <a:pt x="38632" y="3201987"/>
+                </a:lnTo>
+                <a:lnTo>
+                  <a:pt x="23515" y="3248025"/>
+                </a:lnTo>
+                <a:lnTo>
+                  <a:pt x="11758" y="3300412"/>
+                </a:lnTo>
+                <a:lnTo>
+                  <a:pt x="3359" y="3360737"/>
+                </a:lnTo>
+                <a:lnTo>
+                  <a:pt x="0" y="3427412"/>
+                </a:lnTo>
+                <a:lnTo>
+                  <a:pt x="3359" y="3497262"/>
+                </a:lnTo>
+                <a:lnTo>
+                  <a:pt x="11758" y="3557587"/>
+                </a:lnTo>
+                <a:lnTo>
+                  <a:pt x="23515" y="3609975"/>
+                </a:lnTo>
+                <a:lnTo>
+                  <a:pt x="38632" y="3656012"/>
+                </a:lnTo>
+                <a:lnTo>
+                  <a:pt x="55427" y="3697287"/>
+                </a:lnTo>
+                <a:lnTo>
+                  <a:pt x="75583" y="3736975"/>
+                </a:lnTo>
+                <a:lnTo>
+                  <a:pt x="115893" y="3811587"/>
+                </a:lnTo>
+                <a:lnTo>
+                  <a:pt x="134368" y="3848100"/>
+                </a:lnTo>
+                <a:lnTo>
+                  <a:pt x="152844" y="3890962"/>
+                </a:lnTo>
+                <a:lnTo>
+                  <a:pt x="167960" y="3935412"/>
+                </a:lnTo>
+                <a:lnTo>
+                  <a:pt x="178038" y="3987800"/>
+                </a:lnTo>
+                <a:lnTo>
+                  <a:pt x="188115" y="4048125"/>
+                </a:lnTo>
+                <a:lnTo>
+                  <a:pt x="189795" y="4116387"/>
+                </a:lnTo>
+                <a:lnTo>
+                  <a:pt x="188115" y="4186237"/>
+                </a:lnTo>
+                <a:lnTo>
+                  <a:pt x="178038" y="4244975"/>
+                </a:lnTo>
+                <a:lnTo>
+                  <a:pt x="167960" y="4297362"/>
+                </a:lnTo>
+                <a:lnTo>
+                  <a:pt x="152844" y="4343400"/>
+                </a:lnTo>
+                <a:lnTo>
+                  <a:pt x="134368" y="4386262"/>
+                </a:lnTo>
+                <a:lnTo>
+                  <a:pt x="115893" y="4424362"/>
+                </a:lnTo>
+                <a:lnTo>
+                  <a:pt x="75583" y="4498975"/>
+                </a:lnTo>
+                <a:lnTo>
+                  <a:pt x="55427" y="4537075"/>
+                </a:lnTo>
+                <a:lnTo>
+                  <a:pt x="38632" y="4579937"/>
+                </a:lnTo>
+                <a:lnTo>
+                  <a:pt x="23515" y="4625975"/>
+                </a:lnTo>
+                <a:lnTo>
+                  <a:pt x="11758" y="4678362"/>
+                </a:lnTo>
+                <a:lnTo>
+                  <a:pt x="3359" y="4738687"/>
+                </a:lnTo>
+                <a:lnTo>
+                  <a:pt x="0" y="4806950"/>
+                </a:lnTo>
+                <a:lnTo>
+                  <a:pt x="3359" y="4875212"/>
+                </a:lnTo>
+                <a:lnTo>
+                  <a:pt x="11758" y="4935537"/>
+                </a:lnTo>
+                <a:lnTo>
+                  <a:pt x="23515" y="4987925"/>
+                </a:lnTo>
+                <a:lnTo>
+                  <a:pt x="38632" y="5033962"/>
+                </a:lnTo>
+                <a:lnTo>
+                  <a:pt x="55427" y="5075237"/>
+                </a:lnTo>
+                <a:lnTo>
+                  <a:pt x="75583" y="5114925"/>
+                </a:lnTo>
+                <a:lnTo>
+                  <a:pt x="95738" y="5149850"/>
+                </a:lnTo>
+                <a:lnTo>
+                  <a:pt x="115893" y="5186362"/>
+                </a:lnTo>
+                <a:lnTo>
+                  <a:pt x="134368" y="5226050"/>
+                </a:lnTo>
+                <a:lnTo>
+                  <a:pt x="152844" y="5268912"/>
+                </a:lnTo>
+                <a:lnTo>
+                  <a:pt x="167960" y="5313362"/>
+                </a:lnTo>
+                <a:lnTo>
+                  <a:pt x="178038" y="5365750"/>
+                </a:lnTo>
+                <a:lnTo>
+                  <a:pt x="188115" y="5426075"/>
+                </a:lnTo>
+                <a:lnTo>
+                  <a:pt x="189795" y="5494337"/>
+                </a:lnTo>
+                <a:lnTo>
+                  <a:pt x="188115" y="5562600"/>
+                </a:lnTo>
+                <a:lnTo>
+                  <a:pt x="178038" y="5622925"/>
+                </a:lnTo>
+                <a:lnTo>
+                  <a:pt x="167960" y="5675312"/>
+                </a:lnTo>
+                <a:lnTo>
+                  <a:pt x="152844" y="5721350"/>
+                </a:lnTo>
+                <a:lnTo>
+                  <a:pt x="134368" y="5762625"/>
+                </a:lnTo>
+                <a:lnTo>
+                  <a:pt x="115893" y="5802312"/>
+                </a:lnTo>
+                <a:lnTo>
+                  <a:pt x="95738" y="5840412"/>
+                </a:lnTo>
+                <a:lnTo>
+                  <a:pt x="75583" y="5876925"/>
+                </a:lnTo>
+                <a:lnTo>
+                  <a:pt x="55427" y="5915025"/>
+                </a:lnTo>
+                <a:lnTo>
+                  <a:pt x="38632" y="5956300"/>
+                </a:lnTo>
+                <a:lnTo>
+                  <a:pt x="23515" y="6003925"/>
+                </a:lnTo>
+                <a:lnTo>
+                  <a:pt x="11758" y="6056312"/>
+                </a:lnTo>
+                <a:lnTo>
+                  <a:pt x="3359" y="6113462"/>
+                </a:lnTo>
+                <a:lnTo>
+                  <a:pt x="0" y="6183312"/>
+                </a:lnTo>
+                <a:lnTo>
+                  <a:pt x="3359" y="6251575"/>
+                </a:lnTo>
+                <a:lnTo>
+                  <a:pt x="11758" y="6311900"/>
+                </a:lnTo>
+                <a:lnTo>
+                  <a:pt x="23515" y="6361112"/>
+                </a:lnTo>
+                <a:lnTo>
+                  <a:pt x="38632" y="6407150"/>
+                </a:lnTo>
+                <a:lnTo>
+                  <a:pt x="55427" y="6448425"/>
+                </a:lnTo>
+                <a:lnTo>
+                  <a:pt x="73903" y="6488112"/>
+                </a:lnTo>
+                <a:lnTo>
+                  <a:pt x="92379" y="6523037"/>
+                </a:lnTo>
+                <a:lnTo>
+                  <a:pt x="112534" y="6561137"/>
+                </a:lnTo>
+                <a:lnTo>
+                  <a:pt x="132689" y="6597650"/>
+                </a:lnTo>
+                <a:lnTo>
+                  <a:pt x="149485" y="6640512"/>
+                </a:lnTo>
+                <a:lnTo>
+                  <a:pt x="166281" y="6683375"/>
+                </a:lnTo>
+                <a:lnTo>
+                  <a:pt x="176358" y="6735762"/>
+                </a:lnTo>
+                <a:lnTo>
+                  <a:pt x="184756" y="6791325"/>
+                </a:lnTo>
+                <a:lnTo>
+                  <a:pt x="189795" y="6858000"/>
+                </a:lnTo>
+                <a:lnTo>
+                  <a:pt x="334173" y="6858000"/>
+                </a:lnTo>
+                <a:lnTo>
+                  <a:pt x="334174" y="6858000"/>
+                </a:lnTo>
+                <a:lnTo>
+                  <a:pt x="3459219" y="6858000"/>
+                </a:lnTo>
+                <a:lnTo>
+                  <a:pt x="4417162" y="6858000"/>
+                </a:lnTo>
+                <a:lnTo>
+                  <a:pt x="4838076" y="6858000"/>
+                </a:lnTo>
+                <a:close/>
+              </a:path>
+            </a:pathLst>
+          </a:custGeom>
+          <a:solidFill>
+            <a:srgbClr val="FFFFFF"/>
+          </a:solidFill>
+          <a:ln>
+            <a:noFill/>
+          </a:ln>
+        </p:spPr>
+        <p:style>
+          <a:lnRef idx="2">
+            <a:schemeClr val="accent1">
+              <a:shade val="50000"/>
+            </a:schemeClr>
+          </a:lnRef>
+          <a:fillRef idx="1">
+            <a:schemeClr val="accent1"/>
+          </a:fillRef>
+          <a:effectRef idx="0">
+            <a:schemeClr val="accent1"/>
+          </a:effectRef>
+          <a:fontRef idx="minor">
+            <a:schemeClr val="lt1"/>
+          </a:fontRef>
+        </p:style>
+        <p:txBody>
+          <a:bodyPr wrap="square" rtlCol="0" anchor="ctr">
+            <a:noAutofit/>
+          </a:bodyPr>
+          <a:lstStyle/>
+          <a:p>
+            <a:pPr algn="ctr"/>
+            <a:endParaRPr lang="en-US" dirty="0"/>
+          </a:p>
+        </p:txBody>
+      </p:sp>
+      <p:sp>
+        <p:nvSpPr>
+          <p:cNvPr id="31" name="Freeform: Shape 30">
+            <a:extLst>
+              <a:ext uri="{FF2B5EF4-FFF2-40B4-BE49-F238E27FC236}">
+                <a16:creationId xmlns:a16="http://schemas.microsoft.com/office/drawing/2014/main" id="{11BAB570-FF10-4E96-8A3F-FA9804702B89}"/>
+              </a:ext>
+              <a:ext uri="{C183D7F6-B498-43B3-948B-1728B52AA6E4}">
+                <adec:decorative xmlns:adec="http://schemas.microsoft.com/office/drawing/2017/decorative" val="1"/>
+              </a:ext>
+            </a:extLst>
+          </p:cNvPr>
+          <p:cNvSpPr>
+            <a:spLocks noGrp="1" noRot="1" noChangeAspect="1" noMove="1" noResize="1" noEditPoints="1" noAdjustHandles="1" noChangeArrowheads="1" noChangeShapeType="1" noTextEdit="1"/>
+          </p:cNvSpPr>
+          <p:nvPr>
+            <p:extLst>
+              <p:ext uri="{386F3935-93C4-4BCD-93E2-E3B085C9AB24}">
+                <p16:designElem xmlns:p16="http://schemas.microsoft.com/office/powerpoint/2015/main" val="1"/>
+              </p:ext>
+            </p:extLst>
+          </p:nvPr>
+        </p:nvSpPr>
+        <p:spPr bwMode="ltGray">
+          <a:xfrm>
+            <a:off x="0" y="0"/>
+            <a:ext cx="4693698" cy="6858000"/>
+          </a:xfrm>
+          <a:custGeom>
+            <a:avLst/>
+            <a:gdLst>
+              <a:gd name="connsiteX0" fmla="*/ 0 w 4693698"/>
+              <a:gd name="connsiteY0" fmla="*/ 0 h 6858000"/>
+              <a:gd name="connsiteX1" fmla="*/ 420914 w 4693698"/>
+              <a:gd name="connsiteY1" fmla="*/ 0 h 6858000"/>
+              <a:gd name="connsiteX2" fmla="*/ 1582057 w 4693698"/>
+              <a:gd name="connsiteY2" fmla="*/ 0 h 6858000"/>
+              <a:gd name="connsiteX3" fmla="*/ 4503903 w 4693698"/>
+              <a:gd name="connsiteY3" fmla="*/ 0 h 6858000"/>
+              <a:gd name="connsiteX4" fmla="*/ 4508943 w 4693698"/>
+              <a:gd name="connsiteY4" fmla="*/ 66675 h 6858000"/>
+              <a:gd name="connsiteX5" fmla="*/ 4517340 w 4693698"/>
+              <a:gd name="connsiteY5" fmla="*/ 122237 h 6858000"/>
+              <a:gd name="connsiteX6" fmla="*/ 4527418 w 4693698"/>
+              <a:gd name="connsiteY6" fmla="*/ 174625 h 6858000"/>
+              <a:gd name="connsiteX7" fmla="*/ 4544214 w 4693698"/>
+              <a:gd name="connsiteY7" fmla="*/ 217487 h 6858000"/>
+              <a:gd name="connsiteX8" fmla="*/ 4561010 w 4693698"/>
+              <a:gd name="connsiteY8" fmla="*/ 260350 h 6858000"/>
+              <a:gd name="connsiteX9" fmla="*/ 4581165 w 4693698"/>
+              <a:gd name="connsiteY9" fmla="*/ 296862 h 6858000"/>
+              <a:gd name="connsiteX10" fmla="*/ 4601320 w 4693698"/>
+              <a:gd name="connsiteY10" fmla="*/ 334962 h 6858000"/>
+              <a:gd name="connsiteX11" fmla="*/ 4619796 w 4693698"/>
+              <a:gd name="connsiteY11" fmla="*/ 369887 h 6858000"/>
+              <a:gd name="connsiteX12" fmla="*/ 4638271 w 4693698"/>
+              <a:gd name="connsiteY12" fmla="*/ 409575 h 6858000"/>
+              <a:gd name="connsiteX13" fmla="*/ 4655067 w 4693698"/>
+              <a:gd name="connsiteY13" fmla="*/ 450850 h 6858000"/>
+              <a:gd name="connsiteX14" fmla="*/ 4670184 w 4693698"/>
+              <a:gd name="connsiteY14" fmla="*/ 496887 h 6858000"/>
+              <a:gd name="connsiteX15" fmla="*/ 4681941 w 4693698"/>
+              <a:gd name="connsiteY15" fmla="*/ 546100 h 6858000"/>
+              <a:gd name="connsiteX16" fmla="*/ 4690339 w 4693698"/>
+              <a:gd name="connsiteY16" fmla="*/ 606425 h 6858000"/>
+              <a:gd name="connsiteX17" fmla="*/ 4693698 w 4693698"/>
+              <a:gd name="connsiteY17" fmla="*/ 673100 h 6858000"/>
+              <a:gd name="connsiteX18" fmla="*/ 4690339 w 4693698"/>
+              <a:gd name="connsiteY18" fmla="*/ 744537 h 6858000"/>
+              <a:gd name="connsiteX19" fmla="*/ 4681941 w 4693698"/>
+              <a:gd name="connsiteY19" fmla="*/ 801687 h 6858000"/>
+              <a:gd name="connsiteX20" fmla="*/ 4670184 w 4693698"/>
+              <a:gd name="connsiteY20" fmla="*/ 854075 h 6858000"/>
+              <a:gd name="connsiteX21" fmla="*/ 4655067 w 4693698"/>
+              <a:gd name="connsiteY21" fmla="*/ 901700 h 6858000"/>
+              <a:gd name="connsiteX22" fmla="*/ 4638271 w 4693698"/>
+              <a:gd name="connsiteY22" fmla="*/ 942975 h 6858000"/>
+              <a:gd name="connsiteX23" fmla="*/ 4618116 w 4693698"/>
+              <a:gd name="connsiteY23" fmla="*/ 981075 h 6858000"/>
+              <a:gd name="connsiteX24" fmla="*/ 4597961 w 4693698"/>
+              <a:gd name="connsiteY24" fmla="*/ 1017587 h 6858000"/>
+              <a:gd name="connsiteX25" fmla="*/ 4577806 w 4693698"/>
+              <a:gd name="connsiteY25" fmla="*/ 1055687 h 6858000"/>
+              <a:gd name="connsiteX26" fmla="*/ 4559330 w 4693698"/>
+              <a:gd name="connsiteY26" fmla="*/ 1095375 h 6858000"/>
+              <a:gd name="connsiteX27" fmla="*/ 4540854 w 4693698"/>
+              <a:gd name="connsiteY27" fmla="*/ 1136650 h 6858000"/>
+              <a:gd name="connsiteX28" fmla="*/ 4525739 w 4693698"/>
+              <a:gd name="connsiteY28" fmla="*/ 1182687 h 6858000"/>
+              <a:gd name="connsiteX29" fmla="*/ 4515661 w 4693698"/>
+              <a:gd name="connsiteY29" fmla="*/ 1235075 h 6858000"/>
+              <a:gd name="connsiteX30" fmla="*/ 4505583 w 4693698"/>
+              <a:gd name="connsiteY30" fmla="*/ 1295400 h 6858000"/>
+              <a:gd name="connsiteX31" fmla="*/ 4503903 w 4693698"/>
+              <a:gd name="connsiteY31" fmla="*/ 1363662 h 6858000"/>
+              <a:gd name="connsiteX32" fmla="*/ 4505583 w 4693698"/>
+              <a:gd name="connsiteY32" fmla="*/ 1431925 h 6858000"/>
+              <a:gd name="connsiteX33" fmla="*/ 4515661 w 4693698"/>
+              <a:gd name="connsiteY33" fmla="*/ 1492250 h 6858000"/>
+              <a:gd name="connsiteX34" fmla="*/ 4525739 w 4693698"/>
+              <a:gd name="connsiteY34" fmla="*/ 1544637 h 6858000"/>
+              <a:gd name="connsiteX35" fmla="*/ 4540854 w 4693698"/>
+              <a:gd name="connsiteY35" fmla="*/ 1589087 h 6858000"/>
+              <a:gd name="connsiteX36" fmla="*/ 4559330 w 4693698"/>
+              <a:gd name="connsiteY36" fmla="*/ 1631950 h 6858000"/>
+              <a:gd name="connsiteX37" fmla="*/ 4577806 w 4693698"/>
+              <a:gd name="connsiteY37" fmla="*/ 1671637 h 6858000"/>
+              <a:gd name="connsiteX38" fmla="*/ 4597961 w 4693698"/>
+              <a:gd name="connsiteY38" fmla="*/ 1708150 h 6858000"/>
+              <a:gd name="connsiteX39" fmla="*/ 4618116 w 4693698"/>
+              <a:gd name="connsiteY39" fmla="*/ 1743075 h 6858000"/>
+              <a:gd name="connsiteX40" fmla="*/ 4638271 w 4693698"/>
+              <a:gd name="connsiteY40" fmla="*/ 1782762 h 6858000"/>
+              <a:gd name="connsiteX41" fmla="*/ 4655067 w 4693698"/>
+              <a:gd name="connsiteY41" fmla="*/ 1824037 h 6858000"/>
+              <a:gd name="connsiteX42" fmla="*/ 4670184 w 4693698"/>
+              <a:gd name="connsiteY42" fmla="*/ 1870075 h 6858000"/>
+              <a:gd name="connsiteX43" fmla="*/ 4681941 w 4693698"/>
+              <a:gd name="connsiteY43" fmla="*/ 1922462 h 6858000"/>
+              <a:gd name="connsiteX44" fmla="*/ 4690339 w 4693698"/>
+              <a:gd name="connsiteY44" fmla="*/ 1982787 h 6858000"/>
+              <a:gd name="connsiteX45" fmla="*/ 4693698 w 4693698"/>
+              <a:gd name="connsiteY45" fmla="*/ 2051050 h 6858000"/>
+              <a:gd name="connsiteX46" fmla="*/ 4690339 w 4693698"/>
+              <a:gd name="connsiteY46" fmla="*/ 2119312 h 6858000"/>
+              <a:gd name="connsiteX47" fmla="*/ 4681941 w 4693698"/>
+              <a:gd name="connsiteY47" fmla="*/ 2179637 h 6858000"/>
+              <a:gd name="connsiteX48" fmla="*/ 4670184 w 4693698"/>
+              <a:gd name="connsiteY48" fmla="*/ 2232025 h 6858000"/>
+              <a:gd name="connsiteX49" fmla="*/ 4655067 w 4693698"/>
+              <a:gd name="connsiteY49" fmla="*/ 2278062 h 6858000"/>
+              <a:gd name="connsiteX50" fmla="*/ 4638271 w 4693698"/>
+              <a:gd name="connsiteY50" fmla="*/ 2319337 h 6858000"/>
+              <a:gd name="connsiteX51" fmla="*/ 4618116 w 4693698"/>
+              <a:gd name="connsiteY51" fmla="*/ 2359025 h 6858000"/>
+              <a:gd name="connsiteX52" fmla="*/ 4597961 w 4693698"/>
+              <a:gd name="connsiteY52" fmla="*/ 2395537 h 6858000"/>
+              <a:gd name="connsiteX53" fmla="*/ 4577806 w 4693698"/>
+              <a:gd name="connsiteY53" fmla="*/ 2433637 h 6858000"/>
+              <a:gd name="connsiteX54" fmla="*/ 4559330 w 4693698"/>
+              <a:gd name="connsiteY54" fmla="*/ 2471737 h 6858000"/>
+              <a:gd name="connsiteX55" fmla="*/ 4540854 w 4693698"/>
+              <a:gd name="connsiteY55" fmla="*/ 2513012 h 6858000"/>
+              <a:gd name="connsiteX56" fmla="*/ 4525739 w 4693698"/>
+              <a:gd name="connsiteY56" fmla="*/ 2560637 h 6858000"/>
+              <a:gd name="connsiteX57" fmla="*/ 4515661 w 4693698"/>
+              <a:gd name="connsiteY57" fmla="*/ 2613025 h 6858000"/>
+              <a:gd name="connsiteX58" fmla="*/ 4505583 w 4693698"/>
+              <a:gd name="connsiteY58" fmla="*/ 2671762 h 6858000"/>
+              <a:gd name="connsiteX59" fmla="*/ 4503903 w 4693698"/>
+              <a:gd name="connsiteY59" fmla="*/ 2741612 h 6858000"/>
+              <a:gd name="connsiteX60" fmla="*/ 4505583 w 4693698"/>
+              <a:gd name="connsiteY60" fmla="*/ 2809875 h 6858000"/>
+              <a:gd name="connsiteX61" fmla="*/ 4515661 w 4693698"/>
+              <a:gd name="connsiteY61" fmla="*/ 2868612 h 6858000"/>
+              <a:gd name="connsiteX62" fmla="*/ 4525739 w 4693698"/>
+              <a:gd name="connsiteY62" fmla="*/ 2922587 h 6858000"/>
+              <a:gd name="connsiteX63" fmla="*/ 4540854 w 4693698"/>
+              <a:gd name="connsiteY63" fmla="*/ 2967037 h 6858000"/>
+              <a:gd name="connsiteX64" fmla="*/ 4559330 w 4693698"/>
+              <a:gd name="connsiteY64" fmla="*/ 3009900 h 6858000"/>
+              <a:gd name="connsiteX65" fmla="*/ 4577806 w 4693698"/>
+              <a:gd name="connsiteY65" fmla="*/ 3046412 h 6858000"/>
+              <a:gd name="connsiteX66" fmla="*/ 4597961 w 4693698"/>
+              <a:gd name="connsiteY66" fmla="*/ 3084512 h 6858000"/>
+              <a:gd name="connsiteX67" fmla="*/ 4618116 w 4693698"/>
+              <a:gd name="connsiteY67" fmla="*/ 3121025 h 6858000"/>
+              <a:gd name="connsiteX68" fmla="*/ 4638271 w 4693698"/>
+              <a:gd name="connsiteY68" fmla="*/ 3160712 h 6858000"/>
+              <a:gd name="connsiteX69" fmla="*/ 4655067 w 4693698"/>
+              <a:gd name="connsiteY69" fmla="*/ 3201987 h 6858000"/>
+              <a:gd name="connsiteX70" fmla="*/ 4670184 w 4693698"/>
+              <a:gd name="connsiteY70" fmla="*/ 3248025 h 6858000"/>
+              <a:gd name="connsiteX71" fmla="*/ 4681941 w 4693698"/>
+              <a:gd name="connsiteY71" fmla="*/ 3300412 h 6858000"/>
+              <a:gd name="connsiteX72" fmla="*/ 4690339 w 4693698"/>
+              <a:gd name="connsiteY72" fmla="*/ 3360737 h 6858000"/>
+              <a:gd name="connsiteX73" fmla="*/ 4693698 w 4693698"/>
+              <a:gd name="connsiteY73" fmla="*/ 3427412 h 6858000"/>
+              <a:gd name="connsiteX74" fmla="*/ 4690339 w 4693698"/>
+              <a:gd name="connsiteY74" fmla="*/ 3497262 h 6858000"/>
+              <a:gd name="connsiteX75" fmla="*/ 4681941 w 4693698"/>
+              <a:gd name="connsiteY75" fmla="*/ 3557587 h 6858000"/>
+              <a:gd name="connsiteX76" fmla="*/ 4670184 w 4693698"/>
+              <a:gd name="connsiteY76" fmla="*/ 3609975 h 6858000"/>
+              <a:gd name="connsiteX77" fmla="*/ 4655067 w 4693698"/>
+              <a:gd name="connsiteY77" fmla="*/ 3656012 h 6858000"/>
+              <a:gd name="connsiteX78" fmla="*/ 4638271 w 4693698"/>
+              <a:gd name="connsiteY78" fmla="*/ 3697287 h 6858000"/>
+              <a:gd name="connsiteX79" fmla="*/ 4618116 w 4693698"/>
+              <a:gd name="connsiteY79" fmla="*/ 3736975 h 6858000"/>
+              <a:gd name="connsiteX80" fmla="*/ 4577806 w 4693698"/>
+              <a:gd name="connsiteY80" fmla="*/ 3811587 h 6858000"/>
+              <a:gd name="connsiteX81" fmla="*/ 4559330 w 4693698"/>
+              <a:gd name="connsiteY81" fmla="*/ 3848100 h 6858000"/>
+              <a:gd name="connsiteX82" fmla="*/ 4540854 w 4693698"/>
+              <a:gd name="connsiteY82" fmla="*/ 3890962 h 6858000"/>
+              <a:gd name="connsiteX83" fmla="*/ 4525739 w 4693698"/>
+              <a:gd name="connsiteY83" fmla="*/ 3935412 h 6858000"/>
+              <a:gd name="connsiteX84" fmla="*/ 4515661 w 4693698"/>
+              <a:gd name="connsiteY84" fmla="*/ 3987800 h 6858000"/>
+              <a:gd name="connsiteX85" fmla="*/ 4505583 w 4693698"/>
+              <a:gd name="connsiteY85" fmla="*/ 4048125 h 6858000"/>
+              <a:gd name="connsiteX86" fmla="*/ 4503903 w 4693698"/>
+              <a:gd name="connsiteY86" fmla="*/ 4116387 h 6858000"/>
+              <a:gd name="connsiteX87" fmla="*/ 4505583 w 4693698"/>
+              <a:gd name="connsiteY87" fmla="*/ 4186237 h 6858000"/>
+              <a:gd name="connsiteX88" fmla="*/ 4515661 w 4693698"/>
+              <a:gd name="connsiteY88" fmla="*/ 4244975 h 6858000"/>
+              <a:gd name="connsiteX89" fmla="*/ 4525739 w 4693698"/>
+              <a:gd name="connsiteY89" fmla="*/ 4297362 h 6858000"/>
+              <a:gd name="connsiteX90" fmla="*/ 4540854 w 4693698"/>
+              <a:gd name="connsiteY90" fmla="*/ 4343400 h 6858000"/>
+              <a:gd name="connsiteX91" fmla="*/ 4559330 w 4693698"/>
+              <a:gd name="connsiteY91" fmla="*/ 4386262 h 6858000"/>
+              <a:gd name="connsiteX92" fmla="*/ 4577806 w 4693698"/>
+              <a:gd name="connsiteY92" fmla="*/ 4424362 h 6858000"/>
+              <a:gd name="connsiteX93" fmla="*/ 4618116 w 4693698"/>
+              <a:gd name="connsiteY93" fmla="*/ 4498975 h 6858000"/>
+              <a:gd name="connsiteX94" fmla="*/ 4638271 w 4693698"/>
+              <a:gd name="connsiteY94" fmla="*/ 4537075 h 6858000"/>
+              <a:gd name="connsiteX95" fmla="*/ 4655067 w 4693698"/>
+              <a:gd name="connsiteY95" fmla="*/ 4579937 h 6858000"/>
+              <a:gd name="connsiteX96" fmla="*/ 4670184 w 4693698"/>
+              <a:gd name="connsiteY96" fmla="*/ 4625975 h 6858000"/>
+              <a:gd name="connsiteX97" fmla="*/ 4681941 w 4693698"/>
+              <a:gd name="connsiteY97" fmla="*/ 4678362 h 6858000"/>
+              <a:gd name="connsiteX98" fmla="*/ 4690339 w 4693698"/>
+              <a:gd name="connsiteY98" fmla="*/ 4738687 h 6858000"/>
+              <a:gd name="connsiteX99" fmla="*/ 4693698 w 4693698"/>
+              <a:gd name="connsiteY99" fmla="*/ 4806950 h 6858000"/>
+              <a:gd name="connsiteX100" fmla="*/ 4690339 w 4693698"/>
+              <a:gd name="connsiteY100" fmla="*/ 4875212 h 6858000"/>
+              <a:gd name="connsiteX101" fmla="*/ 4681941 w 4693698"/>
+              <a:gd name="connsiteY101" fmla="*/ 4935537 h 6858000"/>
+              <a:gd name="connsiteX102" fmla="*/ 4670184 w 4693698"/>
+              <a:gd name="connsiteY102" fmla="*/ 4987925 h 6858000"/>
+              <a:gd name="connsiteX103" fmla="*/ 4655067 w 4693698"/>
+              <a:gd name="connsiteY103" fmla="*/ 5033962 h 6858000"/>
+              <a:gd name="connsiteX104" fmla="*/ 4638271 w 4693698"/>
+              <a:gd name="connsiteY104" fmla="*/ 5075237 h 6858000"/>
+              <a:gd name="connsiteX105" fmla="*/ 4618116 w 4693698"/>
+              <a:gd name="connsiteY105" fmla="*/ 5114925 h 6858000"/>
+              <a:gd name="connsiteX106" fmla="*/ 4597961 w 4693698"/>
+              <a:gd name="connsiteY106" fmla="*/ 5149850 h 6858000"/>
+              <a:gd name="connsiteX107" fmla="*/ 4577806 w 4693698"/>
+              <a:gd name="connsiteY107" fmla="*/ 5186362 h 6858000"/>
+              <a:gd name="connsiteX108" fmla="*/ 4559330 w 4693698"/>
+              <a:gd name="connsiteY108" fmla="*/ 5226050 h 6858000"/>
+              <a:gd name="connsiteX109" fmla="*/ 4540854 w 4693698"/>
+              <a:gd name="connsiteY109" fmla="*/ 5268912 h 6858000"/>
+              <a:gd name="connsiteX110" fmla="*/ 4525739 w 4693698"/>
+              <a:gd name="connsiteY110" fmla="*/ 5313362 h 6858000"/>
+              <a:gd name="connsiteX111" fmla="*/ 4515661 w 4693698"/>
+              <a:gd name="connsiteY111" fmla="*/ 5365750 h 6858000"/>
+              <a:gd name="connsiteX112" fmla="*/ 4505583 w 4693698"/>
+              <a:gd name="connsiteY112" fmla="*/ 5426075 h 6858000"/>
+              <a:gd name="connsiteX113" fmla="*/ 4503903 w 4693698"/>
+              <a:gd name="connsiteY113" fmla="*/ 5494337 h 6858000"/>
+              <a:gd name="connsiteX114" fmla="*/ 4505583 w 4693698"/>
+              <a:gd name="connsiteY114" fmla="*/ 5562600 h 6858000"/>
+              <a:gd name="connsiteX115" fmla="*/ 4515661 w 4693698"/>
+              <a:gd name="connsiteY115" fmla="*/ 5622925 h 6858000"/>
+              <a:gd name="connsiteX116" fmla="*/ 4525739 w 4693698"/>
+              <a:gd name="connsiteY116" fmla="*/ 5675312 h 6858000"/>
+              <a:gd name="connsiteX117" fmla="*/ 4540854 w 4693698"/>
+              <a:gd name="connsiteY117" fmla="*/ 5721350 h 6858000"/>
+              <a:gd name="connsiteX118" fmla="*/ 4559330 w 4693698"/>
+              <a:gd name="connsiteY118" fmla="*/ 5762625 h 6858000"/>
+              <a:gd name="connsiteX119" fmla="*/ 4577806 w 4693698"/>
+              <a:gd name="connsiteY119" fmla="*/ 5802312 h 6858000"/>
+              <a:gd name="connsiteX120" fmla="*/ 4597961 w 4693698"/>
+              <a:gd name="connsiteY120" fmla="*/ 5840412 h 6858000"/>
+              <a:gd name="connsiteX121" fmla="*/ 4618116 w 4693698"/>
+              <a:gd name="connsiteY121" fmla="*/ 5876925 h 6858000"/>
+              <a:gd name="connsiteX122" fmla="*/ 4638271 w 4693698"/>
+              <a:gd name="connsiteY122" fmla="*/ 5915025 h 6858000"/>
+              <a:gd name="connsiteX123" fmla="*/ 4655067 w 4693698"/>
+              <a:gd name="connsiteY123" fmla="*/ 5956300 h 6858000"/>
+              <a:gd name="connsiteX124" fmla="*/ 4670184 w 4693698"/>
+              <a:gd name="connsiteY124" fmla="*/ 6003925 h 6858000"/>
+              <a:gd name="connsiteX125" fmla="*/ 4681941 w 4693698"/>
+              <a:gd name="connsiteY125" fmla="*/ 6056312 h 6858000"/>
+              <a:gd name="connsiteX126" fmla="*/ 4690339 w 4693698"/>
+              <a:gd name="connsiteY126" fmla="*/ 6113462 h 6858000"/>
+              <a:gd name="connsiteX127" fmla="*/ 4693698 w 4693698"/>
+              <a:gd name="connsiteY127" fmla="*/ 6183312 h 6858000"/>
+              <a:gd name="connsiteX128" fmla="*/ 4690339 w 4693698"/>
+              <a:gd name="connsiteY128" fmla="*/ 6251575 h 6858000"/>
+              <a:gd name="connsiteX129" fmla="*/ 4681941 w 4693698"/>
+              <a:gd name="connsiteY129" fmla="*/ 6311900 h 6858000"/>
+              <a:gd name="connsiteX130" fmla="*/ 4670184 w 4693698"/>
+              <a:gd name="connsiteY130" fmla="*/ 6361112 h 6858000"/>
+              <a:gd name="connsiteX131" fmla="*/ 4655067 w 4693698"/>
+              <a:gd name="connsiteY131" fmla="*/ 6407150 h 6858000"/>
+              <a:gd name="connsiteX132" fmla="*/ 4638271 w 4693698"/>
+              <a:gd name="connsiteY132" fmla="*/ 6448425 h 6858000"/>
+              <a:gd name="connsiteX133" fmla="*/ 4619796 w 4693698"/>
+              <a:gd name="connsiteY133" fmla="*/ 6488112 h 6858000"/>
+              <a:gd name="connsiteX134" fmla="*/ 4601320 w 4693698"/>
+              <a:gd name="connsiteY134" fmla="*/ 6523037 h 6858000"/>
+              <a:gd name="connsiteX135" fmla="*/ 4581165 w 4693698"/>
+              <a:gd name="connsiteY135" fmla="*/ 6561137 h 6858000"/>
+              <a:gd name="connsiteX136" fmla="*/ 4561010 w 4693698"/>
+              <a:gd name="connsiteY136" fmla="*/ 6597650 h 6858000"/>
+              <a:gd name="connsiteX137" fmla="*/ 4544214 w 4693698"/>
+              <a:gd name="connsiteY137" fmla="*/ 6640512 h 6858000"/>
+              <a:gd name="connsiteX138" fmla="*/ 4527418 w 4693698"/>
+              <a:gd name="connsiteY138" fmla="*/ 6683375 h 6858000"/>
+              <a:gd name="connsiteX139" fmla="*/ 4517340 w 4693698"/>
+              <a:gd name="connsiteY139" fmla="*/ 6735762 h 6858000"/>
+              <a:gd name="connsiteX140" fmla="*/ 4508943 w 4693698"/>
+              <a:gd name="connsiteY140" fmla="*/ 6791325 h 6858000"/>
+              <a:gd name="connsiteX141" fmla="*/ 4503903 w 4693698"/>
+              <a:gd name="connsiteY141" fmla="*/ 6858000 h 6858000"/>
+              <a:gd name="connsiteX142" fmla="*/ 1582057 w 4693698"/>
+              <a:gd name="connsiteY142" fmla="*/ 6858000 h 6858000"/>
+              <a:gd name="connsiteX143" fmla="*/ 420914 w 4693698"/>
+              <a:gd name="connsiteY143" fmla="*/ 6858000 h 6858000"/>
+              <a:gd name="connsiteX144" fmla="*/ 0 w 4693698"/>
+              <a:gd name="connsiteY144" fmla="*/ 6858000 h 6858000"/>
+            </a:gdLst>
+            <a:ahLst/>
+            <a:cxnLst>
+              <a:cxn ang="0">
+                <a:pos x="connsiteX0" y="connsiteY0"/>
+              </a:cxn>
+              <a:cxn ang="0">
+                <a:pos x="connsiteX1" y="connsiteY1"/>
+              </a:cxn>
+              <a:cxn ang="0">
+                <a:pos x="connsiteX2" y="connsiteY2"/>
+              </a:cxn>
+              <a:cxn ang="0">
+                <a:pos x="connsiteX3" y="connsiteY3"/>
+              </a:cxn>
+              <a:cxn ang="0">
+                <a:pos x="connsiteX4" y="connsiteY4"/>
+              </a:cxn>
+              <a:cxn ang="0">
+                <a:pos x="connsiteX5" y="connsiteY5"/>
+              </a:cxn>
+              <a:cxn ang="0">
+                <a:pos x="connsiteX6" y="connsiteY6"/>
+              </a:cxn>
+              <a:cxn ang="0">
+                <a:pos x="connsiteX7" y="connsiteY7"/>
+              </a:cxn>
+              <a:cxn ang="0">
+                <a:pos x="connsiteX8" y="connsiteY8"/>
+              </a:cxn>
+              <a:cxn ang="0">
+                <a:pos x="connsiteX9" y="connsiteY9"/>
+              </a:cxn>
+              <a:cxn ang="0">
+                <a:pos x="connsiteX10" y="connsiteY10"/>
+              </a:cxn>
+              <a:cxn ang="0">
+                <a:pos x="connsiteX11" y="connsiteY11"/>
+              </a:cxn>
+              <a:cxn ang="0">
+                <a:pos x="connsiteX12" y="connsiteY12"/>
+              </a:cxn>
+              <a:cxn ang="0">
+                <a:pos x="connsiteX13" y="connsiteY13"/>
+              </a:cxn>
+              <a:cxn ang="0">
+                <a:pos x="connsiteX14" y="connsiteY14"/>
+              </a:cxn>
+              <a:cxn ang="0">
+                <a:pos x="connsiteX15" y="connsiteY15"/>
+              </a:cxn>
+              <a:cxn ang="0">
+                <a:pos x="connsiteX16" y="connsiteY16"/>
+              </a:cxn>
+              <a:cxn ang="0">
+                <a:pos x="connsiteX17" y="connsiteY17"/>
+              </a:cxn>
+              <a:cxn ang="0">
+                <a:pos x="connsiteX18" y="connsiteY18"/>
+              </a:cxn>
+              <a:cxn ang="0">
+                <a:pos x="connsiteX19" y="connsiteY19"/>
+              </a:cxn>
+              <a:cxn ang="0">
+                <a:pos x="connsiteX20" y="connsiteY20"/>
+              </a:cxn>
+              <a:cxn ang="0">
+                <a:pos x="connsiteX21" y="connsiteY21"/>
+              </a:cxn>
+              <a:cxn ang="0">
+                <a:pos x="connsiteX22" y="connsiteY22"/>
+              </a:cxn>
+              <a:cxn ang="0">
+                <a:pos x="connsiteX23" y="connsiteY23"/>
+              </a:cxn>
+              <a:cxn ang="0">
+                <a:pos x="connsiteX24" y="connsiteY24"/>
+              </a:cxn>
+              <a:cxn ang="0">
+                <a:pos x="connsiteX25" y="connsiteY25"/>
+              </a:cxn>
+              <a:cxn ang="0">
+                <a:pos x="connsiteX26" y="connsiteY26"/>
+              </a:cxn>
+              <a:cxn ang="0">
+                <a:pos x="connsiteX27" y="connsiteY27"/>
+              </a:cxn>
+              <a:cxn ang="0">
+                <a:pos x="connsiteX28" y="connsiteY28"/>
+              </a:cxn>
+              <a:cxn ang="0">
+                <a:pos x="connsiteX29" y="connsiteY29"/>
+              </a:cxn>
+              <a:cxn ang="0">
+                <a:pos x="connsiteX30" y="connsiteY30"/>
+              </a:cxn>
+              <a:cxn ang="0">
+                <a:pos x="connsiteX31" y="connsiteY31"/>
+              </a:cxn>
+              <a:cxn ang="0">
+                <a:pos x="connsiteX32" y="connsiteY32"/>
+              </a:cxn>
+              <a:cxn ang="0">
+                <a:pos x="connsiteX33" y="connsiteY33"/>
+              </a:cxn>
+              <a:cxn ang="0">
+                <a:pos x="connsiteX34" y="connsiteY34"/>
+              </a:cxn>
+              <a:cxn ang="0">
+                <a:pos x="connsiteX35" y="connsiteY35"/>
+              </a:cxn>
+              <a:cxn ang="0">
+                <a:pos x="connsiteX36" y="connsiteY36"/>
+              </a:cxn>
+              <a:cxn ang="0">
+                <a:pos x="connsiteX37" y="connsiteY37"/>
+              </a:cxn>
+              <a:cxn ang="0">
+                <a:pos x="connsiteX38" y="connsiteY38"/>
+              </a:cxn>
+              <a:cxn ang="0">
+                <a:pos x="connsiteX39" y="connsiteY39"/>
+              </a:cxn>
+              <a:cxn ang="0">
+                <a:pos x="connsiteX40" y="connsiteY40"/>
+              </a:cxn>
+              <a:cxn ang="0">
+                <a:pos x="connsiteX41" y="connsiteY41"/>
+              </a:cxn>
+              <a:cxn ang="0">
+                <a:pos x="connsiteX42" y="connsiteY42"/>
+              </a:cxn>
+              <a:cxn ang="0">
+                <a:pos x="connsiteX43" y="connsiteY43"/>
+              </a:cxn>
+              <a:cxn ang="0">
+                <a:pos x="connsiteX44" y="connsiteY44"/>
+              </a:cxn>
+              <a:cxn ang="0">
+                <a:pos x="connsiteX45" y="connsiteY45"/>
+              </a:cxn>
+              <a:cxn ang="0">
+                <a:pos x="connsiteX46" y="connsiteY46"/>
+              </a:cxn>
+              <a:cxn ang="0">
+                <a:pos x="connsiteX47" y="connsiteY47"/>
+              </a:cxn>
+              <a:cxn ang="0">
+                <a:pos x="connsiteX48" y="connsiteY48"/>
+              </a:cxn>
+              <a:cxn ang="0">
+                <a:pos x="connsiteX49" y="connsiteY49"/>
+              </a:cxn>
+              <a:cxn ang="0">
+                <a:pos x="connsiteX50" y="connsiteY50"/>
+              </a:cxn>
+              <a:cxn ang="0">
+                <a:pos x="connsiteX51" y="connsiteY51"/>
+              </a:cxn>
+              <a:cxn ang="0">
+                <a:pos x="connsiteX52" y="connsiteY52"/>
+              </a:cxn>
+              <a:cxn ang="0">
+                <a:pos x="connsiteX53" y="connsiteY53"/>
+              </a:cxn>
+              <a:cxn ang="0">
+                <a:pos x="connsiteX54" y="connsiteY54"/>
+              </a:cxn>
+              <a:cxn ang="0">
+                <a:pos x="connsiteX55" y="connsiteY55"/>
+              </a:cxn>
+              <a:cxn ang="0">
+                <a:pos x="connsiteX56" y="connsiteY56"/>
+              </a:cxn>
+              <a:cxn ang="0">
+                <a:pos x="connsiteX57" y="connsiteY57"/>
+              </a:cxn>
+              <a:cxn ang="0">
+                <a:pos x="connsiteX58" y="connsiteY58"/>
+              </a:cxn>
+              <a:cxn ang="0">
+                <a:pos x="connsiteX59" y="connsiteY59"/>
+              </a:cxn>
+              <a:cxn ang="0">
+                <a:pos x="connsiteX60" y="connsiteY60"/>
+              </a:cxn>
+              <a:cxn ang="0">
+                <a:pos x="connsiteX61" y="connsiteY61"/>
+              </a:cxn>
+              <a:cxn ang="0">
+                <a:pos x="connsiteX62" y="connsiteY62"/>
+              </a:cxn>
+              <a:cxn ang="0">
+                <a:pos x="connsiteX63" y="connsiteY63"/>
+              </a:cxn>
+              <a:cxn ang="0">
+                <a:pos x="connsiteX64" y="connsiteY64"/>
+              </a:cxn>
+              <a:cxn ang="0">
+                <a:pos x="connsiteX65" y="connsiteY65"/>
+              </a:cxn>
+              <a:cxn ang="0">
+                <a:pos x="connsiteX66" y="connsiteY66"/>
+              </a:cxn>
+              <a:cxn ang="0">
+                <a:pos x="connsiteX67" y="connsiteY67"/>
+              </a:cxn>
+              <a:cxn ang="0">
+                <a:pos x="connsiteX68" y="connsiteY68"/>
+              </a:cxn>
+              <a:cxn ang="0">
+                <a:pos x="connsiteX69" y="connsiteY69"/>
+              </a:cxn>
+              <a:cxn ang="0">
+                <a:pos x="connsiteX70" y="connsiteY70"/>
+              </a:cxn>
+              <a:cxn ang="0">
+                <a:pos x="connsiteX71" y="connsiteY71"/>
+              </a:cxn>
+              <a:cxn ang="0">
+                <a:pos x="connsiteX72" y="connsiteY72"/>
+              </a:cxn>
+              <a:cxn ang="0">
+                <a:pos x="connsiteX73" y="connsiteY73"/>
+              </a:cxn>
+              <a:cxn ang="0">
+                <a:pos x="connsiteX74" y="connsiteY74"/>
+              </a:cxn>
+              <a:cxn ang="0">
+                <a:pos x="connsiteX75" y="connsiteY75"/>
+              </a:cxn>
+              <a:cxn ang="0">
+                <a:pos x="connsiteX76" y="connsiteY76"/>
+              </a:cxn>
+              <a:cxn ang="0">
+                <a:pos x="connsiteX77" y="connsiteY77"/>
+              </a:cxn>
+              <a:cxn ang="0">
+                <a:pos x="connsiteX78" y="connsiteY78"/>
+              </a:cxn>
+              <a:cxn ang="0">
+                <a:pos x="connsiteX79" y="connsiteY79"/>
+              </a:cxn>
+              <a:cxn ang="0">
+                <a:pos x="connsiteX80" y="connsiteY80"/>
+              </a:cxn>
+              <a:cxn ang="0">
+                <a:pos x="connsiteX81" y="connsiteY81"/>
+              </a:cxn>
+              <a:cxn ang="0">
+                <a:pos x="connsiteX82" y="connsiteY82"/>
+              </a:cxn>
+              <a:cxn ang="0">
+                <a:pos x="connsiteX83" y="connsiteY83"/>
+              </a:cxn>
+              <a:cxn ang="0">
+                <a:pos x="connsiteX84" y="connsiteY84"/>
+              </a:cxn>
+              <a:cxn ang="0">
+                <a:pos x="connsiteX85" y="connsiteY85"/>
+              </a:cxn>
+              <a:cxn ang="0">
+                <a:pos x="connsiteX86" y="connsiteY86"/>
+              </a:cxn>
+              <a:cxn ang="0">
+                <a:pos x="connsiteX87" y="connsiteY87"/>
+              </a:cxn>
+              <a:cxn ang="0">
+                <a:pos x="connsiteX88" y="connsiteY88"/>
+              </a:cxn>
+              <a:cxn ang="0">
+                <a:pos x="connsiteX89" y="connsiteY89"/>
+              </a:cxn>
+              <a:cxn ang="0">
+                <a:pos x="connsiteX90" y="connsiteY90"/>
+              </a:cxn>
+              <a:cxn ang="0">
+                <a:pos x="connsiteX91" y="connsiteY91"/>
+              </a:cxn>
+              <a:cxn ang="0">
+                <a:pos x="connsiteX92" y="connsiteY92"/>
+              </a:cxn>
+              <a:cxn ang="0">
+                <a:pos x="connsiteX93" y="connsiteY93"/>
+              </a:cxn>
+              <a:cxn ang="0">
+                <a:pos x="connsiteX94" y="connsiteY94"/>
+              </a:cxn>
+              <a:cxn ang="0">
+                <a:pos x="connsiteX95" y="connsiteY95"/>
+              </a:cxn>
+              <a:cxn ang="0">
+                <a:pos x="connsiteX96" y="connsiteY96"/>
+              </a:cxn>
+              <a:cxn ang="0">
+                <a:pos x="connsiteX97" y="connsiteY97"/>
+              </a:cxn>
+              <a:cxn ang="0">
+                <a:pos x="connsiteX98" y="connsiteY98"/>
+              </a:cxn>
+              <a:cxn ang="0">
+                <a:pos x="connsiteX99" y="connsiteY99"/>
+              </a:cxn>
+              <a:cxn ang="0">
+                <a:pos x="connsiteX100" y="connsiteY100"/>
+              </a:cxn>
+              <a:cxn ang="0">
+                <a:pos x="connsiteX101" y="connsiteY101"/>
+              </a:cxn>
+              <a:cxn ang="0">
+                <a:pos x="connsiteX102" y="connsiteY102"/>
+              </a:cxn>
+              <a:cxn ang="0">
+                <a:pos x="connsiteX103" y="connsiteY103"/>
+              </a:cxn>
+              <a:cxn ang="0">
+                <a:pos x="connsiteX104" y="connsiteY104"/>
+              </a:cxn>
+              <a:cxn ang="0">
+                <a:pos x="connsiteX105" y="connsiteY105"/>
+              </a:cxn>
+              <a:cxn ang="0">
+                <a:pos x="connsiteX106" y="connsiteY106"/>
+              </a:cxn>
+              <a:cxn ang="0">
+                <a:pos x="connsiteX107" y="connsiteY107"/>
+              </a:cxn>
+              <a:cxn ang="0">
+                <a:pos x="connsiteX108" y="connsiteY108"/>
+              </a:cxn>
+              <a:cxn ang="0">
+                <a:pos x="connsiteX109" y="connsiteY109"/>
+              </a:cxn>
+              <a:cxn ang="0">
+                <a:pos x="connsiteX110" y="connsiteY110"/>
+              </a:cxn>
+              <a:cxn ang="0">
+                <a:pos x="connsiteX111" y="connsiteY111"/>
+              </a:cxn>
+              <a:cxn ang="0">
+                <a:pos x="connsiteX112" y="connsiteY112"/>
+              </a:cxn>
+              <a:cxn ang="0">
+                <a:pos x="connsiteX113" y="connsiteY113"/>
+              </a:cxn>
+              <a:cxn ang="0">
+                <a:pos x="connsiteX114" y="connsiteY114"/>
+              </a:cxn>
+              <a:cxn ang="0">
+                <a:pos x="connsiteX115" y="connsiteY115"/>
+              </a:cxn>
+              <a:cxn ang="0">
+                <a:pos x="connsiteX116" y="connsiteY116"/>
+              </a:cxn>
+              <a:cxn ang="0">
+                <a:pos x="connsiteX117" y="connsiteY117"/>
+              </a:cxn>
+              <a:cxn ang="0">
+                <a:pos x="connsiteX118" y="connsiteY118"/>
+              </a:cxn>
+              <a:cxn ang="0">
+                <a:pos x="connsiteX119" y="connsiteY119"/>
+              </a:cxn>
+              <a:cxn ang="0">
+                <a:pos x="connsiteX120" y="connsiteY120"/>
+              </a:cxn>
+              <a:cxn ang="0">
+                <a:pos x="connsiteX121" y="connsiteY121"/>
+              </a:cxn>
+              <a:cxn ang="0">
+                <a:pos x="connsiteX122" y="connsiteY122"/>
+              </a:cxn>
+              <a:cxn ang="0">
+                <a:pos x="connsiteX123" y="connsiteY123"/>
+              </a:cxn>
+              <a:cxn ang="0">
+                <a:pos x="connsiteX124" y="connsiteY124"/>
+              </a:cxn>
+              <a:cxn ang="0">
+                <a:pos x="connsiteX125" y="connsiteY125"/>
+              </a:cxn>
+              <a:cxn ang="0">
+                <a:pos x="connsiteX126" y="connsiteY126"/>
+              </a:cxn>
+              <a:cxn ang="0">
+                <a:pos x="connsiteX127" y="connsiteY127"/>
+              </a:cxn>
+              <a:cxn ang="0">
+                <a:pos x="connsiteX128" y="connsiteY128"/>
+              </a:cxn>
+              <a:cxn ang="0">
+                <a:pos x="connsiteX129" y="connsiteY129"/>
+              </a:cxn>
+              <a:cxn ang="0">
+                <a:pos x="connsiteX130" y="connsiteY130"/>
+              </a:cxn>
+              <a:cxn ang="0">
+                <a:pos x="connsiteX131" y="connsiteY131"/>
+              </a:cxn>
+              <a:cxn ang="0">
+                <a:pos x="connsiteX132" y="connsiteY132"/>
+              </a:cxn>
+              <a:cxn ang="0">
+                <a:pos x="connsiteX133" y="connsiteY133"/>
+              </a:cxn>
+              <a:cxn ang="0">
+                <a:pos x="connsiteX134" y="connsiteY134"/>
+              </a:cxn>
+              <a:cxn ang="0">
+                <a:pos x="connsiteX135" y="connsiteY135"/>
+              </a:cxn>
+              <a:cxn ang="0">
+                <a:pos x="connsiteX136" y="connsiteY136"/>
+              </a:cxn>
+              <a:cxn ang="0">
+                <a:pos x="connsiteX137" y="connsiteY137"/>
+              </a:cxn>
+              <a:cxn ang="0">
+                <a:pos x="connsiteX138" y="connsiteY138"/>
+              </a:cxn>
+              <a:cxn ang="0">
+                <a:pos x="connsiteX139" y="connsiteY139"/>
+              </a:cxn>
+              <a:cxn ang="0">
+                <a:pos x="connsiteX140" y="connsiteY140"/>
+              </a:cxn>
+              <a:cxn ang="0">
+                <a:pos x="connsiteX141" y="connsiteY141"/>
+              </a:cxn>
+              <a:cxn ang="0">
+                <a:pos x="connsiteX142" y="connsiteY142"/>
+              </a:cxn>
+              <a:cxn ang="0">
+                <a:pos x="connsiteX143" y="connsiteY143"/>
+              </a:cxn>
+              <a:cxn ang="0">
+                <a:pos x="connsiteX144" y="connsiteY144"/>
+              </a:cxn>
+            </a:cxnLst>
+            <a:rect l="l" t="t" r="r" b="b"/>
+            <a:pathLst>
+              <a:path w="4693698" h="6858000">
+                <a:moveTo>
+                  <a:pt x="0" y="0"/>
+                </a:moveTo>
+                <a:lnTo>
+                  <a:pt x="420914" y="0"/>
+                </a:lnTo>
+                <a:lnTo>
+                  <a:pt x="1582057" y="0"/>
+                </a:lnTo>
+                <a:lnTo>
+                  <a:pt x="4503903" y="0"/>
+                </a:lnTo>
+                <a:lnTo>
+                  <a:pt x="4508943" y="66675"/>
+                </a:lnTo>
+                <a:lnTo>
+                  <a:pt x="4517340" y="122237"/>
+                </a:lnTo>
+                <a:lnTo>
+                  <a:pt x="4527418" y="174625"/>
+                </a:lnTo>
+                <a:lnTo>
+                  <a:pt x="4544214" y="217487"/>
+                </a:lnTo>
+                <a:lnTo>
+                  <a:pt x="4561010" y="260350"/>
+                </a:lnTo>
+                <a:lnTo>
+                  <a:pt x="4581165" y="296862"/>
+                </a:lnTo>
+                <a:lnTo>
+                  <a:pt x="4601320" y="334962"/>
+                </a:lnTo>
+                <a:lnTo>
+                  <a:pt x="4619796" y="369887"/>
+                </a:lnTo>
+                <a:lnTo>
+                  <a:pt x="4638271" y="409575"/>
+                </a:lnTo>
+                <a:lnTo>
+                  <a:pt x="4655067" y="450850"/>
+                </a:lnTo>
+                <a:lnTo>
+                  <a:pt x="4670184" y="496887"/>
+                </a:lnTo>
+                <a:lnTo>
+                  <a:pt x="4681941" y="546100"/>
+                </a:lnTo>
+                <a:lnTo>
+                  <a:pt x="4690339" y="606425"/>
+                </a:lnTo>
+                <a:lnTo>
+                  <a:pt x="4693698" y="673100"/>
+                </a:lnTo>
+                <a:lnTo>
+                  <a:pt x="4690339" y="744537"/>
+                </a:lnTo>
+                <a:lnTo>
+                  <a:pt x="4681941" y="801687"/>
+                </a:lnTo>
+                <a:lnTo>
+                  <a:pt x="4670184" y="854075"/>
+                </a:lnTo>
+                <a:lnTo>
+                  <a:pt x="4655067" y="901700"/>
+                </a:lnTo>
+                <a:lnTo>
+                  <a:pt x="4638271" y="942975"/>
+                </a:lnTo>
+                <a:lnTo>
+                  <a:pt x="4618116" y="981075"/>
+                </a:lnTo>
+                <a:lnTo>
+                  <a:pt x="4597961" y="1017587"/>
+                </a:lnTo>
+                <a:lnTo>
+                  <a:pt x="4577806" y="1055687"/>
+                </a:lnTo>
+                <a:lnTo>
+                  <a:pt x="4559330" y="1095375"/>
+                </a:lnTo>
+                <a:lnTo>
+                  <a:pt x="4540854" y="1136650"/>
+                </a:lnTo>
+                <a:lnTo>
+                  <a:pt x="4525739" y="1182687"/>
+                </a:lnTo>
+                <a:lnTo>
+                  <a:pt x="4515661" y="1235075"/>
+                </a:lnTo>
+                <a:lnTo>
+                  <a:pt x="4505583" y="1295400"/>
+                </a:lnTo>
+                <a:lnTo>
+                  <a:pt x="4503903" y="1363662"/>
+                </a:lnTo>
+                <a:lnTo>
+                  <a:pt x="4505583" y="1431925"/>
+                </a:lnTo>
+                <a:lnTo>
+                  <a:pt x="4515661" y="1492250"/>
+                </a:lnTo>
+                <a:lnTo>
+                  <a:pt x="4525739" y="1544637"/>
+                </a:lnTo>
+                <a:lnTo>
+                  <a:pt x="4540854" y="1589087"/>
+                </a:lnTo>
+                <a:lnTo>
+                  <a:pt x="4559330" y="1631950"/>
+                </a:lnTo>
+                <a:lnTo>
+                  <a:pt x="4577806" y="1671637"/>
+                </a:lnTo>
+                <a:lnTo>
+                  <a:pt x="4597961" y="1708150"/>
+                </a:lnTo>
+                <a:lnTo>
+                  <a:pt x="4618116" y="1743075"/>
+                </a:lnTo>
+                <a:lnTo>
+                  <a:pt x="4638271" y="1782762"/>
+                </a:lnTo>
+                <a:lnTo>
+                  <a:pt x="4655067" y="1824037"/>
+                </a:lnTo>
+                <a:lnTo>
+                  <a:pt x="4670184" y="1870075"/>
+                </a:lnTo>
+                <a:lnTo>
+                  <a:pt x="4681941" y="1922462"/>
+                </a:lnTo>
+                <a:lnTo>
+                  <a:pt x="4690339" y="1982787"/>
+                </a:lnTo>
+                <a:lnTo>
+                  <a:pt x="4693698" y="2051050"/>
+                </a:lnTo>
+                <a:lnTo>
+                  <a:pt x="4690339" y="2119312"/>
+                </a:lnTo>
+                <a:lnTo>
+                  <a:pt x="4681941" y="2179637"/>
+                </a:lnTo>
+                <a:lnTo>
+                  <a:pt x="4670184" y="2232025"/>
+                </a:lnTo>
+                <a:lnTo>
+                  <a:pt x="4655067" y="2278062"/>
+                </a:lnTo>
+                <a:lnTo>
+                  <a:pt x="4638271" y="2319337"/>
+                </a:lnTo>
+                <a:lnTo>
+                  <a:pt x="4618116" y="2359025"/>
+                </a:lnTo>
+                <a:lnTo>
+                  <a:pt x="4597961" y="2395537"/>
+                </a:lnTo>
+                <a:lnTo>
+                  <a:pt x="4577806" y="2433637"/>
+                </a:lnTo>
+                <a:lnTo>
+                  <a:pt x="4559330" y="2471737"/>
+                </a:lnTo>
+                <a:lnTo>
+                  <a:pt x="4540854" y="2513012"/>
+                </a:lnTo>
+                <a:lnTo>
+                  <a:pt x="4525739" y="2560637"/>
+                </a:lnTo>
+                <a:lnTo>
+                  <a:pt x="4515661" y="2613025"/>
+                </a:lnTo>
+                <a:lnTo>
+                  <a:pt x="4505583" y="2671762"/>
+                </a:lnTo>
+                <a:lnTo>
+                  <a:pt x="4503903" y="2741612"/>
+                </a:lnTo>
+                <a:lnTo>
+                  <a:pt x="4505583" y="2809875"/>
+                </a:lnTo>
+                <a:lnTo>
+                  <a:pt x="4515661" y="2868612"/>
+                </a:lnTo>
+                <a:lnTo>
+                  <a:pt x="4525739" y="2922587"/>
+                </a:lnTo>
+                <a:lnTo>
+                  <a:pt x="4540854" y="2967037"/>
+                </a:lnTo>
+                <a:lnTo>
+                  <a:pt x="4559330" y="3009900"/>
+                </a:lnTo>
+                <a:lnTo>
+                  <a:pt x="4577806" y="3046412"/>
+                </a:lnTo>
+                <a:lnTo>
+                  <a:pt x="4597961" y="3084512"/>
+                </a:lnTo>
+                <a:lnTo>
+                  <a:pt x="4618116" y="3121025"/>
+                </a:lnTo>
+                <a:lnTo>
+                  <a:pt x="4638271" y="3160712"/>
+                </a:lnTo>
+                <a:lnTo>
+                  <a:pt x="4655067" y="3201987"/>
+                </a:lnTo>
+                <a:lnTo>
+                  <a:pt x="4670184" y="3248025"/>
+                </a:lnTo>
+                <a:lnTo>
+                  <a:pt x="4681941" y="3300412"/>
+                </a:lnTo>
+                <a:lnTo>
+                  <a:pt x="4690339" y="3360737"/>
+                </a:lnTo>
+                <a:lnTo>
+                  <a:pt x="4693698" y="3427412"/>
+                </a:lnTo>
+                <a:lnTo>
+                  <a:pt x="4690339" y="3497262"/>
+                </a:lnTo>
+                <a:lnTo>
+                  <a:pt x="4681941" y="3557587"/>
+                </a:lnTo>
+                <a:lnTo>
+                  <a:pt x="4670184" y="3609975"/>
+                </a:lnTo>
+                <a:lnTo>
+                  <a:pt x="4655067" y="3656012"/>
+                </a:lnTo>
+                <a:lnTo>
+                  <a:pt x="4638271" y="3697287"/>
+                </a:lnTo>
+                <a:lnTo>
+                  <a:pt x="4618116" y="3736975"/>
+                </a:lnTo>
+                <a:lnTo>
+                  <a:pt x="4577806" y="3811587"/>
+                </a:lnTo>
+                <a:lnTo>
+                  <a:pt x="4559330" y="3848100"/>
+                </a:lnTo>
+                <a:lnTo>
+                  <a:pt x="4540854" y="3890962"/>
+                </a:lnTo>
+                <a:lnTo>
+                  <a:pt x="4525739" y="3935412"/>
+                </a:lnTo>
+                <a:lnTo>
+                  <a:pt x="4515661" y="3987800"/>
+                </a:lnTo>
+                <a:lnTo>
+                  <a:pt x="4505583" y="4048125"/>
+                </a:lnTo>
+                <a:lnTo>
+                  <a:pt x="4503903" y="4116387"/>
+                </a:lnTo>
+                <a:lnTo>
+                  <a:pt x="4505583" y="4186237"/>
+                </a:lnTo>
+                <a:lnTo>
+                  <a:pt x="4515661" y="4244975"/>
+                </a:lnTo>
+                <a:lnTo>
+                  <a:pt x="4525739" y="4297362"/>
+                </a:lnTo>
+                <a:lnTo>
+                  <a:pt x="4540854" y="4343400"/>
+                </a:lnTo>
+                <a:lnTo>
+                  <a:pt x="4559330" y="4386262"/>
+                </a:lnTo>
+                <a:lnTo>
+                  <a:pt x="4577806" y="4424362"/>
+                </a:lnTo>
+                <a:lnTo>
+                  <a:pt x="4618116" y="4498975"/>
+                </a:lnTo>
+                <a:lnTo>
+                  <a:pt x="4638271" y="4537075"/>
+                </a:lnTo>
+                <a:lnTo>
+                  <a:pt x="4655067" y="4579937"/>
+                </a:lnTo>
+                <a:lnTo>
+                  <a:pt x="4670184" y="4625975"/>
+                </a:lnTo>
+                <a:lnTo>
+                  <a:pt x="4681941" y="4678362"/>
+                </a:lnTo>
+                <a:lnTo>
+                  <a:pt x="4690339" y="4738687"/>
+                </a:lnTo>
+                <a:lnTo>
+                  <a:pt x="4693698" y="4806950"/>
+                </a:lnTo>
+                <a:lnTo>
+                  <a:pt x="4690339" y="4875212"/>
+                </a:lnTo>
+                <a:lnTo>
+                  <a:pt x="4681941" y="4935537"/>
+                </a:lnTo>
+                <a:lnTo>
+                  <a:pt x="4670184" y="4987925"/>
+                </a:lnTo>
+                <a:lnTo>
+                  <a:pt x="4655067" y="5033962"/>
+                </a:lnTo>
+                <a:lnTo>
+                  <a:pt x="4638271" y="5075237"/>
+                </a:lnTo>
+                <a:lnTo>
+                  <a:pt x="4618116" y="5114925"/>
+                </a:lnTo>
+                <a:lnTo>
+                  <a:pt x="4597961" y="5149850"/>
+                </a:lnTo>
+                <a:lnTo>
+                  <a:pt x="4577806" y="5186362"/>
+                </a:lnTo>
+                <a:lnTo>
+                  <a:pt x="4559330" y="5226050"/>
+                </a:lnTo>
+                <a:lnTo>
+                  <a:pt x="4540854" y="5268912"/>
+                </a:lnTo>
+                <a:lnTo>
+                  <a:pt x="4525739" y="5313362"/>
+                </a:lnTo>
+                <a:lnTo>
+                  <a:pt x="4515661" y="5365750"/>
+                </a:lnTo>
+                <a:lnTo>
+                  <a:pt x="4505583" y="5426075"/>
+                </a:lnTo>
+                <a:lnTo>
+                  <a:pt x="4503903" y="5494337"/>
+                </a:lnTo>
+                <a:lnTo>
+                  <a:pt x="4505583" y="5562600"/>
+                </a:lnTo>
+                <a:lnTo>
+                  <a:pt x="4515661" y="5622925"/>
+                </a:lnTo>
+                <a:lnTo>
+                  <a:pt x="4525739" y="5675312"/>
+                </a:lnTo>
+                <a:lnTo>
+                  <a:pt x="4540854" y="5721350"/>
+                </a:lnTo>
+                <a:lnTo>
+                  <a:pt x="4559330" y="5762625"/>
+                </a:lnTo>
+                <a:lnTo>
+                  <a:pt x="4577806" y="5802312"/>
+                </a:lnTo>
+                <a:lnTo>
+                  <a:pt x="4597961" y="5840412"/>
+                </a:lnTo>
+                <a:lnTo>
+                  <a:pt x="4618116" y="5876925"/>
+                </a:lnTo>
+                <a:lnTo>
+                  <a:pt x="4638271" y="5915025"/>
+                </a:lnTo>
+                <a:lnTo>
+                  <a:pt x="4655067" y="5956300"/>
+                </a:lnTo>
+                <a:lnTo>
+                  <a:pt x="4670184" y="6003925"/>
+                </a:lnTo>
+                <a:lnTo>
+                  <a:pt x="4681941" y="6056312"/>
+                </a:lnTo>
+                <a:lnTo>
+                  <a:pt x="4690339" y="6113462"/>
+                </a:lnTo>
+                <a:lnTo>
+                  <a:pt x="4693698" y="6183312"/>
+                </a:lnTo>
+                <a:lnTo>
+                  <a:pt x="4690339" y="6251575"/>
+                </a:lnTo>
+                <a:lnTo>
+                  <a:pt x="4681941" y="6311900"/>
+                </a:lnTo>
+                <a:lnTo>
+                  <a:pt x="4670184" y="6361112"/>
+                </a:lnTo>
+                <a:lnTo>
+                  <a:pt x="4655067" y="6407150"/>
+                </a:lnTo>
+                <a:lnTo>
+                  <a:pt x="4638271" y="6448425"/>
+                </a:lnTo>
+                <a:lnTo>
+                  <a:pt x="4619796" y="6488112"/>
+                </a:lnTo>
+                <a:lnTo>
+                  <a:pt x="4601320" y="6523037"/>
+                </a:lnTo>
+                <a:lnTo>
+                  <a:pt x="4581165" y="6561137"/>
+                </a:lnTo>
+                <a:lnTo>
+                  <a:pt x="4561010" y="6597650"/>
+                </a:lnTo>
+                <a:lnTo>
+                  <a:pt x="4544214" y="6640512"/>
+                </a:lnTo>
+                <a:lnTo>
+                  <a:pt x="4527418" y="6683375"/>
+                </a:lnTo>
+                <a:lnTo>
+                  <a:pt x="4517340" y="6735762"/>
+                </a:lnTo>
+                <a:lnTo>
+                  <a:pt x="4508943" y="6791325"/>
+                </a:lnTo>
+                <a:lnTo>
+                  <a:pt x="4503903" y="6858000"/>
+                </a:lnTo>
+                <a:lnTo>
+                  <a:pt x="1582057" y="6858000"/>
+                </a:lnTo>
+                <a:lnTo>
+                  <a:pt x="420914" y="6858000"/>
+                </a:lnTo>
+                <a:lnTo>
+                  <a:pt x="0" y="6858000"/>
+                </a:lnTo>
+                <a:close/>
+              </a:path>
+            </a:pathLst>
+          </a:custGeom>
+          <a:solidFill>
+            <a:schemeClr val="bg1"/>
+          </a:solidFill>
+          <a:ln w="0">
+            <a:noFill/>
+            <a:prstDash val="solid"/>
+            <a:round/>
+            <a:headEnd/>
+            <a:tailEnd/>
+          </a:ln>
+        </p:spPr>
+        <p:txBody>
+          <a:bodyPr wrap="square">
+            <a:noAutofit/>
+          </a:bodyPr>
+          <a:lstStyle/>
+          <a:p>
+            <a:endParaRPr lang="en-US" dirty="0"/>
+          </a:p>
+        </p:txBody>
+      </p:sp>
+      <p:sp>
+        <p:nvSpPr>
+          <p:cNvPr id="2" name="Title 1">
+            <a:extLst>
+              <a:ext uri="{FF2B5EF4-FFF2-40B4-BE49-F238E27FC236}">
+                <a16:creationId xmlns:a16="http://schemas.microsoft.com/office/drawing/2014/main" id="{F73DC523-70CE-4532-95E2-779E28B8180E}"/>
+              </a:ext>
+            </a:extLst>
+          </p:cNvPr>
+          <p:cNvSpPr>
+            <a:spLocks noGrp="1"/>
+          </p:cNvSpPr>
+          <p:nvPr>
+            <p:ph type="title"/>
+          </p:nvPr>
+        </p:nvSpPr>
+        <p:spPr>
+          <a:xfrm>
+            <a:off x="765051" y="662400"/>
+            <a:ext cx="2901785" cy="1492132"/>
+          </a:xfrm>
+        </p:spPr>
+        <p:txBody>
+          <a:bodyPr anchor="t">
+            <a:normAutofit/>
+          </a:bodyPr>
+          <a:lstStyle/>
+          <a:p>
+            <a:r>
+              <a:rPr lang="en-US" dirty="0"/>
+              <a:t>GPS I2C &amp; SPI Lines</a:t>
+            </a:r>
+          </a:p>
+        </p:txBody>
+      </p:sp>
+      <p:sp>
+        <p:nvSpPr>
+          <p:cNvPr id="3" name="Content Placeholder 2">
+            <a:extLst>
+              <a:ext uri="{FF2B5EF4-FFF2-40B4-BE49-F238E27FC236}">
+                <a16:creationId xmlns:a16="http://schemas.microsoft.com/office/drawing/2014/main" id="{69052F02-D78E-4581-9A47-372022F486B5}"/>
+              </a:ext>
+            </a:extLst>
+          </p:cNvPr>
+          <p:cNvSpPr>
+            <a:spLocks noGrp="1"/>
+          </p:cNvSpPr>
+          <p:nvPr>
+            <p:ph idx="1"/>
+          </p:nvPr>
+        </p:nvSpPr>
+        <p:spPr>
+          <a:xfrm>
+            <a:off x="765051" y="2286000"/>
+            <a:ext cx="3384000" cy="3844800"/>
+          </a:xfrm>
+        </p:spPr>
+        <p:txBody>
+          <a:bodyPr>
+            <a:normAutofit/>
+          </a:bodyPr>
+          <a:lstStyle/>
+          <a:p>
+            <a:r>
+              <a:rPr lang="en-US" sz="2000" dirty="0"/>
+              <a:t>Thicker Traces, Lower Resistance</a:t>
+            </a:r>
+          </a:p>
+          <a:p>
+            <a:r>
+              <a:rPr lang="en-US" sz="2000" dirty="0"/>
+              <a:t>Greater Spacing</a:t>
+            </a:r>
+          </a:p>
+          <a:p>
+            <a:r>
+              <a:rPr lang="en-US" sz="2000" dirty="0"/>
+              <a:t>Ground Plane Shielding</a:t>
+            </a:r>
+          </a:p>
+          <a:p>
+            <a:r>
+              <a:rPr lang="en-US" sz="2000" dirty="0"/>
+              <a:t>Added Vias To Reduce Ground Impedance, Improved Shielding</a:t>
+            </a:r>
+          </a:p>
+        </p:txBody>
+      </p:sp>
+      <p:sp>
+        <p:nvSpPr>
+          <p:cNvPr id="10" name="Rectangle 9">
+            <a:extLst>
+              <a:ext uri="{FF2B5EF4-FFF2-40B4-BE49-F238E27FC236}">
+                <a16:creationId xmlns:a16="http://schemas.microsoft.com/office/drawing/2014/main" id="{33492E6B-0E76-499B-B43C-308FD9D86C05}"/>
+              </a:ext>
+            </a:extLst>
+          </p:cNvPr>
+          <p:cNvSpPr/>
+          <p:nvPr/>
+        </p:nvSpPr>
+        <p:spPr>
+          <a:xfrm>
+            <a:off x="4426853" y="3339149"/>
+            <a:ext cx="7765147" cy="190500"/>
+          </a:xfrm>
+          <a:prstGeom prst="rect">
+            <a:avLst/>
+          </a:prstGeom>
+          <a:solidFill>
+            <a:schemeClr val="bg1"/>
+          </a:solidFill>
+          <a:ln>
+            <a:noFill/>
+          </a:ln>
+        </p:spPr>
+        <p:style>
+          <a:lnRef idx="2">
+            <a:schemeClr val="accent1">
+              <a:shade val="50000"/>
+            </a:schemeClr>
+          </a:lnRef>
+          <a:fillRef idx="1">
+            <a:schemeClr val="accent1"/>
+          </a:fillRef>
+          <a:effectRef idx="0">
+            <a:schemeClr val="accent1"/>
+          </a:effectRef>
+          <a:fontRef idx="minor">
+            <a:schemeClr val="lt1"/>
+          </a:fontRef>
+        </p:style>
+        <p:txBody>
+          <a:bodyPr rtlCol="0" anchor="ctr"/>
+          <a:lstStyle/>
+          <a:p>
+            <a:pPr algn="ctr"/>
+            <a:endParaRPr lang="en-US"/>
+          </a:p>
+        </p:txBody>
+      </p:sp>
+    </p:spTree>
+    <p:extLst>
+      <p:ext uri="{BB962C8B-B14F-4D97-AF65-F5344CB8AC3E}">
+        <p14:creationId xmlns:p14="http://schemas.microsoft.com/office/powerpoint/2010/main" val="397879573"/>
+      </p:ext>
+    </p:extLst>
+  </p:cSld>
+  <p:clrMapOvr>
+    <a:masterClrMapping/>
+  </p:clrMapOvr>
+</p:sld>
+</file>
+
+<file path=ppt/slides/slide4.xml><?xml version="1.0" encoding="utf-8"?>
+<p:sld xmlns:a="http://schemas.openxmlformats.org/drawingml/2006/main" xmlns:r="http://schemas.openxmlformats.org/officeDocument/2006/relationships" xmlns:p="http://schemas.openxmlformats.org/presentationml/2006/main">
+  <p:cSld>
+    <p:bg>
+      <p:bgPr>
+        <a:solidFill>
+          <a:schemeClr val="bg1"/>
+        </a:solidFill>
+        <a:effectLst/>
+      </p:bgPr>
+    </p:bg>
+    <p:spTree>
+      <p:nvGrpSpPr>
+        <p:cNvPr id="1" name=""/>
+        <p:cNvGrpSpPr/>
+        <p:nvPr/>
+      </p:nvGrpSpPr>
+      <p:grpSpPr>
+        <a:xfrm>
+          <a:off x="0" y="0"/>
+          <a:ext cx="0" cy="0"/>
+          <a:chOff x="0" y="0"/>
+          <a:chExt cx="0" cy="0"/>
+        </a:xfrm>
+      </p:grpSpPr>
+      <p:sp useBgFill="1">
+        <p:nvSpPr>
+          <p:cNvPr id="39" name="Rectangle 38">
+            <a:extLst>
+              <a:ext uri="{FF2B5EF4-FFF2-40B4-BE49-F238E27FC236}">
+                <a16:creationId xmlns:a16="http://schemas.microsoft.com/office/drawing/2014/main" id="{F13C74B1-5B17-4795-BED0-7140497B445A}"/>
+              </a:ext>
+              <a:ext uri="{C183D7F6-B498-43B3-948B-1728B52AA6E4}">
+                <adec:decorative xmlns:adec="http://schemas.microsoft.com/office/drawing/2017/decorative" val="1"/>
+              </a:ext>
+            </a:extLst>
+          </p:cNvPr>
+          <p:cNvSpPr>
+            <a:spLocks noGrp="1" noRot="1" noChangeAspect="1" noMove="1" noResize="1" noEditPoints="1" noAdjustHandles="1" noChangeArrowheads="1" noChangeShapeType="1" noTextEdit="1"/>
+          </p:cNvSpPr>
+          <p:nvPr>
+            <p:extLst>
+              <p:ext uri="{386F3935-93C4-4BCD-93E2-E3B085C9AB24}">
+                <p16:designElem xmlns:p16="http://schemas.microsoft.com/office/powerpoint/2015/main" val="1"/>
+              </p:ext>
+            </p:extLst>
+          </p:nvPr>
+        </p:nvSpPr>
+        <p:spPr>
+          <a:xfrm>
+            <a:off x="0" y="0"/>
+            <a:ext cx="12188952" cy="6858000"/>
+          </a:xfrm>
+          <a:prstGeom prst="rect">
+            <a:avLst/>
+          </a:prstGeom>
+          <a:ln>
+            <a:noFill/>
+          </a:ln>
+        </p:spPr>
+        <p:style>
+          <a:lnRef idx="2">
+            <a:schemeClr val="accent1">
+              <a:shade val="50000"/>
+            </a:schemeClr>
+          </a:lnRef>
+          <a:fillRef idx="1">
+            <a:schemeClr val="accent1"/>
+          </a:fillRef>
+          <a:effectRef idx="0">
+            <a:schemeClr val="accent1"/>
+          </a:effectRef>
+          <a:fontRef idx="minor">
+            <a:schemeClr val="lt1"/>
+          </a:fontRef>
+        </p:style>
+        <p:txBody>
+          <a:bodyPr rtlCol="0" anchor="ctr"/>
+          <a:lstStyle/>
+          <a:p>
+            <a:pPr algn="ctr"/>
+            <a:endParaRPr lang="en-US"/>
+          </a:p>
+        </p:txBody>
+      </p:sp>
+      <p:sp>
+        <p:nvSpPr>
+          <p:cNvPr id="2" name="Title 1">
+            <a:extLst>
+              <a:ext uri="{FF2B5EF4-FFF2-40B4-BE49-F238E27FC236}">
+                <a16:creationId xmlns:a16="http://schemas.microsoft.com/office/drawing/2014/main" id="{65B65BB6-0D0C-416E-A5C0-6126BDE71DFF}"/>
+              </a:ext>
+            </a:extLst>
+          </p:cNvPr>
+          <p:cNvSpPr>
+            <a:spLocks noGrp="1"/>
+          </p:cNvSpPr>
+          <p:nvPr>
+            <p:ph type="title"/>
+          </p:nvPr>
+        </p:nvSpPr>
+        <p:spPr>
+          <a:xfrm>
+            <a:off x="640080" y="325369"/>
+            <a:ext cx="4368602" cy="1956841"/>
+          </a:xfrm>
+        </p:spPr>
+        <p:txBody>
+          <a:bodyPr anchor="b">
+            <a:normAutofit fontScale="90000"/>
+          </a:bodyPr>
+          <a:lstStyle/>
+          <a:p>
+            <a:r>
+              <a:rPr lang="en-US" sz="5000" dirty="0"/>
+              <a:t>Old Accelerometer Layouts</a:t>
+            </a:r>
+          </a:p>
+        </p:txBody>
+      </p:sp>
+      <p:sp>
+        <p:nvSpPr>
+          <p:cNvPr id="41" name="sketchy line">
+            <a:extLst>
+              <a:ext uri="{FF2B5EF4-FFF2-40B4-BE49-F238E27FC236}">
+                <a16:creationId xmlns:a16="http://schemas.microsoft.com/office/drawing/2014/main" id="{D4974D33-8DC5-464E-8C6D-BE58F0669C17}"/>
+              </a:ext>
+              <a:ext uri="{C183D7F6-B498-43B3-948B-1728B52AA6E4}">
+                <adec:decorative xmlns:adec="http://schemas.microsoft.com/office/drawing/2017/decorative" val="1"/>
+              </a:ext>
+            </a:extLst>
+          </p:cNvPr>
+          <p:cNvSpPr>
+            <a:spLocks noGrp="1" noRot="1" noChangeAspect="1" noMove="1" noResize="1" noEditPoints="1" noAdjustHandles="1" noChangeArrowheads="1" noChangeShapeType="1" noTextEdit="1"/>
+          </p:cNvSpPr>
+          <p:nvPr>
+            <p:extLst>
+              <p:ext uri="{386F3935-93C4-4BCD-93E2-E3B085C9AB24}">
+                <p16:designElem xmlns:p16="http://schemas.microsoft.com/office/powerpoint/2015/main" val="1"/>
+              </p:ext>
+            </p:extLst>
+          </p:nvPr>
+        </p:nvSpPr>
+        <p:spPr>
+          <a:xfrm>
+            <a:off x="640080" y="2586994"/>
+            <a:ext cx="3474720" cy="18288"/>
+          </a:xfrm>
+          <a:custGeom>
+            <a:avLst/>
+            <a:gdLst>
+              <a:gd name="connsiteX0" fmla="*/ 0 w 3474720"/>
+              <a:gd name="connsiteY0" fmla="*/ 0 h 18288"/>
+              <a:gd name="connsiteX1" fmla="*/ 694944 w 3474720"/>
+              <a:gd name="connsiteY1" fmla="*/ 0 h 18288"/>
+              <a:gd name="connsiteX2" fmla="*/ 1355141 w 3474720"/>
+              <a:gd name="connsiteY2" fmla="*/ 0 h 18288"/>
+              <a:gd name="connsiteX3" fmla="*/ 2015338 w 3474720"/>
+              <a:gd name="connsiteY3" fmla="*/ 0 h 18288"/>
+              <a:gd name="connsiteX4" fmla="*/ 2779776 w 3474720"/>
+              <a:gd name="connsiteY4" fmla="*/ 0 h 18288"/>
+              <a:gd name="connsiteX5" fmla="*/ 3474720 w 3474720"/>
+              <a:gd name="connsiteY5" fmla="*/ 0 h 18288"/>
+              <a:gd name="connsiteX6" fmla="*/ 3474720 w 3474720"/>
+              <a:gd name="connsiteY6" fmla="*/ 18288 h 18288"/>
+              <a:gd name="connsiteX7" fmla="*/ 2779776 w 3474720"/>
+              <a:gd name="connsiteY7" fmla="*/ 18288 h 18288"/>
+              <a:gd name="connsiteX8" fmla="*/ 2189074 w 3474720"/>
+              <a:gd name="connsiteY8" fmla="*/ 18288 h 18288"/>
+              <a:gd name="connsiteX9" fmla="*/ 1528877 w 3474720"/>
+              <a:gd name="connsiteY9" fmla="*/ 18288 h 18288"/>
+              <a:gd name="connsiteX10" fmla="*/ 868680 w 3474720"/>
+              <a:gd name="connsiteY10" fmla="*/ 18288 h 18288"/>
+              <a:gd name="connsiteX11" fmla="*/ 0 w 3474720"/>
+              <a:gd name="connsiteY11" fmla="*/ 18288 h 18288"/>
+              <a:gd name="connsiteX12" fmla="*/ 0 w 3474720"/>
+              <a:gd name="connsiteY12" fmla="*/ 0 h 18288"/>
+            </a:gdLst>
+            <a:ahLst/>
+            <a:cxnLst>
+              <a:cxn ang="0">
+                <a:pos x="connsiteX0" y="connsiteY0"/>
+              </a:cxn>
+              <a:cxn ang="0">
+                <a:pos x="connsiteX1" y="connsiteY1"/>
+              </a:cxn>
+              <a:cxn ang="0">
+                <a:pos x="connsiteX2" y="connsiteY2"/>
+              </a:cxn>
+              <a:cxn ang="0">
+                <a:pos x="connsiteX3" y="connsiteY3"/>
+              </a:cxn>
+              <a:cxn ang="0">
+                <a:pos x="connsiteX4" y="connsiteY4"/>
+              </a:cxn>
+              <a:cxn ang="0">
+                <a:pos x="connsiteX5" y="connsiteY5"/>
+              </a:cxn>
+              <a:cxn ang="0">
+                <a:pos x="connsiteX6" y="connsiteY6"/>
+              </a:cxn>
+              <a:cxn ang="0">
+                <a:pos x="connsiteX7" y="connsiteY7"/>
+              </a:cxn>
+              <a:cxn ang="0">
+                <a:pos x="connsiteX8" y="connsiteY8"/>
+              </a:cxn>
+              <a:cxn ang="0">
+                <a:pos x="connsiteX9" y="connsiteY9"/>
+              </a:cxn>
+              <a:cxn ang="0">
+                <a:pos x="connsiteX10" y="connsiteY10"/>
+              </a:cxn>
+              <a:cxn ang="0">
+                <a:pos x="connsiteX11" y="connsiteY11"/>
+              </a:cxn>
+              <a:cxn ang="0">
+                <a:pos x="connsiteX12" y="connsiteY12"/>
+              </a:cxn>
+            </a:cxnLst>
+            <a:rect l="l" t="t" r="r" b="b"/>
+            <a:pathLst>
+              <a:path w="3474720" h="18288" fill="none" extrusionOk="0">
+                <a:moveTo>
+                  <a:pt x="0" y="0"/>
+                </a:moveTo>
+                <a:cubicBezTo>
+                  <a:pt x="224454" y="-14544"/>
+                  <a:pt x="495407" y="26540"/>
+                  <a:pt x="694944" y="0"/>
+                </a:cubicBezTo>
+                <a:cubicBezTo>
+                  <a:pt x="894481" y="-26540"/>
+                  <a:pt x="1130063" y="24713"/>
+                  <a:pt x="1355141" y="0"/>
+                </a:cubicBezTo>
+                <a:cubicBezTo>
+                  <a:pt x="1580219" y="-24713"/>
+                  <a:pt x="1820099" y="26695"/>
+                  <a:pt x="2015338" y="0"/>
+                </a:cubicBezTo>
+                <a:cubicBezTo>
+                  <a:pt x="2210577" y="-26695"/>
+                  <a:pt x="2402045" y="165"/>
+                  <a:pt x="2779776" y="0"/>
+                </a:cubicBezTo>
+                <a:cubicBezTo>
+                  <a:pt x="3157507" y="-165"/>
+                  <a:pt x="3286859" y="-15571"/>
+                  <a:pt x="3474720" y="0"/>
+                </a:cubicBezTo>
+                <a:cubicBezTo>
+                  <a:pt x="3474286" y="7551"/>
+                  <a:pt x="3474253" y="9822"/>
+                  <a:pt x="3474720" y="18288"/>
+                </a:cubicBezTo>
+                <a:cubicBezTo>
+                  <a:pt x="3233904" y="29845"/>
+                  <a:pt x="2945134" y="-5256"/>
+                  <a:pt x="2779776" y="18288"/>
+                </a:cubicBezTo>
+                <a:cubicBezTo>
+                  <a:pt x="2614418" y="41832"/>
+                  <a:pt x="2339768" y="22709"/>
+                  <a:pt x="2189074" y="18288"/>
+                </a:cubicBezTo>
+                <a:cubicBezTo>
+                  <a:pt x="2038380" y="13867"/>
+                  <a:pt x="1817434" y="-4947"/>
+                  <a:pt x="1528877" y="18288"/>
+                </a:cubicBezTo>
+                <a:cubicBezTo>
+                  <a:pt x="1240320" y="41523"/>
+                  <a:pt x="1042447" y="37198"/>
+                  <a:pt x="868680" y="18288"/>
+                </a:cubicBezTo>
+                <a:cubicBezTo>
+                  <a:pt x="694913" y="-622"/>
+                  <a:pt x="233232" y="44909"/>
+                  <a:pt x="0" y="18288"/>
+                </a:cubicBezTo>
+                <a:cubicBezTo>
+                  <a:pt x="60" y="11696"/>
+                  <a:pt x="66" y="3758"/>
+                  <a:pt x="0" y="0"/>
+                </a:cubicBezTo>
+                <a:close/>
+              </a:path>
+              <a:path w="3474720" h="18288" stroke="0" extrusionOk="0">
+                <a:moveTo>
+                  <a:pt x="0" y="0"/>
+                </a:moveTo>
+                <a:cubicBezTo>
+                  <a:pt x="202328" y="-14716"/>
+                  <a:pt x="332722" y="-11499"/>
+                  <a:pt x="625450" y="0"/>
+                </a:cubicBezTo>
+                <a:cubicBezTo>
+                  <a:pt x="918178" y="11499"/>
+                  <a:pt x="1096688" y="5123"/>
+                  <a:pt x="1389888" y="0"/>
+                </a:cubicBezTo>
+                <a:cubicBezTo>
+                  <a:pt x="1683088" y="-5123"/>
+                  <a:pt x="1835981" y="-14038"/>
+                  <a:pt x="1980590" y="0"/>
+                </a:cubicBezTo>
+                <a:cubicBezTo>
+                  <a:pt x="2125199" y="14038"/>
+                  <a:pt x="2396099" y="-7203"/>
+                  <a:pt x="2571293" y="0"/>
+                </a:cubicBezTo>
+                <a:cubicBezTo>
+                  <a:pt x="2746487" y="7203"/>
+                  <a:pt x="3041609" y="-12036"/>
+                  <a:pt x="3474720" y="0"/>
+                </a:cubicBezTo>
+                <a:cubicBezTo>
+                  <a:pt x="3474638" y="4406"/>
+                  <a:pt x="3474631" y="9982"/>
+                  <a:pt x="3474720" y="18288"/>
+                </a:cubicBezTo>
+                <a:cubicBezTo>
+                  <a:pt x="3324873" y="21876"/>
+                  <a:pt x="3136771" y="12587"/>
+                  <a:pt x="2814523" y="18288"/>
+                </a:cubicBezTo>
+                <a:cubicBezTo>
+                  <a:pt x="2492275" y="23989"/>
+                  <a:pt x="2294402" y="47111"/>
+                  <a:pt x="2154326" y="18288"/>
+                </a:cubicBezTo>
+                <a:cubicBezTo>
+                  <a:pt x="2014250" y="-10535"/>
+                  <a:pt x="1820317" y="33903"/>
+                  <a:pt x="1494130" y="18288"/>
+                </a:cubicBezTo>
+                <a:cubicBezTo>
+                  <a:pt x="1167943" y="2673"/>
+                  <a:pt x="948432" y="14868"/>
+                  <a:pt x="729691" y="18288"/>
+                </a:cubicBezTo>
+                <a:cubicBezTo>
+                  <a:pt x="510950" y="21708"/>
+                  <a:pt x="264032" y="24354"/>
+                  <a:pt x="0" y="18288"/>
+                </a:cubicBezTo>
+                <a:cubicBezTo>
+                  <a:pt x="189" y="14288"/>
+                  <a:pt x="-703" y="3747"/>
+                  <a:pt x="0" y="0"/>
+                </a:cubicBezTo>
+                <a:close/>
+              </a:path>
+            </a:pathLst>
+          </a:custGeom>
+          <a:solidFill>
+            <a:schemeClr val="accent2"/>
+          </a:solidFill>
+          <a:ln w="44450" cap="rnd">
+            <a:solidFill>
+              <a:schemeClr val="accent2"/>
+            </a:solidFill>
+            <a:round/>
+            <a:extLst>
+              <a:ext uri="{C807C97D-BFC1-408E-A445-0C87EB9F89A2}">
+                <ask:lineSketchStyleProps xmlns:ask="http://schemas.microsoft.com/office/drawing/2018/sketchyshapes" sd="2863741219">
+                  <a:prstGeom prst="rect">
+                    <a:avLst/>
+                  </a:prstGeom>
+                  <ask:type>
+                    <ask:lineSketchFreehand/>
+                  </ask:type>
+                </ask:lineSketchStyleProps>
+              </a:ext>
+            </a:extLst>
+          </a:ln>
+        </p:spPr>
+        <p:style>
+          <a:lnRef idx="2">
+            <a:schemeClr val="accent1">
+              <a:shade val="50000"/>
+            </a:schemeClr>
+          </a:lnRef>
+          <a:fillRef idx="1">
+            <a:schemeClr val="accent1"/>
+          </a:fillRef>
+          <a:effectRef idx="0">
+            <a:schemeClr val="accent1"/>
+          </a:effectRef>
+          <a:fontRef idx="minor">
+            <a:schemeClr val="lt1"/>
+          </a:fontRef>
+        </p:style>
+        <p:txBody>
+          <a:bodyPr rtlCol="0" anchor="ctr"/>
+          <a:lstStyle/>
+          <a:p>
+            <a:pPr algn="ctr"/>
+            <a:endParaRPr lang="en-US"/>
+          </a:p>
+        </p:txBody>
+      </p:sp>
+      <p:sp>
+        <p:nvSpPr>
+          <p:cNvPr id="3" name="Content Placeholder 2">
+            <a:extLst>
+              <a:ext uri="{FF2B5EF4-FFF2-40B4-BE49-F238E27FC236}">
+                <a16:creationId xmlns:a16="http://schemas.microsoft.com/office/drawing/2014/main" id="{FCC49443-6240-434F-8C88-B4E4D752521B}"/>
+              </a:ext>
+            </a:extLst>
+          </p:cNvPr>
+          <p:cNvSpPr>
+            <a:spLocks noGrp="1"/>
+          </p:cNvSpPr>
+          <p:nvPr>
+            <p:ph idx="1"/>
+          </p:nvPr>
+        </p:nvSpPr>
+        <p:spPr>
+          <a:xfrm>
+            <a:off x="640080" y="2872899"/>
+            <a:ext cx="4243589" cy="3320668"/>
+          </a:xfrm>
+        </p:spPr>
+        <p:txBody>
+          <a:bodyPr>
+            <a:normAutofit fontScale="92500" lnSpcReduction="10000"/>
+          </a:bodyPr>
+          <a:lstStyle/>
+          <a:p>
+            <a:r>
+              <a:rPr lang="en-US" sz="2200" dirty="0"/>
+              <a:t>Decoupling Capacitors</a:t>
+            </a:r>
+          </a:p>
+          <a:p>
+            <a:pPr lvl="1"/>
+            <a:r>
+              <a:rPr lang="en-US" sz="2200" dirty="0"/>
+              <a:t>Far from the chips</a:t>
+            </a:r>
+          </a:p>
+          <a:p>
+            <a:pPr lvl="1"/>
+            <a:r>
+              <a:rPr lang="en-US" sz="2200" dirty="0"/>
+              <a:t>Located along common power line, reducing effectiveness</a:t>
+            </a:r>
+          </a:p>
+          <a:p>
+            <a:r>
+              <a:rPr lang="en-US" sz="2200" dirty="0"/>
+              <a:t>Unused pins are left floating</a:t>
+            </a:r>
+          </a:p>
+          <a:p>
+            <a:r>
+              <a:rPr lang="en-US" sz="2200" dirty="0"/>
+              <a:t>SPI lines and I2C lines</a:t>
+            </a:r>
+          </a:p>
+          <a:p>
+            <a:pPr lvl="1"/>
+            <a:r>
+              <a:rPr lang="en-US" sz="1700" dirty="0"/>
+              <a:t>Cross over each other</a:t>
+            </a:r>
+          </a:p>
+          <a:p>
+            <a:pPr lvl="1"/>
+            <a:r>
+              <a:rPr lang="en-US" sz="1700" dirty="0"/>
+              <a:t>Unnecessarily small and long</a:t>
+            </a:r>
+          </a:p>
+          <a:p>
+            <a:r>
+              <a:rPr lang="en-US" sz="2200" dirty="0"/>
+              <a:t>LEDs are powered directly off data lines, reducing signal integrity and power</a:t>
+            </a:r>
+          </a:p>
+        </p:txBody>
+      </p:sp>
+      <p:pic>
+        <p:nvPicPr>
+          <p:cNvPr id="11" name="Picture 10">
+            <a:extLst>
+              <a:ext uri="{FF2B5EF4-FFF2-40B4-BE49-F238E27FC236}">
+                <a16:creationId xmlns:a16="http://schemas.microsoft.com/office/drawing/2014/main" id="{2691F304-6E18-44CB-9708-D83C75870624}"/>
+              </a:ext>
+            </a:extLst>
+          </p:cNvPr>
+          <p:cNvPicPr>
+            <a:picLocks noChangeAspect="1"/>
+          </p:cNvPicPr>
+          <p:nvPr/>
+        </p:nvPicPr>
+        <p:blipFill rotWithShape="1">
+          <a:blip r:embed="rId2"/>
+          <a:srcRect l="3430" r="2283" b="-2"/>
+          <a:stretch/>
+        </p:blipFill>
+        <p:spPr>
+          <a:xfrm>
+            <a:off x="5311702" y="10"/>
+            <a:ext cx="6878775" cy="6857990"/>
+          </a:xfrm>
+          <a:custGeom>
+            <a:avLst/>
+            <a:gdLst/>
+            <a:ahLst/>
+            <a:cxnLst/>
+            <a:rect l="l" t="t" r="r" b="b"/>
+            <a:pathLst>
+              <a:path w="6878775" h="6858000">
+                <a:moveTo>
+                  <a:pt x="1102973" y="0"/>
+                </a:moveTo>
+                <a:lnTo>
+                  <a:pt x="1160688" y="0"/>
+                </a:lnTo>
+                <a:lnTo>
+                  <a:pt x="983189" y="331786"/>
+                </a:lnTo>
+                <a:cubicBezTo>
+                  <a:pt x="914866" y="469145"/>
+                  <a:pt x="850355" y="608712"/>
+                  <a:pt x="789261" y="750263"/>
+                </a:cubicBezTo>
+                <a:cubicBezTo>
+                  <a:pt x="774307" y="784928"/>
+                  <a:pt x="759992" y="819849"/>
+                  <a:pt x="745295" y="854514"/>
+                </a:cubicBezTo>
+                <a:cubicBezTo>
+                  <a:pt x="756682" y="845393"/>
+                  <a:pt x="765489" y="833492"/>
+                  <a:pt x="770857" y="819975"/>
+                </a:cubicBezTo>
+                <a:cubicBezTo>
+                  <a:pt x="879943" y="589569"/>
+                  <a:pt x="999605" y="365513"/>
+                  <a:pt x="1131329" y="148742"/>
+                </a:cubicBezTo>
+                <a:lnTo>
+                  <a:pt x="1227589" y="0"/>
+                </a:lnTo>
+                <a:lnTo>
+                  <a:pt x="6878775" y="0"/>
+                </a:lnTo>
+                <a:lnTo>
+                  <a:pt x="6878775" y="6858000"/>
+                </a:lnTo>
+                <a:lnTo>
+                  <a:pt x="713521" y="6858000"/>
+                </a:lnTo>
+                <a:lnTo>
+                  <a:pt x="625642" y="6670527"/>
+                </a:lnTo>
+                <a:cubicBezTo>
+                  <a:pt x="507232" y="6398531"/>
+                  <a:pt x="403083" y="6118381"/>
+                  <a:pt x="312785" y="5830359"/>
+                </a:cubicBezTo>
+                <a:cubicBezTo>
+                  <a:pt x="278149" y="5719759"/>
+                  <a:pt x="248879" y="5607635"/>
+                  <a:pt x="212198" y="5480401"/>
+                </a:cubicBezTo>
+                <a:cubicBezTo>
+                  <a:pt x="212208" y="5491601"/>
+                  <a:pt x="212803" y="5502788"/>
+                  <a:pt x="213988" y="5513923"/>
+                </a:cubicBezTo>
+                <a:cubicBezTo>
+                  <a:pt x="264089" y="5723695"/>
+                  <a:pt x="307290" y="5935370"/>
+                  <a:pt x="365826" y="6142729"/>
+                </a:cubicBezTo>
+                <a:cubicBezTo>
+                  <a:pt x="433152" y="6380817"/>
+                  <a:pt x="510068" y="6614016"/>
+                  <a:pt x="597975" y="6841549"/>
+                </a:cubicBezTo>
+                <a:lnTo>
+                  <a:pt x="604824" y="6858000"/>
+                </a:lnTo>
+                <a:lnTo>
+                  <a:pt x="552056" y="6858000"/>
+                </a:lnTo>
+                <a:lnTo>
+                  <a:pt x="539576" y="6828295"/>
+                </a:lnTo>
+                <a:cubicBezTo>
+                  <a:pt x="380597" y="6414594"/>
+                  <a:pt x="260223" y="5988893"/>
+                  <a:pt x="171555" y="5552906"/>
+                </a:cubicBezTo>
+                <a:cubicBezTo>
+                  <a:pt x="91163" y="5157998"/>
+                  <a:pt x="43746" y="4758899"/>
+                  <a:pt x="12305" y="4357388"/>
+                </a:cubicBezTo>
+                <a:cubicBezTo>
+                  <a:pt x="-14281" y="4013908"/>
+                  <a:pt x="4507" y="3672965"/>
+                  <a:pt x="46684" y="3331516"/>
+                </a:cubicBezTo>
+                <a:cubicBezTo>
+                  <a:pt x="127203" y="2664286"/>
+                  <a:pt x="277819" y="2007265"/>
+                  <a:pt x="496065" y="1371196"/>
+                </a:cubicBezTo>
+                <a:cubicBezTo>
+                  <a:pt x="636273" y="966066"/>
+                  <a:pt x="800445" y="573253"/>
+                  <a:pt x="995723" y="196614"/>
+                </a:cubicBezTo>
+                <a:close/>
+              </a:path>
+            </a:pathLst>
+          </a:custGeom>
+        </p:spPr>
+      </p:pic>
+    </p:spTree>
+    <p:extLst>
+      <p:ext uri="{BB962C8B-B14F-4D97-AF65-F5344CB8AC3E}">
+        <p14:creationId xmlns:p14="http://schemas.microsoft.com/office/powerpoint/2010/main" val="4202615688"/>
+      </p:ext>
+    </p:extLst>
+  </p:cSld>
+  <p:clrMapOvr>
+    <a:masterClrMapping/>
+  </p:clrMapOvr>
+</p:sld>
+</file>
+
+<file path=ppt/slides/slide5.xml><?xml version="1.0" encoding="utf-8"?>
+<p:sld xmlns:a="http://schemas.openxmlformats.org/drawingml/2006/main" xmlns:r="http://schemas.openxmlformats.org/officeDocument/2006/relationships" xmlns:p="http://schemas.openxmlformats.org/presentationml/2006/main">
+  <p:cSld>
+    <p:bg>
+      <p:bgPr>
+        <a:solidFill>
+          <a:schemeClr val="bg1"/>
+        </a:solidFill>
+        <a:effectLst/>
+      </p:bgPr>
+    </p:bg>
+    <p:spTree>
+      <p:nvGrpSpPr>
+        <p:cNvPr id="1" name=""/>
+        <p:cNvGrpSpPr/>
+        <p:nvPr/>
+      </p:nvGrpSpPr>
+      <p:grpSpPr>
+        <a:xfrm>
+          <a:off x="0" y="0"/>
+          <a:ext cx="0" cy="0"/>
+          <a:chOff x="0" y="0"/>
+          <a:chExt cx="0" cy="0"/>
+        </a:xfrm>
+      </p:grpSpPr>
+      <p:sp useBgFill="1">
+        <p:nvSpPr>
+          <p:cNvPr id="33" name="Rectangle 32">
+            <a:extLst>
+              <a:ext uri="{FF2B5EF4-FFF2-40B4-BE49-F238E27FC236}">
+                <a16:creationId xmlns:a16="http://schemas.microsoft.com/office/drawing/2014/main" id="{F13C74B1-5B17-4795-BED0-7140497B445A}"/>
+              </a:ext>
+              <a:ext uri="{C183D7F6-B498-43B3-948B-1728B52AA6E4}">
+                <adec:decorative xmlns:adec="http://schemas.microsoft.com/office/drawing/2017/decorative" val="1"/>
+              </a:ext>
+            </a:extLst>
+          </p:cNvPr>
+          <p:cNvSpPr>
+            <a:spLocks noGrp="1" noRot="1" noChangeAspect="1" noMove="1" noResize="1" noEditPoints="1" noAdjustHandles="1" noChangeArrowheads="1" noChangeShapeType="1" noTextEdit="1"/>
+          </p:cNvSpPr>
+          <p:nvPr>
+            <p:extLst>
+              <p:ext uri="{386F3935-93C4-4BCD-93E2-E3B085C9AB24}">
+                <p16:designElem xmlns:p16="http://schemas.microsoft.com/office/powerpoint/2015/main" val="1"/>
+              </p:ext>
+            </p:extLst>
+          </p:nvPr>
+        </p:nvSpPr>
+        <p:spPr>
+          <a:xfrm>
+            <a:off x="0" y="0"/>
+            <a:ext cx="12188952" cy="6858000"/>
+          </a:xfrm>
+          <a:prstGeom prst="rect">
+            <a:avLst/>
+          </a:prstGeom>
+          <a:ln>
+            <a:noFill/>
+          </a:ln>
+        </p:spPr>
+        <p:style>
+          <a:lnRef idx="2">
+            <a:schemeClr val="accent1">
+              <a:shade val="50000"/>
+            </a:schemeClr>
+          </a:lnRef>
+          <a:fillRef idx="1">
+            <a:schemeClr val="accent1"/>
+          </a:fillRef>
+          <a:effectRef idx="0">
+            <a:schemeClr val="accent1"/>
+          </a:effectRef>
+          <a:fontRef idx="minor">
+            <a:schemeClr val="lt1"/>
+          </a:fontRef>
+        </p:style>
+        <p:txBody>
+          <a:bodyPr rtlCol="0" anchor="ctr"/>
+          <a:lstStyle/>
+          <a:p>
+            <a:pPr algn="ctr"/>
+            <a:endParaRPr lang="en-US"/>
+          </a:p>
+        </p:txBody>
+      </p:sp>
+      <p:sp>
+        <p:nvSpPr>
+          <p:cNvPr id="2" name="Title 1">
+            <a:extLst>
+              <a:ext uri="{FF2B5EF4-FFF2-40B4-BE49-F238E27FC236}">
+                <a16:creationId xmlns:a16="http://schemas.microsoft.com/office/drawing/2014/main" id="{2586514B-1113-4907-852C-6CBAF646237A}"/>
+              </a:ext>
+            </a:extLst>
+          </p:cNvPr>
+          <p:cNvSpPr>
+            <a:spLocks noGrp="1"/>
+          </p:cNvSpPr>
+          <p:nvPr>
+            <p:ph type="title"/>
+          </p:nvPr>
+        </p:nvSpPr>
+        <p:spPr>
+          <a:xfrm>
+            <a:off x="640080" y="325369"/>
+            <a:ext cx="4368602" cy="1956841"/>
+          </a:xfrm>
+        </p:spPr>
+        <p:txBody>
+          <a:bodyPr anchor="b">
+            <a:normAutofit/>
+          </a:bodyPr>
+          <a:lstStyle/>
+          <a:p>
+            <a:r>
+              <a:rPr lang="en-US" sz="4200" dirty="0"/>
+              <a:t>New Accelerometer Layout</a:t>
+            </a:r>
+          </a:p>
+        </p:txBody>
+      </p:sp>
+      <p:sp>
+        <p:nvSpPr>
+          <p:cNvPr id="35" name="sketchy line">
+            <a:extLst>
+              <a:ext uri="{FF2B5EF4-FFF2-40B4-BE49-F238E27FC236}">
+                <a16:creationId xmlns:a16="http://schemas.microsoft.com/office/drawing/2014/main" id="{D4974D33-8DC5-464E-8C6D-BE58F0669C17}"/>
+              </a:ext>
+              <a:ext uri="{C183D7F6-B498-43B3-948B-1728B52AA6E4}">
+                <adec:decorative xmlns:adec="http://schemas.microsoft.com/office/drawing/2017/decorative" val="1"/>
+              </a:ext>
+            </a:extLst>
+          </p:cNvPr>
+          <p:cNvSpPr>
+            <a:spLocks noGrp="1" noRot="1" noChangeAspect="1" noMove="1" noResize="1" noEditPoints="1" noAdjustHandles="1" noChangeArrowheads="1" noChangeShapeType="1" noTextEdit="1"/>
+          </p:cNvSpPr>
+          <p:nvPr>
+            <p:extLst>
+              <p:ext uri="{386F3935-93C4-4BCD-93E2-E3B085C9AB24}">
+                <p16:designElem xmlns:p16="http://schemas.microsoft.com/office/powerpoint/2015/main" val="1"/>
+              </p:ext>
+            </p:extLst>
+          </p:nvPr>
+        </p:nvSpPr>
+        <p:spPr>
+          <a:xfrm>
+            <a:off x="640080" y="2586994"/>
+            <a:ext cx="3474720" cy="18288"/>
+          </a:xfrm>
+          <a:custGeom>
+            <a:avLst/>
+            <a:gdLst>
+              <a:gd name="connsiteX0" fmla="*/ 0 w 3474720"/>
+              <a:gd name="connsiteY0" fmla="*/ 0 h 18288"/>
+              <a:gd name="connsiteX1" fmla="*/ 694944 w 3474720"/>
+              <a:gd name="connsiteY1" fmla="*/ 0 h 18288"/>
+              <a:gd name="connsiteX2" fmla="*/ 1355141 w 3474720"/>
+              <a:gd name="connsiteY2" fmla="*/ 0 h 18288"/>
+              <a:gd name="connsiteX3" fmla="*/ 2015338 w 3474720"/>
+              <a:gd name="connsiteY3" fmla="*/ 0 h 18288"/>
+              <a:gd name="connsiteX4" fmla="*/ 2779776 w 3474720"/>
+              <a:gd name="connsiteY4" fmla="*/ 0 h 18288"/>
+              <a:gd name="connsiteX5" fmla="*/ 3474720 w 3474720"/>
+              <a:gd name="connsiteY5" fmla="*/ 0 h 18288"/>
+              <a:gd name="connsiteX6" fmla="*/ 3474720 w 3474720"/>
+              <a:gd name="connsiteY6" fmla="*/ 18288 h 18288"/>
+              <a:gd name="connsiteX7" fmla="*/ 2779776 w 3474720"/>
+              <a:gd name="connsiteY7" fmla="*/ 18288 h 18288"/>
+              <a:gd name="connsiteX8" fmla="*/ 2189074 w 3474720"/>
+              <a:gd name="connsiteY8" fmla="*/ 18288 h 18288"/>
+              <a:gd name="connsiteX9" fmla="*/ 1528877 w 3474720"/>
+              <a:gd name="connsiteY9" fmla="*/ 18288 h 18288"/>
+              <a:gd name="connsiteX10" fmla="*/ 868680 w 3474720"/>
+              <a:gd name="connsiteY10" fmla="*/ 18288 h 18288"/>
+              <a:gd name="connsiteX11" fmla="*/ 0 w 3474720"/>
+              <a:gd name="connsiteY11" fmla="*/ 18288 h 18288"/>
+              <a:gd name="connsiteX12" fmla="*/ 0 w 3474720"/>
+              <a:gd name="connsiteY12" fmla="*/ 0 h 18288"/>
+            </a:gdLst>
+            <a:ahLst/>
+            <a:cxnLst>
+              <a:cxn ang="0">
+                <a:pos x="connsiteX0" y="connsiteY0"/>
+              </a:cxn>
+              <a:cxn ang="0">
+                <a:pos x="connsiteX1" y="connsiteY1"/>
+              </a:cxn>
+              <a:cxn ang="0">
+                <a:pos x="connsiteX2" y="connsiteY2"/>
+              </a:cxn>
+              <a:cxn ang="0">
+                <a:pos x="connsiteX3" y="connsiteY3"/>
+              </a:cxn>
+              <a:cxn ang="0">
+                <a:pos x="connsiteX4" y="connsiteY4"/>
+              </a:cxn>
+              <a:cxn ang="0">
+                <a:pos x="connsiteX5" y="connsiteY5"/>
+              </a:cxn>
+              <a:cxn ang="0">
+                <a:pos x="connsiteX6" y="connsiteY6"/>
+              </a:cxn>
+              <a:cxn ang="0">
+                <a:pos x="connsiteX7" y="connsiteY7"/>
+              </a:cxn>
+              <a:cxn ang="0">
+                <a:pos x="connsiteX8" y="connsiteY8"/>
+              </a:cxn>
+              <a:cxn ang="0">
+                <a:pos x="connsiteX9" y="connsiteY9"/>
+              </a:cxn>
+              <a:cxn ang="0">
+                <a:pos x="connsiteX10" y="connsiteY10"/>
+              </a:cxn>
+              <a:cxn ang="0">
+                <a:pos x="connsiteX11" y="connsiteY11"/>
+              </a:cxn>
+              <a:cxn ang="0">
+                <a:pos x="connsiteX12" y="connsiteY12"/>
+              </a:cxn>
+            </a:cxnLst>
+            <a:rect l="l" t="t" r="r" b="b"/>
+            <a:pathLst>
+              <a:path w="3474720" h="18288" fill="none" extrusionOk="0">
+                <a:moveTo>
+                  <a:pt x="0" y="0"/>
+                </a:moveTo>
+                <a:cubicBezTo>
+                  <a:pt x="224454" y="-14544"/>
+                  <a:pt x="495407" y="26540"/>
+                  <a:pt x="694944" y="0"/>
+                </a:cubicBezTo>
+                <a:cubicBezTo>
+                  <a:pt x="894481" y="-26540"/>
+                  <a:pt x="1130063" y="24713"/>
+                  <a:pt x="1355141" y="0"/>
+                </a:cubicBezTo>
+                <a:cubicBezTo>
+                  <a:pt x="1580219" y="-24713"/>
+                  <a:pt x="1820099" y="26695"/>
+                  <a:pt x="2015338" y="0"/>
+                </a:cubicBezTo>
+                <a:cubicBezTo>
+                  <a:pt x="2210577" y="-26695"/>
+                  <a:pt x="2402045" y="165"/>
+                  <a:pt x="2779776" y="0"/>
+                </a:cubicBezTo>
+                <a:cubicBezTo>
+                  <a:pt x="3157507" y="-165"/>
+                  <a:pt x="3286859" y="-15571"/>
+                  <a:pt x="3474720" y="0"/>
+                </a:cubicBezTo>
+                <a:cubicBezTo>
+                  <a:pt x="3474286" y="7551"/>
+                  <a:pt x="3474253" y="9822"/>
+                  <a:pt x="3474720" y="18288"/>
+                </a:cubicBezTo>
+                <a:cubicBezTo>
+                  <a:pt x="3233904" y="29845"/>
+                  <a:pt x="2945134" y="-5256"/>
+                  <a:pt x="2779776" y="18288"/>
+                </a:cubicBezTo>
+                <a:cubicBezTo>
+                  <a:pt x="2614418" y="41832"/>
+                  <a:pt x="2339768" y="22709"/>
+                  <a:pt x="2189074" y="18288"/>
+                </a:cubicBezTo>
+                <a:cubicBezTo>
+                  <a:pt x="2038380" y="13867"/>
+                  <a:pt x="1817434" y="-4947"/>
+                  <a:pt x="1528877" y="18288"/>
+                </a:cubicBezTo>
+                <a:cubicBezTo>
+                  <a:pt x="1240320" y="41523"/>
+                  <a:pt x="1042447" y="37198"/>
+                  <a:pt x="868680" y="18288"/>
+                </a:cubicBezTo>
+                <a:cubicBezTo>
+                  <a:pt x="694913" y="-622"/>
+                  <a:pt x="233232" y="44909"/>
+                  <a:pt x="0" y="18288"/>
+                </a:cubicBezTo>
+                <a:cubicBezTo>
+                  <a:pt x="60" y="11696"/>
+                  <a:pt x="66" y="3758"/>
+                  <a:pt x="0" y="0"/>
+                </a:cubicBezTo>
+                <a:close/>
+              </a:path>
+              <a:path w="3474720" h="18288" stroke="0" extrusionOk="0">
+                <a:moveTo>
+                  <a:pt x="0" y="0"/>
+                </a:moveTo>
+                <a:cubicBezTo>
+                  <a:pt x="202328" y="-14716"/>
+                  <a:pt x="332722" y="-11499"/>
+                  <a:pt x="625450" y="0"/>
+                </a:cubicBezTo>
+                <a:cubicBezTo>
+                  <a:pt x="918178" y="11499"/>
+                  <a:pt x="1096688" y="5123"/>
+                  <a:pt x="1389888" y="0"/>
+                </a:cubicBezTo>
+                <a:cubicBezTo>
+                  <a:pt x="1683088" y="-5123"/>
+                  <a:pt x="1835981" y="-14038"/>
+                  <a:pt x="1980590" y="0"/>
+                </a:cubicBezTo>
+                <a:cubicBezTo>
+                  <a:pt x="2125199" y="14038"/>
+                  <a:pt x="2396099" y="-7203"/>
+                  <a:pt x="2571293" y="0"/>
+                </a:cubicBezTo>
+                <a:cubicBezTo>
+                  <a:pt x="2746487" y="7203"/>
+                  <a:pt x="3041609" y="-12036"/>
+                  <a:pt x="3474720" y="0"/>
+                </a:cubicBezTo>
+                <a:cubicBezTo>
+                  <a:pt x="3474638" y="4406"/>
+                  <a:pt x="3474631" y="9982"/>
+                  <a:pt x="3474720" y="18288"/>
+                </a:cubicBezTo>
+                <a:cubicBezTo>
+                  <a:pt x="3324873" y="21876"/>
+                  <a:pt x="3136771" y="12587"/>
+                  <a:pt x="2814523" y="18288"/>
+                </a:cubicBezTo>
+                <a:cubicBezTo>
+                  <a:pt x="2492275" y="23989"/>
+                  <a:pt x="2294402" y="47111"/>
+                  <a:pt x="2154326" y="18288"/>
+                </a:cubicBezTo>
+                <a:cubicBezTo>
+                  <a:pt x="2014250" y="-10535"/>
+                  <a:pt x="1820317" y="33903"/>
+                  <a:pt x="1494130" y="18288"/>
+                </a:cubicBezTo>
+                <a:cubicBezTo>
+                  <a:pt x="1167943" y="2673"/>
+                  <a:pt x="948432" y="14868"/>
+                  <a:pt x="729691" y="18288"/>
+                </a:cubicBezTo>
+                <a:cubicBezTo>
+                  <a:pt x="510950" y="21708"/>
+                  <a:pt x="264032" y="24354"/>
+                  <a:pt x="0" y="18288"/>
+                </a:cubicBezTo>
+                <a:cubicBezTo>
+                  <a:pt x="189" y="14288"/>
+                  <a:pt x="-703" y="3747"/>
+                  <a:pt x="0" y="0"/>
+                </a:cubicBezTo>
+                <a:close/>
+              </a:path>
+            </a:pathLst>
+          </a:custGeom>
+          <a:solidFill>
+            <a:schemeClr val="accent2"/>
+          </a:solidFill>
+          <a:ln w="44450" cap="rnd">
+            <a:solidFill>
+              <a:schemeClr val="accent2"/>
+            </a:solidFill>
+            <a:round/>
+            <a:extLst>
+              <a:ext uri="{C807C97D-BFC1-408E-A445-0C87EB9F89A2}">
+                <ask:lineSketchStyleProps xmlns:ask="http://schemas.microsoft.com/office/drawing/2018/sketchyshapes" sd="2863741219">
+                  <a:prstGeom prst="rect">
+                    <a:avLst/>
+                  </a:prstGeom>
+                  <ask:type>
+                    <ask:lineSketchFreehand/>
+                  </ask:type>
+                </ask:lineSketchStyleProps>
+              </a:ext>
+            </a:extLst>
+          </a:ln>
+        </p:spPr>
+        <p:style>
+          <a:lnRef idx="2">
+            <a:schemeClr val="accent1">
+              <a:shade val="50000"/>
+            </a:schemeClr>
+          </a:lnRef>
+          <a:fillRef idx="1">
+            <a:schemeClr val="accent1"/>
+          </a:fillRef>
+          <a:effectRef idx="0">
+            <a:schemeClr val="accent1"/>
+          </a:effectRef>
+          <a:fontRef idx="minor">
+            <a:schemeClr val="lt1"/>
+          </a:fontRef>
+        </p:style>
+        <p:txBody>
+          <a:bodyPr rtlCol="0" anchor="ctr"/>
+          <a:lstStyle/>
+          <a:p>
+            <a:pPr algn="ctr"/>
+            <a:endParaRPr lang="en-US"/>
+          </a:p>
+        </p:txBody>
+      </p:sp>
+      <p:sp>
+        <p:nvSpPr>
+          <p:cNvPr id="3" name="Content Placeholder 2">
+            <a:extLst>
+              <a:ext uri="{FF2B5EF4-FFF2-40B4-BE49-F238E27FC236}">
+                <a16:creationId xmlns:a16="http://schemas.microsoft.com/office/drawing/2014/main" id="{CDC36849-2F3A-4F1A-AF0C-EE3A06BC822E}"/>
+              </a:ext>
+            </a:extLst>
+          </p:cNvPr>
+          <p:cNvSpPr>
+            <a:spLocks noGrp="1"/>
+          </p:cNvSpPr>
+          <p:nvPr>
+            <p:ph idx="1"/>
+          </p:nvPr>
+        </p:nvSpPr>
+        <p:spPr>
+          <a:xfrm>
+            <a:off x="640080" y="2872899"/>
+            <a:ext cx="4458393" cy="3320668"/>
+          </a:xfrm>
+        </p:spPr>
+        <p:txBody>
+          <a:bodyPr>
+            <a:normAutofit fontScale="92500" lnSpcReduction="20000"/>
+          </a:bodyPr>
+          <a:lstStyle/>
+          <a:p>
+            <a:r>
+              <a:rPr lang="en-US" sz="2200" dirty="0"/>
+              <a:t>Decoupling Capacitors</a:t>
+            </a:r>
+          </a:p>
+          <a:p>
+            <a:pPr lvl="1"/>
+            <a:r>
+              <a:rPr lang="en-US" sz="2200" dirty="0"/>
+              <a:t>Closer to power pins</a:t>
+            </a:r>
+          </a:p>
+          <a:p>
+            <a:pPr lvl="1"/>
+            <a:r>
+              <a:rPr lang="en-US" sz="2200" dirty="0"/>
+              <a:t>Individual 3V3 connections</a:t>
+            </a:r>
+          </a:p>
+          <a:p>
+            <a:r>
+              <a:rPr lang="en-US" sz="2000" dirty="0"/>
+              <a:t>Unused Pins Connected To Pulldown Resistors, Optional Pins Have Test Points</a:t>
+            </a:r>
+          </a:p>
+          <a:p>
+            <a:r>
+              <a:rPr lang="en-US" sz="2000" dirty="0"/>
+              <a:t>SPI and I2C lines</a:t>
+            </a:r>
+          </a:p>
+          <a:p>
+            <a:pPr lvl="1"/>
+            <a:r>
+              <a:rPr lang="en-US" sz="1600" dirty="0"/>
+              <a:t>Do Not Cross, Not Even Nearby</a:t>
+            </a:r>
+          </a:p>
+          <a:p>
+            <a:pPr lvl="1"/>
+            <a:r>
+              <a:rPr lang="en-US" sz="1600" dirty="0"/>
+              <a:t>Thicker Traces</a:t>
+            </a:r>
+          </a:p>
+          <a:p>
+            <a:pPr lvl="1"/>
+            <a:r>
+              <a:rPr lang="en-US" sz="1600" dirty="0"/>
+              <a:t>Isolated With Ground Plane In Between</a:t>
+            </a:r>
+          </a:p>
+          <a:p>
+            <a:pPr lvl="1"/>
+            <a:r>
+              <a:rPr lang="en-US" sz="1600" dirty="0"/>
+              <a:t>Added Vias To Add Shielding Inside Substrate</a:t>
+            </a:r>
+          </a:p>
+          <a:p>
+            <a:r>
+              <a:rPr lang="en-US" sz="2000" dirty="0"/>
+              <a:t>LEDs moved off data lines, connected directly to Raspberry Pi</a:t>
+            </a:r>
+          </a:p>
+          <a:p>
+            <a:endParaRPr lang="en-US" sz="2600" dirty="0"/>
+          </a:p>
+          <a:p>
+            <a:pPr marL="457200" lvl="1" indent="0">
+              <a:buNone/>
+            </a:pPr>
+            <a:endParaRPr lang="en-US" sz="2200" dirty="0"/>
+          </a:p>
+        </p:txBody>
+      </p:sp>
+      <p:pic>
+        <p:nvPicPr>
+          <p:cNvPr id="11" name="Picture 10">
+            <a:extLst>
+              <a:ext uri="{FF2B5EF4-FFF2-40B4-BE49-F238E27FC236}">
+                <a16:creationId xmlns:a16="http://schemas.microsoft.com/office/drawing/2014/main" id="{644B9DAB-B03F-4250-9CB2-0BC8FDF1A6E7}"/>
+              </a:ext>
+            </a:extLst>
+          </p:cNvPr>
+          <p:cNvPicPr>
+            <a:picLocks noChangeAspect="1"/>
+          </p:cNvPicPr>
+          <p:nvPr/>
+        </p:nvPicPr>
+        <p:blipFill rotWithShape="1">
+          <a:blip r:embed="rId2"/>
+          <a:srcRect r="2" b="161"/>
+          <a:stretch/>
+        </p:blipFill>
+        <p:spPr>
+          <a:xfrm>
+            <a:off x="5311702" y="10"/>
+            <a:ext cx="6878775" cy="6857990"/>
+          </a:xfrm>
+          <a:custGeom>
+            <a:avLst/>
+            <a:gdLst/>
+            <a:ahLst/>
+            <a:cxnLst/>
+            <a:rect l="l" t="t" r="r" b="b"/>
+            <a:pathLst>
+              <a:path w="6878775" h="6858000">
+                <a:moveTo>
+                  <a:pt x="1102973" y="0"/>
+                </a:moveTo>
+                <a:lnTo>
+                  <a:pt x="1160688" y="0"/>
+                </a:lnTo>
+                <a:lnTo>
+                  <a:pt x="983189" y="331786"/>
+                </a:lnTo>
+                <a:cubicBezTo>
+                  <a:pt x="914866" y="469145"/>
+                  <a:pt x="850355" y="608712"/>
+                  <a:pt x="789261" y="750263"/>
+                </a:cubicBezTo>
+                <a:cubicBezTo>
+                  <a:pt x="774307" y="784928"/>
+                  <a:pt x="759992" y="819849"/>
+                  <a:pt x="745295" y="854514"/>
+                </a:cubicBezTo>
+                <a:cubicBezTo>
+                  <a:pt x="756682" y="845393"/>
+                  <a:pt x="765489" y="833492"/>
+                  <a:pt x="770857" y="819975"/>
+                </a:cubicBezTo>
+                <a:cubicBezTo>
+                  <a:pt x="879943" y="589569"/>
+                  <a:pt x="999605" y="365513"/>
+                  <a:pt x="1131329" y="148742"/>
+                </a:cubicBezTo>
+                <a:lnTo>
+                  <a:pt x="1227589" y="0"/>
+                </a:lnTo>
+                <a:lnTo>
+                  <a:pt x="6878775" y="0"/>
+                </a:lnTo>
+                <a:lnTo>
+                  <a:pt x="6878775" y="6858000"/>
+                </a:lnTo>
+                <a:lnTo>
+                  <a:pt x="713521" y="6858000"/>
+                </a:lnTo>
+                <a:lnTo>
+                  <a:pt x="625642" y="6670527"/>
+                </a:lnTo>
+                <a:cubicBezTo>
+                  <a:pt x="507232" y="6398531"/>
+                  <a:pt x="403083" y="6118381"/>
+                  <a:pt x="312785" y="5830359"/>
+                </a:cubicBezTo>
+                <a:cubicBezTo>
+                  <a:pt x="278149" y="5719759"/>
+                  <a:pt x="248879" y="5607635"/>
+                  <a:pt x="212198" y="5480401"/>
+                </a:cubicBezTo>
+                <a:cubicBezTo>
+                  <a:pt x="212208" y="5491601"/>
+                  <a:pt x="212803" y="5502788"/>
+                  <a:pt x="213988" y="5513923"/>
+                </a:cubicBezTo>
+                <a:cubicBezTo>
+                  <a:pt x="264089" y="5723695"/>
+                  <a:pt x="307290" y="5935370"/>
+                  <a:pt x="365826" y="6142729"/>
+                </a:cubicBezTo>
+                <a:cubicBezTo>
+                  <a:pt x="433152" y="6380817"/>
+                  <a:pt x="510068" y="6614016"/>
+                  <a:pt x="597975" y="6841549"/>
+                </a:cubicBezTo>
+                <a:lnTo>
+                  <a:pt x="604824" y="6858000"/>
+                </a:lnTo>
+                <a:lnTo>
+                  <a:pt x="552056" y="6858000"/>
+                </a:lnTo>
+                <a:lnTo>
+                  <a:pt x="539576" y="6828295"/>
+                </a:lnTo>
+                <a:cubicBezTo>
+                  <a:pt x="380597" y="6414594"/>
+                  <a:pt x="260223" y="5988893"/>
+                  <a:pt x="171555" y="5552906"/>
+                </a:cubicBezTo>
+                <a:cubicBezTo>
+                  <a:pt x="91163" y="5157998"/>
+                  <a:pt x="43746" y="4758899"/>
+                  <a:pt x="12305" y="4357388"/>
+                </a:cubicBezTo>
+                <a:cubicBezTo>
+                  <a:pt x="-14281" y="4013908"/>
+                  <a:pt x="4507" y="3672965"/>
+                  <a:pt x="46684" y="3331516"/>
+                </a:cubicBezTo>
+                <a:cubicBezTo>
+                  <a:pt x="127203" y="2664286"/>
+                  <a:pt x="277819" y="2007265"/>
+                  <a:pt x="496065" y="1371196"/>
+                </a:cubicBezTo>
+                <a:cubicBezTo>
+                  <a:pt x="636273" y="966066"/>
+                  <a:pt x="800445" y="573253"/>
+                  <a:pt x="995723" y="196614"/>
+                </a:cubicBezTo>
+                <a:close/>
+              </a:path>
+            </a:pathLst>
+          </a:custGeom>
+        </p:spPr>
+      </p:pic>
+    </p:spTree>
+    <p:extLst>
+      <p:ext uri="{BB962C8B-B14F-4D97-AF65-F5344CB8AC3E}">
+        <p14:creationId xmlns:p14="http://schemas.microsoft.com/office/powerpoint/2010/main" val="1634200830"/>
+      </p:ext>
+    </p:extLst>
+  </p:cSld>
+  <p:clrMapOvr>
+    <a:masterClrMapping/>
+  </p:clrMapOvr>
+</p:sld>
+</file>
+
+<file path=ppt/slides/slide6.xml><?xml version="1.0" encoding="utf-8"?>
+<p:sld xmlns:a="http://schemas.openxmlformats.org/drawingml/2006/main" xmlns:r="http://schemas.openxmlformats.org/officeDocument/2006/relationships" xmlns:p="http://schemas.openxmlformats.org/presentationml/2006/main">
+  <p:cSld>
+    <p:bg>
+      <p:bgPr>
+        <a:solidFill>
+          <a:schemeClr val="bg1"/>
+        </a:solidFill>
+        <a:effectLst/>
+      </p:bgPr>
+    </p:bg>
+    <p:spTree>
+      <p:nvGrpSpPr>
+        <p:cNvPr id="1" name=""/>
+        <p:cNvGrpSpPr/>
+        <p:nvPr/>
+      </p:nvGrpSpPr>
+      <p:grpSpPr>
+        <a:xfrm>
+          <a:off x="0" y="0"/>
+          <a:ext cx="0" cy="0"/>
+          <a:chOff x="0" y="0"/>
+          <a:chExt cx="0" cy="0"/>
+        </a:xfrm>
+      </p:grpSpPr>
+      <p:sp>
+        <p:nvSpPr>
+          <p:cNvPr id="2" name="Title 1">
+            <a:extLst>
+              <a:ext uri="{FF2B5EF4-FFF2-40B4-BE49-F238E27FC236}">
+                <a16:creationId xmlns:a16="http://schemas.microsoft.com/office/drawing/2014/main" id="{0C8C6AFF-E9A9-43B4-B517-975D08576E4B}"/>
+              </a:ext>
+            </a:extLst>
+          </p:cNvPr>
+          <p:cNvSpPr>
+            <a:spLocks noGrp="1"/>
+          </p:cNvSpPr>
+          <p:nvPr>
+            <p:ph type="title"/>
+          </p:nvPr>
+        </p:nvSpPr>
+        <p:spPr>
+          <a:xfrm>
+            <a:off x="4965430" y="629268"/>
+            <a:ext cx="6586491" cy="1286160"/>
+          </a:xfrm>
+        </p:spPr>
+        <p:txBody>
+          <a:bodyPr anchor="b">
+            <a:normAutofit/>
+          </a:bodyPr>
+          <a:lstStyle/>
+          <a:p>
+            <a:r>
+              <a:rPr lang="en-US" dirty="0"/>
+              <a:t>New Accelerometer Layouts</a:t>
+            </a:r>
+          </a:p>
+        </p:txBody>
+      </p:sp>
+      <p:sp>
+        <p:nvSpPr>
+          <p:cNvPr id="3" name="Content Placeholder 2">
+            <a:extLst>
+              <a:ext uri="{FF2B5EF4-FFF2-40B4-BE49-F238E27FC236}">
+                <a16:creationId xmlns:a16="http://schemas.microsoft.com/office/drawing/2014/main" id="{300E664B-8627-435D-A0B3-44D66B15F89F}"/>
+              </a:ext>
+            </a:extLst>
+          </p:cNvPr>
+          <p:cNvSpPr>
+            <a:spLocks noGrp="1"/>
+          </p:cNvSpPr>
+          <p:nvPr>
+            <p:ph idx="1"/>
+          </p:nvPr>
+        </p:nvSpPr>
+        <p:spPr>
+          <a:xfrm>
+            <a:off x="4965431" y="2438400"/>
+            <a:ext cx="6586489" cy="3785419"/>
+          </a:xfrm>
+        </p:spPr>
+        <p:txBody>
+          <a:bodyPr>
+            <a:normAutofit/>
+          </a:bodyPr>
+          <a:lstStyle/>
+          <a:p>
+            <a:endParaRPr lang="en-US" sz="2000" dirty="0"/>
+          </a:p>
+        </p:txBody>
+      </p:sp>
+      <p:cxnSp>
+        <p:nvCxnSpPr>
+          <p:cNvPr id="10" name="Straight Connector 9">
+            <a:extLst>
+              <a:ext uri="{FF2B5EF4-FFF2-40B4-BE49-F238E27FC236}">
+                <a16:creationId xmlns:a16="http://schemas.microsoft.com/office/drawing/2014/main" id="{A7F400EE-A8A5-48AF-B4D6-291B52C6F0B0}"/>
+              </a:ext>
+              <a:ext uri="{C183D7F6-B498-43B3-948B-1728B52AA6E4}">
+                <adec:decorative xmlns:adec="http://schemas.microsoft.com/office/drawing/2017/decorative" val="1"/>
+              </a:ext>
+            </a:extLst>
+          </p:cNvPr>
+          <p:cNvCxnSpPr>
+            <a:cxnSpLocks noGrp="1" noRot="1" noChangeAspect="1" noMove="1" noResize="1" noEditPoints="1" noAdjustHandles="1" noChangeArrowheads="1" noChangeShapeType="1"/>
+          </p:cNvCxnSpPr>
+          <p:nvPr>
+            <p:extLst>
+              <p:ext uri="{386F3935-93C4-4BCD-93E2-E3B085C9AB24}">
+                <p16:designElem xmlns:p16="http://schemas.microsoft.com/office/powerpoint/2015/main" val="1"/>
+              </p:ext>
+            </p:extLst>
+          </p:nvPr>
+        </p:nvCxnSpPr>
+        <p:spPr>
+          <a:xfrm>
+            <a:off x="5080934" y="2115117"/>
+            <a:ext cx="6309360" cy="0"/>
+          </a:xfrm>
+          <a:prstGeom prst="line">
+            <a:avLst/>
+          </a:prstGeom>
+          <a:ln w="19050">
+            <a:solidFill>
+              <a:srgbClr val="DF8400"/>
+            </a:solidFill>
+          </a:ln>
+        </p:spPr>
+        <p:style>
+          <a:lnRef idx="1">
+            <a:schemeClr val="accent1"/>
+          </a:lnRef>
+          <a:fillRef idx="0">
+            <a:schemeClr val="accent1"/>
+          </a:fillRef>
+          <a:effectRef idx="0">
+            <a:schemeClr val="accent1"/>
+          </a:effectRef>
+          <a:fontRef idx="minor">
+            <a:schemeClr val="tx1"/>
+          </a:fontRef>
+        </p:style>
+      </p:cxnSp>
+    </p:spTree>
+    <p:extLst>
+      <p:ext uri="{BB962C8B-B14F-4D97-AF65-F5344CB8AC3E}">
+        <p14:creationId xmlns:p14="http://schemas.microsoft.com/office/powerpoint/2010/main" val="1648650677"/>
+      </p:ext>
+    </p:extLst>
+  </p:cSld>
+  <p:clrMapOvr>
+    <a:masterClrMapping/>
+  </p:clrMapOvr>
+</p:sld>
+</file>
+
 <file path=ppt/theme/theme1.xml><?xml version="1.0" encoding="utf-8"?>
 <a:theme xmlns:a="http://schemas.openxmlformats.org/drawingml/2006/main" name="Office Theme">
   <a:themeElements>

</xml_diff>

<commit_message>
Added Information To Voltage Regulator Component Sheets, Improved Schematic Review 1 Powerpoint
</commit_message>
<xml_diff>
--- a/Documentation/Schematic Review 1.pptx
+++ b/Documentation/Schematic Review 1.pptx
@@ -6,11 +6,14 @@
   </p:sldMasterIdLst>
   <p:sldIdLst>
     <p:sldId id="256" r:id="rId2"/>
-    <p:sldId id="257" r:id="rId3"/>
-    <p:sldId id="258" r:id="rId4"/>
-    <p:sldId id="259" r:id="rId5"/>
-    <p:sldId id="261" r:id="rId6"/>
-    <p:sldId id="260" r:id="rId7"/>
+    <p:sldId id="262" r:id="rId3"/>
+    <p:sldId id="257" r:id="rId4"/>
+    <p:sldId id="265" r:id="rId5"/>
+    <p:sldId id="266" r:id="rId6"/>
+    <p:sldId id="258" r:id="rId7"/>
+    <p:sldId id="259" r:id="rId8"/>
+    <p:sldId id="261" r:id="rId9"/>
+    <p:sldId id="260" r:id="rId10"/>
   </p:sldIdLst>
   <p:sldSz cx="12192000" cy="6858000"/>
   <p:notesSz cx="6858000" cy="9144000"/>
@@ -3317,6 +3320,14 @@
 <file path=ppt/slides/slide1.xml><?xml version="1.0" encoding="utf-8"?>
 <p:sld xmlns:a="http://schemas.openxmlformats.org/drawingml/2006/main" xmlns:r="http://schemas.openxmlformats.org/officeDocument/2006/relationships" xmlns:p="http://schemas.openxmlformats.org/presentationml/2006/main">
   <p:cSld>
+    <p:bg>
+      <p:bgPr>
+        <a:solidFill>
+          <a:schemeClr val="bg1"/>
+        </a:solidFill>
+        <a:effectLst/>
+      </p:bgPr>
+    </p:bg>
     <p:spTree>
       <p:nvGrpSpPr>
         <p:cNvPr id="1" name=""/>
@@ -3331,6 +3342,66 @@
           <a:chExt cx="0" cy="0"/>
         </a:xfrm>
       </p:grpSpPr>
+      <p:sp useBgFill="1">
+        <p:nvSpPr>
+          <p:cNvPr id="10" name="Rectangle 9">
+            <a:extLst>
+              <a:ext uri="{FF2B5EF4-FFF2-40B4-BE49-F238E27FC236}">
+                <a16:creationId xmlns:a16="http://schemas.microsoft.com/office/drawing/2014/main" id="{9B7AD9F6-8CE7-4299-8FC6-328F4DCD3FF9}"/>
+              </a:ext>
+              <a:ext uri="{C183D7F6-B498-43B3-948B-1728B52AA6E4}">
+                <adec:decorative xmlns:adec="http://schemas.microsoft.com/office/drawing/2017/decorative" val="1"/>
+              </a:ext>
+            </a:extLst>
+          </p:cNvPr>
+          <p:cNvSpPr>
+            <a:spLocks noGrp="1" noRot="1" noChangeAspect="1" noMove="1" noResize="1" noEditPoints="1" noAdjustHandles="1" noChangeArrowheads="1" noChangeShapeType="1" noTextEdit="1"/>
+          </p:cNvSpPr>
+          <p:nvPr>
+            <p:extLst>
+              <p:ext uri="{386F3935-93C4-4BCD-93E2-E3B085C9AB24}">
+                <p16:designElem xmlns:p16="http://schemas.microsoft.com/office/powerpoint/2015/main" val="1"/>
+              </p:ext>
+            </p:extLst>
+          </p:nvPr>
+        </p:nvSpPr>
+        <p:spPr>
+          <a:xfrm>
+            <a:off x="0" y="0"/>
+            <a:ext cx="12188952" cy="6858000"/>
+          </a:xfrm>
+          <a:prstGeom prst="rect">
+            <a:avLst/>
+          </a:prstGeom>
+          <a:ln>
+            <a:noFill/>
+          </a:ln>
+        </p:spPr>
+        <p:style>
+          <a:lnRef idx="2">
+            <a:schemeClr val="accent1">
+              <a:shade val="50000"/>
+            </a:schemeClr>
+          </a:lnRef>
+          <a:fillRef idx="1">
+            <a:schemeClr val="accent1"/>
+          </a:fillRef>
+          <a:effectRef idx="0">
+            <a:schemeClr val="accent1"/>
+          </a:effectRef>
+          <a:fontRef idx="minor">
+            <a:schemeClr val="lt1"/>
+          </a:fontRef>
+        </p:style>
+        <p:txBody>
+          <a:bodyPr rtlCol="0" anchor="ctr"/>
+          <a:lstStyle/>
+          <a:p>
+            <a:pPr algn="ctr"/>
+            <a:endParaRPr lang="en-US"/>
+          </a:p>
+        </p:txBody>
+      </p:sp>
       <p:sp>
         <p:nvSpPr>
           <p:cNvPr id="2" name="Title 1">
@@ -3347,12 +3418,23 @@
             <p:ph type="ctrTitle"/>
           </p:nvPr>
         </p:nvSpPr>
-        <p:spPr/>
+        <p:spPr>
+          <a:xfrm>
+            <a:off x="890338" y="640080"/>
+            <a:ext cx="3734014" cy="3566160"/>
+          </a:xfrm>
+        </p:spPr>
         <p:txBody>
-          <a:bodyPr/>
+          <a:bodyPr anchor="b">
+            <a:normAutofit/>
+          </a:bodyPr>
           <a:lstStyle/>
           <a:p>
-            <a:endParaRPr lang="en-US" dirty="0"/>
+            <a:pPr algn="l"/>
+            <a:r>
+              <a:rPr lang="en-US" sz="5400"/>
+              <a:t>MRDT Nav Board</a:t>
+            </a:r>
           </a:p>
         </p:txBody>
       </p:sp>
@@ -3372,15 +3454,478 @@
             <p:ph type="subTitle" idx="1"/>
           </p:nvPr>
         </p:nvSpPr>
-        <p:spPr/>
+        <p:spPr>
+          <a:xfrm>
+            <a:off x="890339" y="4636008"/>
+            <a:ext cx="3734014" cy="1572768"/>
+          </a:xfrm>
+        </p:spPr>
         <p:txBody>
-          <a:bodyPr/>
+          <a:bodyPr>
+            <a:normAutofit/>
+          </a:bodyPr>
           <a:lstStyle/>
           <a:p>
+            <a:pPr algn="l"/>
+            <a:r>
+              <a:rPr lang="en-US" dirty="0"/>
+              <a:t>Thomas Francois</a:t>
+            </a:r>
+            <a:endParaRPr lang="en-US"/>
+          </a:p>
+          <a:p>
+            <a:pPr algn="l"/>
+            <a:r>
+              <a:rPr lang="en-US" dirty="0"/>
+              <a:t>Katherine Dunlap</a:t>
+            </a:r>
+            <a:endParaRPr lang="en-US"/>
+          </a:p>
+          <a:p>
+            <a:pPr algn="l"/>
+            <a:r>
+              <a:rPr lang="en-US" dirty="0" err="1"/>
+              <a:t>Nithin</a:t>
+            </a:r>
+            <a:r>
+              <a:rPr lang="en-US" dirty="0"/>
+              <a:t> Vijay</a:t>
+            </a:r>
             <a:endParaRPr lang="en-US"/>
           </a:p>
         </p:txBody>
       </p:sp>
+      <p:sp>
+        <p:nvSpPr>
+          <p:cNvPr id="12" name="sketchy line">
+            <a:extLst>
+              <a:ext uri="{FF2B5EF4-FFF2-40B4-BE49-F238E27FC236}">
+                <a16:creationId xmlns:a16="http://schemas.microsoft.com/office/drawing/2014/main" id="{F49775AF-8896-43EE-92C6-83497D6DC56F}"/>
+              </a:ext>
+              <a:ext uri="{C183D7F6-B498-43B3-948B-1728B52AA6E4}">
+                <adec:decorative xmlns:adec="http://schemas.microsoft.com/office/drawing/2017/decorative" val="1"/>
+              </a:ext>
+            </a:extLst>
+          </p:cNvPr>
+          <p:cNvSpPr>
+            <a:spLocks noGrp="1" noRot="1" noChangeAspect="1" noMove="1" noResize="1" noEditPoints="1" noAdjustHandles="1" noChangeArrowheads="1" noChangeShapeType="1" noTextEdit="1"/>
+          </p:cNvSpPr>
+          <p:nvPr>
+            <p:extLst>
+              <p:ext uri="{386F3935-93C4-4BCD-93E2-E3B085C9AB24}">
+                <p16:designElem xmlns:p16="http://schemas.microsoft.com/office/powerpoint/2015/main" val="1"/>
+              </p:ext>
+            </p:extLst>
+          </p:nvPr>
+        </p:nvSpPr>
+        <p:spPr>
+          <a:xfrm>
+            <a:off x="890338" y="4409267"/>
+            <a:ext cx="3474720" cy="18288"/>
+          </a:xfrm>
+          <a:custGeom>
+            <a:avLst/>
+            <a:gdLst>
+              <a:gd name="connsiteX0" fmla="*/ 0 w 3474720"/>
+              <a:gd name="connsiteY0" fmla="*/ 0 h 18288"/>
+              <a:gd name="connsiteX1" fmla="*/ 694944 w 3474720"/>
+              <a:gd name="connsiteY1" fmla="*/ 0 h 18288"/>
+              <a:gd name="connsiteX2" fmla="*/ 1355141 w 3474720"/>
+              <a:gd name="connsiteY2" fmla="*/ 0 h 18288"/>
+              <a:gd name="connsiteX3" fmla="*/ 2015338 w 3474720"/>
+              <a:gd name="connsiteY3" fmla="*/ 0 h 18288"/>
+              <a:gd name="connsiteX4" fmla="*/ 2779776 w 3474720"/>
+              <a:gd name="connsiteY4" fmla="*/ 0 h 18288"/>
+              <a:gd name="connsiteX5" fmla="*/ 3474720 w 3474720"/>
+              <a:gd name="connsiteY5" fmla="*/ 0 h 18288"/>
+              <a:gd name="connsiteX6" fmla="*/ 3474720 w 3474720"/>
+              <a:gd name="connsiteY6" fmla="*/ 18288 h 18288"/>
+              <a:gd name="connsiteX7" fmla="*/ 2779776 w 3474720"/>
+              <a:gd name="connsiteY7" fmla="*/ 18288 h 18288"/>
+              <a:gd name="connsiteX8" fmla="*/ 2189074 w 3474720"/>
+              <a:gd name="connsiteY8" fmla="*/ 18288 h 18288"/>
+              <a:gd name="connsiteX9" fmla="*/ 1528877 w 3474720"/>
+              <a:gd name="connsiteY9" fmla="*/ 18288 h 18288"/>
+              <a:gd name="connsiteX10" fmla="*/ 868680 w 3474720"/>
+              <a:gd name="connsiteY10" fmla="*/ 18288 h 18288"/>
+              <a:gd name="connsiteX11" fmla="*/ 0 w 3474720"/>
+              <a:gd name="connsiteY11" fmla="*/ 18288 h 18288"/>
+              <a:gd name="connsiteX12" fmla="*/ 0 w 3474720"/>
+              <a:gd name="connsiteY12" fmla="*/ 0 h 18288"/>
+            </a:gdLst>
+            <a:ahLst/>
+            <a:cxnLst>
+              <a:cxn ang="0">
+                <a:pos x="connsiteX0" y="connsiteY0"/>
+              </a:cxn>
+              <a:cxn ang="0">
+                <a:pos x="connsiteX1" y="connsiteY1"/>
+              </a:cxn>
+              <a:cxn ang="0">
+                <a:pos x="connsiteX2" y="connsiteY2"/>
+              </a:cxn>
+              <a:cxn ang="0">
+                <a:pos x="connsiteX3" y="connsiteY3"/>
+              </a:cxn>
+              <a:cxn ang="0">
+                <a:pos x="connsiteX4" y="connsiteY4"/>
+              </a:cxn>
+              <a:cxn ang="0">
+                <a:pos x="connsiteX5" y="connsiteY5"/>
+              </a:cxn>
+              <a:cxn ang="0">
+                <a:pos x="connsiteX6" y="connsiteY6"/>
+              </a:cxn>
+              <a:cxn ang="0">
+                <a:pos x="connsiteX7" y="connsiteY7"/>
+              </a:cxn>
+              <a:cxn ang="0">
+                <a:pos x="connsiteX8" y="connsiteY8"/>
+              </a:cxn>
+              <a:cxn ang="0">
+                <a:pos x="connsiteX9" y="connsiteY9"/>
+              </a:cxn>
+              <a:cxn ang="0">
+                <a:pos x="connsiteX10" y="connsiteY10"/>
+              </a:cxn>
+              <a:cxn ang="0">
+                <a:pos x="connsiteX11" y="connsiteY11"/>
+              </a:cxn>
+              <a:cxn ang="0">
+                <a:pos x="connsiteX12" y="connsiteY12"/>
+              </a:cxn>
+            </a:cxnLst>
+            <a:rect l="l" t="t" r="r" b="b"/>
+            <a:pathLst>
+              <a:path w="3474720" h="18288" fill="none" extrusionOk="0">
+                <a:moveTo>
+                  <a:pt x="0" y="0"/>
+                </a:moveTo>
+                <a:cubicBezTo>
+                  <a:pt x="224454" y="-14544"/>
+                  <a:pt x="495407" y="26540"/>
+                  <a:pt x="694944" y="0"/>
+                </a:cubicBezTo>
+                <a:cubicBezTo>
+                  <a:pt x="894481" y="-26540"/>
+                  <a:pt x="1130063" y="24713"/>
+                  <a:pt x="1355141" y="0"/>
+                </a:cubicBezTo>
+                <a:cubicBezTo>
+                  <a:pt x="1580219" y="-24713"/>
+                  <a:pt x="1820099" y="26695"/>
+                  <a:pt x="2015338" y="0"/>
+                </a:cubicBezTo>
+                <a:cubicBezTo>
+                  <a:pt x="2210577" y="-26695"/>
+                  <a:pt x="2402045" y="165"/>
+                  <a:pt x="2779776" y="0"/>
+                </a:cubicBezTo>
+                <a:cubicBezTo>
+                  <a:pt x="3157507" y="-165"/>
+                  <a:pt x="3286859" y="-15571"/>
+                  <a:pt x="3474720" y="0"/>
+                </a:cubicBezTo>
+                <a:cubicBezTo>
+                  <a:pt x="3474286" y="7551"/>
+                  <a:pt x="3474253" y="9822"/>
+                  <a:pt x="3474720" y="18288"/>
+                </a:cubicBezTo>
+                <a:cubicBezTo>
+                  <a:pt x="3233904" y="29845"/>
+                  <a:pt x="2945134" y="-5256"/>
+                  <a:pt x="2779776" y="18288"/>
+                </a:cubicBezTo>
+                <a:cubicBezTo>
+                  <a:pt x="2614418" y="41832"/>
+                  <a:pt x="2339768" y="22709"/>
+                  <a:pt x="2189074" y="18288"/>
+                </a:cubicBezTo>
+                <a:cubicBezTo>
+                  <a:pt x="2038380" y="13867"/>
+                  <a:pt x="1817434" y="-4947"/>
+                  <a:pt x="1528877" y="18288"/>
+                </a:cubicBezTo>
+                <a:cubicBezTo>
+                  <a:pt x="1240320" y="41523"/>
+                  <a:pt x="1042447" y="37198"/>
+                  <a:pt x="868680" y="18288"/>
+                </a:cubicBezTo>
+                <a:cubicBezTo>
+                  <a:pt x="694913" y="-622"/>
+                  <a:pt x="233232" y="44909"/>
+                  <a:pt x="0" y="18288"/>
+                </a:cubicBezTo>
+                <a:cubicBezTo>
+                  <a:pt x="60" y="11696"/>
+                  <a:pt x="66" y="3758"/>
+                  <a:pt x="0" y="0"/>
+                </a:cubicBezTo>
+                <a:close/>
+              </a:path>
+              <a:path w="3474720" h="18288" stroke="0" extrusionOk="0">
+                <a:moveTo>
+                  <a:pt x="0" y="0"/>
+                </a:moveTo>
+                <a:cubicBezTo>
+                  <a:pt x="202328" y="-14716"/>
+                  <a:pt x="332722" y="-11499"/>
+                  <a:pt x="625450" y="0"/>
+                </a:cubicBezTo>
+                <a:cubicBezTo>
+                  <a:pt x="918178" y="11499"/>
+                  <a:pt x="1096688" y="5123"/>
+                  <a:pt x="1389888" y="0"/>
+                </a:cubicBezTo>
+                <a:cubicBezTo>
+                  <a:pt x="1683088" y="-5123"/>
+                  <a:pt x="1835981" y="-14038"/>
+                  <a:pt x="1980590" y="0"/>
+                </a:cubicBezTo>
+                <a:cubicBezTo>
+                  <a:pt x="2125199" y="14038"/>
+                  <a:pt x="2396099" y="-7203"/>
+                  <a:pt x="2571293" y="0"/>
+                </a:cubicBezTo>
+                <a:cubicBezTo>
+                  <a:pt x="2746487" y="7203"/>
+                  <a:pt x="3041609" y="-12036"/>
+                  <a:pt x="3474720" y="0"/>
+                </a:cubicBezTo>
+                <a:cubicBezTo>
+                  <a:pt x="3474638" y="4406"/>
+                  <a:pt x="3474631" y="9982"/>
+                  <a:pt x="3474720" y="18288"/>
+                </a:cubicBezTo>
+                <a:cubicBezTo>
+                  <a:pt x="3324873" y="21876"/>
+                  <a:pt x="3136771" y="12587"/>
+                  <a:pt x="2814523" y="18288"/>
+                </a:cubicBezTo>
+                <a:cubicBezTo>
+                  <a:pt x="2492275" y="23989"/>
+                  <a:pt x="2294402" y="47111"/>
+                  <a:pt x="2154326" y="18288"/>
+                </a:cubicBezTo>
+                <a:cubicBezTo>
+                  <a:pt x="2014250" y="-10535"/>
+                  <a:pt x="1820317" y="33903"/>
+                  <a:pt x="1494130" y="18288"/>
+                </a:cubicBezTo>
+                <a:cubicBezTo>
+                  <a:pt x="1167943" y="2673"/>
+                  <a:pt x="948432" y="14868"/>
+                  <a:pt x="729691" y="18288"/>
+                </a:cubicBezTo>
+                <a:cubicBezTo>
+                  <a:pt x="510950" y="21708"/>
+                  <a:pt x="264032" y="24354"/>
+                  <a:pt x="0" y="18288"/>
+                </a:cubicBezTo>
+                <a:cubicBezTo>
+                  <a:pt x="189" y="14288"/>
+                  <a:pt x="-703" y="3747"/>
+                  <a:pt x="0" y="0"/>
+                </a:cubicBezTo>
+                <a:close/>
+              </a:path>
+            </a:pathLst>
+          </a:custGeom>
+          <a:solidFill>
+            <a:schemeClr val="accent2"/>
+          </a:solidFill>
+          <a:ln w="44450" cap="rnd">
+            <a:solidFill>
+              <a:schemeClr val="accent2"/>
+            </a:solidFill>
+            <a:round/>
+            <a:extLst>
+              <a:ext uri="{C807C97D-BFC1-408E-A445-0C87EB9F89A2}">
+                <ask:lineSketchStyleProps xmlns:ask="http://schemas.microsoft.com/office/drawing/2018/sketchyshapes" sd="2863741219">
+                  <a:prstGeom prst="rect">
+                    <a:avLst/>
+                  </a:prstGeom>
+                  <ask:type>
+                    <ask:lineSketchFreehand/>
+                  </ask:type>
+                </ask:lineSketchStyleProps>
+              </a:ext>
+            </a:extLst>
+          </a:ln>
+        </p:spPr>
+        <p:style>
+          <a:lnRef idx="2">
+            <a:schemeClr val="accent1">
+              <a:shade val="50000"/>
+            </a:schemeClr>
+          </a:lnRef>
+          <a:fillRef idx="1">
+            <a:schemeClr val="accent1"/>
+          </a:fillRef>
+          <a:effectRef idx="0">
+            <a:schemeClr val="accent1"/>
+          </a:effectRef>
+          <a:fontRef idx="minor">
+            <a:schemeClr val="lt1"/>
+          </a:fontRef>
+        </p:style>
+        <p:txBody>
+          <a:bodyPr rtlCol="0" anchor="ctr"/>
+          <a:lstStyle/>
+          <a:p>
+            <a:pPr algn="ctr"/>
+            <a:endParaRPr lang="en-US"/>
+          </a:p>
+        </p:txBody>
+      </p:sp>
+      <p:pic>
+        <p:nvPicPr>
+          <p:cNvPr id="5" name="Picture 4" descr="Logo&#10;&#10;Description automatically generated">
+            <a:extLst>
+              <a:ext uri="{FF2B5EF4-FFF2-40B4-BE49-F238E27FC236}">
+                <a16:creationId xmlns:a16="http://schemas.microsoft.com/office/drawing/2014/main" id="{35777AD5-3FAE-4A88-829A-36E7A21FA11F}"/>
+              </a:ext>
+            </a:extLst>
+          </p:cNvPr>
+          <p:cNvPicPr>
+            <a:picLocks noChangeAspect="1"/>
+          </p:cNvPicPr>
+          <p:nvPr/>
+        </p:nvPicPr>
+        <p:blipFill rotWithShape="1">
+          <a:blip r:embed="rId2">
+            <a:alphaModFix amt="50000"/>
+            <a:extLst>
+              <a:ext uri="{28A0092B-C50C-407E-A947-70E740481C1C}">
+                <a14:useLocalDpi xmlns:a14="http://schemas.microsoft.com/office/drawing/2010/main" val="0"/>
+              </a:ext>
+            </a:extLst>
+          </a:blip>
+          <a:srcRect t="302" r="3" b="3"/>
+          <a:stretch/>
+        </p:blipFill>
+        <p:spPr>
+          <a:xfrm>
+            <a:off x="5311702" y="10"/>
+            <a:ext cx="6878775" cy="6857990"/>
+          </a:xfrm>
+          <a:custGeom>
+            <a:avLst/>
+            <a:gdLst/>
+            <a:ahLst/>
+            <a:cxnLst/>
+            <a:rect l="l" t="t" r="r" b="b"/>
+            <a:pathLst>
+              <a:path w="6878775" h="6858000">
+                <a:moveTo>
+                  <a:pt x="1102973" y="0"/>
+                </a:moveTo>
+                <a:lnTo>
+                  <a:pt x="1160688" y="0"/>
+                </a:lnTo>
+                <a:lnTo>
+                  <a:pt x="983189" y="331786"/>
+                </a:lnTo>
+                <a:cubicBezTo>
+                  <a:pt x="914866" y="469145"/>
+                  <a:pt x="850355" y="608712"/>
+                  <a:pt x="789261" y="750263"/>
+                </a:cubicBezTo>
+                <a:cubicBezTo>
+                  <a:pt x="774307" y="784928"/>
+                  <a:pt x="759992" y="819849"/>
+                  <a:pt x="745295" y="854514"/>
+                </a:cubicBezTo>
+                <a:cubicBezTo>
+                  <a:pt x="756682" y="845393"/>
+                  <a:pt x="765489" y="833492"/>
+                  <a:pt x="770857" y="819975"/>
+                </a:cubicBezTo>
+                <a:cubicBezTo>
+                  <a:pt x="879943" y="589569"/>
+                  <a:pt x="999605" y="365513"/>
+                  <a:pt x="1131329" y="148742"/>
+                </a:cubicBezTo>
+                <a:lnTo>
+                  <a:pt x="1227589" y="0"/>
+                </a:lnTo>
+                <a:lnTo>
+                  <a:pt x="6878775" y="0"/>
+                </a:lnTo>
+                <a:lnTo>
+                  <a:pt x="6878775" y="6858000"/>
+                </a:lnTo>
+                <a:lnTo>
+                  <a:pt x="713521" y="6858000"/>
+                </a:lnTo>
+                <a:lnTo>
+                  <a:pt x="625642" y="6670527"/>
+                </a:lnTo>
+                <a:cubicBezTo>
+                  <a:pt x="507232" y="6398531"/>
+                  <a:pt x="403083" y="6118381"/>
+                  <a:pt x="312785" y="5830359"/>
+                </a:cubicBezTo>
+                <a:cubicBezTo>
+                  <a:pt x="278149" y="5719759"/>
+                  <a:pt x="248879" y="5607635"/>
+                  <a:pt x="212198" y="5480401"/>
+                </a:cubicBezTo>
+                <a:cubicBezTo>
+                  <a:pt x="212208" y="5491601"/>
+                  <a:pt x="212803" y="5502788"/>
+                  <a:pt x="213988" y="5513923"/>
+                </a:cubicBezTo>
+                <a:cubicBezTo>
+                  <a:pt x="264089" y="5723695"/>
+                  <a:pt x="307290" y="5935370"/>
+                  <a:pt x="365826" y="6142729"/>
+                </a:cubicBezTo>
+                <a:cubicBezTo>
+                  <a:pt x="433152" y="6380817"/>
+                  <a:pt x="510068" y="6614016"/>
+                  <a:pt x="597975" y="6841549"/>
+                </a:cubicBezTo>
+                <a:lnTo>
+                  <a:pt x="604824" y="6858000"/>
+                </a:lnTo>
+                <a:lnTo>
+                  <a:pt x="552056" y="6858000"/>
+                </a:lnTo>
+                <a:lnTo>
+                  <a:pt x="539576" y="6828295"/>
+                </a:lnTo>
+                <a:cubicBezTo>
+                  <a:pt x="380597" y="6414594"/>
+                  <a:pt x="260223" y="5988893"/>
+                  <a:pt x="171555" y="5552906"/>
+                </a:cubicBezTo>
+                <a:cubicBezTo>
+                  <a:pt x="91163" y="5157998"/>
+                  <a:pt x="43746" y="4758899"/>
+                  <a:pt x="12305" y="4357388"/>
+                </a:cubicBezTo>
+                <a:cubicBezTo>
+                  <a:pt x="-14281" y="4013908"/>
+                  <a:pt x="4507" y="3672965"/>
+                  <a:pt x="46684" y="3331516"/>
+                </a:cubicBezTo>
+                <a:cubicBezTo>
+                  <a:pt x="127203" y="2664286"/>
+                  <a:pt x="277819" y="2007265"/>
+                  <a:pt x="496065" y="1371196"/>
+                </a:cubicBezTo>
+                <a:cubicBezTo>
+                  <a:pt x="636273" y="966066"/>
+                  <a:pt x="800445" y="573253"/>
+                  <a:pt x="995723" y="196614"/>
+                </a:cubicBezTo>
+                <a:close/>
+              </a:path>
+            </a:pathLst>
+          </a:custGeom>
+        </p:spPr>
+      </p:pic>
     </p:spTree>
     <p:extLst>
       <p:ext uri="{BB962C8B-B14F-4D97-AF65-F5344CB8AC3E}">
@@ -3391,12 +3936,287 @@
   <p:clrMapOvr>
     <a:masterClrMapping/>
   </p:clrMapOvr>
+  <p:timing>
+    <p:tnLst>
+      <p:par>
+        <p:cTn id="1" dur="indefinite" restart="never" nodeType="tmRoot">
+          <p:childTnLst>
+            <p:seq concurrent="1" nextAc="seek">
+              <p:cTn id="2" dur="indefinite" nodeType="mainSeq">
+                <p:childTnLst>
+                  <p:par>
+                    <p:cTn id="3" fill="hold">
+                      <p:stCondLst>
+                        <p:cond delay="indefinite"/>
+                        <p:cond evt="onBegin" delay="0">
+                          <p:tn val="2"/>
+                        </p:cond>
+                      </p:stCondLst>
+                      <p:childTnLst>
+                        <p:par>
+                          <p:cTn id="4" fill="hold">
+                            <p:stCondLst>
+                              <p:cond delay="0"/>
+                            </p:stCondLst>
+                            <p:childTnLst>
+                              <p:par>
+                                <p:cTn id="5" presetID="10" presetClass="entr" presetSubtype="0" fill="hold" grpId="0" nodeType="withEffect">
+                                  <p:stCondLst>
+                                    <p:cond delay="2000"/>
+                                  </p:stCondLst>
+                                  <p:iterate type="lt">
+                                    <p:tmPct val="10000"/>
+                                  </p:iterate>
+                                  <p:childTnLst>
+                                    <p:set>
+                                      <p:cBhvr>
+                                        <p:cTn id="6" dur="1" fill="hold">
+                                          <p:stCondLst>
+                                            <p:cond delay="0"/>
+                                          </p:stCondLst>
+                                        </p:cTn>
+                                        <p:tgtEl>
+                                          <p:spTgt spid="3">
+                                            <p:txEl>
+                                              <p:pRg st="0" end="0"/>
+                                            </p:txEl>
+                                          </p:spTgt>
+                                        </p:tgtEl>
+                                        <p:attrNameLst>
+                                          <p:attrName>style.visibility</p:attrName>
+                                        </p:attrNameLst>
+                                      </p:cBhvr>
+                                      <p:to>
+                                        <p:strVal val="visible"/>
+                                      </p:to>
+                                    </p:set>
+                                    <p:animEffect transition="in" filter="fade">
+                                      <p:cBhvr>
+                                        <p:cTn id="7" dur="400"/>
+                                        <p:tgtEl>
+                                          <p:spTgt spid="3">
+                                            <p:txEl>
+                                              <p:pRg st="0" end="0"/>
+                                            </p:txEl>
+                                          </p:spTgt>
+                                        </p:tgtEl>
+                                      </p:cBhvr>
+                                    </p:animEffect>
+                                  </p:childTnLst>
+                                </p:cTn>
+                              </p:par>
+                              <p:par>
+                                <p:cTn id="8" presetID="10" presetClass="entr" presetSubtype="0" fill="hold" grpId="0" nodeType="withEffect">
+                                  <p:stCondLst>
+                                    <p:cond delay="1000"/>
+                                  </p:stCondLst>
+                                  <p:iterate type="lt">
+                                    <p:tmPct val="10000"/>
+                                  </p:iterate>
+                                  <p:childTnLst>
+                                    <p:set>
+                                      <p:cBhvr>
+                                        <p:cTn id="9" dur="1" fill="hold">
+                                          <p:stCondLst>
+                                            <p:cond delay="0"/>
+                                          </p:stCondLst>
+                                        </p:cTn>
+                                        <p:tgtEl>
+                                          <p:spTgt spid="2"/>
+                                        </p:tgtEl>
+                                        <p:attrNameLst>
+                                          <p:attrName>style.visibility</p:attrName>
+                                        </p:attrNameLst>
+                                      </p:cBhvr>
+                                      <p:to>
+                                        <p:strVal val="visible"/>
+                                      </p:to>
+                                    </p:set>
+                                    <p:animEffect transition="in" filter="fade">
+                                      <p:cBhvr>
+                                        <p:cTn id="10" dur="400"/>
+                                        <p:tgtEl>
+                                          <p:spTgt spid="2"/>
+                                        </p:tgtEl>
+                                      </p:cBhvr>
+                                    </p:animEffect>
+                                  </p:childTnLst>
+                                </p:cTn>
+                              </p:par>
+                            </p:childTnLst>
+                          </p:cTn>
+                        </p:par>
+                      </p:childTnLst>
+                    </p:cTn>
+                  </p:par>
+                  <p:par>
+                    <p:cTn id="11" fill="hold">
+                      <p:stCondLst>
+                        <p:cond delay="indefinite"/>
+                      </p:stCondLst>
+                      <p:childTnLst>
+                        <p:par>
+                          <p:cTn id="12" fill="hold">
+                            <p:stCondLst>
+                              <p:cond delay="0"/>
+                            </p:stCondLst>
+                            <p:childTnLst>
+                              <p:par>
+                                <p:cTn id="13" presetID="10" presetClass="entr" presetSubtype="0" fill="hold" grpId="0" nodeType="clickEffect">
+                                  <p:stCondLst>
+                                    <p:cond delay="2000"/>
+                                  </p:stCondLst>
+                                  <p:iterate type="lt">
+                                    <p:tmPct val="10000"/>
+                                  </p:iterate>
+                                  <p:childTnLst>
+                                    <p:set>
+                                      <p:cBhvr>
+                                        <p:cTn id="14" dur="1" fill="hold">
+                                          <p:stCondLst>
+                                            <p:cond delay="0"/>
+                                          </p:stCondLst>
+                                        </p:cTn>
+                                        <p:tgtEl>
+                                          <p:spTgt spid="3">
+                                            <p:txEl>
+                                              <p:pRg st="1" end="1"/>
+                                            </p:txEl>
+                                          </p:spTgt>
+                                        </p:tgtEl>
+                                        <p:attrNameLst>
+                                          <p:attrName>style.visibility</p:attrName>
+                                        </p:attrNameLst>
+                                      </p:cBhvr>
+                                      <p:to>
+                                        <p:strVal val="visible"/>
+                                      </p:to>
+                                    </p:set>
+                                    <p:animEffect transition="in" filter="fade">
+                                      <p:cBhvr>
+                                        <p:cTn id="15" dur="400"/>
+                                        <p:tgtEl>
+                                          <p:spTgt spid="3">
+                                            <p:txEl>
+                                              <p:pRg st="1" end="1"/>
+                                            </p:txEl>
+                                          </p:spTgt>
+                                        </p:tgtEl>
+                                      </p:cBhvr>
+                                    </p:animEffect>
+                                  </p:childTnLst>
+                                </p:cTn>
+                              </p:par>
+                            </p:childTnLst>
+                          </p:cTn>
+                        </p:par>
+                      </p:childTnLst>
+                    </p:cTn>
+                  </p:par>
+                  <p:par>
+                    <p:cTn id="16" fill="hold">
+                      <p:stCondLst>
+                        <p:cond delay="indefinite"/>
+                      </p:stCondLst>
+                      <p:childTnLst>
+                        <p:par>
+                          <p:cTn id="17" fill="hold">
+                            <p:stCondLst>
+                              <p:cond delay="0"/>
+                            </p:stCondLst>
+                            <p:childTnLst>
+                              <p:par>
+                                <p:cTn id="18" presetID="10" presetClass="entr" presetSubtype="0" fill="hold" grpId="0" nodeType="clickEffect">
+                                  <p:stCondLst>
+                                    <p:cond delay="2000"/>
+                                  </p:stCondLst>
+                                  <p:iterate type="lt">
+                                    <p:tmPct val="10000"/>
+                                  </p:iterate>
+                                  <p:childTnLst>
+                                    <p:set>
+                                      <p:cBhvr>
+                                        <p:cTn id="19" dur="1" fill="hold">
+                                          <p:stCondLst>
+                                            <p:cond delay="0"/>
+                                          </p:stCondLst>
+                                        </p:cTn>
+                                        <p:tgtEl>
+                                          <p:spTgt spid="3">
+                                            <p:txEl>
+                                              <p:pRg st="2" end="2"/>
+                                            </p:txEl>
+                                          </p:spTgt>
+                                        </p:tgtEl>
+                                        <p:attrNameLst>
+                                          <p:attrName>style.visibility</p:attrName>
+                                        </p:attrNameLst>
+                                      </p:cBhvr>
+                                      <p:to>
+                                        <p:strVal val="visible"/>
+                                      </p:to>
+                                    </p:set>
+                                    <p:animEffect transition="in" filter="fade">
+                                      <p:cBhvr>
+                                        <p:cTn id="20" dur="400"/>
+                                        <p:tgtEl>
+                                          <p:spTgt spid="3">
+                                            <p:txEl>
+                                              <p:pRg st="2" end="2"/>
+                                            </p:txEl>
+                                          </p:spTgt>
+                                        </p:tgtEl>
+                                      </p:cBhvr>
+                                    </p:animEffect>
+                                  </p:childTnLst>
+                                </p:cTn>
+                              </p:par>
+                            </p:childTnLst>
+                          </p:cTn>
+                        </p:par>
+                      </p:childTnLst>
+                    </p:cTn>
+                  </p:par>
+                </p:childTnLst>
+              </p:cTn>
+              <p:prevCondLst>
+                <p:cond evt="onPrev" delay="0">
+                  <p:tgtEl>
+                    <p:sldTgt/>
+                  </p:tgtEl>
+                </p:cond>
+              </p:prevCondLst>
+              <p:nextCondLst>
+                <p:cond evt="onNext" delay="0">
+                  <p:tgtEl>
+                    <p:sldTgt/>
+                  </p:tgtEl>
+                </p:cond>
+              </p:nextCondLst>
+            </p:seq>
+          </p:childTnLst>
+        </p:cTn>
+      </p:par>
+    </p:tnLst>
+    <p:bldLst>
+      <p:bldP spid="2" grpId="0"/>
+      <p:bldP spid="3" grpId="0" build="p"/>
+    </p:bldLst>
+  </p:timing>
 </p:sld>
 </file>
 
 <file path=ppt/slides/slide2.xml><?xml version="1.0" encoding="utf-8"?>
 <p:sld xmlns:a="http://schemas.openxmlformats.org/drawingml/2006/main" xmlns:r="http://schemas.openxmlformats.org/officeDocument/2006/relationships" xmlns:p="http://schemas.openxmlformats.org/presentationml/2006/main">
   <p:cSld>
+    <p:bg>
+      <p:bgPr>
+        <a:solidFill>
+          <a:schemeClr val="bg1"/>
+        </a:solidFill>
+        <a:effectLst/>
+      </p:bgPr>
+    </p:bg>
     <p:spTree>
       <p:nvGrpSpPr>
         <p:cNvPr id="1" name=""/>
@@ -3411,12 +4231,407 @@
           <a:chExt cx="0" cy="0"/>
         </a:xfrm>
       </p:grpSpPr>
+      <p:sp useBgFill="1">
+        <p:nvSpPr>
+          <p:cNvPr id="16" name="Rectangle 15">
+            <a:extLst>
+              <a:ext uri="{FF2B5EF4-FFF2-40B4-BE49-F238E27FC236}">
+                <a16:creationId xmlns:a16="http://schemas.microsoft.com/office/drawing/2014/main" id="{5C9B446A-6343-4E56-90BA-061E4DDF0FFB}"/>
+              </a:ext>
+              <a:ext uri="{C183D7F6-B498-43B3-948B-1728B52AA6E4}">
+                <adec:decorative xmlns:adec="http://schemas.microsoft.com/office/drawing/2017/decorative" val="1"/>
+              </a:ext>
+            </a:extLst>
+          </p:cNvPr>
+          <p:cNvSpPr>
+            <a:spLocks noGrp="1" noRot="1" noChangeAspect="1" noMove="1" noResize="1" noEditPoints="1" noAdjustHandles="1" noChangeArrowheads="1" noChangeShapeType="1" noTextEdit="1"/>
+          </p:cNvSpPr>
+          <p:nvPr>
+            <p:extLst>
+              <p:ext uri="{386F3935-93C4-4BCD-93E2-E3B085C9AB24}">
+                <p16:designElem xmlns:p16="http://schemas.microsoft.com/office/powerpoint/2015/main" val="1"/>
+              </p:ext>
+            </p:extLst>
+          </p:nvPr>
+        </p:nvSpPr>
+        <p:spPr>
+          <a:xfrm>
+            <a:off x="0" y="0"/>
+            <a:ext cx="12192000" cy="6858000"/>
+          </a:xfrm>
+          <a:prstGeom prst="rect">
+            <a:avLst/>
+          </a:prstGeom>
+          <a:ln>
+            <a:noFill/>
+          </a:ln>
+        </p:spPr>
+        <p:style>
+          <a:lnRef idx="2">
+            <a:schemeClr val="accent1">
+              <a:shade val="50000"/>
+            </a:schemeClr>
+          </a:lnRef>
+          <a:fillRef idx="1">
+            <a:schemeClr val="accent1"/>
+          </a:fillRef>
+          <a:effectRef idx="0">
+            <a:schemeClr val="accent1"/>
+          </a:effectRef>
+          <a:fontRef idx="minor">
+            <a:schemeClr val="lt1"/>
+          </a:fontRef>
+        </p:style>
+        <p:txBody>
+          <a:bodyPr rtlCol="0" anchor="ctr"/>
+          <a:lstStyle/>
+          <a:p>
+            <a:pPr algn="ctr"/>
+            <a:endParaRPr lang="en-US"/>
+          </a:p>
+        </p:txBody>
+      </p:sp>
+      <p:sp useBgFill="1">
+        <p:nvSpPr>
+          <p:cNvPr id="18" name="Freeform: Shape 17">
+            <a:extLst>
+              <a:ext uri="{FF2B5EF4-FFF2-40B4-BE49-F238E27FC236}">
+                <a16:creationId xmlns:a16="http://schemas.microsoft.com/office/drawing/2014/main" id="{3EC72A1B-03D3-499C-B4BF-AC68EEC22B10}"/>
+              </a:ext>
+              <a:ext uri="{C183D7F6-B498-43B3-948B-1728B52AA6E4}">
+                <adec:decorative xmlns:adec="http://schemas.microsoft.com/office/drawing/2017/decorative" val="1"/>
+              </a:ext>
+            </a:extLst>
+          </p:cNvPr>
+          <p:cNvSpPr>
+            <a:spLocks noGrp="1" noRot="1" noChangeAspect="1" noMove="1" noResize="1" noEditPoints="1" noAdjustHandles="1" noChangeArrowheads="1" noChangeShapeType="1" noTextEdit="1"/>
+          </p:cNvSpPr>
+          <p:nvPr>
+            <p:extLst>
+              <p:ext uri="{386F3935-93C4-4BCD-93E2-E3B085C9AB24}">
+                <p16:designElem xmlns:p16="http://schemas.microsoft.com/office/powerpoint/2015/main" val="1"/>
+              </p:ext>
+            </p:extLst>
+          </p:nvPr>
+        </p:nvSpPr>
+        <p:spPr>
+          <a:xfrm>
+            <a:off x="-1" y="0"/>
+            <a:ext cx="4455673" cy="6858000"/>
+          </a:xfrm>
+          <a:custGeom>
+            <a:avLst/>
+            <a:gdLst>
+              <a:gd name="connsiteX0" fmla="*/ 0 w 4455673"/>
+              <a:gd name="connsiteY0" fmla="*/ 0 h 6858000"/>
+              <a:gd name="connsiteX1" fmla="*/ 3242695 w 4455673"/>
+              <a:gd name="connsiteY1" fmla="*/ 0 h 6858000"/>
+              <a:gd name="connsiteX2" fmla="*/ 3305678 w 4455673"/>
+              <a:gd name="connsiteY2" fmla="*/ 69271 h 6858000"/>
+              <a:gd name="connsiteX3" fmla="*/ 4455673 w 4455673"/>
+              <a:gd name="connsiteY3" fmla="*/ 3429000 h 6858000"/>
+              <a:gd name="connsiteX4" fmla="*/ 3305678 w 4455673"/>
+              <a:gd name="connsiteY4" fmla="*/ 6788730 h 6858000"/>
+              <a:gd name="connsiteX5" fmla="*/ 3242695 w 4455673"/>
+              <a:gd name="connsiteY5" fmla="*/ 6858000 h 6858000"/>
+              <a:gd name="connsiteX6" fmla="*/ 0 w 4455673"/>
+              <a:gd name="connsiteY6" fmla="*/ 6858000 h 6858000"/>
+            </a:gdLst>
+            <a:ahLst/>
+            <a:cxnLst>
+              <a:cxn ang="0">
+                <a:pos x="connsiteX0" y="connsiteY0"/>
+              </a:cxn>
+              <a:cxn ang="0">
+                <a:pos x="connsiteX1" y="connsiteY1"/>
+              </a:cxn>
+              <a:cxn ang="0">
+                <a:pos x="connsiteX2" y="connsiteY2"/>
+              </a:cxn>
+              <a:cxn ang="0">
+                <a:pos x="connsiteX3" y="connsiteY3"/>
+              </a:cxn>
+              <a:cxn ang="0">
+                <a:pos x="connsiteX4" y="connsiteY4"/>
+              </a:cxn>
+              <a:cxn ang="0">
+                <a:pos x="connsiteX5" y="connsiteY5"/>
+              </a:cxn>
+              <a:cxn ang="0">
+                <a:pos x="connsiteX6" y="connsiteY6"/>
+              </a:cxn>
+            </a:cxnLst>
+            <a:rect l="l" t="t" r="r" b="b"/>
+            <a:pathLst>
+              <a:path w="4455673" h="6858000">
+                <a:moveTo>
+                  <a:pt x="0" y="0"/>
+                </a:moveTo>
+                <a:lnTo>
+                  <a:pt x="3242695" y="0"/>
+                </a:lnTo>
+                <a:lnTo>
+                  <a:pt x="3305678" y="69271"/>
+                </a:lnTo>
+                <a:cubicBezTo>
+                  <a:pt x="4016204" y="929100"/>
+                  <a:pt x="4455673" y="2116944"/>
+                  <a:pt x="4455673" y="3429000"/>
+                </a:cubicBezTo>
+                <a:cubicBezTo>
+                  <a:pt x="4455673" y="4741056"/>
+                  <a:pt x="4016204" y="5928900"/>
+                  <a:pt x="3305678" y="6788730"/>
+                </a:cubicBezTo>
+                <a:lnTo>
+                  <a:pt x="3242695" y="6858000"/>
+                </a:lnTo>
+                <a:lnTo>
+                  <a:pt x="0" y="6858000"/>
+                </a:lnTo>
+                <a:close/>
+              </a:path>
+            </a:pathLst>
+          </a:custGeom>
+          <a:ln w="9525">
+            <a:solidFill>
+              <a:srgbClr val="EFEFEF"/>
+            </a:solidFill>
+          </a:ln>
+          <a:effectLst>
+            <a:outerShdw blurRad="88900" dist="38100" algn="l" rotWithShape="0">
+              <a:schemeClr val="bg1">
+                <a:lumMod val="85000"/>
+                <a:alpha val="50000"/>
+              </a:schemeClr>
+            </a:outerShdw>
+          </a:effectLst>
+        </p:spPr>
+        <p:style>
+          <a:lnRef idx="2">
+            <a:schemeClr val="accent1">
+              <a:shade val="50000"/>
+            </a:schemeClr>
+          </a:lnRef>
+          <a:fillRef idx="1">
+            <a:schemeClr val="accent1"/>
+          </a:fillRef>
+          <a:effectRef idx="0">
+            <a:schemeClr val="accent1"/>
+          </a:effectRef>
+          <a:fontRef idx="minor">
+            <a:schemeClr val="lt1"/>
+          </a:fontRef>
+        </p:style>
+        <p:txBody>
+          <a:bodyPr wrap="square" rtlCol="0" anchor="ctr">
+            <a:noAutofit/>
+          </a:bodyPr>
+          <a:lstStyle/>
+          <a:p>
+            <a:pPr marL="0" marR="0" lvl="0" indent="0" algn="ctr" defTabSz="914400" rtl="0" eaLnBrk="1" fontAlgn="auto" latinLnBrk="0" hangingPunct="1">
+              <a:lnSpc>
+                <a:spcPct val="100000"/>
+              </a:lnSpc>
+              <a:spcBef>
+                <a:spcPts val="0"/>
+              </a:spcBef>
+              <a:spcAft>
+                <a:spcPts val="0"/>
+              </a:spcAft>
+              <a:buClrTx/>
+              <a:buSzTx/>
+              <a:buFontTx/>
+              <a:buNone/>
+              <a:tabLst/>
+              <a:defRPr/>
+            </a:pPr>
+            <a:endParaRPr kumimoji="0" lang="en-US" sz="1800" b="0" i="0" u="none" strike="noStrike" kern="1200" cap="none" spc="0" normalizeH="0" baseline="0" noProof="0">
+              <a:ln>
+                <a:noFill/>
+              </a:ln>
+              <a:solidFill>
+                <a:prstClr val="white"/>
+              </a:solidFill>
+              <a:effectLst/>
+              <a:uLnTx/>
+              <a:uFillTx/>
+              <a:latin typeface="Calibri" panose="020F0502020204030204"/>
+              <a:ea typeface="+mn-ea"/>
+              <a:cs typeface="+mn-cs"/>
+            </a:endParaRPr>
+          </a:p>
+        </p:txBody>
+      </p:sp>
+      <p:sp useBgFill="1">
+        <p:nvSpPr>
+          <p:cNvPr id="20" name="Freeform: Shape 19">
+            <a:extLst>
+              <a:ext uri="{FF2B5EF4-FFF2-40B4-BE49-F238E27FC236}">
+                <a16:creationId xmlns:a16="http://schemas.microsoft.com/office/drawing/2014/main" id="{216322C2-3CF0-4D33-BF90-3F384CF6D232}"/>
+              </a:ext>
+              <a:ext uri="{C183D7F6-B498-43B3-948B-1728B52AA6E4}">
+                <adec:decorative xmlns:adec="http://schemas.microsoft.com/office/drawing/2017/decorative" val="1"/>
+              </a:ext>
+            </a:extLst>
+          </p:cNvPr>
+          <p:cNvSpPr>
+            <a:spLocks noGrp="1" noRot="1" noChangeAspect="1" noMove="1" noResize="1" noEditPoints="1" noAdjustHandles="1" noChangeArrowheads="1" noChangeShapeType="1" noTextEdit="1"/>
+          </p:cNvSpPr>
+          <p:nvPr>
+            <p:extLst>
+              <p:ext uri="{386F3935-93C4-4BCD-93E2-E3B085C9AB24}">
+                <p16:designElem xmlns:p16="http://schemas.microsoft.com/office/powerpoint/2015/main" val="1"/>
+              </p:ext>
+            </p:extLst>
+          </p:nvPr>
+        </p:nvSpPr>
+        <p:spPr>
+          <a:xfrm>
+            <a:off x="0" y="0"/>
+            <a:ext cx="4446529" cy="6858000"/>
+          </a:xfrm>
+          <a:custGeom>
+            <a:avLst/>
+            <a:gdLst>
+              <a:gd name="connsiteX0" fmla="*/ 0 w 4446529"/>
+              <a:gd name="connsiteY0" fmla="*/ 0 h 6858000"/>
+              <a:gd name="connsiteX1" fmla="*/ 3233551 w 4446529"/>
+              <a:gd name="connsiteY1" fmla="*/ 0 h 6858000"/>
+              <a:gd name="connsiteX2" fmla="*/ 3296534 w 4446529"/>
+              <a:gd name="connsiteY2" fmla="*/ 69271 h 6858000"/>
+              <a:gd name="connsiteX3" fmla="*/ 4446529 w 4446529"/>
+              <a:gd name="connsiteY3" fmla="*/ 3429000 h 6858000"/>
+              <a:gd name="connsiteX4" fmla="*/ 3296534 w 4446529"/>
+              <a:gd name="connsiteY4" fmla="*/ 6788730 h 6858000"/>
+              <a:gd name="connsiteX5" fmla="*/ 3233551 w 4446529"/>
+              <a:gd name="connsiteY5" fmla="*/ 6858000 h 6858000"/>
+              <a:gd name="connsiteX6" fmla="*/ 0 w 4446529"/>
+              <a:gd name="connsiteY6" fmla="*/ 6858000 h 6858000"/>
+            </a:gdLst>
+            <a:ahLst/>
+            <a:cxnLst>
+              <a:cxn ang="0">
+                <a:pos x="connsiteX0" y="connsiteY0"/>
+              </a:cxn>
+              <a:cxn ang="0">
+                <a:pos x="connsiteX1" y="connsiteY1"/>
+              </a:cxn>
+              <a:cxn ang="0">
+                <a:pos x="connsiteX2" y="connsiteY2"/>
+              </a:cxn>
+              <a:cxn ang="0">
+                <a:pos x="connsiteX3" y="connsiteY3"/>
+              </a:cxn>
+              <a:cxn ang="0">
+                <a:pos x="connsiteX4" y="connsiteY4"/>
+              </a:cxn>
+              <a:cxn ang="0">
+                <a:pos x="connsiteX5" y="connsiteY5"/>
+              </a:cxn>
+              <a:cxn ang="0">
+                <a:pos x="connsiteX6" y="connsiteY6"/>
+              </a:cxn>
+            </a:cxnLst>
+            <a:rect l="l" t="t" r="r" b="b"/>
+            <a:pathLst>
+              <a:path w="4446529" h="6858000">
+                <a:moveTo>
+                  <a:pt x="0" y="0"/>
+                </a:moveTo>
+                <a:lnTo>
+                  <a:pt x="3233551" y="0"/>
+                </a:lnTo>
+                <a:lnTo>
+                  <a:pt x="3296534" y="69271"/>
+                </a:lnTo>
+                <a:cubicBezTo>
+                  <a:pt x="4007060" y="929100"/>
+                  <a:pt x="4446529" y="2116944"/>
+                  <a:pt x="4446529" y="3429000"/>
+                </a:cubicBezTo>
+                <a:cubicBezTo>
+                  <a:pt x="4446529" y="4741056"/>
+                  <a:pt x="4007060" y="5928900"/>
+                  <a:pt x="3296534" y="6788730"/>
+                </a:cubicBezTo>
+                <a:lnTo>
+                  <a:pt x="3233551" y="6858000"/>
+                </a:lnTo>
+                <a:lnTo>
+                  <a:pt x="0" y="6858000"/>
+                </a:lnTo>
+                <a:close/>
+              </a:path>
+            </a:pathLst>
+          </a:custGeom>
+          <a:ln w="9525">
+            <a:noFill/>
+          </a:ln>
+          <a:effectLst/>
+        </p:spPr>
+        <p:style>
+          <a:lnRef idx="2">
+            <a:schemeClr val="accent1">
+              <a:shade val="50000"/>
+            </a:schemeClr>
+          </a:lnRef>
+          <a:fillRef idx="1">
+            <a:schemeClr val="accent1"/>
+          </a:fillRef>
+          <a:effectRef idx="0">
+            <a:schemeClr val="accent1"/>
+          </a:effectRef>
+          <a:fontRef idx="minor">
+            <a:schemeClr val="lt1"/>
+          </a:fontRef>
+        </p:style>
+        <p:txBody>
+          <a:bodyPr wrap="square" rtlCol="0" anchor="ctr">
+            <a:noAutofit/>
+          </a:bodyPr>
+          <a:lstStyle/>
+          <a:p>
+            <a:pPr marL="0" marR="0" lvl="0" indent="0" algn="ctr" defTabSz="914400" rtl="0" eaLnBrk="1" fontAlgn="auto" latinLnBrk="0" hangingPunct="1">
+              <a:lnSpc>
+                <a:spcPct val="100000"/>
+              </a:lnSpc>
+              <a:spcBef>
+                <a:spcPts val="0"/>
+              </a:spcBef>
+              <a:spcAft>
+                <a:spcPts val="0"/>
+              </a:spcAft>
+              <a:buClrTx/>
+              <a:buSzTx/>
+              <a:buFontTx/>
+              <a:buNone/>
+              <a:tabLst/>
+              <a:defRPr/>
+            </a:pPr>
+            <a:endParaRPr kumimoji="0" lang="en-US" sz="1800" b="0" i="0" u="none" strike="noStrike" kern="1200" cap="none" spc="0" normalizeH="0" baseline="0" noProof="0">
+              <a:ln>
+                <a:noFill/>
+              </a:ln>
+              <a:solidFill>
+                <a:prstClr val="white"/>
+              </a:solidFill>
+              <a:effectLst/>
+              <a:uLnTx/>
+              <a:uFillTx/>
+              <a:latin typeface="Calibri" panose="020F0502020204030204"/>
+              <a:ea typeface="+mn-ea"/>
+              <a:cs typeface="+mn-cs"/>
+            </a:endParaRPr>
+          </a:p>
+        </p:txBody>
+      </p:sp>
       <p:sp>
         <p:nvSpPr>
           <p:cNvPr id="2" name="Title 1">
             <a:extLst>
               <a:ext uri="{FF2B5EF4-FFF2-40B4-BE49-F238E27FC236}">
-                <a16:creationId xmlns:a16="http://schemas.microsoft.com/office/drawing/2014/main" id="{9AB886EE-3197-4603-8164-B1527AB9F3E3}"/>
+                <a16:creationId xmlns:a16="http://schemas.microsoft.com/office/drawing/2014/main" id="{66C1ADCF-2499-4A70-8B79-A310D03A2D65}"/>
               </a:ext>
             </a:extLst>
           </p:cNvPr>
@@ -3427,21 +4642,168 @@
             <p:ph type="title"/>
           </p:nvPr>
         </p:nvSpPr>
-        <p:spPr/>
+        <p:spPr>
+          <a:xfrm>
+            <a:off x="371094" y="1161288"/>
+            <a:ext cx="3438144" cy="1124712"/>
+          </a:xfrm>
+        </p:spPr>
         <p:txBody>
-          <a:bodyPr/>
+          <a:bodyPr anchor="b">
+            <a:normAutofit/>
+          </a:bodyPr>
           <a:lstStyle/>
           <a:p>
-            <a:endParaRPr lang="en-US" dirty="0"/>
+            <a:r>
+              <a:rPr lang="en-US" dirty="0"/>
+              <a:t>Old Schematic</a:t>
+            </a:r>
           </a:p>
         </p:txBody>
       </p:sp>
       <p:sp>
         <p:nvSpPr>
-          <p:cNvPr id="3" name="Content Placeholder 2">
-            <a:extLst>
-              <a:ext uri="{FF2B5EF4-FFF2-40B4-BE49-F238E27FC236}">
-                <a16:creationId xmlns:a16="http://schemas.microsoft.com/office/drawing/2014/main" id="{09BF6F67-5352-4D55-B157-F37D98F1128B}"/>
+          <p:cNvPr id="22" name="Rectangle 21">
+            <a:extLst>
+              <a:ext uri="{FF2B5EF4-FFF2-40B4-BE49-F238E27FC236}">
+                <a16:creationId xmlns:a16="http://schemas.microsoft.com/office/drawing/2014/main" id="{55D4142C-5077-457F-A6AD-3FECFDB39685}"/>
+              </a:ext>
+              <a:ext uri="{C183D7F6-B498-43B3-948B-1728B52AA6E4}">
+                <adec:decorative xmlns:adec="http://schemas.microsoft.com/office/drawing/2017/decorative" val="1"/>
+              </a:ext>
+            </a:extLst>
+          </p:cNvPr>
+          <p:cNvSpPr>
+            <a:spLocks noGrp="1" noRot="1" noChangeAspect="1" noMove="1" noResize="1" noEditPoints="1" noAdjustHandles="1" noChangeArrowheads="1" noChangeShapeType="1" noTextEdit="1"/>
+          </p:cNvSpPr>
+          <p:nvPr>
+            <p:extLst>
+              <p:ext uri="{386F3935-93C4-4BCD-93E2-E3B085C9AB24}">
+                <p16:designElem xmlns:p16="http://schemas.microsoft.com/office/powerpoint/2015/main" val="1"/>
+              </p:ext>
+            </p:extLst>
+          </p:nvPr>
+        </p:nvSpPr>
+        <p:spPr>
+          <a:xfrm rot="5400000">
+            <a:off x="662559" y="605790"/>
+            <a:ext cx="73152" cy="548640"/>
+          </a:xfrm>
+          <a:prstGeom prst="rect">
+            <a:avLst/>
+          </a:prstGeom>
+          <a:solidFill>
+            <a:schemeClr val="accent2"/>
+          </a:solidFill>
+          <a:ln>
+            <a:noFill/>
+          </a:ln>
+        </p:spPr>
+        <p:style>
+          <a:lnRef idx="2">
+            <a:schemeClr val="accent1">
+              <a:shade val="50000"/>
+            </a:schemeClr>
+          </a:lnRef>
+          <a:fillRef idx="1">
+            <a:schemeClr val="accent1"/>
+          </a:fillRef>
+          <a:effectRef idx="0">
+            <a:schemeClr val="accent1"/>
+          </a:effectRef>
+          <a:fontRef idx="minor">
+            <a:schemeClr val="lt1"/>
+          </a:fontRef>
+        </p:style>
+        <p:txBody>
+          <a:bodyPr rtlCol="0" anchor="ctr"/>
+          <a:lstStyle/>
+          <a:p>
+            <a:pPr algn="ctr"/>
+            <a:endParaRPr lang="en-US">
+              <a:solidFill>
+                <a:prstClr val="white"/>
+              </a:solidFill>
+              <a:latin typeface="Calibri" panose="020F0502020204030204"/>
+            </a:endParaRPr>
+          </a:p>
+        </p:txBody>
+      </p:sp>
+      <p:sp>
+        <p:nvSpPr>
+          <p:cNvPr id="24" name="Rectangle 23">
+            <a:extLst>
+              <a:ext uri="{FF2B5EF4-FFF2-40B4-BE49-F238E27FC236}">
+                <a16:creationId xmlns:a16="http://schemas.microsoft.com/office/drawing/2014/main" id="{7A5F0580-5EE9-419F-96EE-B6529EF6E7D0}"/>
+              </a:ext>
+              <a:ext uri="{C183D7F6-B498-43B3-948B-1728B52AA6E4}">
+                <adec:decorative xmlns:adec="http://schemas.microsoft.com/office/drawing/2017/decorative" val="1"/>
+              </a:ext>
+            </a:extLst>
+          </p:cNvPr>
+          <p:cNvSpPr>
+            <a:spLocks noGrp="1" noRot="1" noChangeAspect="1" noMove="1" noResize="1" noEditPoints="1" noAdjustHandles="1" noChangeArrowheads="1" noChangeShapeType="1" noTextEdit="1"/>
+          </p:cNvSpPr>
+          <p:nvPr>
+            <p:extLst>
+              <p:ext uri="{386F3935-93C4-4BCD-93E2-E3B085C9AB24}">
+                <p16:designElem xmlns:p16="http://schemas.microsoft.com/office/powerpoint/2015/main" val="1"/>
+              </p:ext>
+            </p:extLst>
+          </p:nvPr>
+        </p:nvSpPr>
+        <p:spPr>
+          <a:xfrm>
+            <a:off x="428244" y="2443480"/>
+            <a:ext cx="3337560" cy="18288"/>
+          </a:xfrm>
+          <a:prstGeom prst="rect">
+            <a:avLst/>
+          </a:prstGeom>
+          <a:solidFill>
+            <a:srgbClr val="D5D5D5"/>
+          </a:solidFill>
+          <a:ln w="3175">
+            <a:noFill/>
+          </a:ln>
+          <a:effectLst/>
+        </p:spPr>
+        <p:style>
+          <a:lnRef idx="2">
+            <a:schemeClr val="accent1">
+              <a:shade val="50000"/>
+            </a:schemeClr>
+          </a:lnRef>
+          <a:fillRef idx="1">
+            <a:schemeClr val="accent1"/>
+          </a:fillRef>
+          <a:effectRef idx="0">
+            <a:schemeClr val="accent1"/>
+          </a:effectRef>
+          <a:fontRef idx="minor">
+            <a:schemeClr val="lt1"/>
+          </a:fontRef>
+        </p:style>
+        <p:txBody>
+          <a:bodyPr rtlCol="0" anchor="ctr"/>
+          <a:lstStyle/>
+          <a:p>
+            <a:pPr algn="ctr"/>
+            <a:endParaRPr lang="en-US">
+              <a:solidFill>
+                <a:prstClr val="white"/>
+              </a:solidFill>
+              <a:latin typeface="Calibri" panose="020F0502020204030204"/>
+            </a:endParaRPr>
+          </a:p>
+        </p:txBody>
+      </p:sp>
+      <p:sp>
+        <p:nvSpPr>
+          <p:cNvPr id="13" name="Content Placeholder 12">
+            <a:extLst>
+              <a:ext uri="{FF2B5EF4-FFF2-40B4-BE49-F238E27FC236}">
+                <a16:creationId xmlns:a16="http://schemas.microsoft.com/office/drawing/2014/main" id="{37B99D78-40E4-777D-1E1C-AF8A7D024D6F}"/>
               </a:ext>
             </a:extLst>
           </p:cNvPr>
@@ -3452,18 +4814,855 @@
             <p:ph idx="1"/>
           </p:nvPr>
         </p:nvSpPr>
-        <p:spPr/>
+        <p:spPr>
+          <a:xfrm>
+            <a:off x="371094" y="2718054"/>
+            <a:ext cx="3438906" cy="3835146"/>
+          </a:xfrm>
+        </p:spPr>
         <p:txBody>
-          <a:bodyPr/>
+          <a:bodyPr anchor="t">
+            <a:normAutofit lnSpcReduction="10000"/>
+          </a:bodyPr>
           <a:lstStyle/>
           <a:p>
             <a:r>
-              <a:rPr lang="en-US" dirty="0"/>
-              <a:t>Fixed mislabeled GND pin on Raspberry Pi Header (Pin 38)</a:t>
+              <a:rPr lang="en-US" sz="1700" dirty="0"/>
+              <a:t>Use of Global Labels</a:t>
+            </a:r>
+          </a:p>
+          <a:p>
+            <a:pPr lvl="1"/>
+            <a:r>
+              <a:rPr lang="en-US" sz="1300" dirty="0"/>
+              <a:t>Dangerous Practice</a:t>
+            </a:r>
+          </a:p>
+          <a:p>
+            <a:r>
+              <a:rPr lang="en-US" sz="1700" dirty="0"/>
+              <a:t>Doesn’t Show Signal Flow</a:t>
+            </a:r>
+          </a:p>
+          <a:p>
+            <a:r>
+              <a:rPr lang="en-US" sz="1700" dirty="0"/>
+              <a:t>Incorrect Input For Raspberry Pi</a:t>
+            </a:r>
+          </a:p>
+          <a:p>
+            <a:pPr lvl="1"/>
+            <a:r>
+              <a:rPr lang="en-US" sz="1400" dirty="0"/>
+              <a:t>Mislabeled GND (Pin 38)</a:t>
+            </a:r>
+          </a:p>
+          <a:p>
+            <a:r>
+              <a:rPr lang="en-US" sz="1700" dirty="0"/>
+              <a:t>No Page Information</a:t>
+            </a:r>
+          </a:p>
+          <a:p>
+            <a:r>
+              <a:rPr lang="en-US" sz="1700" dirty="0"/>
+              <a:t>Cluttered Accelerometer Symbols, Unnecessary NC Pins</a:t>
+            </a:r>
+          </a:p>
+          <a:p>
+            <a:r>
+              <a:rPr lang="en-US" sz="1700" dirty="0"/>
+              <a:t>LEDs Powered Directly Off Data Lines, Reducing Signal Integrity And Power</a:t>
+            </a:r>
+          </a:p>
+          <a:p>
+            <a:r>
+              <a:rPr lang="en-US" sz="1700" dirty="0"/>
+              <a:t>No Pull-Down Resistors On I2C Lines</a:t>
             </a:r>
           </a:p>
         </p:txBody>
       </p:sp>
+      <p:pic>
+        <p:nvPicPr>
+          <p:cNvPr id="9" name="Content Placeholder 8">
+            <a:extLst>
+              <a:ext uri="{FF2B5EF4-FFF2-40B4-BE49-F238E27FC236}">
+                <a16:creationId xmlns:a16="http://schemas.microsoft.com/office/drawing/2014/main" id="{FCC4668D-1F67-4DC7-A27C-4E14A2A2C485}"/>
+              </a:ext>
+            </a:extLst>
+          </p:cNvPr>
+          <p:cNvPicPr>
+            <a:picLocks noChangeAspect="1"/>
+          </p:cNvPicPr>
+          <p:nvPr/>
+        </p:nvPicPr>
+        <p:blipFill>
+          <a:blip r:embed="rId2">
+            <a:extLst>
+              <a:ext uri="{28A0092B-C50C-407E-A947-70E740481C1C}">
+                <a14:useLocalDpi xmlns:a14="http://schemas.microsoft.com/office/drawing/2010/main" val="0"/>
+              </a:ext>
+              <a:ext uri="{96DAC541-7B7A-43D3-8B79-37D633B846F1}">
+                <asvg:svgBlip xmlns:asvg="http://schemas.microsoft.com/office/drawing/2016/SVG/main" r:embed="rId3"/>
+              </a:ext>
+            </a:extLst>
+          </a:blip>
+          <a:stretch>
+            <a:fillRect/>
+          </a:stretch>
+        </p:blipFill>
+        <p:spPr>
+          <a:xfrm>
+            <a:off x="4898967" y="1036595"/>
+            <a:ext cx="6921940" cy="4894051"/>
+          </a:xfrm>
+          <a:prstGeom prst="rect">
+            <a:avLst/>
+          </a:prstGeom>
+        </p:spPr>
+      </p:pic>
+    </p:spTree>
+    <p:extLst>
+      <p:ext uri="{BB962C8B-B14F-4D97-AF65-F5344CB8AC3E}">
+        <p14:creationId xmlns:p14="http://schemas.microsoft.com/office/powerpoint/2010/main" val="2178190478"/>
+      </p:ext>
+    </p:extLst>
+  </p:cSld>
+  <p:clrMapOvr>
+    <a:masterClrMapping/>
+  </p:clrMapOvr>
+</p:sld>
+</file>
+
+<file path=ppt/slides/slide3.xml><?xml version="1.0" encoding="utf-8"?>
+<p:sld xmlns:a="http://schemas.openxmlformats.org/drawingml/2006/main" xmlns:r="http://schemas.openxmlformats.org/officeDocument/2006/relationships" xmlns:p="http://schemas.openxmlformats.org/presentationml/2006/main">
+  <p:cSld>
+    <p:bg>
+      <p:bgPr>
+        <a:solidFill>
+          <a:schemeClr val="bg1"/>
+        </a:solidFill>
+        <a:effectLst/>
+      </p:bgPr>
+    </p:bg>
+    <p:spTree>
+      <p:nvGrpSpPr>
+        <p:cNvPr id="1" name=""/>
+        <p:cNvGrpSpPr/>
+        <p:nvPr/>
+      </p:nvGrpSpPr>
+      <p:grpSpPr>
+        <a:xfrm>
+          <a:off x="0" y="0"/>
+          <a:ext cx="0" cy="0"/>
+          <a:chOff x="0" y="0"/>
+          <a:chExt cx="0" cy="0"/>
+        </a:xfrm>
+      </p:grpSpPr>
+      <p:sp useBgFill="1">
+        <p:nvSpPr>
+          <p:cNvPr id="18" name="Rectangle 10">
+            <a:extLst>
+              <a:ext uri="{FF2B5EF4-FFF2-40B4-BE49-F238E27FC236}">
+                <a16:creationId xmlns:a16="http://schemas.microsoft.com/office/drawing/2014/main" id="{5C9B446A-6343-4E56-90BA-061E4DDF0FFB}"/>
+              </a:ext>
+              <a:ext uri="{C183D7F6-B498-43B3-948B-1728B52AA6E4}">
+                <adec:decorative xmlns:adec="http://schemas.microsoft.com/office/drawing/2017/decorative" val="1"/>
+              </a:ext>
+            </a:extLst>
+          </p:cNvPr>
+          <p:cNvSpPr>
+            <a:spLocks noGrp="1" noRot="1" noChangeAspect="1" noMove="1" noResize="1" noEditPoints="1" noAdjustHandles="1" noChangeArrowheads="1" noChangeShapeType="1" noTextEdit="1"/>
+          </p:cNvSpPr>
+          <p:nvPr>
+            <p:extLst>
+              <p:ext uri="{386F3935-93C4-4BCD-93E2-E3B085C9AB24}">
+                <p16:designElem xmlns:p16="http://schemas.microsoft.com/office/powerpoint/2015/main" val="1"/>
+              </p:ext>
+            </p:extLst>
+          </p:nvPr>
+        </p:nvSpPr>
+        <p:spPr>
+          <a:xfrm>
+            <a:off x="0" y="0"/>
+            <a:ext cx="12192000" cy="6858000"/>
+          </a:xfrm>
+          <a:prstGeom prst="rect">
+            <a:avLst/>
+          </a:prstGeom>
+          <a:ln>
+            <a:noFill/>
+          </a:ln>
+        </p:spPr>
+        <p:style>
+          <a:lnRef idx="2">
+            <a:schemeClr val="accent1">
+              <a:shade val="50000"/>
+            </a:schemeClr>
+          </a:lnRef>
+          <a:fillRef idx="1">
+            <a:schemeClr val="accent1"/>
+          </a:fillRef>
+          <a:effectRef idx="0">
+            <a:schemeClr val="accent1"/>
+          </a:effectRef>
+          <a:fontRef idx="minor">
+            <a:schemeClr val="lt1"/>
+          </a:fontRef>
+        </p:style>
+        <p:txBody>
+          <a:bodyPr rtlCol="0" anchor="ctr"/>
+          <a:lstStyle/>
+          <a:p>
+            <a:pPr algn="ctr"/>
+            <a:endParaRPr lang="en-US"/>
+          </a:p>
+        </p:txBody>
+      </p:sp>
+      <p:sp useBgFill="1">
+        <p:nvSpPr>
+          <p:cNvPr id="20" name="Freeform: Shape 12">
+            <a:extLst>
+              <a:ext uri="{FF2B5EF4-FFF2-40B4-BE49-F238E27FC236}">
+                <a16:creationId xmlns:a16="http://schemas.microsoft.com/office/drawing/2014/main" id="{3EC72A1B-03D3-499C-B4BF-AC68EEC22B10}"/>
+              </a:ext>
+              <a:ext uri="{C183D7F6-B498-43B3-948B-1728B52AA6E4}">
+                <adec:decorative xmlns:adec="http://schemas.microsoft.com/office/drawing/2017/decorative" val="1"/>
+              </a:ext>
+            </a:extLst>
+          </p:cNvPr>
+          <p:cNvSpPr>
+            <a:spLocks noGrp="1" noRot="1" noChangeAspect="1" noMove="1" noResize="1" noEditPoints="1" noAdjustHandles="1" noChangeArrowheads="1" noChangeShapeType="1" noTextEdit="1"/>
+          </p:cNvSpPr>
+          <p:nvPr>
+            <p:extLst>
+              <p:ext uri="{386F3935-93C4-4BCD-93E2-E3B085C9AB24}">
+                <p16:designElem xmlns:p16="http://schemas.microsoft.com/office/powerpoint/2015/main" val="1"/>
+              </p:ext>
+            </p:extLst>
+          </p:nvPr>
+        </p:nvSpPr>
+        <p:spPr>
+          <a:xfrm>
+            <a:off x="-1" y="0"/>
+            <a:ext cx="4455673" cy="6858000"/>
+          </a:xfrm>
+          <a:custGeom>
+            <a:avLst/>
+            <a:gdLst>
+              <a:gd name="connsiteX0" fmla="*/ 0 w 4455673"/>
+              <a:gd name="connsiteY0" fmla="*/ 0 h 6858000"/>
+              <a:gd name="connsiteX1" fmla="*/ 3242695 w 4455673"/>
+              <a:gd name="connsiteY1" fmla="*/ 0 h 6858000"/>
+              <a:gd name="connsiteX2" fmla="*/ 3305678 w 4455673"/>
+              <a:gd name="connsiteY2" fmla="*/ 69271 h 6858000"/>
+              <a:gd name="connsiteX3" fmla="*/ 4455673 w 4455673"/>
+              <a:gd name="connsiteY3" fmla="*/ 3429000 h 6858000"/>
+              <a:gd name="connsiteX4" fmla="*/ 3305678 w 4455673"/>
+              <a:gd name="connsiteY4" fmla="*/ 6788730 h 6858000"/>
+              <a:gd name="connsiteX5" fmla="*/ 3242695 w 4455673"/>
+              <a:gd name="connsiteY5" fmla="*/ 6858000 h 6858000"/>
+              <a:gd name="connsiteX6" fmla="*/ 0 w 4455673"/>
+              <a:gd name="connsiteY6" fmla="*/ 6858000 h 6858000"/>
+            </a:gdLst>
+            <a:ahLst/>
+            <a:cxnLst>
+              <a:cxn ang="0">
+                <a:pos x="connsiteX0" y="connsiteY0"/>
+              </a:cxn>
+              <a:cxn ang="0">
+                <a:pos x="connsiteX1" y="connsiteY1"/>
+              </a:cxn>
+              <a:cxn ang="0">
+                <a:pos x="connsiteX2" y="connsiteY2"/>
+              </a:cxn>
+              <a:cxn ang="0">
+                <a:pos x="connsiteX3" y="connsiteY3"/>
+              </a:cxn>
+              <a:cxn ang="0">
+                <a:pos x="connsiteX4" y="connsiteY4"/>
+              </a:cxn>
+              <a:cxn ang="0">
+                <a:pos x="connsiteX5" y="connsiteY5"/>
+              </a:cxn>
+              <a:cxn ang="0">
+                <a:pos x="connsiteX6" y="connsiteY6"/>
+              </a:cxn>
+            </a:cxnLst>
+            <a:rect l="l" t="t" r="r" b="b"/>
+            <a:pathLst>
+              <a:path w="4455673" h="6858000">
+                <a:moveTo>
+                  <a:pt x="0" y="0"/>
+                </a:moveTo>
+                <a:lnTo>
+                  <a:pt x="3242695" y="0"/>
+                </a:lnTo>
+                <a:lnTo>
+                  <a:pt x="3305678" y="69271"/>
+                </a:lnTo>
+                <a:cubicBezTo>
+                  <a:pt x="4016204" y="929100"/>
+                  <a:pt x="4455673" y="2116944"/>
+                  <a:pt x="4455673" y="3429000"/>
+                </a:cubicBezTo>
+                <a:cubicBezTo>
+                  <a:pt x="4455673" y="4741056"/>
+                  <a:pt x="4016204" y="5928900"/>
+                  <a:pt x="3305678" y="6788730"/>
+                </a:cubicBezTo>
+                <a:lnTo>
+                  <a:pt x="3242695" y="6858000"/>
+                </a:lnTo>
+                <a:lnTo>
+                  <a:pt x="0" y="6858000"/>
+                </a:lnTo>
+                <a:close/>
+              </a:path>
+            </a:pathLst>
+          </a:custGeom>
+          <a:ln w="9525">
+            <a:solidFill>
+              <a:srgbClr val="EFEFEF"/>
+            </a:solidFill>
+          </a:ln>
+          <a:effectLst>
+            <a:outerShdw blurRad="88900" dist="38100" algn="l" rotWithShape="0">
+              <a:schemeClr val="bg1">
+                <a:lumMod val="85000"/>
+                <a:alpha val="50000"/>
+              </a:schemeClr>
+            </a:outerShdw>
+          </a:effectLst>
+        </p:spPr>
+        <p:style>
+          <a:lnRef idx="2">
+            <a:schemeClr val="accent1">
+              <a:shade val="50000"/>
+            </a:schemeClr>
+          </a:lnRef>
+          <a:fillRef idx="1">
+            <a:schemeClr val="accent1"/>
+          </a:fillRef>
+          <a:effectRef idx="0">
+            <a:schemeClr val="accent1"/>
+          </a:effectRef>
+          <a:fontRef idx="minor">
+            <a:schemeClr val="lt1"/>
+          </a:fontRef>
+        </p:style>
+        <p:txBody>
+          <a:bodyPr wrap="square" rtlCol="0" anchor="ctr">
+            <a:noAutofit/>
+          </a:bodyPr>
+          <a:lstStyle/>
+          <a:p>
+            <a:pPr marL="0" marR="0" lvl="0" indent="0" algn="ctr" defTabSz="914400" rtl="0" eaLnBrk="1" fontAlgn="auto" latinLnBrk="0" hangingPunct="1">
+              <a:lnSpc>
+                <a:spcPct val="100000"/>
+              </a:lnSpc>
+              <a:spcBef>
+                <a:spcPts val="0"/>
+              </a:spcBef>
+              <a:spcAft>
+                <a:spcPts val="0"/>
+              </a:spcAft>
+              <a:buClrTx/>
+              <a:buSzTx/>
+              <a:buFontTx/>
+              <a:buNone/>
+              <a:tabLst/>
+              <a:defRPr/>
+            </a:pPr>
+            <a:endParaRPr kumimoji="0" lang="en-US" sz="1800" b="0" i="0" u="none" strike="noStrike" kern="1200" cap="none" spc="0" normalizeH="0" baseline="0" noProof="0">
+              <a:ln>
+                <a:noFill/>
+              </a:ln>
+              <a:solidFill>
+                <a:prstClr val="white"/>
+              </a:solidFill>
+              <a:effectLst/>
+              <a:uLnTx/>
+              <a:uFillTx/>
+              <a:latin typeface="Calibri" panose="020F0502020204030204"/>
+              <a:ea typeface="+mn-ea"/>
+              <a:cs typeface="+mn-cs"/>
+            </a:endParaRPr>
+          </a:p>
+        </p:txBody>
+      </p:sp>
+      <p:sp useBgFill="1">
+        <p:nvSpPr>
+          <p:cNvPr id="21" name="Freeform: Shape 14">
+            <a:extLst>
+              <a:ext uri="{FF2B5EF4-FFF2-40B4-BE49-F238E27FC236}">
+                <a16:creationId xmlns:a16="http://schemas.microsoft.com/office/drawing/2014/main" id="{216322C2-3CF0-4D33-BF90-3F384CF6D232}"/>
+              </a:ext>
+              <a:ext uri="{C183D7F6-B498-43B3-948B-1728B52AA6E4}">
+                <adec:decorative xmlns:adec="http://schemas.microsoft.com/office/drawing/2017/decorative" val="1"/>
+              </a:ext>
+            </a:extLst>
+          </p:cNvPr>
+          <p:cNvSpPr>
+            <a:spLocks noGrp="1" noRot="1" noChangeAspect="1" noMove="1" noResize="1" noEditPoints="1" noAdjustHandles="1" noChangeArrowheads="1" noChangeShapeType="1" noTextEdit="1"/>
+          </p:cNvSpPr>
+          <p:nvPr>
+            <p:extLst>
+              <p:ext uri="{386F3935-93C4-4BCD-93E2-E3B085C9AB24}">
+                <p16:designElem xmlns:p16="http://schemas.microsoft.com/office/powerpoint/2015/main" val="1"/>
+              </p:ext>
+            </p:extLst>
+          </p:nvPr>
+        </p:nvSpPr>
+        <p:spPr>
+          <a:xfrm>
+            <a:off x="0" y="0"/>
+            <a:ext cx="4446529" cy="6858000"/>
+          </a:xfrm>
+          <a:custGeom>
+            <a:avLst/>
+            <a:gdLst>
+              <a:gd name="connsiteX0" fmla="*/ 0 w 4446529"/>
+              <a:gd name="connsiteY0" fmla="*/ 0 h 6858000"/>
+              <a:gd name="connsiteX1" fmla="*/ 3233551 w 4446529"/>
+              <a:gd name="connsiteY1" fmla="*/ 0 h 6858000"/>
+              <a:gd name="connsiteX2" fmla="*/ 3296534 w 4446529"/>
+              <a:gd name="connsiteY2" fmla="*/ 69271 h 6858000"/>
+              <a:gd name="connsiteX3" fmla="*/ 4446529 w 4446529"/>
+              <a:gd name="connsiteY3" fmla="*/ 3429000 h 6858000"/>
+              <a:gd name="connsiteX4" fmla="*/ 3296534 w 4446529"/>
+              <a:gd name="connsiteY4" fmla="*/ 6788730 h 6858000"/>
+              <a:gd name="connsiteX5" fmla="*/ 3233551 w 4446529"/>
+              <a:gd name="connsiteY5" fmla="*/ 6858000 h 6858000"/>
+              <a:gd name="connsiteX6" fmla="*/ 0 w 4446529"/>
+              <a:gd name="connsiteY6" fmla="*/ 6858000 h 6858000"/>
+            </a:gdLst>
+            <a:ahLst/>
+            <a:cxnLst>
+              <a:cxn ang="0">
+                <a:pos x="connsiteX0" y="connsiteY0"/>
+              </a:cxn>
+              <a:cxn ang="0">
+                <a:pos x="connsiteX1" y="connsiteY1"/>
+              </a:cxn>
+              <a:cxn ang="0">
+                <a:pos x="connsiteX2" y="connsiteY2"/>
+              </a:cxn>
+              <a:cxn ang="0">
+                <a:pos x="connsiteX3" y="connsiteY3"/>
+              </a:cxn>
+              <a:cxn ang="0">
+                <a:pos x="connsiteX4" y="connsiteY4"/>
+              </a:cxn>
+              <a:cxn ang="0">
+                <a:pos x="connsiteX5" y="connsiteY5"/>
+              </a:cxn>
+              <a:cxn ang="0">
+                <a:pos x="connsiteX6" y="connsiteY6"/>
+              </a:cxn>
+            </a:cxnLst>
+            <a:rect l="l" t="t" r="r" b="b"/>
+            <a:pathLst>
+              <a:path w="4446529" h="6858000">
+                <a:moveTo>
+                  <a:pt x="0" y="0"/>
+                </a:moveTo>
+                <a:lnTo>
+                  <a:pt x="3233551" y="0"/>
+                </a:lnTo>
+                <a:lnTo>
+                  <a:pt x="3296534" y="69271"/>
+                </a:lnTo>
+                <a:cubicBezTo>
+                  <a:pt x="4007060" y="929100"/>
+                  <a:pt x="4446529" y="2116944"/>
+                  <a:pt x="4446529" y="3429000"/>
+                </a:cubicBezTo>
+                <a:cubicBezTo>
+                  <a:pt x="4446529" y="4741056"/>
+                  <a:pt x="4007060" y="5928900"/>
+                  <a:pt x="3296534" y="6788730"/>
+                </a:cubicBezTo>
+                <a:lnTo>
+                  <a:pt x="3233551" y="6858000"/>
+                </a:lnTo>
+                <a:lnTo>
+                  <a:pt x="0" y="6858000"/>
+                </a:lnTo>
+                <a:close/>
+              </a:path>
+            </a:pathLst>
+          </a:custGeom>
+          <a:ln w="9525">
+            <a:noFill/>
+          </a:ln>
+          <a:effectLst/>
+        </p:spPr>
+        <p:style>
+          <a:lnRef idx="2">
+            <a:schemeClr val="accent1">
+              <a:shade val="50000"/>
+            </a:schemeClr>
+          </a:lnRef>
+          <a:fillRef idx="1">
+            <a:schemeClr val="accent1"/>
+          </a:fillRef>
+          <a:effectRef idx="0">
+            <a:schemeClr val="accent1"/>
+          </a:effectRef>
+          <a:fontRef idx="minor">
+            <a:schemeClr val="lt1"/>
+          </a:fontRef>
+        </p:style>
+        <p:txBody>
+          <a:bodyPr wrap="square" rtlCol="0" anchor="ctr">
+            <a:noAutofit/>
+          </a:bodyPr>
+          <a:lstStyle/>
+          <a:p>
+            <a:pPr marL="0" marR="0" lvl="0" indent="0" algn="ctr" defTabSz="914400" rtl="0" eaLnBrk="1" fontAlgn="auto" latinLnBrk="0" hangingPunct="1">
+              <a:lnSpc>
+                <a:spcPct val="100000"/>
+              </a:lnSpc>
+              <a:spcBef>
+                <a:spcPts val="0"/>
+              </a:spcBef>
+              <a:spcAft>
+                <a:spcPts val="0"/>
+              </a:spcAft>
+              <a:buClrTx/>
+              <a:buSzTx/>
+              <a:buFontTx/>
+              <a:buNone/>
+              <a:tabLst/>
+              <a:defRPr/>
+            </a:pPr>
+            <a:endParaRPr kumimoji="0" lang="en-US" sz="1800" b="0" i="0" u="none" strike="noStrike" kern="1200" cap="none" spc="0" normalizeH="0" baseline="0" noProof="0">
+              <a:ln>
+                <a:noFill/>
+              </a:ln>
+              <a:solidFill>
+                <a:prstClr val="white"/>
+              </a:solidFill>
+              <a:effectLst/>
+              <a:uLnTx/>
+              <a:uFillTx/>
+              <a:latin typeface="Calibri" panose="020F0502020204030204"/>
+              <a:ea typeface="+mn-ea"/>
+              <a:cs typeface="+mn-cs"/>
+            </a:endParaRPr>
+          </a:p>
+        </p:txBody>
+      </p:sp>
+      <p:sp>
+        <p:nvSpPr>
+          <p:cNvPr id="2" name="Title 1">
+            <a:extLst>
+              <a:ext uri="{FF2B5EF4-FFF2-40B4-BE49-F238E27FC236}">
+                <a16:creationId xmlns:a16="http://schemas.microsoft.com/office/drawing/2014/main" id="{9AB886EE-3197-4603-8164-B1527AB9F3E3}"/>
+              </a:ext>
+            </a:extLst>
+          </p:cNvPr>
+          <p:cNvSpPr>
+            <a:spLocks noGrp="1"/>
+          </p:cNvSpPr>
+          <p:nvPr>
+            <p:ph type="title"/>
+          </p:nvPr>
+        </p:nvSpPr>
+        <p:spPr>
+          <a:xfrm>
+            <a:off x="371093" y="1161288"/>
+            <a:ext cx="3791332" cy="1124712"/>
+          </a:xfrm>
+        </p:spPr>
+        <p:txBody>
+          <a:bodyPr anchor="b">
+            <a:noAutofit/>
+          </a:bodyPr>
+          <a:lstStyle/>
+          <a:p>
+            <a:r>
+              <a:rPr lang="en-US" dirty="0"/>
+              <a:t>New Schematic</a:t>
+            </a:r>
+          </a:p>
+        </p:txBody>
+      </p:sp>
+      <p:sp>
+        <p:nvSpPr>
+          <p:cNvPr id="17" name="Rectangle 16">
+            <a:extLst>
+              <a:ext uri="{FF2B5EF4-FFF2-40B4-BE49-F238E27FC236}">
+                <a16:creationId xmlns:a16="http://schemas.microsoft.com/office/drawing/2014/main" id="{55D4142C-5077-457F-A6AD-3FECFDB39685}"/>
+              </a:ext>
+              <a:ext uri="{C183D7F6-B498-43B3-948B-1728B52AA6E4}">
+                <adec:decorative xmlns:adec="http://schemas.microsoft.com/office/drawing/2017/decorative" val="1"/>
+              </a:ext>
+            </a:extLst>
+          </p:cNvPr>
+          <p:cNvSpPr>
+            <a:spLocks noGrp="1" noRot="1" noChangeAspect="1" noMove="1" noResize="1" noEditPoints="1" noAdjustHandles="1" noChangeArrowheads="1" noChangeShapeType="1" noTextEdit="1"/>
+          </p:cNvSpPr>
+          <p:nvPr>
+            <p:extLst>
+              <p:ext uri="{386F3935-93C4-4BCD-93E2-E3B085C9AB24}">
+                <p16:designElem xmlns:p16="http://schemas.microsoft.com/office/powerpoint/2015/main" val="1"/>
+              </p:ext>
+            </p:extLst>
+          </p:nvPr>
+        </p:nvSpPr>
+        <p:spPr>
+          <a:xfrm rot="5400000">
+            <a:off x="662559" y="605790"/>
+            <a:ext cx="73152" cy="548640"/>
+          </a:xfrm>
+          <a:prstGeom prst="rect">
+            <a:avLst/>
+          </a:prstGeom>
+          <a:solidFill>
+            <a:schemeClr val="accent2"/>
+          </a:solidFill>
+          <a:ln>
+            <a:noFill/>
+          </a:ln>
+        </p:spPr>
+        <p:style>
+          <a:lnRef idx="2">
+            <a:schemeClr val="accent1">
+              <a:shade val="50000"/>
+            </a:schemeClr>
+          </a:lnRef>
+          <a:fillRef idx="1">
+            <a:schemeClr val="accent1"/>
+          </a:fillRef>
+          <a:effectRef idx="0">
+            <a:schemeClr val="accent1"/>
+          </a:effectRef>
+          <a:fontRef idx="minor">
+            <a:schemeClr val="lt1"/>
+          </a:fontRef>
+        </p:style>
+        <p:txBody>
+          <a:bodyPr rtlCol="0" anchor="ctr"/>
+          <a:lstStyle/>
+          <a:p>
+            <a:pPr algn="ctr"/>
+            <a:endParaRPr lang="en-US">
+              <a:solidFill>
+                <a:prstClr val="white"/>
+              </a:solidFill>
+              <a:latin typeface="Calibri" panose="020F0502020204030204"/>
+            </a:endParaRPr>
+          </a:p>
+        </p:txBody>
+      </p:sp>
+      <p:sp>
+        <p:nvSpPr>
+          <p:cNvPr id="19" name="Rectangle 18">
+            <a:extLst>
+              <a:ext uri="{FF2B5EF4-FFF2-40B4-BE49-F238E27FC236}">
+                <a16:creationId xmlns:a16="http://schemas.microsoft.com/office/drawing/2014/main" id="{7A5F0580-5EE9-419F-96EE-B6529EF6E7D0}"/>
+              </a:ext>
+              <a:ext uri="{C183D7F6-B498-43B3-948B-1728B52AA6E4}">
+                <adec:decorative xmlns:adec="http://schemas.microsoft.com/office/drawing/2017/decorative" val="1"/>
+              </a:ext>
+            </a:extLst>
+          </p:cNvPr>
+          <p:cNvSpPr>
+            <a:spLocks noGrp="1" noRot="1" noChangeAspect="1" noMove="1" noResize="1" noEditPoints="1" noAdjustHandles="1" noChangeArrowheads="1" noChangeShapeType="1" noTextEdit="1"/>
+          </p:cNvSpPr>
+          <p:nvPr>
+            <p:extLst>
+              <p:ext uri="{386F3935-93C4-4BCD-93E2-E3B085C9AB24}">
+                <p16:designElem xmlns:p16="http://schemas.microsoft.com/office/powerpoint/2015/main" val="1"/>
+              </p:ext>
+            </p:extLst>
+          </p:nvPr>
+        </p:nvSpPr>
+        <p:spPr>
+          <a:xfrm>
+            <a:off x="428244" y="2443480"/>
+            <a:ext cx="3337560" cy="18288"/>
+          </a:xfrm>
+          <a:prstGeom prst="rect">
+            <a:avLst/>
+          </a:prstGeom>
+          <a:solidFill>
+            <a:srgbClr val="D5D5D5"/>
+          </a:solidFill>
+          <a:ln w="3175">
+            <a:noFill/>
+          </a:ln>
+          <a:effectLst/>
+        </p:spPr>
+        <p:style>
+          <a:lnRef idx="2">
+            <a:schemeClr val="accent1">
+              <a:shade val="50000"/>
+            </a:schemeClr>
+          </a:lnRef>
+          <a:fillRef idx="1">
+            <a:schemeClr val="accent1"/>
+          </a:fillRef>
+          <a:effectRef idx="0">
+            <a:schemeClr val="accent1"/>
+          </a:effectRef>
+          <a:fontRef idx="minor">
+            <a:schemeClr val="lt1"/>
+          </a:fontRef>
+        </p:style>
+        <p:txBody>
+          <a:bodyPr rtlCol="0" anchor="ctr"/>
+          <a:lstStyle/>
+          <a:p>
+            <a:pPr algn="ctr"/>
+            <a:endParaRPr lang="en-US">
+              <a:solidFill>
+                <a:prstClr val="white"/>
+              </a:solidFill>
+              <a:latin typeface="Calibri" panose="020F0502020204030204"/>
+            </a:endParaRPr>
+          </a:p>
+        </p:txBody>
+      </p:sp>
+      <p:sp>
+        <p:nvSpPr>
+          <p:cNvPr id="3" name="Content Placeholder 2">
+            <a:extLst>
+              <a:ext uri="{FF2B5EF4-FFF2-40B4-BE49-F238E27FC236}">
+                <a16:creationId xmlns:a16="http://schemas.microsoft.com/office/drawing/2014/main" id="{09BF6F67-5352-4D55-B157-F37D98F1128B}"/>
+              </a:ext>
+            </a:extLst>
+          </p:cNvPr>
+          <p:cNvSpPr>
+            <a:spLocks noGrp="1"/>
+          </p:cNvSpPr>
+          <p:nvPr>
+            <p:ph idx="1"/>
+          </p:nvPr>
+        </p:nvSpPr>
+        <p:spPr>
+          <a:xfrm>
+            <a:off x="371093" y="2718054"/>
+            <a:ext cx="4075435" cy="3931158"/>
+          </a:xfrm>
+        </p:spPr>
+        <p:txBody>
+          <a:bodyPr anchor="t">
+            <a:normAutofit/>
+          </a:bodyPr>
+          <a:lstStyle/>
+          <a:p>
+            <a:r>
+              <a:rPr lang="en-US" sz="1700" dirty="0"/>
+              <a:t>Moved IMUs And Voltage Regulators To Hierarchical Sheets</a:t>
+            </a:r>
+          </a:p>
+          <a:p>
+            <a:pPr lvl="1"/>
+            <a:r>
+              <a:rPr lang="en-US" sz="1300" dirty="0"/>
+              <a:t>Improved Simplicity Of System Overview Page</a:t>
+            </a:r>
+          </a:p>
+          <a:p>
+            <a:pPr lvl="1"/>
+            <a:r>
+              <a:rPr lang="en-US" sz="1300" dirty="0"/>
+              <a:t>Reduced Clutter, Improved Scalability</a:t>
+            </a:r>
+          </a:p>
+          <a:p>
+            <a:r>
+              <a:rPr lang="en-US" sz="1700" dirty="0"/>
+              <a:t>Used Official </a:t>
+            </a:r>
+            <a:r>
+              <a:rPr lang="en-US" sz="1700" dirty="0" err="1"/>
+              <a:t>KiCAD</a:t>
+            </a:r>
+            <a:r>
+              <a:rPr lang="en-US" sz="1700" dirty="0"/>
+              <a:t> Raspberry Pi Header Symbol, Improved Molex Symbol</a:t>
+            </a:r>
+          </a:p>
+          <a:p>
+            <a:r>
+              <a:rPr lang="en-US" sz="1700" dirty="0"/>
+              <a:t>Use Of Bus Lines for I2C, UART, and SPI</a:t>
+            </a:r>
+          </a:p>
+          <a:p>
+            <a:pPr lvl="1"/>
+            <a:r>
+              <a:rPr lang="en-US" sz="1300" dirty="0"/>
+              <a:t>Improves Understanding Of System Data Flow</a:t>
+            </a:r>
+          </a:p>
+          <a:p>
+            <a:r>
+              <a:rPr lang="en-US" sz="1700" dirty="0"/>
+              <a:t>LEDs moved off data lines, connected directly to Raspberry Pi</a:t>
+            </a:r>
+          </a:p>
+          <a:p>
+            <a:r>
+              <a:rPr lang="en-US" sz="1700" dirty="0"/>
+              <a:t>Added Pull-Down Resistors To I2C</a:t>
+            </a:r>
+          </a:p>
+          <a:p>
+            <a:r>
+              <a:rPr lang="en-US" sz="1700" dirty="0"/>
+              <a:t>Added Page Information</a:t>
+            </a:r>
+          </a:p>
+          <a:p>
+            <a:endParaRPr lang="en-US" sz="1700" dirty="0"/>
+          </a:p>
+        </p:txBody>
+      </p:sp>
+      <p:pic>
+        <p:nvPicPr>
+          <p:cNvPr id="6" name="Graphic 5">
+            <a:extLst>
+              <a:ext uri="{FF2B5EF4-FFF2-40B4-BE49-F238E27FC236}">
+                <a16:creationId xmlns:a16="http://schemas.microsoft.com/office/drawing/2014/main" id="{1BCDD2F2-8341-4D7F-94F7-3B2983CFDDE7}"/>
+              </a:ext>
+            </a:extLst>
+          </p:cNvPr>
+          <p:cNvPicPr>
+            <a:picLocks noChangeAspect="1"/>
+          </p:cNvPicPr>
+          <p:nvPr/>
+        </p:nvPicPr>
+        <p:blipFill>
+          <a:blip r:embed="rId2">
+            <a:extLst>
+              <a:ext uri="{28A0092B-C50C-407E-A947-70E740481C1C}">
+                <a14:useLocalDpi xmlns:a14="http://schemas.microsoft.com/office/drawing/2010/main" val="0"/>
+              </a:ext>
+              <a:ext uri="{96DAC541-7B7A-43D3-8B79-37D633B846F1}">
+                <asvg:svgBlip xmlns:asvg="http://schemas.microsoft.com/office/drawing/2016/SVG/main" r:embed="rId3"/>
+              </a:ext>
+            </a:extLst>
+          </a:blip>
+          <a:stretch>
+            <a:fillRect/>
+          </a:stretch>
+        </p:blipFill>
+        <p:spPr>
+          <a:xfrm>
+            <a:off x="4587240" y="825246"/>
+            <a:ext cx="7602922" cy="5375529"/>
+          </a:xfrm>
+          <a:prstGeom prst="rect">
+            <a:avLst/>
+          </a:prstGeom>
+        </p:spPr>
+      </p:pic>
     </p:spTree>
     <p:extLst>
       <p:ext uri="{BB962C8B-B14F-4D97-AF65-F5344CB8AC3E}">
@@ -3477,7 +5676,1002 @@
 </p:sld>
 </file>
 
-<file path=ppt/slides/slide3.xml><?xml version="1.0" encoding="utf-8"?>
+<file path=ppt/slides/slide4.xml><?xml version="1.0" encoding="utf-8"?>
+<p:sld xmlns:a="http://schemas.openxmlformats.org/drawingml/2006/main" xmlns:r="http://schemas.openxmlformats.org/officeDocument/2006/relationships" xmlns:p="http://schemas.openxmlformats.org/presentationml/2006/main">
+  <p:cSld>
+    <p:bg>
+      <p:bgPr>
+        <a:solidFill>
+          <a:schemeClr val="bg1"/>
+        </a:solidFill>
+        <a:effectLst/>
+      </p:bgPr>
+    </p:bg>
+    <p:spTree>
+      <p:nvGrpSpPr>
+        <p:cNvPr id="1" name=""/>
+        <p:cNvGrpSpPr/>
+        <p:nvPr/>
+      </p:nvGrpSpPr>
+      <p:grpSpPr>
+        <a:xfrm>
+          <a:off x="0" y="0"/>
+          <a:ext cx="0" cy="0"/>
+          <a:chOff x="0" y="0"/>
+          <a:chExt cx="0" cy="0"/>
+        </a:xfrm>
+      </p:grpSpPr>
+      <p:sp useBgFill="1">
+        <p:nvSpPr>
+          <p:cNvPr id="12" name="Rectangle 11">
+            <a:extLst>
+              <a:ext uri="{FF2B5EF4-FFF2-40B4-BE49-F238E27FC236}">
+                <a16:creationId xmlns:a16="http://schemas.microsoft.com/office/drawing/2014/main" id="{385E1BDC-A9B0-4A87-82E3-F3187F69A802}"/>
+              </a:ext>
+              <a:ext uri="{C183D7F6-B498-43B3-948B-1728B52AA6E4}">
+                <adec:decorative xmlns:adec="http://schemas.microsoft.com/office/drawing/2017/decorative" val="1"/>
+              </a:ext>
+            </a:extLst>
+          </p:cNvPr>
+          <p:cNvSpPr>
+            <a:spLocks noGrp="1" noRot="1" noChangeAspect="1" noMove="1" noResize="1" noEditPoints="1" noAdjustHandles="1" noChangeArrowheads="1" noChangeShapeType="1" noTextEdit="1"/>
+          </p:cNvSpPr>
+          <p:nvPr>
+            <p:extLst>
+              <p:ext uri="{386F3935-93C4-4BCD-93E2-E3B085C9AB24}">
+                <p16:designElem xmlns:p16="http://schemas.microsoft.com/office/powerpoint/2015/main" val="1"/>
+              </p:ext>
+            </p:extLst>
+          </p:nvPr>
+        </p:nvSpPr>
+        <p:spPr>
+          <a:xfrm>
+            <a:off x="0" y="0"/>
+            <a:ext cx="12192000" cy="6858000"/>
+          </a:xfrm>
+          <a:prstGeom prst="rect">
+            <a:avLst/>
+          </a:prstGeom>
+          <a:ln>
+            <a:noFill/>
+          </a:ln>
+        </p:spPr>
+        <p:style>
+          <a:lnRef idx="2">
+            <a:schemeClr val="accent1">
+              <a:shade val="50000"/>
+            </a:schemeClr>
+          </a:lnRef>
+          <a:fillRef idx="1">
+            <a:schemeClr val="accent1"/>
+          </a:fillRef>
+          <a:effectRef idx="0">
+            <a:schemeClr val="accent1"/>
+          </a:effectRef>
+          <a:fontRef idx="minor">
+            <a:schemeClr val="lt1"/>
+          </a:fontRef>
+        </p:style>
+        <p:txBody>
+          <a:bodyPr rtlCol="0" anchor="ctr"/>
+          <a:lstStyle/>
+          <a:p>
+            <a:pPr algn="ctr"/>
+            <a:endParaRPr lang="en-US"/>
+          </a:p>
+        </p:txBody>
+      </p:sp>
+      <p:sp useBgFill="1">
+        <p:nvSpPr>
+          <p:cNvPr id="14" name="Rectangle 13">
+            <a:extLst>
+              <a:ext uri="{FF2B5EF4-FFF2-40B4-BE49-F238E27FC236}">
+                <a16:creationId xmlns:a16="http://schemas.microsoft.com/office/drawing/2014/main" id="{0990C621-3B8B-4820-8328-D47EF7CE823C}"/>
+              </a:ext>
+              <a:ext uri="{C183D7F6-B498-43B3-948B-1728B52AA6E4}">
+                <adec:decorative xmlns:adec="http://schemas.microsoft.com/office/drawing/2017/decorative" val="1"/>
+              </a:ext>
+            </a:extLst>
+          </p:cNvPr>
+          <p:cNvSpPr>
+            <a:spLocks noGrp="1" noRot="1" noChangeAspect="1" noMove="1" noResize="1" noEditPoints="1" noAdjustHandles="1" noChangeArrowheads="1" noChangeShapeType="1" noTextEdit="1"/>
+          </p:cNvSpPr>
+          <p:nvPr>
+            <p:extLst>
+              <p:ext uri="{386F3935-93C4-4BCD-93E2-E3B085C9AB24}">
+                <p16:designElem xmlns:p16="http://schemas.microsoft.com/office/powerpoint/2015/main" val="1"/>
+              </p:ext>
+            </p:extLst>
+          </p:nvPr>
+        </p:nvSpPr>
+        <p:spPr>
+          <a:xfrm>
+            <a:off x="554416" y="365125"/>
+            <a:ext cx="11167447" cy="2089317"/>
+          </a:xfrm>
+          <a:prstGeom prst="rect">
+            <a:avLst/>
+          </a:prstGeom>
+          <a:ln w="12700">
+            <a:solidFill>
+              <a:srgbClr val="DEDEDE"/>
+            </a:solidFill>
+          </a:ln>
+          <a:effectLst>
+            <a:outerShdw blurRad="50800" dist="38100" dir="2700000" algn="tl" rotWithShape="0">
+              <a:schemeClr val="bg2">
+                <a:lumMod val="85000"/>
+                <a:alpha val="50000"/>
+              </a:schemeClr>
+            </a:outerShdw>
+          </a:effectLst>
+        </p:spPr>
+        <p:style>
+          <a:lnRef idx="2">
+            <a:schemeClr val="accent1">
+              <a:shade val="50000"/>
+            </a:schemeClr>
+          </a:lnRef>
+          <a:fillRef idx="1">
+            <a:schemeClr val="accent1"/>
+          </a:fillRef>
+          <a:effectRef idx="0">
+            <a:schemeClr val="accent1"/>
+          </a:effectRef>
+          <a:fontRef idx="minor">
+            <a:schemeClr val="lt1"/>
+          </a:fontRef>
+        </p:style>
+        <p:txBody>
+          <a:bodyPr rtlCol="0" anchor="ctr"/>
+          <a:lstStyle/>
+          <a:p>
+            <a:pPr marL="0" marR="0" lvl="0" indent="0" algn="ctr" defTabSz="914400" rtl="0" eaLnBrk="1" fontAlgn="auto" latinLnBrk="0" hangingPunct="1">
+              <a:lnSpc>
+                <a:spcPct val="100000"/>
+              </a:lnSpc>
+              <a:spcBef>
+                <a:spcPts val="0"/>
+              </a:spcBef>
+              <a:spcAft>
+                <a:spcPts val="0"/>
+              </a:spcAft>
+              <a:buClrTx/>
+              <a:buSzTx/>
+              <a:buFontTx/>
+              <a:buNone/>
+              <a:tabLst/>
+              <a:defRPr/>
+            </a:pPr>
+            <a:endParaRPr kumimoji="0" lang="en-US" sz="1800" b="0" i="0" u="none" strike="noStrike" kern="1200" cap="none" spc="0" normalizeH="0" baseline="0" noProof="0">
+              <a:ln>
+                <a:noFill/>
+              </a:ln>
+              <a:solidFill>
+                <a:prstClr val="white"/>
+              </a:solidFill>
+              <a:effectLst/>
+              <a:uLnTx/>
+              <a:uFillTx/>
+              <a:latin typeface="Calibri" panose="020F0502020204030204"/>
+              <a:ea typeface="+mn-ea"/>
+              <a:cs typeface="+mn-cs"/>
+            </a:endParaRPr>
+          </a:p>
+        </p:txBody>
+      </p:sp>
+      <p:sp>
+        <p:nvSpPr>
+          <p:cNvPr id="2" name="Title 1">
+            <a:extLst>
+              <a:ext uri="{FF2B5EF4-FFF2-40B4-BE49-F238E27FC236}">
+                <a16:creationId xmlns:a16="http://schemas.microsoft.com/office/drawing/2014/main" id="{7E78B658-FC25-403E-9F93-A0FDE3E6E488}"/>
+              </a:ext>
+            </a:extLst>
+          </p:cNvPr>
+          <p:cNvSpPr>
+            <a:spLocks noGrp="1"/>
+          </p:cNvSpPr>
+          <p:nvPr>
+            <p:ph type="title"/>
+          </p:nvPr>
+        </p:nvSpPr>
+        <p:spPr>
+          <a:xfrm>
+            <a:off x="1051560" y="586822"/>
+            <a:ext cx="3657600" cy="1645920"/>
+          </a:xfrm>
+        </p:spPr>
+        <p:txBody>
+          <a:bodyPr>
+            <a:normAutofit/>
+          </a:bodyPr>
+          <a:lstStyle/>
+          <a:p>
+            <a:r>
+              <a:rPr lang="en-US" sz="3200" dirty="0"/>
+              <a:t>Accelerometer Component Sheets</a:t>
+            </a:r>
+          </a:p>
+        </p:txBody>
+      </p:sp>
+      <p:sp>
+        <p:nvSpPr>
+          <p:cNvPr id="16" name="Rectangle 15">
+            <a:extLst>
+              <a:ext uri="{FF2B5EF4-FFF2-40B4-BE49-F238E27FC236}">
+                <a16:creationId xmlns:a16="http://schemas.microsoft.com/office/drawing/2014/main" id="{C1A2385B-1D2A-4E17-84FA-6CB7F0AAE473}"/>
+              </a:ext>
+              <a:ext uri="{C183D7F6-B498-43B3-948B-1728B52AA6E4}">
+                <adec:decorative xmlns:adec="http://schemas.microsoft.com/office/drawing/2017/decorative" val="1"/>
+              </a:ext>
+            </a:extLst>
+          </p:cNvPr>
+          <p:cNvSpPr>
+            <a:spLocks noGrp="1" noRot="1" noChangeAspect="1" noMove="1" noResize="1" noEditPoints="1" noAdjustHandles="1" noChangeArrowheads="1" noChangeShapeType="1" noTextEdit="1"/>
+          </p:cNvSpPr>
+          <p:nvPr>
+            <p:extLst>
+              <p:ext uri="{386F3935-93C4-4BCD-93E2-E3B085C9AB24}">
+                <p16:designElem xmlns:p16="http://schemas.microsoft.com/office/powerpoint/2015/main" val="1"/>
+              </p:ext>
+            </p:extLst>
+          </p:nvPr>
+        </p:nvSpPr>
+        <p:spPr>
+          <a:xfrm>
+            <a:off x="490408" y="1057739"/>
+            <a:ext cx="128016" cy="704088"/>
+          </a:xfrm>
+          <a:prstGeom prst="rect">
+            <a:avLst/>
+          </a:prstGeom>
+          <a:solidFill>
+            <a:schemeClr val="accent2"/>
+          </a:solidFill>
+          <a:ln>
+            <a:noFill/>
+          </a:ln>
+        </p:spPr>
+        <p:style>
+          <a:lnRef idx="2">
+            <a:schemeClr val="accent1">
+              <a:shade val="50000"/>
+            </a:schemeClr>
+          </a:lnRef>
+          <a:fillRef idx="1">
+            <a:schemeClr val="accent1"/>
+          </a:fillRef>
+          <a:effectRef idx="0">
+            <a:schemeClr val="accent1"/>
+          </a:effectRef>
+          <a:fontRef idx="minor">
+            <a:schemeClr val="lt1"/>
+          </a:fontRef>
+        </p:style>
+        <p:txBody>
+          <a:bodyPr rtlCol="0" anchor="ctr"/>
+          <a:lstStyle/>
+          <a:p>
+            <a:pPr algn="ctr"/>
+            <a:endParaRPr lang="en-US" dirty="0">
+              <a:solidFill>
+                <a:prstClr val="white"/>
+              </a:solidFill>
+              <a:latin typeface="Calibri" panose="020F0502020204030204"/>
+            </a:endParaRPr>
+          </a:p>
+        </p:txBody>
+      </p:sp>
+      <p:sp>
+        <p:nvSpPr>
+          <p:cNvPr id="18" name="Rectangle 17">
+            <a:extLst>
+              <a:ext uri="{FF2B5EF4-FFF2-40B4-BE49-F238E27FC236}">
+                <a16:creationId xmlns:a16="http://schemas.microsoft.com/office/drawing/2014/main" id="{5E791F2F-79DB-4CC0-9FA1-001E3E91E8B7}"/>
+              </a:ext>
+              <a:ext uri="{C183D7F6-B498-43B3-948B-1728B52AA6E4}">
+                <adec:decorative xmlns:adec="http://schemas.microsoft.com/office/drawing/2017/decorative" val="1"/>
+              </a:ext>
+            </a:extLst>
+          </p:cNvPr>
+          <p:cNvSpPr>
+            <a:spLocks noGrp="1" noRot="1" noChangeAspect="1" noMove="1" noResize="1" noEditPoints="1" noAdjustHandles="1" noChangeArrowheads="1" noChangeShapeType="1" noTextEdit="1"/>
+          </p:cNvSpPr>
+          <p:nvPr>
+            <p:extLst>
+              <p:ext uri="{386F3935-93C4-4BCD-93E2-E3B085C9AB24}">
+                <p16:designElem xmlns:p16="http://schemas.microsoft.com/office/powerpoint/2015/main" val="1"/>
+              </p:ext>
+            </p:extLst>
+          </p:nvPr>
+        </p:nvSpPr>
+        <p:spPr>
+          <a:xfrm rot="5400000">
+            <a:off x="4243541" y="1400638"/>
+            <a:ext cx="1463040" cy="18288"/>
+          </a:xfrm>
+          <a:prstGeom prst="rect">
+            <a:avLst/>
+          </a:prstGeom>
+          <a:solidFill>
+            <a:srgbClr val="D5D5D5"/>
+          </a:solidFill>
+          <a:ln w="3175">
+            <a:noFill/>
+          </a:ln>
+          <a:effectLst/>
+        </p:spPr>
+        <p:style>
+          <a:lnRef idx="2">
+            <a:schemeClr val="accent1">
+              <a:shade val="50000"/>
+            </a:schemeClr>
+          </a:lnRef>
+          <a:fillRef idx="1">
+            <a:schemeClr val="accent1"/>
+          </a:fillRef>
+          <a:effectRef idx="0">
+            <a:schemeClr val="accent1"/>
+          </a:effectRef>
+          <a:fontRef idx="minor">
+            <a:schemeClr val="lt1"/>
+          </a:fontRef>
+        </p:style>
+        <p:txBody>
+          <a:bodyPr rtlCol="0" anchor="ctr"/>
+          <a:lstStyle/>
+          <a:p>
+            <a:pPr marL="0" marR="0" lvl="0" indent="0" algn="ctr" defTabSz="914400" rtl="0" eaLnBrk="1" fontAlgn="auto" latinLnBrk="0" hangingPunct="1">
+              <a:lnSpc>
+                <a:spcPct val="100000"/>
+              </a:lnSpc>
+              <a:spcBef>
+                <a:spcPts val="0"/>
+              </a:spcBef>
+              <a:spcAft>
+                <a:spcPts val="0"/>
+              </a:spcAft>
+              <a:buClrTx/>
+              <a:buSzTx/>
+              <a:buFontTx/>
+              <a:buNone/>
+              <a:tabLst/>
+              <a:defRPr/>
+            </a:pPr>
+            <a:endParaRPr kumimoji="0" lang="en-US" sz="1800" b="0" i="0" u="none" strike="noStrike" kern="1200" cap="none" spc="0" normalizeH="0" baseline="0" noProof="0">
+              <a:ln>
+                <a:noFill/>
+              </a:ln>
+              <a:solidFill>
+                <a:prstClr val="white"/>
+              </a:solidFill>
+              <a:effectLst/>
+              <a:uLnTx/>
+              <a:uFillTx/>
+              <a:latin typeface="Calibri" panose="020F0502020204030204"/>
+              <a:ea typeface="+mn-ea"/>
+              <a:cs typeface="+mn-cs"/>
+            </a:endParaRPr>
+          </a:p>
+        </p:txBody>
+      </p:sp>
+      <p:sp>
+        <p:nvSpPr>
+          <p:cNvPr id="3" name="Content Placeholder 2">
+            <a:extLst>
+              <a:ext uri="{FF2B5EF4-FFF2-40B4-BE49-F238E27FC236}">
+                <a16:creationId xmlns:a16="http://schemas.microsoft.com/office/drawing/2014/main" id="{B8F1CDE9-4D9D-4D1B-9671-259DEA73DCF1}"/>
+              </a:ext>
+            </a:extLst>
+          </p:cNvPr>
+          <p:cNvSpPr>
+            <a:spLocks noGrp="1"/>
+          </p:cNvSpPr>
+          <p:nvPr>
+            <p:ph idx="1"/>
+          </p:nvPr>
+        </p:nvSpPr>
+        <p:spPr>
+          <a:xfrm>
+            <a:off x="5250106" y="586822"/>
+            <a:ext cx="6106742" cy="1645920"/>
+          </a:xfrm>
+        </p:spPr>
+        <p:txBody>
+          <a:bodyPr anchor="ctr">
+            <a:normAutofit/>
+          </a:bodyPr>
+          <a:lstStyle/>
+          <a:p>
+            <a:r>
+              <a:rPr lang="en-US" sz="1800" dirty="0"/>
+              <a:t>Added Pull-Down Resistors To Unused Pins</a:t>
+            </a:r>
+          </a:p>
+          <a:p>
+            <a:r>
+              <a:rPr lang="en-US" sz="1800" dirty="0"/>
+              <a:t>Removed Do Not Connect Pins, Declutters Symbols</a:t>
+            </a:r>
+          </a:p>
+          <a:p>
+            <a:r>
+              <a:rPr lang="en-US" sz="1800" dirty="0"/>
+              <a:t>Added Test Points To GPIO and Interrupt Pins</a:t>
+            </a:r>
+          </a:p>
+          <a:p>
+            <a:pPr lvl="1"/>
+            <a:r>
+              <a:rPr lang="en-US" sz="1400" dirty="0"/>
+              <a:t>For Future Debug, Easier Modification For Future Features</a:t>
+            </a:r>
+          </a:p>
+        </p:txBody>
+      </p:sp>
+      <p:pic>
+        <p:nvPicPr>
+          <p:cNvPr id="5" name="Picture 4">
+            <a:extLst>
+              <a:ext uri="{FF2B5EF4-FFF2-40B4-BE49-F238E27FC236}">
+                <a16:creationId xmlns:a16="http://schemas.microsoft.com/office/drawing/2014/main" id="{96A3DC19-A40A-4A00-80E0-59A5EA3EA3CE}"/>
+              </a:ext>
+            </a:extLst>
+          </p:cNvPr>
+          <p:cNvPicPr>
+            <a:picLocks noChangeAspect="1"/>
+          </p:cNvPicPr>
+          <p:nvPr/>
+        </p:nvPicPr>
+        <p:blipFill>
+          <a:blip r:embed="rId2"/>
+          <a:stretch>
+            <a:fillRect/>
+          </a:stretch>
+        </p:blipFill>
+        <p:spPr>
+          <a:xfrm>
+            <a:off x="1291651" y="2729397"/>
+            <a:ext cx="4013772" cy="3483864"/>
+          </a:xfrm>
+          <a:prstGeom prst="rect">
+            <a:avLst/>
+          </a:prstGeom>
+        </p:spPr>
+      </p:pic>
+      <p:pic>
+        <p:nvPicPr>
+          <p:cNvPr id="7" name="Picture 6">
+            <a:extLst>
+              <a:ext uri="{FF2B5EF4-FFF2-40B4-BE49-F238E27FC236}">
+                <a16:creationId xmlns:a16="http://schemas.microsoft.com/office/drawing/2014/main" id="{79A8DE98-0CB9-4CB2-96CB-A5046C337CCE}"/>
+              </a:ext>
+            </a:extLst>
+          </p:cNvPr>
+          <p:cNvPicPr>
+            <a:picLocks noChangeAspect="1"/>
+          </p:cNvPicPr>
+          <p:nvPr/>
+        </p:nvPicPr>
+        <p:blipFill>
+          <a:blip r:embed="rId3"/>
+          <a:stretch>
+            <a:fillRect/>
+          </a:stretch>
+        </p:blipFill>
+        <p:spPr>
+          <a:xfrm>
+            <a:off x="6829518" y="2729397"/>
+            <a:ext cx="4261607" cy="3483864"/>
+          </a:xfrm>
+          <a:prstGeom prst="rect">
+            <a:avLst/>
+          </a:prstGeom>
+        </p:spPr>
+      </p:pic>
+    </p:spTree>
+    <p:extLst>
+      <p:ext uri="{BB962C8B-B14F-4D97-AF65-F5344CB8AC3E}">
+        <p14:creationId xmlns:p14="http://schemas.microsoft.com/office/powerpoint/2010/main" val="563598032"/>
+      </p:ext>
+    </p:extLst>
+  </p:cSld>
+  <p:clrMapOvr>
+    <a:masterClrMapping/>
+  </p:clrMapOvr>
+</p:sld>
+</file>
+
+<file path=ppt/slides/slide5.xml><?xml version="1.0" encoding="utf-8"?>
+<p:sld xmlns:a="http://schemas.openxmlformats.org/drawingml/2006/main" xmlns:r="http://schemas.openxmlformats.org/officeDocument/2006/relationships" xmlns:p="http://schemas.openxmlformats.org/presentationml/2006/main">
+  <p:cSld>
+    <p:bg>
+      <p:bgPr>
+        <a:solidFill>
+          <a:schemeClr val="bg1"/>
+        </a:solidFill>
+        <a:effectLst/>
+      </p:bgPr>
+    </p:bg>
+    <p:spTree>
+      <p:nvGrpSpPr>
+        <p:cNvPr id="1" name=""/>
+        <p:cNvGrpSpPr/>
+        <p:nvPr/>
+      </p:nvGrpSpPr>
+      <p:grpSpPr>
+        <a:xfrm>
+          <a:off x="0" y="0"/>
+          <a:ext cx="0" cy="0"/>
+          <a:chOff x="0" y="0"/>
+          <a:chExt cx="0" cy="0"/>
+        </a:xfrm>
+      </p:grpSpPr>
+      <p:sp useBgFill="1">
+        <p:nvSpPr>
+          <p:cNvPr id="41" name="Rectangle 40">
+            <a:extLst>
+              <a:ext uri="{FF2B5EF4-FFF2-40B4-BE49-F238E27FC236}">
+                <a16:creationId xmlns:a16="http://schemas.microsoft.com/office/drawing/2014/main" id="{385E1BDC-A9B0-4A87-82E3-F3187F69A802}"/>
+              </a:ext>
+              <a:ext uri="{C183D7F6-B498-43B3-948B-1728B52AA6E4}">
+                <adec:decorative xmlns:adec="http://schemas.microsoft.com/office/drawing/2017/decorative" val="1"/>
+              </a:ext>
+            </a:extLst>
+          </p:cNvPr>
+          <p:cNvSpPr>
+            <a:spLocks noGrp="1" noRot="1" noChangeAspect="1" noMove="1" noResize="1" noEditPoints="1" noAdjustHandles="1" noChangeArrowheads="1" noChangeShapeType="1" noTextEdit="1"/>
+          </p:cNvSpPr>
+          <p:nvPr>
+            <p:extLst>
+              <p:ext uri="{386F3935-93C4-4BCD-93E2-E3B085C9AB24}">
+                <p16:designElem xmlns:p16="http://schemas.microsoft.com/office/powerpoint/2015/main" val="1"/>
+              </p:ext>
+            </p:extLst>
+          </p:nvPr>
+        </p:nvSpPr>
+        <p:spPr>
+          <a:xfrm>
+            <a:off x="0" y="0"/>
+            <a:ext cx="12192000" cy="6858000"/>
+          </a:xfrm>
+          <a:prstGeom prst="rect">
+            <a:avLst/>
+          </a:prstGeom>
+          <a:ln>
+            <a:noFill/>
+          </a:ln>
+        </p:spPr>
+        <p:style>
+          <a:lnRef idx="2">
+            <a:schemeClr val="accent1">
+              <a:shade val="50000"/>
+            </a:schemeClr>
+          </a:lnRef>
+          <a:fillRef idx="1">
+            <a:schemeClr val="accent1"/>
+          </a:fillRef>
+          <a:effectRef idx="0">
+            <a:schemeClr val="accent1"/>
+          </a:effectRef>
+          <a:fontRef idx="minor">
+            <a:schemeClr val="lt1"/>
+          </a:fontRef>
+        </p:style>
+        <p:txBody>
+          <a:bodyPr rtlCol="0" anchor="ctr"/>
+          <a:lstStyle/>
+          <a:p>
+            <a:pPr algn="ctr"/>
+            <a:endParaRPr lang="en-US"/>
+          </a:p>
+        </p:txBody>
+      </p:sp>
+      <p:sp useBgFill="1">
+        <p:nvSpPr>
+          <p:cNvPr id="43" name="Rectangle 42">
+            <a:extLst>
+              <a:ext uri="{FF2B5EF4-FFF2-40B4-BE49-F238E27FC236}">
+                <a16:creationId xmlns:a16="http://schemas.microsoft.com/office/drawing/2014/main" id="{0990C621-3B8B-4820-8328-D47EF7CE823C}"/>
+              </a:ext>
+              <a:ext uri="{C183D7F6-B498-43B3-948B-1728B52AA6E4}">
+                <adec:decorative xmlns:adec="http://schemas.microsoft.com/office/drawing/2017/decorative" val="1"/>
+              </a:ext>
+            </a:extLst>
+          </p:cNvPr>
+          <p:cNvSpPr>
+            <a:spLocks noGrp="1" noRot="1" noChangeAspect="1" noMove="1" noResize="1" noEditPoints="1" noAdjustHandles="1" noChangeArrowheads="1" noChangeShapeType="1" noTextEdit="1"/>
+          </p:cNvSpPr>
+          <p:nvPr>
+            <p:extLst>
+              <p:ext uri="{386F3935-93C4-4BCD-93E2-E3B085C9AB24}">
+                <p16:designElem xmlns:p16="http://schemas.microsoft.com/office/powerpoint/2015/main" val="1"/>
+              </p:ext>
+            </p:extLst>
+          </p:nvPr>
+        </p:nvSpPr>
+        <p:spPr>
+          <a:xfrm>
+            <a:off x="554416" y="365125"/>
+            <a:ext cx="11167447" cy="2089317"/>
+          </a:xfrm>
+          <a:prstGeom prst="rect">
+            <a:avLst/>
+          </a:prstGeom>
+          <a:ln w="12700">
+            <a:solidFill>
+              <a:srgbClr val="DEDEDE"/>
+            </a:solidFill>
+          </a:ln>
+          <a:effectLst>
+            <a:outerShdw blurRad="50800" dist="38100" dir="2700000" algn="tl" rotWithShape="0">
+              <a:schemeClr val="bg2">
+                <a:lumMod val="85000"/>
+                <a:alpha val="50000"/>
+              </a:schemeClr>
+            </a:outerShdw>
+          </a:effectLst>
+        </p:spPr>
+        <p:style>
+          <a:lnRef idx="2">
+            <a:schemeClr val="accent1">
+              <a:shade val="50000"/>
+            </a:schemeClr>
+          </a:lnRef>
+          <a:fillRef idx="1">
+            <a:schemeClr val="accent1"/>
+          </a:fillRef>
+          <a:effectRef idx="0">
+            <a:schemeClr val="accent1"/>
+          </a:effectRef>
+          <a:fontRef idx="minor">
+            <a:schemeClr val="lt1"/>
+          </a:fontRef>
+        </p:style>
+        <p:txBody>
+          <a:bodyPr rtlCol="0" anchor="ctr"/>
+          <a:lstStyle/>
+          <a:p>
+            <a:pPr marL="0" marR="0" lvl="0" indent="0" algn="ctr" defTabSz="914400" rtl="0" eaLnBrk="1" fontAlgn="auto" latinLnBrk="0" hangingPunct="1">
+              <a:lnSpc>
+                <a:spcPct val="100000"/>
+              </a:lnSpc>
+              <a:spcBef>
+                <a:spcPts val="0"/>
+              </a:spcBef>
+              <a:spcAft>
+                <a:spcPts val="0"/>
+              </a:spcAft>
+              <a:buClrTx/>
+              <a:buSzTx/>
+              <a:buFontTx/>
+              <a:buNone/>
+              <a:tabLst/>
+              <a:defRPr/>
+            </a:pPr>
+            <a:endParaRPr kumimoji="0" lang="en-US" sz="1800" b="0" i="0" u="none" strike="noStrike" kern="1200" cap="none" spc="0" normalizeH="0" baseline="0" noProof="0">
+              <a:ln>
+                <a:noFill/>
+              </a:ln>
+              <a:solidFill>
+                <a:prstClr val="white"/>
+              </a:solidFill>
+              <a:effectLst/>
+              <a:uLnTx/>
+              <a:uFillTx/>
+              <a:latin typeface="Calibri" panose="020F0502020204030204"/>
+              <a:ea typeface="+mn-ea"/>
+              <a:cs typeface="+mn-cs"/>
+            </a:endParaRPr>
+          </a:p>
+        </p:txBody>
+      </p:sp>
+      <p:sp>
+        <p:nvSpPr>
+          <p:cNvPr id="2" name="Title 1">
+            <a:extLst>
+              <a:ext uri="{FF2B5EF4-FFF2-40B4-BE49-F238E27FC236}">
+                <a16:creationId xmlns:a16="http://schemas.microsoft.com/office/drawing/2014/main" id="{0683798C-2EE4-4A8A-8630-BD657E1EDCB0}"/>
+              </a:ext>
+            </a:extLst>
+          </p:cNvPr>
+          <p:cNvSpPr>
+            <a:spLocks noGrp="1"/>
+          </p:cNvSpPr>
+          <p:nvPr>
+            <p:ph type="title"/>
+          </p:nvPr>
+        </p:nvSpPr>
+        <p:spPr>
+          <a:xfrm>
+            <a:off x="1051560" y="586822"/>
+            <a:ext cx="3657600" cy="1645920"/>
+          </a:xfrm>
+        </p:spPr>
+        <p:txBody>
+          <a:bodyPr>
+            <a:normAutofit/>
+          </a:bodyPr>
+          <a:lstStyle/>
+          <a:p>
+            <a:r>
+              <a:rPr lang="en-US" sz="3200" dirty="0"/>
+              <a:t>Voltage Regulator Component Sheets</a:t>
+            </a:r>
+          </a:p>
+        </p:txBody>
+      </p:sp>
+      <p:sp>
+        <p:nvSpPr>
+          <p:cNvPr id="45" name="Rectangle 44">
+            <a:extLst>
+              <a:ext uri="{FF2B5EF4-FFF2-40B4-BE49-F238E27FC236}">
+                <a16:creationId xmlns:a16="http://schemas.microsoft.com/office/drawing/2014/main" id="{C1A2385B-1D2A-4E17-84FA-6CB7F0AAE473}"/>
+              </a:ext>
+              <a:ext uri="{C183D7F6-B498-43B3-948B-1728B52AA6E4}">
+                <adec:decorative xmlns:adec="http://schemas.microsoft.com/office/drawing/2017/decorative" val="1"/>
+              </a:ext>
+            </a:extLst>
+          </p:cNvPr>
+          <p:cNvSpPr>
+            <a:spLocks noGrp="1" noRot="1" noChangeAspect="1" noMove="1" noResize="1" noEditPoints="1" noAdjustHandles="1" noChangeArrowheads="1" noChangeShapeType="1" noTextEdit="1"/>
+          </p:cNvSpPr>
+          <p:nvPr>
+            <p:extLst>
+              <p:ext uri="{386F3935-93C4-4BCD-93E2-E3B085C9AB24}">
+                <p16:designElem xmlns:p16="http://schemas.microsoft.com/office/powerpoint/2015/main" val="1"/>
+              </p:ext>
+            </p:extLst>
+          </p:nvPr>
+        </p:nvSpPr>
+        <p:spPr>
+          <a:xfrm>
+            <a:off x="490408" y="1057739"/>
+            <a:ext cx="128016" cy="704088"/>
+          </a:xfrm>
+          <a:prstGeom prst="rect">
+            <a:avLst/>
+          </a:prstGeom>
+          <a:solidFill>
+            <a:schemeClr val="accent2"/>
+          </a:solidFill>
+          <a:ln>
+            <a:noFill/>
+          </a:ln>
+        </p:spPr>
+        <p:style>
+          <a:lnRef idx="2">
+            <a:schemeClr val="accent1">
+              <a:shade val="50000"/>
+            </a:schemeClr>
+          </a:lnRef>
+          <a:fillRef idx="1">
+            <a:schemeClr val="accent1"/>
+          </a:fillRef>
+          <a:effectRef idx="0">
+            <a:schemeClr val="accent1"/>
+          </a:effectRef>
+          <a:fontRef idx="minor">
+            <a:schemeClr val="lt1"/>
+          </a:fontRef>
+        </p:style>
+        <p:txBody>
+          <a:bodyPr rtlCol="0" anchor="ctr"/>
+          <a:lstStyle/>
+          <a:p>
+            <a:pPr algn="ctr"/>
+            <a:endParaRPr lang="en-US" dirty="0">
+              <a:solidFill>
+                <a:prstClr val="white"/>
+              </a:solidFill>
+              <a:latin typeface="Calibri" panose="020F0502020204030204"/>
+            </a:endParaRPr>
+          </a:p>
+        </p:txBody>
+      </p:sp>
+      <p:sp>
+        <p:nvSpPr>
+          <p:cNvPr id="47" name="Rectangle 46">
+            <a:extLst>
+              <a:ext uri="{FF2B5EF4-FFF2-40B4-BE49-F238E27FC236}">
+                <a16:creationId xmlns:a16="http://schemas.microsoft.com/office/drawing/2014/main" id="{5E791F2F-79DB-4CC0-9FA1-001E3E91E8B7}"/>
+              </a:ext>
+              <a:ext uri="{C183D7F6-B498-43B3-948B-1728B52AA6E4}">
+                <adec:decorative xmlns:adec="http://schemas.microsoft.com/office/drawing/2017/decorative" val="1"/>
+              </a:ext>
+            </a:extLst>
+          </p:cNvPr>
+          <p:cNvSpPr>
+            <a:spLocks noGrp="1" noRot="1" noChangeAspect="1" noMove="1" noResize="1" noEditPoints="1" noAdjustHandles="1" noChangeArrowheads="1" noChangeShapeType="1" noTextEdit="1"/>
+          </p:cNvSpPr>
+          <p:nvPr>
+            <p:extLst>
+              <p:ext uri="{386F3935-93C4-4BCD-93E2-E3B085C9AB24}">
+                <p16:designElem xmlns:p16="http://schemas.microsoft.com/office/powerpoint/2015/main" val="1"/>
+              </p:ext>
+            </p:extLst>
+          </p:nvPr>
+        </p:nvSpPr>
+        <p:spPr>
+          <a:xfrm rot="5400000">
+            <a:off x="4243541" y="1400638"/>
+            <a:ext cx="1463040" cy="18288"/>
+          </a:xfrm>
+          <a:prstGeom prst="rect">
+            <a:avLst/>
+          </a:prstGeom>
+          <a:solidFill>
+            <a:srgbClr val="D5D5D5"/>
+          </a:solidFill>
+          <a:ln w="3175">
+            <a:noFill/>
+          </a:ln>
+          <a:effectLst/>
+        </p:spPr>
+        <p:style>
+          <a:lnRef idx="2">
+            <a:schemeClr val="accent1">
+              <a:shade val="50000"/>
+            </a:schemeClr>
+          </a:lnRef>
+          <a:fillRef idx="1">
+            <a:schemeClr val="accent1"/>
+          </a:fillRef>
+          <a:effectRef idx="0">
+            <a:schemeClr val="accent1"/>
+          </a:effectRef>
+          <a:fontRef idx="minor">
+            <a:schemeClr val="lt1"/>
+          </a:fontRef>
+        </p:style>
+        <p:txBody>
+          <a:bodyPr rtlCol="0" anchor="ctr"/>
+          <a:lstStyle/>
+          <a:p>
+            <a:pPr marL="0" marR="0" lvl="0" indent="0" algn="ctr" defTabSz="914400" rtl="0" eaLnBrk="1" fontAlgn="auto" latinLnBrk="0" hangingPunct="1">
+              <a:lnSpc>
+                <a:spcPct val="100000"/>
+              </a:lnSpc>
+              <a:spcBef>
+                <a:spcPts val="0"/>
+              </a:spcBef>
+              <a:spcAft>
+                <a:spcPts val="0"/>
+              </a:spcAft>
+              <a:buClrTx/>
+              <a:buSzTx/>
+              <a:buFontTx/>
+              <a:buNone/>
+              <a:tabLst/>
+              <a:defRPr/>
+            </a:pPr>
+            <a:endParaRPr kumimoji="0" lang="en-US" sz="1800" b="0" i="0" u="none" strike="noStrike" kern="1200" cap="none" spc="0" normalizeH="0" baseline="0" noProof="0">
+              <a:ln>
+                <a:noFill/>
+              </a:ln>
+              <a:solidFill>
+                <a:prstClr val="white"/>
+              </a:solidFill>
+              <a:effectLst/>
+              <a:uLnTx/>
+              <a:uFillTx/>
+              <a:latin typeface="Calibri" panose="020F0502020204030204"/>
+              <a:ea typeface="+mn-ea"/>
+              <a:cs typeface="+mn-cs"/>
+            </a:endParaRPr>
+          </a:p>
+        </p:txBody>
+      </p:sp>
+      <p:sp>
+        <p:nvSpPr>
+          <p:cNvPr id="3" name="Content Placeholder 2">
+            <a:extLst>
+              <a:ext uri="{FF2B5EF4-FFF2-40B4-BE49-F238E27FC236}">
+                <a16:creationId xmlns:a16="http://schemas.microsoft.com/office/drawing/2014/main" id="{8C6857BA-F16D-46F6-B0BD-327F62C80CF8}"/>
+              </a:ext>
+            </a:extLst>
+          </p:cNvPr>
+          <p:cNvSpPr>
+            <a:spLocks noGrp="1"/>
+          </p:cNvSpPr>
+          <p:nvPr>
+            <p:ph idx="1"/>
+          </p:nvPr>
+        </p:nvSpPr>
+        <p:spPr>
+          <a:xfrm>
+            <a:off x="5250106" y="586822"/>
+            <a:ext cx="6106742" cy="1645920"/>
+          </a:xfrm>
+        </p:spPr>
+        <p:txBody>
+          <a:bodyPr anchor="ctr">
+            <a:normAutofit/>
+          </a:bodyPr>
+          <a:lstStyle/>
+          <a:p>
+            <a:r>
+              <a:rPr lang="en-US" sz="1800" dirty="0"/>
+              <a:t>Moved To Component Sheets For Simplicity Of Main Page</a:t>
+            </a:r>
+          </a:p>
+        </p:txBody>
+      </p:sp>
+      <p:pic>
+        <p:nvPicPr>
+          <p:cNvPr id="15" name="Picture 14">
+            <a:extLst>
+              <a:ext uri="{FF2B5EF4-FFF2-40B4-BE49-F238E27FC236}">
+                <a16:creationId xmlns:a16="http://schemas.microsoft.com/office/drawing/2014/main" id="{A31DECC6-8969-44ED-80DC-2964BE3BF2E2}"/>
+              </a:ext>
+            </a:extLst>
+          </p:cNvPr>
+          <p:cNvPicPr>
+            <a:picLocks noChangeAspect="1"/>
+          </p:cNvPicPr>
+          <p:nvPr/>
+        </p:nvPicPr>
+        <p:blipFill>
+          <a:blip r:embed="rId2"/>
+          <a:stretch>
+            <a:fillRect/>
+          </a:stretch>
+        </p:blipFill>
+        <p:spPr>
+          <a:xfrm>
+            <a:off x="557783" y="2785765"/>
+            <a:ext cx="5481509" cy="3371127"/>
+          </a:xfrm>
+          <a:prstGeom prst="rect">
+            <a:avLst/>
+          </a:prstGeom>
+        </p:spPr>
+      </p:pic>
+      <p:pic>
+        <p:nvPicPr>
+          <p:cNvPr id="9" name="Picture 8">
+            <a:extLst>
+              <a:ext uri="{FF2B5EF4-FFF2-40B4-BE49-F238E27FC236}">
+                <a16:creationId xmlns:a16="http://schemas.microsoft.com/office/drawing/2014/main" id="{5190BE28-90D3-4F50-9FEC-70AEE6A1AF5C}"/>
+              </a:ext>
+            </a:extLst>
+          </p:cNvPr>
+          <p:cNvPicPr>
+            <a:picLocks noChangeAspect="1"/>
+          </p:cNvPicPr>
+          <p:nvPr/>
+        </p:nvPicPr>
+        <p:blipFill>
+          <a:blip r:embed="rId3"/>
+          <a:stretch>
+            <a:fillRect/>
+          </a:stretch>
+        </p:blipFill>
+        <p:spPr>
+          <a:xfrm>
+            <a:off x="6198781" y="2807501"/>
+            <a:ext cx="5523082" cy="3327656"/>
+          </a:xfrm>
+          <a:prstGeom prst="rect">
+            <a:avLst/>
+          </a:prstGeom>
+        </p:spPr>
+      </p:pic>
+    </p:spTree>
+    <p:extLst>
+      <p:ext uri="{BB962C8B-B14F-4D97-AF65-F5344CB8AC3E}">
+        <p14:creationId xmlns:p14="http://schemas.microsoft.com/office/powerpoint/2010/main" val="3413695953"/>
+      </p:ext>
+    </p:extLst>
+  </p:cSld>
+  <p:clrMapOvr>
+    <a:masterClrMapping/>
+  </p:clrMapOvr>
+</p:sld>
+</file>
+
+<file path=ppt/slides/slide6.xml><?xml version="1.0" encoding="utf-8"?>
 <p:sld xmlns:a="http://schemas.openxmlformats.org/drawingml/2006/main" xmlns:r="http://schemas.openxmlformats.org/officeDocument/2006/relationships" xmlns:p="http://schemas.openxmlformats.org/presentationml/2006/main">
   <p:cSld>
     <p:bg>
@@ -6141,7 +9335,7 @@
           <a:p>
             <a:r>
               <a:rPr lang="en-US" dirty="0"/>
-              <a:t>GPS I2C &amp; SPI Lines</a:t>
+              <a:t>GPS I2C &amp; UART Lines</a:t>
             </a:r>
           </a:p>
         </p:txBody>
@@ -6170,7 +9364,7 @@
         </p:spPr>
         <p:txBody>
           <a:bodyPr>
-            <a:normAutofit/>
+            <a:normAutofit lnSpcReduction="10000"/>
           </a:bodyPr>
           <a:lstStyle/>
           <a:p>
@@ -6188,13 +9382,33 @@
           <a:p>
             <a:r>
               <a:rPr lang="en-US" sz="2000" dirty="0"/>
-              <a:t>Ground Plane Shielding</a:t>
+              <a:t>Ground Plane Shielding Between Traces</a:t>
             </a:r>
           </a:p>
           <a:p>
             <a:r>
               <a:rPr lang="en-US" sz="2000" dirty="0"/>
-              <a:t>Added Vias To Reduce Ground Impedance, Improved Shielding</a:t>
+              <a:t>Added Vias To Reduce Ground Impedance, Improved Shielding Inside Substrate</a:t>
+            </a:r>
+          </a:p>
+          <a:p>
+            <a:r>
+              <a:rPr lang="en-US" sz="2000" dirty="0"/>
+              <a:t>For Added Shielding:</a:t>
+            </a:r>
+          </a:p>
+          <a:p>
+            <a:pPr lvl="1"/>
+            <a:r>
+              <a:rPr lang="en-US" sz="1600" dirty="0"/>
+              <a:t>UART Routed On Top Layer</a:t>
+            </a:r>
+          </a:p>
+          <a:p>
+            <a:pPr lvl="1"/>
+            <a:r>
+              <a:rPr lang="en-US" sz="1600" dirty="0"/>
+              <a:t>I2C Routed On Bottom Layer</a:t>
             </a:r>
           </a:p>
         </p:txBody>
@@ -6251,6 +9465,140 @@
           </a:p>
         </p:txBody>
       </p:sp>
+      <p:pic>
+        <p:nvPicPr>
+          <p:cNvPr id="5" name="Picture 4">
+            <a:extLst>
+              <a:ext uri="{FF2B5EF4-FFF2-40B4-BE49-F238E27FC236}">
+                <a16:creationId xmlns:a16="http://schemas.microsoft.com/office/drawing/2014/main" id="{45FB89DE-5CAB-4B95-AF92-499FC05F38E2}"/>
+              </a:ext>
+            </a:extLst>
+          </p:cNvPr>
+          <p:cNvPicPr>
+            <a:picLocks noChangeAspect="1"/>
+          </p:cNvPicPr>
+          <p:nvPr/>
+        </p:nvPicPr>
+        <p:blipFill>
+          <a:blip r:embed="rId4"/>
+          <a:stretch>
+            <a:fillRect/>
+          </a:stretch>
+        </p:blipFill>
+        <p:spPr>
+          <a:xfrm>
+            <a:off x="551785" y="1966037"/>
+            <a:ext cx="3810532" cy="247685"/>
+          </a:xfrm>
+          <a:prstGeom prst="rect">
+            <a:avLst/>
+          </a:prstGeom>
+        </p:spPr>
+      </p:pic>
+      <p:sp>
+        <p:nvSpPr>
+          <p:cNvPr id="6" name="Rectangle: Rounded Corners 5">
+            <a:extLst>
+              <a:ext uri="{FF2B5EF4-FFF2-40B4-BE49-F238E27FC236}">
+                <a16:creationId xmlns:a16="http://schemas.microsoft.com/office/drawing/2014/main" id="{961CD19B-7039-43CB-8DD8-A16370B275E5}"/>
+              </a:ext>
+            </a:extLst>
+          </p:cNvPr>
+          <p:cNvSpPr/>
+          <p:nvPr/>
+        </p:nvSpPr>
+        <p:spPr>
+          <a:xfrm>
+            <a:off x="8072582" y="5357091"/>
+            <a:ext cx="2179782" cy="960582"/>
+          </a:xfrm>
+          <a:prstGeom prst="roundRect">
+            <a:avLst/>
+          </a:prstGeom>
+          <a:solidFill>
+            <a:schemeClr val="tx2"/>
+          </a:solidFill>
+        </p:spPr>
+        <p:style>
+          <a:lnRef idx="2">
+            <a:schemeClr val="accent1">
+              <a:shade val="50000"/>
+            </a:schemeClr>
+          </a:lnRef>
+          <a:fillRef idx="1">
+            <a:schemeClr val="accent1"/>
+          </a:fillRef>
+          <a:effectRef idx="0">
+            <a:schemeClr val="accent1"/>
+          </a:effectRef>
+          <a:fontRef idx="minor">
+            <a:schemeClr val="lt1"/>
+          </a:fontRef>
+        </p:style>
+        <p:txBody>
+          <a:bodyPr rtlCol="0" anchor="ctr"/>
+          <a:lstStyle/>
+          <a:p>
+            <a:pPr algn="ctr"/>
+            <a:r>
+              <a:rPr lang="en-US" sz="3200" dirty="0"/>
+              <a:t>OLD</a:t>
+            </a:r>
+          </a:p>
+        </p:txBody>
+      </p:sp>
+      <p:sp>
+        <p:nvSpPr>
+          <p:cNvPr id="13" name="Rectangle: Rounded Corners 12">
+            <a:extLst>
+              <a:ext uri="{FF2B5EF4-FFF2-40B4-BE49-F238E27FC236}">
+                <a16:creationId xmlns:a16="http://schemas.microsoft.com/office/drawing/2014/main" id="{5BE4D400-78D5-45CE-9DE1-2C8741898038}"/>
+              </a:ext>
+            </a:extLst>
+          </p:cNvPr>
+          <p:cNvSpPr/>
+          <p:nvPr/>
+        </p:nvSpPr>
+        <p:spPr>
+          <a:xfrm>
+            <a:off x="9915237" y="2316022"/>
+            <a:ext cx="2179782" cy="960582"/>
+          </a:xfrm>
+          <a:prstGeom prst="roundRect">
+            <a:avLst/>
+          </a:prstGeom>
+          <a:solidFill>
+            <a:schemeClr val="tx2"/>
+          </a:solidFill>
+        </p:spPr>
+        <p:style>
+          <a:lnRef idx="2">
+            <a:schemeClr val="accent1">
+              <a:shade val="50000"/>
+            </a:schemeClr>
+          </a:lnRef>
+          <a:fillRef idx="1">
+            <a:schemeClr val="accent1"/>
+          </a:fillRef>
+          <a:effectRef idx="0">
+            <a:schemeClr val="accent1"/>
+          </a:effectRef>
+          <a:fontRef idx="minor">
+            <a:schemeClr val="lt1"/>
+          </a:fontRef>
+        </p:style>
+        <p:txBody>
+          <a:bodyPr rtlCol="0" anchor="ctr"/>
+          <a:lstStyle/>
+          <a:p>
+            <a:pPr algn="ctr"/>
+            <a:r>
+              <a:rPr lang="en-US" sz="3200" dirty="0"/>
+              <a:t>NEW</a:t>
+            </a:r>
+          </a:p>
+        </p:txBody>
+      </p:sp>
     </p:spTree>
     <p:extLst>
       <p:ext uri="{BB962C8B-B14F-4D97-AF65-F5344CB8AC3E}">
@@ -6264,7 +9612,7 @@
 </p:sld>
 </file>
 
-<file path=ppt/slides/slide4.xml><?xml version="1.0" encoding="utf-8"?>
+<file path=ppt/slides/slide7.xml><?xml version="1.0" encoding="utf-8"?>
 <p:sld xmlns:a="http://schemas.openxmlformats.org/drawingml/2006/main" xmlns:r="http://schemas.openxmlformats.org/officeDocument/2006/relationships" xmlns:p="http://schemas.openxmlformats.org/presentationml/2006/main">
   <p:cSld>
     <p:bg>
@@ -6379,7 +9727,7 @@
           <a:p>
             <a:r>
               <a:rPr lang="en-US" sz="5000" dirty="0"/>
-              <a:t>Old Accelerometer Layouts</a:t>
+              <a:t>Old Accelerometer Layout</a:t>
             </a:r>
           </a:p>
         </p:txBody>
@@ -6686,7 +10034,7 @@
         <p:spPr>
           <a:xfrm>
             <a:off x="640080" y="2872899"/>
-            <a:ext cx="4243589" cy="3320668"/>
+            <a:ext cx="4243589" cy="3823648"/>
           </a:xfrm>
         </p:spPr>
         <p:txBody>
@@ -6717,13 +10065,20 @@
           <a:p>
             <a:r>
               <a:rPr lang="en-US" sz="2200" dirty="0"/>
-              <a:t>Unused pins are left floating</a:t>
+              <a:t>Unused Pins Are Left Floating</a:t>
+            </a:r>
+          </a:p>
+          <a:p>
+            <a:pPr lvl="1"/>
+            <a:r>
+              <a:rPr lang="en-US" sz="1800" dirty="0"/>
+              <a:t>Including Interrupt Pin</a:t>
             </a:r>
           </a:p>
           <a:p>
             <a:r>
               <a:rPr lang="en-US" sz="2200" dirty="0"/>
-              <a:t>SPI lines and I2C lines</a:t>
+              <a:t>SPI, I2C, And UART Lines</a:t>
             </a:r>
           </a:p>
           <a:p>
@@ -6902,7 +10257,7 @@
 </p:sld>
 </file>
 
-<file path=ppt/slides/slide5.xml><?xml version="1.0" encoding="utf-8"?>
+<file path=ppt/slides/slide8.xml><?xml version="1.0" encoding="utf-8"?>
 <p:sld xmlns:a="http://schemas.openxmlformats.org/drawingml/2006/main" xmlns:r="http://schemas.openxmlformats.org/officeDocument/2006/relationships" xmlns:p="http://schemas.openxmlformats.org/presentationml/2006/main">
   <p:cSld>
     <p:bg>
@@ -7016,7 +10371,7 @@
           <a:lstStyle/>
           <a:p>
             <a:r>
-              <a:rPr lang="en-US" sz="4200" dirty="0"/>
+              <a:rPr lang="en-US" sz="4500" dirty="0"/>
               <a:t>New Accelerometer Layout</a:t>
             </a:r>
           </a:p>
@@ -7324,12 +10679,12 @@
         <p:spPr>
           <a:xfrm>
             <a:off x="640080" y="2872899"/>
-            <a:ext cx="4458393" cy="3320668"/>
+            <a:ext cx="4551045" cy="3833462"/>
           </a:xfrm>
         </p:spPr>
         <p:txBody>
           <a:bodyPr>
-            <a:normAutofit fontScale="92500" lnSpcReduction="20000"/>
+            <a:normAutofit fontScale="85000" lnSpcReduction="20000"/>
           </a:bodyPr>
           <a:lstStyle/>
           <a:p>
@@ -7382,7 +10737,14 @@
             <a:pPr lvl="1"/>
             <a:r>
               <a:rPr lang="en-US" sz="1600" dirty="0"/>
-              <a:t>Isolated With Ground Plane In Between</a:t>
+              <a:t>Isolated With Ground Plane In Between Signals</a:t>
+            </a:r>
+          </a:p>
+          <a:p>
+            <a:pPr lvl="1"/>
+            <a:r>
+              <a:rPr lang="en-US" sz="1600" dirty="0"/>
+              <a:t>Vias Added To Isolate From UART Lines</a:t>
             </a:r>
           </a:p>
           <a:p>
@@ -7399,6 +10761,10 @@
             </a:r>
           </a:p>
           <a:p>
+            <a:r>
+              <a:rPr lang="en-US" sz="2000" dirty="0"/>
+              <a:t>Added Test Points To GPIO and Interrupt Pins</a:t>
+            </a:r>
             <a:endParaRPr lang="en-US" sz="2600" dirty="0"/>
           </a:p>
           <a:p>
@@ -7563,7 +10929,7 @@
 </p:sld>
 </file>
 
-<file path=ppt/slides/slide6.xml><?xml version="1.0" encoding="utf-8"?>
+<file path=ppt/slides/slide9.xml><?xml version="1.0" encoding="utf-8"?>
 <p:sld xmlns:a="http://schemas.openxmlformats.org/drawingml/2006/main" xmlns:r="http://schemas.openxmlformats.org/officeDocument/2006/relationships" xmlns:p="http://schemas.openxmlformats.org/presentationml/2006/main">
   <p:cSld>
     <p:bg>
@@ -7588,6 +10954,66 @@
           <a:chExt cx="0" cy="0"/>
         </a:xfrm>
       </p:grpSpPr>
+      <p:sp useBgFill="1">
+        <p:nvSpPr>
+          <p:cNvPr id="24" name="Rectangle 23">
+            <a:extLst>
+              <a:ext uri="{FF2B5EF4-FFF2-40B4-BE49-F238E27FC236}">
+                <a16:creationId xmlns:a16="http://schemas.microsoft.com/office/drawing/2014/main" id="{90D01200-0224-43C5-AB38-FB4D16B73FB7}"/>
+              </a:ext>
+              <a:ext uri="{C183D7F6-B498-43B3-948B-1728B52AA6E4}">
+                <adec:decorative xmlns:adec="http://schemas.microsoft.com/office/drawing/2017/decorative" val="1"/>
+              </a:ext>
+            </a:extLst>
+          </p:cNvPr>
+          <p:cNvSpPr>
+            <a:spLocks noGrp="1" noRot="1" noChangeAspect="1" noMove="1" noResize="1" noEditPoints="1" noAdjustHandles="1" noChangeArrowheads="1" noChangeShapeType="1" noTextEdit="1"/>
+          </p:cNvSpPr>
+          <p:nvPr>
+            <p:extLst>
+              <p:ext uri="{386F3935-93C4-4BCD-93E2-E3B085C9AB24}">
+                <p16:designElem xmlns:p16="http://schemas.microsoft.com/office/powerpoint/2015/main" val="1"/>
+              </p:ext>
+            </p:extLst>
+          </p:nvPr>
+        </p:nvSpPr>
+        <p:spPr>
+          <a:xfrm>
+            <a:off x="0" y="0"/>
+            <a:ext cx="12192000" cy="6858000"/>
+          </a:xfrm>
+          <a:prstGeom prst="rect">
+            <a:avLst/>
+          </a:prstGeom>
+          <a:ln>
+            <a:noFill/>
+          </a:ln>
+        </p:spPr>
+        <p:style>
+          <a:lnRef idx="2">
+            <a:schemeClr val="accent1">
+              <a:shade val="50000"/>
+            </a:schemeClr>
+          </a:lnRef>
+          <a:fillRef idx="1">
+            <a:schemeClr val="accent1"/>
+          </a:fillRef>
+          <a:effectRef idx="0">
+            <a:schemeClr val="accent1"/>
+          </a:effectRef>
+          <a:fontRef idx="minor">
+            <a:schemeClr val="lt1"/>
+          </a:fontRef>
+        </p:style>
+        <p:txBody>
+          <a:bodyPr rtlCol="0" anchor="ctr"/>
+          <a:lstStyle/>
+          <a:p>
+            <a:pPr algn="ctr"/>
+            <a:endParaRPr lang="en-US"/>
+          </a:p>
+        </p:txBody>
+      </p:sp>
       <p:sp>
         <p:nvSpPr>
           <p:cNvPr id="2" name="Title 1">
@@ -7606,8 +11032,8 @@
         </p:nvSpPr>
         <p:spPr>
           <a:xfrm>
-            <a:off x="4965430" y="629268"/>
-            <a:ext cx="6586491" cy="1286160"/>
+            <a:off x="612648" y="1078992"/>
+            <a:ext cx="6268770" cy="1536192"/>
           </a:xfrm>
         </p:spPr>
         <p:txBody>
@@ -7617,59 +11043,27 @@
           <a:lstStyle/>
           <a:p>
             <a:r>
-              <a:rPr lang="en-US" dirty="0"/>
-              <a:t>New Accelerometer Layouts</a:t>
+              <a:rPr lang="en-US" sz="5200" dirty="0"/>
+              <a:t>PCB Renderings</a:t>
             </a:r>
           </a:p>
         </p:txBody>
       </p:sp>
       <p:sp>
         <p:nvSpPr>
-          <p:cNvPr id="3" name="Content Placeholder 2">
-            <a:extLst>
-              <a:ext uri="{FF2B5EF4-FFF2-40B4-BE49-F238E27FC236}">
-                <a16:creationId xmlns:a16="http://schemas.microsoft.com/office/drawing/2014/main" id="{300E664B-8627-435D-A0B3-44D66B15F89F}"/>
-              </a:ext>
-            </a:extLst>
-          </p:cNvPr>
-          <p:cNvSpPr>
-            <a:spLocks noGrp="1"/>
-          </p:cNvSpPr>
-          <p:nvPr>
-            <p:ph idx="1"/>
-          </p:nvPr>
-        </p:nvSpPr>
-        <p:spPr>
-          <a:xfrm>
-            <a:off x="4965431" y="2438400"/>
-            <a:ext cx="6586489" cy="3785419"/>
-          </a:xfrm>
-        </p:spPr>
-        <p:txBody>
-          <a:bodyPr>
-            <a:normAutofit/>
-          </a:bodyPr>
-          <a:lstStyle/>
-          <a:p>
-            <a:endParaRPr lang="en-US" sz="2000" dirty="0"/>
-          </a:p>
-        </p:txBody>
-      </p:sp>
-      <p:cxnSp>
-        <p:nvCxnSpPr>
-          <p:cNvPr id="10" name="Straight Connector 9">
-            <a:extLst>
-              <a:ext uri="{FF2B5EF4-FFF2-40B4-BE49-F238E27FC236}">
-                <a16:creationId xmlns:a16="http://schemas.microsoft.com/office/drawing/2014/main" id="{A7F400EE-A8A5-48AF-B4D6-291B52C6F0B0}"/>
+          <p:cNvPr id="26" name="Rectangle 25">
+            <a:extLst>
+              <a:ext uri="{FF2B5EF4-FFF2-40B4-BE49-F238E27FC236}">
+                <a16:creationId xmlns:a16="http://schemas.microsoft.com/office/drawing/2014/main" id="{728A44A4-A002-4A88-9FC9-1D0566C97A47}"/>
               </a:ext>
               <a:ext uri="{C183D7F6-B498-43B3-948B-1728B52AA6E4}">
                 <adec:decorative xmlns:adec="http://schemas.microsoft.com/office/drawing/2017/decorative" val="1"/>
               </a:ext>
             </a:extLst>
           </p:cNvPr>
-          <p:cNvCxnSpPr>
-            <a:cxnSpLocks noGrp="1" noRot="1" noChangeAspect="1" noMove="1" noResize="1" noEditPoints="1" noAdjustHandles="1" noChangeArrowheads="1" noChangeShapeType="1"/>
-          </p:cNvCxnSpPr>
+          <p:cNvSpPr>
+            <a:spLocks noGrp="1" noRot="1" noChangeAspect="1" noMove="1" noResize="1" noEditPoints="1" noAdjustHandles="1" noChangeArrowheads="1" noChangeShapeType="1" noTextEdit="1"/>
+          </p:cNvSpPr>
           <p:nvPr>
             <p:extLst>
               <p:ext uri="{386F3935-93C4-4BCD-93E2-E3B085C9AB24}">
@@ -7677,36 +11071,183 @@
               </p:ext>
             </p:extLst>
           </p:nvPr>
-        </p:nvCxnSpPr>
+        </p:nvSpPr>
         <p:spPr>
-          <a:xfrm>
-            <a:off x="5080934" y="2115117"/>
-            <a:ext cx="6309360" cy="0"/>
+          <a:xfrm rot="5400000">
+            <a:off x="853202" y="363389"/>
+            <a:ext cx="73152" cy="548640"/>
           </a:xfrm>
-          <a:prstGeom prst="line">
+          <a:prstGeom prst="rect">
             <a:avLst/>
           </a:prstGeom>
-          <a:ln w="19050">
-            <a:solidFill>
-              <a:srgbClr val="DF8400"/>
-            </a:solidFill>
+          <a:solidFill>
+            <a:schemeClr val="accent2"/>
+          </a:solidFill>
+          <a:ln>
+            <a:noFill/>
           </a:ln>
         </p:spPr>
         <p:style>
-          <a:lnRef idx="1">
-            <a:schemeClr val="accent1"/>
+          <a:lnRef idx="2">
+            <a:schemeClr val="accent1">
+              <a:shade val="50000"/>
+            </a:schemeClr>
           </a:lnRef>
-          <a:fillRef idx="0">
+          <a:fillRef idx="1">
             <a:schemeClr val="accent1"/>
           </a:fillRef>
           <a:effectRef idx="0">
             <a:schemeClr val="accent1"/>
           </a:effectRef>
           <a:fontRef idx="minor">
-            <a:schemeClr val="tx1"/>
+            <a:schemeClr val="lt1"/>
           </a:fontRef>
         </p:style>
-      </p:cxnSp>
+        <p:txBody>
+          <a:bodyPr rtlCol="0" anchor="ctr"/>
+          <a:lstStyle/>
+          <a:p>
+            <a:pPr algn="ctr"/>
+            <a:endParaRPr lang="en-US">
+              <a:solidFill>
+                <a:prstClr val="white"/>
+              </a:solidFill>
+              <a:latin typeface="Calibri" panose="020F0502020204030204"/>
+            </a:endParaRPr>
+          </a:p>
+        </p:txBody>
+      </p:sp>
+      <p:sp>
+        <p:nvSpPr>
+          <p:cNvPr id="28" name="Rectangle 27">
+            <a:extLst>
+              <a:ext uri="{FF2B5EF4-FFF2-40B4-BE49-F238E27FC236}">
+                <a16:creationId xmlns:a16="http://schemas.microsoft.com/office/drawing/2014/main" id="{3E7D5C7B-DD16-401B-85CE-4AAA2A4F5136}"/>
+              </a:ext>
+              <a:ext uri="{C183D7F6-B498-43B3-948B-1728B52AA6E4}">
+                <adec:decorative xmlns:adec="http://schemas.microsoft.com/office/drawing/2017/decorative" val="1"/>
+              </a:ext>
+            </a:extLst>
+          </p:cNvPr>
+          <p:cNvSpPr>
+            <a:spLocks noGrp="1" noRot="1" noChangeAspect="1" noMove="1" noResize="1" noEditPoints="1" noAdjustHandles="1" noChangeArrowheads="1" noChangeShapeType="1" noTextEdit="1"/>
+          </p:cNvSpPr>
+          <p:nvPr>
+            <p:extLst>
+              <p:ext uri="{386F3935-93C4-4BCD-93E2-E3B085C9AB24}">
+                <p16:designElem xmlns:p16="http://schemas.microsoft.com/office/powerpoint/2015/main" val="1"/>
+              </p:ext>
+            </p:extLst>
+          </p:nvPr>
+        </p:nvSpPr>
+        <p:spPr>
+          <a:xfrm>
+            <a:off x="618506" y="2935541"/>
+            <a:ext cx="6217920" cy="18288"/>
+          </a:xfrm>
+          <a:prstGeom prst="rect">
+            <a:avLst/>
+          </a:prstGeom>
+          <a:solidFill>
+            <a:srgbClr val="D5D5D5"/>
+          </a:solidFill>
+          <a:ln w="3175">
+            <a:noFill/>
+          </a:ln>
+          <a:effectLst/>
+        </p:spPr>
+        <p:style>
+          <a:lnRef idx="2">
+            <a:schemeClr val="accent1">
+              <a:shade val="50000"/>
+            </a:schemeClr>
+          </a:lnRef>
+          <a:fillRef idx="1">
+            <a:schemeClr val="accent1"/>
+          </a:fillRef>
+          <a:effectRef idx="0">
+            <a:schemeClr val="accent1"/>
+          </a:effectRef>
+          <a:fontRef idx="minor">
+            <a:schemeClr val="lt1"/>
+          </a:fontRef>
+        </p:style>
+        <p:txBody>
+          <a:bodyPr rtlCol="0" anchor="ctr"/>
+          <a:lstStyle/>
+          <a:p>
+            <a:pPr algn="ctr"/>
+            <a:endParaRPr lang="en-US">
+              <a:solidFill>
+                <a:prstClr val="white"/>
+              </a:solidFill>
+              <a:latin typeface="Calibri" panose="020F0502020204030204"/>
+            </a:endParaRPr>
+          </a:p>
+        </p:txBody>
+      </p:sp>
+      <p:pic>
+        <p:nvPicPr>
+          <p:cNvPr id="7" name="Picture 6">
+            <a:extLst>
+              <a:ext uri="{FF2B5EF4-FFF2-40B4-BE49-F238E27FC236}">
+                <a16:creationId xmlns:a16="http://schemas.microsoft.com/office/drawing/2014/main" id="{8A430748-3320-48D5-AEB3-F77569DB60C3}"/>
+              </a:ext>
+            </a:extLst>
+          </p:cNvPr>
+          <p:cNvPicPr>
+            <a:picLocks noChangeAspect="1"/>
+          </p:cNvPicPr>
+          <p:nvPr/>
+        </p:nvPicPr>
+        <p:blipFill>
+          <a:blip r:embed="rId2"/>
+          <a:stretch>
+            <a:fillRect/>
+          </a:stretch>
+        </p:blipFill>
+        <p:spPr>
+          <a:xfrm>
+            <a:off x="8113227" y="601133"/>
+            <a:ext cx="2999363" cy="5580211"/>
+          </a:xfrm>
+          <a:prstGeom prst="rect">
+            <a:avLst/>
+          </a:prstGeom>
+        </p:spPr>
+      </p:pic>
+      <p:pic>
+        <p:nvPicPr>
+          <p:cNvPr id="20" name="Content Placeholder 19">
+            <a:extLst>
+              <a:ext uri="{FF2B5EF4-FFF2-40B4-BE49-F238E27FC236}">
+                <a16:creationId xmlns:a16="http://schemas.microsoft.com/office/drawing/2014/main" id="{11A59F4B-0301-4A10-8528-0A520A11929E}"/>
+              </a:ext>
+            </a:extLst>
+          </p:cNvPr>
+          <p:cNvPicPr>
+            <a:picLocks noGrp="1" noChangeAspect="1"/>
+          </p:cNvPicPr>
+          <p:nvPr>
+            <p:ph idx="1"/>
+          </p:nvPr>
+        </p:nvPicPr>
+        <p:blipFill>
+          <a:blip r:embed="rId3"/>
+          <a:stretch>
+            <a:fillRect/>
+          </a:stretch>
+        </p:blipFill>
+        <p:spPr>
+          <a:xfrm>
+            <a:off x="1017296" y="3355975"/>
+            <a:ext cx="5459995" cy="2825750"/>
+          </a:xfrm>
+          <a:prstGeom prst="rect">
+            <a:avLst/>
+          </a:prstGeom>
+        </p:spPr>
+      </p:pic>
     </p:spTree>
     <p:extLst>
       <p:ext uri="{BB962C8B-B14F-4D97-AF65-F5344CB8AC3E}">

</xml_diff>

<commit_message>
Swapped TX and RX for GPS pins
</commit_message>
<xml_diff>
--- a/Documentation/Schematic Review 1.pptx
+++ b/Documentation/Schematic Review 1.pptx
@@ -4914,8 +4914,8 @@
         </p:blipFill>
         <p:spPr>
           <a:xfrm>
-            <a:off x="4898967" y="1036595"/>
-            <a:ext cx="6921940" cy="4894051"/>
+            <a:off x="4567240" y="731899"/>
+            <a:ext cx="7629331" cy="5394201"/>
           </a:xfrm>
           <a:prstGeom prst="rect">
             <a:avLst/>
@@ -5384,9 +5384,10 @@
           <a:lstStyle/>
           <a:p>
             <a:r>
-              <a:rPr lang="en-US" dirty="0"/>
+              <a:rPr lang="en-US"/>
               <a:t>New Schematic</a:t>
             </a:r>
+            <a:endParaRPr lang="en-US" dirty="0"/>
           </a:p>
         </p:txBody>
       </p:sp>
@@ -5556,66 +5557,58 @@
           <a:lstStyle/>
           <a:p>
             <a:r>
-              <a:rPr lang="en-US" sz="1700" dirty="0"/>
+              <a:rPr lang="en-US" sz="1700"/>
               <a:t>Moved IMUs And Voltage Regulators To Hierarchical Sheets</a:t>
             </a:r>
           </a:p>
           <a:p>
             <a:pPr lvl="1"/>
             <a:r>
-              <a:rPr lang="en-US" sz="1300" dirty="0"/>
+              <a:rPr lang="en-US" sz="1300"/>
               <a:t>Improved Simplicity Of System Overview Page</a:t>
             </a:r>
           </a:p>
           <a:p>
             <a:pPr lvl="1"/>
             <a:r>
-              <a:rPr lang="en-US" sz="1300" dirty="0"/>
+              <a:rPr lang="en-US" sz="1300"/>
               <a:t>Reduced Clutter, Improved Scalability</a:t>
             </a:r>
           </a:p>
           <a:p>
             <a:r>
-              <a:rPr lang="en-US" sz="1700" dirty="0"/>
-              <a:t>Used Official </a:t>
-            </a:r>
-            <a:r>
-              <a:rPr lang="en-US" sz="1700" dirty="0" err="1"/>
-              <a:t>KiCAD</a:t>
-            </a:r>
-            <a:r>
-              <a:rPr lang="en-US" sz="1700" dirty="0"/>
-              <a:t> Raspberry Pi Header Symbol, Improved Molex Symbol</a:t>
-            </a:r>
-          </a:p>
-          <a:p>
-            <a:r>
-              <a:rPr lang="en-US" sz="1700" dirty="0"/>
+              <a:rPr lang="en-US" sz="1700"/>
+              <a:t>Used Official KiCAD Raspberry Pi Header Symbol, Improved Molex Symbol</a:t>
+            </a:r>
+          </a:p>
+          <a:p>
+            <a:r>
+              <a:rPr lang="en-US" sz="1700"/>
               <a:t>Use Of Bus Lines for I2C, UART, and SPI</a:t>
             </a:r>
           </a:p>
           <a:p>
             <a:pPr lvl="1"/>
             <a:r>
-              <a:rPr lang="en-US" sz="1300" dirty="0"/>
+              <a:rPr lang="en-US" sz="1300"/>
               <a:t>Improves Understanding Of System Data Flow</a:t>
             </a:r>
           </a:p>
           <a:p>
             <a:r>
-              <a:rPr lang="en-US" sz="1700" dirty="0"/>
+              <a:rPr lang="en-US" sz="1700"/>
               <a:t>LEDs moved off data lines, connected directly to Raspberry Pi</a:t>
             </a:r>
           </a:p>
           <a:p>
             <a:r>
-              <a:rPr lang="en-US" sz="1700" dirty="0"/>
+              <a:rPr lang="en-US" sz="1700"/>
               <a:t>Added Pull-Down Resistors To I2C</a:t>
             </a:r>
           </a:p>
           <a:p>
             <a:r>
-              <a:rPr lang="en-US" sz="1700" dirty="0"/>
+              <a:rPr lang="en-US" sz="1700"/>
               <a:t>Added Page Information</a:t>
             </a:r>
           </a:p>
@@ -5626,10 +5619,10 @@
       </p:sp>
       <p:pic>
         <p:nvPicPr>
-          <p:cNvPr id="6" name="Graphic 5">
-            <a:extLst>
-              <a:ext uri="{FF2B5EF4-FFF2-40B4-BE49-F238E27FC236}">
-                <a16:creationId xmlns:a16="http://schemas.microsoft.com/office/drawing/2014/main" id="{1BCDD2F2-8341-4D7F-94F7-3B2983CFDDE7}"/>
+          <p:cNvPr id="5" name="Graphic 4">
+            <a:extLst>
+              <a:ext uri="{FF2B5EF4-FFF2-40B4-BE49-F238E27FC236}">
+                <a16:creationId xmlns:a16="http://schemas.microsoft.com/office/drawing/2014/main" id="{177ED224-1C7A-4F57-80A0-A0C2C160E1AE}"/>
               </a:ext>
             </a:extLst>
           </p:cNvPr>
@@ -5655,8 +5648,8 @@
         </p:blipFill>
         <p:spPr>
           <a:xfrm>
-            <a:off x="4587240" y="825246"/>
-            <a:ext cx="7602922" cy="5375529"/>
+            <a:off x="4437610" y="687688"/>
+            <a:ext cx="7754390" cy="5482623"/>
           </a:xfrm>
           <a:prstGeom prst="rect">
             <a:avLst/>
@@ -6787,7 +6780,7 @@
       </p:pic>
       <p:pic>
         <p:nvPicPr>
-          <p:cNvPr id="9" name="Picture 8" descr="A screenshot of a video game&#10;&#10;Description automatically generated">
+          <p:cNvPr id="9" name="Picture 8">
             <a:extLst>
               <a:ext uri="{FF2B5EF4-FFF2-40B4-BE49-F238E27FC236}">
                 <a16:creationId xmlns:a16="http://schemas.microsoft.com/office/drawing/2014/main" id="{2B0540FC-8C17-4209-B11A-C40DB095F2DA}"/>
@@ -6800,8 +6793,14 @@
           <p:nvPr/>
         </p:nvPicPr>
         <p:blipFill rotWithShape="1">
-          <a:blip r:embed="rId3"/>
-          <a:srcRect r="6168" b="-1"/>
+          <a:blip r:embed="rId3">
+            <a:extLst>
+              <a:ext uri="{28A0092B-C50C-407E-A947-70E740481C1C}">
+                <a14:useLocalDpi xmlns:a14="http://schemas.microsoft.com/office/drawing/2010/main" val="0"/>
+              </a:ext>
+            </a:extLst>
+          </a:blip>
+          <a:srcRect l="5679" r="5679"/>
           <a:stretch/>
         </p:blipFill>
         <p:spPr>
@@ -10790,8 +10789,14 @@
           <p:nvPr/>
         </p:nvPicPr>
         <p:blipFill rotWithShape="1">
-          <a:blip r:embed="rId2"/>
-          <a:srcRect r="2" b="161"/>
+          <a:blip r:embed="rId2">
+            <a:extLst>
+              <a:ext uri="{28A0092B-C50C-407E-A947-70E740481C1C}">
+                <a14:useLocalDpi xmlns:a14="http://schemas.microsoft.com/office/drawing/2010/main" val="0"/>
+              </a:ext>
+            </a:extLst>
+          </a:blip>
+          <a:srcRect t="775" b="775"/>
           <a:stretch/>
         </p:blipFill>
         <p:spPr>
@@ -11186,68 +11191,31 @@
           </a:p>
         </p:txBody>
       </p:sp>
-      <p:pic>
-        <p:nvPicPr>
-          <p:cNvPr id="7" name="Picture 6">
-            <a:extLst>
-              <a:ext uri="{FF2B5EF4-FFF2-40B4-BE49-F238E27FC236}">
-                <a16:creationId xmlns:a16="http://schemas.microsoft.com/office/drawing/2014/main" id="{8A430748-3320-48D5-AEB3-F77569DB60C3}"/>
-              </a:ext>
-            </a:extLst>
-          </p:cNvPr>
-          <p:cNvPicPr>
-            <a:picLocks noChangeAspect="1"/>
-          </p:cNvPicPr>
-          <p:nvPr/>
-        </p:nvPicPr>
-        <p:blipFill>
-          <a:blip r:embed="rId2"/>
-          <a:stretch>
-            <a:fillRect/>
-          </a:stretch>
-        </p:blipFill>
-        <p:spPr>
-          <a:xfrm>
-            <a:off x="8113227" y="601133"/>
-            <a:ext cx="2999363" cy="5580211"/>
-          </a:xfrm>
-          <a:prstGeom prst="rect">
-            <a:avLst/>
-          </a:prstGeom>
-        </p:spPr>
-      </p:pic>
-      <p:pic>
-        <p:nvPicPr>
-          <p:cNvPr id="20" name="Content Placeholder 19">
-            <a:extLst>
-              <a:ext uri="{FF2B5EF4-FFF2-40B4-BE49-F238E27FC236}">
-                <a16:creationId xmlns:a16="http://schemas.microsoft.com/office/drawing/2014/main" id="{11A59F4B-0301-4A10-8528-0A520A11929E}"/>
-              </a:ext>
-            </a:extLst>
-          </p:cNvPr>
-          <p:cNvPicPr>
-            <a:picLocks noGrp="1" noChangeAspect="1"/>
-          </p:cNvPicPr>
+      <p:sp>
+        <p:nvSpPr>
+          <p:cNvPr id="4" name="Content Placeholder 3">
+            <a:extLst>
+              <a:ext uri="{FF2B5EF4-FFF2-40B4-BE49-F238E27FC236}">
+                <a16:creationId xmlns:a16="http://schemas.microsoft.com/office/drawing/2014/main" id="{525F938D-EDFD-46DD-B9BD-C5FD7067385A}"/>
+              </a:ext>
+            </a:extLst>
+          </p:cNvPr>
+          <p:cNvSpPr>
+            <a:spLocks noGrp="1"/>
+          </p:cNvSpPr>
           <p:nvPr>
             <p:ph idx="1"/>
           </p:nvPr>
-        </p:nvPicPr>
-        <p:blipFill>
-          <a:blip r:embed="rId3"/>
-          <a:stretch>
-            <a:fillRect/>
-          </a:stretch>
-        </p:blipFill>
-        <p:spPr>
-          <a:xfrm>
-            <a:off x="1017296" y="3355975"/>
-            <a:ext cx="5459995" cy="2825750"/>
-          </a:xfrm>
-          <a:prstGeom prst="rect">
-            <a:avLst/>
-          </a:prstGeom>
-        </p:spPr>
-      </p:pic>
+        </p:nvSpPr>
+        <p:spPr/>
+        <p:txBody>
+          <a:bodyPr/>
+          <a:lstStyle/>
+          <a:p>
+            <a:endParaRPr lang="en-US"/>
+          </a:p>
+        </p:txBody>
+      </p:sp>
     </p:spTree>
     <p:extLst>
       <p:ext uri="{BB962C8B-B14F-4D97-AF65-F5344CB8AC3E}">

</xml_diff>

<commit_message>
Updated Schematic Review 1 Powerpoint
</commit_message>
<xml_diff>
--- a/Documentation/Schematic Review 1.pptx
+++ b/Documentation/Schematic Review 1.pptx
@@ -4,6 +4,9 @@
   <p:sldMasterIdLst>
     <p:sldMasterId id="2147483648" r:id="rId1"/>
   </p:sldMasterIdLst>
+  <p:notesMasterIdLst>
+    <p:notesMasterId r:id="rId13"/>
+  </p:notesMasterIdLst>
   <p:sldIdLst>
     <p:sldId id="256" r:id="rId2"/>
     <p:sldId id="262" r:id="rId3"/>
@@ -13,7 +16,9 @@
     <p:sldId id="258" r:id="rId7"/>
     <p:sldId id="259" r:id="rId8"/>
     <p:sldId id="261" r:id="rId9"/>
-    <p:sldId id="260" r:id="rId10"/>
+    <p:sldId id="267" r:id="rId10"/>
+    <p:sldId id="260" r:id="rId11"/>
+    <p:sldId id="268" r:id="rId12"/>
   </p:sldIdLst>
   <p:sldSz cx="12192000" cy="6858000"/>
   <p:notesSz cx="6858000" cy="9144000"/>
@@ -120,6 +125,355 @@
 </p:presentation>
 </file>
 
+<file path=ppt/notesMasters/notesMaster1.xml><?xml version="1.0" encoding="utf-8"?>
+<p:notesMaster xmlns:a="http://schemas.openxmlformats.org/drawingml/2006/main" xmlns:r="http://schemas.openxmlformats.org/officeDocument/2006/relationships" xmlns:p="http://schemas.openxmlformats.org/presentationml/2006/main">
+  <p:cSld>
+    <p:bg>
+      <p:bgRef idx="1001">
+        <a:schemeClr val="bg1"/>
+      </p:bgRef>
+    </p:bg>
+    <p:spTree>
+      <p:nvGrpSpPr>
+        <p:cNvPr id="1" name=""/>
+        <p:cNvGrpSpPr/>
+        <p:nvPr/>
+      </p:nvGrpSpPr>
+      <p:grpSpPr>
+        <a:xfrm>
+          <a:off x="0" y="0"/>
+          <a:ext cx="0" cy="0"/>
+          <a:chOff x="0" y="0"/>
+          <a:chExt cx="0" cy="0"/>
+        </a:xfrm>
+      </p:grpSpPr>
+      <p:sp>
+        <p:nvSpPr>
+          <p:cNvPr id="2" name="Header Placeholder 1"/>
+          <p:cNvSpPr>
+            <a:spLocks noGrp="1"/>
+          </p:cNvSpPr>
+          <p:nvPr>
+            <p:ph type="hdr" sz="quarter"/>
+          </p:nvPr>
+        </p:nvSpPr>
+        <p:spPr>
+          <a:xfrm>
+            <a:off x="0" y="0"/>
+            <a:ext cx="2971800" cy="458788"/>
+          </a:xfrm>
+          <a:prstGeom prst="rect">
+            <a:avLst/>
+          </a:prstGeom>
+        </p:spPr>
+        <p:txBody>
+          <a:bodyPr vert="horz" lIns="91440" tIns="45720" rIns="91440" bIns="45720" rtlCol="0"/>
+          <a:lstStyle>
+            <a:lvl1pPr algn="l">
+              <a:defRPr sz="1200"/>
+            </a:lvl1pPr>
+          </a:lstStyle>
+          <a:p>
+            <a:endParaRPr lang="en-US"/>
+          </a:p>
+        </p:txBody>
+      </p:sp>
+      <p:sp>
+        <p:nvSpPr>
+          <p:cNvPr id="3" name="Date Placeholder 2"/>
+          <p:cNvSpPr>
+            <a:spLocks noGrp="1"/>
+          </p:cNvSpPr>
+          <p:nvPr>
+            <p:ph type="dt" idx="1"/>
+          </p:nvPr>
+        </p:nvSpPr>
+        <p:spPr>
+          <a:xfrm>
+            <a:off x="3884613" y="0"/>
+            <a:ext cx="2971800" cy="458788"/>
+          </a:xfrm>
+          <a:prstGeom prst="rect">
+            <a:avLst/>
+          </a:prstGeom>
+        </p:spPr>
+        <p:txBody>
+          <a:bodyPr vert="horz" lIns="91440" tIns="45720" rIns="91440" bIns="45720" rtlCol="0"/>
+          <a:lstStyle>
+            <a:lvl1pPr algn="r">
+              <a:defRPr sz="1200"/>
+            </a:lvl1pPr>
+          </a:lstStyle>
+          <a:p>
+            <a:fld id="{8CEBA0F0-448E-4AE8-89C0-81814B85B0AE}" type="datetimeFigureOut">
+              <a:rPr lang="en-US" smtClean="0"/>
+              <a:t>9/23/2022</a:t>
+            </a:fld>
+            <a:endParaRPr lang="en-US"/>
+          </a:p>
+        </p:txBody>
+      </p:sp>
+      <p:sp>
+        <p:nvSpPr>
+          <p:cNvPr id="4" name="Slide Image Placeholder 3"/>
+          <p:cNvSpPr>
+            <a:spLocks noGrp="1" noRot="1" noChangeAspect="1"/>
+          </p:cNvSpPr>
+          <p:nvPr>
+            <p:ph type="sldImg" idx="2"/>
+          </p:nvPr>
+        </p:nvSpPr>
+        <p:spPr>
+          <a:xfrm>
+            <a:off x="685800" y="1143000"/>
+            <a:ext cx="5486400" cy="3086100"/>
+          </a:xfrm>
+          <a:prstGeom prst="rect">
+            <a:avLst/>
+          </a:prstGeom>
+          <a:noFill/>
+          <a:ln w="12700">
+            <a:solidFill>
+              <a:prstClr val="black"/>
+            </a:solidFill>
+          </a:ln>
+        </p:spPr>
+        <p:txBody>
+          <a:bodyPr vert="horz" lIns="91440" tIns="45720" rIns="91440" bIns="45720" rtlCol="0" anchor="ctr"/>
+          <a:lstStyle/>
+          <a:p>
+            <a:endParaRPr lang="en-US"/>
+          </a:p>
+        </p:txBody>
+      </p:sp>
+      <p:sp>
+        <p:nvSpPr>
+          <p:cNvPr id="5" name="Notes Placeholder 4"/>
+          <p:cNvSpPr>
+            <a:spLocks noGrp="1"/>
+          </p:cNvSpPr>
+          <p:nvPr>
+            <p:ph type="body" sz="quarter" idx="3"/>
+          </p:nvPr>
+        </p:nvSpPr>
+        <p:spPr>
+          <a:xfrm>
+            <a:off x="685800" y="4400550"/>
+            <a:ext cx="5486400" cy="3600450"/>
+          </a:xfrm>
+          <a:prstGeom prst="rect">
+            <a:avLst/>
+          </a:prstGeom>
+        </p:spPr>
+        <p:txBody>
+          <a:bodyPr vert="horz" lIns="91440" tIns="45720" rIns="91440" bIns="45720" rtlCol="0"/>
+          <a:lstStyle/>
+          <a:p>
+            <a:pPr lvl="0"/>
+            <a:r>
+              <a:rPr lang="en-US"/>
+              <a:t>Click to edit Master text styles</a:t>
+            </a:r>
+          </a:p>
+          <a:p>
+            <a:pPr lvl="1"/>
+            <a:r>
+              <a:rPr lang="en-US"/>
+              <a:t>Second level</a:t>
+            </a:r>
+          </a:p>
+          <a:p>
+            <a:pPr lvl="2"/>
+            <a:r>
+              <a:rPr lang="en-US"/>
+              <a:t>Third level</a:t>
+            </a:r>
+          </a:p>
+          <a:p>
+            <a:pPr lvl="3"/>
+            <a:r>
+              <a:rPr lang="en-US"/>
+              <a:t>Fourth level</a:t>
+            </a:r>
+          </a:p>
+          <a:p>
+            <a:pPr lvl="4"/>
+            <a:r>
+              <a:rPr lang="en-US"/>
+              <a:t>Fifth level</a:t>
+            </a:r>
+          </a:p>
+        </p:txBody>
+      </p:sp>
+      <p:sp>
+        <p:nvSpPr>
+          <p:cNvPr id="6" name="Footer Placeholder 5"/>
+          <p:cNvSpPr>
+            <a:spLocks noGrp="1"/>
+          </p:cNvSpPr>
+          <p:nvPr>
+            <p:ph type="ftr" sz="quarter" idx="4"/>
+          </p:nvPr>
+        </p:nvSpPr>
+        <p:spPr>
+          <a:xfrm>
+            <a:off x="0" y="8685213"/>
+            <a:ext cx="2971800" cy="458787"/>
+          </a:xfrm>
+          <a:prstGeom prst="rect">
+            <a:avLst/>
+          </a:prstGeom>
+        </p:spPr>
+        <p:txBody>
+          <a:bodyPr vert="horz" lIns="91440" tIns="45720" rIns="91440" bIns="45720" rtlCol="0" anchor="b"/>
+          <a:lstStyle>
+            <a:lvl1pPr algn="l">
+              <a:defRPr sz="1200"/>
+            </a:lvl1pPr>
+          </a:lstStyle>
+          <a:p>
+            <a:endParaRPr lang="en-US"/>
+          </a:p>
+        </p:txBody>
+      </p:sp>
+      <p:sp>
+        <p:nvSpPr>
+          <p:cNvPr id="7" name="Slide Number Placeholder 6"/>
+          <p:cNvSpPr>
+            <a:spLocks noGrp="1"/>
+          </p:cNvSpPr>
+          <p:nvPr>
+            <p:ph type="sldNum" sz="quarter" idx="5"/>
+          </p:nvPr>
+        </p:nvSpPr>
+        <p:spPr>
+          <a:xfrm>
+            <a:off x="3884613" y="8685213"/>
+            <a:ext cx="2971800" cy="458787"/>
+          </a:xfrm>
+          <a:prstGeom prst="rect">
+            <a:avLst/>
+          </a:prstGeom>
+        </p:spPr>
+        <p:txBody>
+          <a:bodyPr vert="horz" lIns="91440" tIns="45720" rIns="91440" bIns="45720" rtlCol="0" anchor="b"/>
+          <a:lstStyle>
+            <a:lvl1pPr algn="r">
+              <a:defRPr sz="1200"/>
+            </a:lvl1pPr>
+          </a:lstStyle>
+          <a:p>
+            <a:fld id="{287CFDD1-1DF8-48A0-8F53-4B021C6F751E}" type="slidenum">
+              <a:rPr lang="en-US" smtClean="0"/>
+              <a:t>‹#›</a:t>
+            </a:fld>
+            <a:endParaRPr lang="en-US"/>
+          </a:p>
+        </p:txBody>
+      </p:sp>
+    </p:spTree>
+    <p:extLst>
+      <p:ext uri="{BB962C8B-B14F-4D97-AF65-F5344CB8AC3E}">
+        <p14:creationId xmlns:p14="http://schemas.microsoft.com/office/powerpoint/2010/main" val="3112799271"/>
+      </p:ext>
+    </p:extLst>
+  </p:cSld>
+  <p:clrMap bg1="lt1" tx1="dk1" bg2="lt2" tx2="dk2" accent1="accent1" accent2="accent2" accent3="accent3" accent4="accent4" accent5="accent5" accent6="accent6" hlink="hlink" folHlink="folHlink"/>
+  <p:notesStyle>
+    <a:lvl1pPr marL="0" algn="l" defTabSz="914400" rtl="0" eaLnBrk="1" latinLnBrk="0" hangingPunct="1">
+      <a:defRPr sz="1200" kern="1200">
+        <a:solidFill>
+          <a:schemeClr val="tx1"/>
+        </a:solidFill>
+        <a:latin typeface="+mn-lt"/>
+        <a:ea typeface="+mn-ea"/>
+        <a:cs typeface="+mn-cs"/>
+      </a:defRPr>
+    </a:lvl1pPr>
+    <a:lvl2pPr marL="457200" algn="l" defTabSz="914400" rtl="0" eaLnBrk="1" latinLnBrk="0" hangingPunct="1">
+      <a:defRPr sz="1200" kern="1200">
+        <a:solidFill>
+          <a:schemeClr val="tx1"/>
+        </a:solidFill>
+        <a:latin typeface="+mn-lt"/>
+        <a:ea typeface="+mn-ea"/>
+        <a:cs typeface="+mn-cs"/>
+      </a:defRPr>
+    </a:lvl2pPr>
+    <a:lvl3pPr marL="914400" algn="l" defTabSz="914400" rtl="0" eaLnBrk="1" latinLnBrk="0" hangingPunct="1">
+      <a:defRPr sz="1200" kern="1200">
+        <a:solidFill>
+          <a:schemeClr val="tx1"/>
+        </a:solidFill>
+        <a:latin typeface="+mn-lt"/>
+        <a:ea typeface="+mn-ea"/>
+        <a:cs typeface="+mn-cs"/>
+      </a:defRPr>
+    </a:lvl3pPr>
+    <a:lvl4pPr marL="1371600" algn="l" defTabSz="914400" rtl="0" eaLnBrk="1" latinLnBrk="0" hangingPunct="1">
+      <a:defRPr sz="1200" kern="1200">
+        <a:solidFill>
+          <a:schemeClr val="tx1"/>
+        </a:solidFill>
+        <a:latin typeface="+mn-lt"/>
+        <a:ea typeface="+mn-ea"/>
+        <a:cs typeface="+mn-cs"/>
+      </a:defRPr>
+    </a:lvl4pPr>
+    <a:lvl5pPr marL="1828800" algn="l" defTabSz="914400" rtl="0" eaLnBrk="1" latinLnBrk="0" hangingPunct="1">
+      <a:defRPr sz="1200" kern="1200">
+        <a:solidFill>
+          <a:schemeClr val="tx1"/>
+        </a:solidFill>
+        <a:latin typeface="+mn-lt"/>
+        <a:ea typeface="+mn-ea"/>
+        <a:cs typeface="+mn-cs"/>
+      </a:defRPr>
+    </a:lvl5pPr>
+    <a:lvl6pPr marL="2286000" algn="l" defTabSz="914400" rtl="0" eaLnBrk="1" latinLnBrk="0" hangingPunct="1">
+      <a:defRPr sz="1200" kern="1200">
+        <a:solidFill>
+          <a:schemeClr val="tx1"/>
+        </a:solidFill>
+        <a:latin typeface="+mn-lt"/>
+        <a:ea typeface="+mn-ea"/>
+        <a:cs typeface="+mn-cs"/>
+      </a:defRPr>
+    </a:lvl6pPr>
+    <a:lvl7pPr marL="2743200" algn="l" defTabSz="914400" rtl="0" eaLnBrk="1" latinLnBrk="0" hangingPunct="1">
+      <a:defRPr sz="1200" kern="1200">
+        <a:solidFill>
+          <a:schemeClr val="tx1"/>
+        </a:solidFill>
+        <a:latin typeface="+mn-lt"/>
+        <a:ea typeface="+mn-ea"/>
+        <a:cs typeface="+mn-cs"/>
+      </a:defRPr>
+    </a:lvl7pPr>
+    <a:lvl8pPr marL="3200400" algn="l" defTabSz="914400" rtl="0" eaLnBrk="1" latinLnBrk="0" hangingPunct="1">
+      <a:defRPr sz="1200" kern="1200">
+        <a:solidFill>
+          <a:schemeClr val="tx1"/>
+        </a:solidFill>
+        <a:latin typeface="+mn-lt"/>
+        <a:ea typeface="+mn-ea"/>
+        <a:cs typeface="+mn-cs"/>
+      </a:defRPr>
+    </a:lvl8pPr>
+    <a:lvl9pPr marL="3657600" algn="l" defTabSz="914400" rtl="0" eaLnBrk="1" latinLnBrk="0" hangingPunct="1">
+      <a:defRPr sz="1200" kern="1200">
+        <a:solidFill>
+          <a:schemeClr val="tx1"/>
+        </a:solidFill>
+        <a:latin typeface="+mn-lt"/>
+        <a:ea typeface="+mn-ea"/>
+        <a:cs typeface="+mn-cs"/>
+      </a:defRPr>
+    </a:lvl9pPr>
+  </p:notesStyle>
+</p:notesMaster>
+</file>
+
 <file path=ppt/slideLayouts/slideLayout1.xml><?xml version="1.0" encoding="utf-8"?>
 <p:sldLayout xmlns:a="http://schemas.openxmlformats.org/drawingml/2006/main" xmlns:r="http://schemas.openxmlformats.org/officeDocument/2006/relationships" xmlns:p="http://schemas.openxmlformats.org/presentationml/2006/main" type="title" preserve="1">
   <p:cSld name="Title Slide">
@@ -267,7 +621,7 @@
           <a:p>
             <a:fld id="{67A852C0-EA74-4E50-8184-272026F38F49}" type="datetimeFigureOut">
               <a:rPr lang="en-US" smtClean="0"/>
-              <a:t>9/17/2022</a:t>
+              <a:t>9/23/2022</a:t>
             </a:fld>
             <a:endParaRPr lang="en-US"/>
           </a:p>
@@ -465,7 +819,7 @@
           <a:p>
             <a:fld id="{67A852C0-EA74-4E50-8184-272026F38F49}" type="datetimeFigureOut">
               <a:rPr lang="en-US" smtClean="0"/>
-              <a:t>9/17/2022</a:t>
+              <a:t>9/23/2022</a:t>
             </a:fld>
             <a:endParaRPr lang="en-US"/>
           </a:p>
@@ -673,7 +1027,7 @@
           <a:p>
             <a:fld id="{67A852C0-EA74-4E50-8184-272026F38F49}" type="datetimeFigureOut">
               <a:rPr lang="en-US" smtClean="0"/>
-              <a:t>9/17/2022</a:t>
+              <a:t>9/23/2022</a:t>
             </a:fld>
             <a:endParaRPr lang="en-US"/>
           </a:p>
@@ -871,7 +1225,7 @@
           <a:p>
             <a:fld id="{67A852C0-EA74-4E50-8184-272026F38F49}" type="datetimeFigureOut">
               <a:rPr lang="en-US" smtClean="0"/>
-              <a:t>9/17/2022</a:t>
+              <a:t>9/23/2022</a:t>
             </a:fld>
             <a:endParaRPr lang="en-US"/>
           </a:p>
@@ -1146,7 +1500,7 @@
           <a:p>
             <a:fld id="{67A852C0-EA74-4E50-8184-272026F38F49}" type="datetimeFigureOut">
               <a:rPr lang="en-US" smtClean="0"/>
-              <a:t>9/17/2022</a:t>
+              <a:t>9/23/2022</a:t>
             </a:fld>
             <a:endParaRPr lang="en-US"/>
           </a:p>
@@ -1411,7 +1765,7 @@
           <a:p>
             <a:fld id="{67A852C0-EA74-4E50-8184-272026F38F49}" type="datetimeFigureOut">
               <a:rPr lang="en-US" smtClean="0"/>
-              <a:t>9/17/2022</a:t>
+              <a:t>9/23/2022</a:t>
             </a:fld>
             <a:endParaRPr lang="en-US"/>
           </a:p>
@@ -1823,7 +2177,7 @@
           <a:p>
             <a:fld id="{67A852C0-EA74-4E50-8184-272026F38F49}" type="datetimeFigureOut">
               <a:rPr lang="en-US" smtClean="0"/>
-              <a:t>9/17/2022</a:t>
+              <a:t>9/23/2022</a:t>
             </a:fld>
             <a:endParaRPr lang="en-US"/>
           </a:p>
@@ -1964,7 +2318,7 @@
           <a:p>
             <a:fld id="{67A852C0-EA74-4E50-8184-272026F38F49}" type="datetimeFigureOut">
               <a:rPr lang="en-US" smtClean="0"/>
-              <a:t>9/17/2022</a:t>
+              <a:t>9/23/2022</a:t>
             </a:fld>
             <a:endParaRPr lang="en-US"/>
           </a:p>
@@ -2077,7 +2431,7 @@
           <a:p>
             <a:fld id="{67A852C0-EA74-4E50-8184-272026F38F49}" type="datetimeFigureOut">
               <a:rPr lang="en-US" smtClean="0"/>
-              <a:t>9/17/2022</a:t>
+              <a:t>9/23/2022</a:t>
             </a:fld>
             <a:endParaRPr lang="en-US"/>
           </a:p>
@@ -2388,7 +2742,7 @@
           <a:p>
             <a:fld id="{67A852C0-EA74-4E50-8184-272026F38F49}" type="datetimeFigureOut">
               <a:rPr lang="en-US" smtClean="0"/>
-              <a:t>9/17/2022</a:t>
+              <a:t>9/23/2022</a:t>
             </a:fld>
             <a:endParaRPr lang="en-US"/>
           </a:p>
@@ -2676,7 +3030,7 @@
           <a:p>
             <a:fld id="{67A852C0-EA74-4E50-8184-272026F38F49}" type="datetimeFigureOut">
               <a:rPr lang="en-US" smtClean="0"/>
-              <a:t>9/17/2022</a:t>
+              <a:t>9/23/2022</a:t>
             </a:fld>
             <a:endParaRPr lang="en-US"/>
           </a:p>
@@ -2917,7 +3271,7 @@
           <a:p>
             <a:fld id="{67A852C0-EA74-4E50-8184-272026F38F49}" type="datetimeFigureOut">
               <a:rPr lang="en-US" smtClean="0"/>
-              <a:t>9/17/2022</a:t>
+              <a:t>9/23/2022</a:t>
             </a:fld>
             <a:endParaRPr lang="en-US"/>
           </a:p>
@@ -4206,6 +4560,666 @@
 </p:sld>
 </file>
 
+<file path=ppt/slides/slide10.xml><?xml version="1.0" encoding="utf-8"?>
+<p:sld xmlns:a="http://schemas.openxmlformats.org/drawingml/2006/main" xmlns:r="http://schemas.openxmlformats.org/officeDocument/2006/relationships" xmlns:p="http://schemas.openxmlformats.org/presentationml/2006/main">
+  <p:cSld>
+    <p:bg>
+      <p:bgPr>
+        <a:solidFill>
+          <a:schemeClr val="bg1"/>
+        </a:solidFill>
+        <a:effectLst/>
+      </p:bgPr>
+    </p:bg>
+    <p:spTree>
+      <p:nvGrpSpPr>
+        <p:cNvPr id="1" name=""/>
+        <p:cNvGrpSpPr/>
+        <p:nvPr/>
+      </p:nvGrpSpPr>
+      <p:grpSpPr>
+        <a:xfrm>
+          <a:off x="0" y="0"/>
+          <a:ext cx="0" cy="0"/>
+          <a:chOff x="0" y="0"/>
+          <a:chExt cx="0" cy="0"/>
+        </a:xfrm>
+      </p:grpSpPr>
+      <p:pic>
+        <p:nvPicPr>
+          <p:cNvPr id="9" name="Content Placeholder 8">
+            <a:extLst>
+              <a:ext uri="{FF2B5EF4-FFF2-40B4-BE49-F238E27FC236}">
+                <a16:creationId xmlns:a16="http://schemas.microsoft.com/office/drawing/2014/main" id="{F0A8748D-4CB6-4455-A14E-2E95BAC520C9}"/>
+              </a:ext>
+            </a:extLst>
+          </p:cNvPr>
+          <p:cNvPicPr>
+            <a:picLocks noGrp="1" noChangeAspect="1"/>
+          </p:cNvPicPr>
+          <p:nvPr>
+            <p:ph idx="1"/>
+          </p:nvPr>
+        </p:nvPicPr>
+        <p:blipFill rotWithShape="1">
+          <a:blip r:embed="rId2"/>
+          <a:srcRect l="3192" r="2585"/>
+          <a:stretch/>
+        </p:blipFill>
+        <p:spPr>
+          <a:xfrm>
+            <a:off x="20" y="10"/>
+            <a:ext cx="12191980" cy="6857990"/>
+          </a:xfrm>
+          <a:prstGeom prst="rect">
+            <a:avLst/>
+          </a:prstGeom>
+        </p:spPr>
+      </p:pic>
+      <p:sp>
+        <p:nvSpPr>
+          <p:cNvPr id="40" name="Freeform 5">
+            <a:extLst>
+              <a:ext uri="{FF2B5EF4-FFF2-40B4-BE49-F238E27FC236}">
+                <a16:creationId xmlns:a16="http://schemas.microsoft.com/office/drawing/2014/main" id="{87CC2527-562A-4F69-B487-4371E5B243E7}"/>
+              </a:ext>
+              <a:ext uri="{C183D7F6-B498-43B3-948B-1728B52AA6E4}">
+                <adec:decorative xmlns:adec="http://schemas.microsoft.com/office/drawing/2017/decorative" val="1"/>
+              </a:ext>
+            </a:extLst>
+          </p:cNvPr>
+          <p:cNvSpPr>
+            <a:spLocks noGrp="1" noRot="1" noChangeAspect="1" noMove="1" noResize="1" noEditPoints="1" noAdjustHandles="1" noChangeArrowheads="1" noChangeShapeType="1" noTextEdit="1"/>
+          </p:cNvSpPr>
+          <p:nvPr>
+            <p:extLst>
+              <p:ext uri="{386F3935-93C4-4BCD-93E2-E3B085C9AB24}">
+                <p16:designElem xmlns:p16="http://schemas.microsoft.com/office/powerpoint/2015/main" val="1"/>
+              </p:ext>
+            </p:extLst>
+          </p:nvPr>
+        </p:nvSpPr>
+        <p:spPr bwMode="grayWhite">
+          <a:xfrm>
+            <a:off x="7488621" y="2277613"/>
+            <a:ext cx="4703379" cy="4580387"/>
+          </a:xfrm>
+          <a:custGeom>
+            <a:avLst/>
+            <a:gdLst>
+              <a:gd name="T0" fmla="*/ 1333 w 1333"/>
+              <a:gd name="T1" fmla="*/ 1031 h 1298"/>
+              <a:gd name="T2" fmla="*/ 1333 w 1333"/>
+              <a:gd name="T3" fmla="*/ 380 h 1298"/>
+              <a:gd name="T4" fmla="*/ 706 w 1333"/>
+              <a:gd name="T5" fmla="*/ 0 h 1298"/>
+              <a:gd name="T6" fmla="*/ 0 w 1333"/>
+              <a:gd name="T7" fmla="*/ 706 h 1298"/>
+              <a:gd name="T8" fmla="*/ 323 w 1333"/>
+              <a:gd name="T9" fmla="*/ 1298 h 1298"/>
+              <a:gd name="T10" fmla="*/ 1090 w 1333"/>
+              <a:gd name="T11" fmla="*/ 1298 h 1298"/>
+              <a:gd name="T12" fmla="*/ 1333 w 1333"/>
+              <a:gd name="T13" fmla="*/ 1031 h 1298"/>
+            </a:gdLst>
+            <a:ahLst/>
+            <a:cxnLst>
+              <a:cxn ang="0">
+                <a:pos x="T0" y="T1"/>
+              </a:cxn>
+              <a:cxn ang="0">
+                <a:pos x="T2" y="T3"/>
+              </a:cxn>
+              <a:cxn ang="0">
+                <a:pos x="T4" y="T5"/>
+              </a:cxn>
+              <a:cxn ang="0">
+                <a:pos x="T6" y="T7"/>
+              </a:cxn>
+              <a:cxn ang="0">
+                <a:pos x="T8" y="T9"/>
+              </a:cxn>
+              <a:cxn ang="0">
+                <a:pos x="T10" y="T11"/>
+              </a:cxn>
+              <a:cxn ang="0">
+                <a:pos x="T12" y="T13"/>
+              </a:cxn>
+            </a:cxnLst>
+            <a:rect l="0" t="0" r="r" b="b"/>
+            <a:pathLst>
+              <a:path w="1333" h="1298">
+                <a:moveTo>
+                  <a:pt x="1333" y="1031"/>
+                </a:moveTo>
+                <a:cubicBezTo>
+                  <a:pt x="1333" y="380"/>
+                  <a:pt x="1333" y="380"/>
+                  <a:pt x="1333" y="380"/>
+                </a:cubicBezTo>
+                <a:cubicBezTo>
+                  <a:pt x="1215" y="154"/>
+                  <a:pt x="979" y="0"/>
+                  <a:pt x="706" y="0"/>
+                </a:cubicBezTo>
+                <a:cubicBezTo>
+                  <a:pt x="317" y="0"/>
+                  <a:pt x="0" y="316"/>
+                  <a:pt x="0" y="706"/>
+                </a:cubicBezTo>
+                <a:cubicBezTo>
+                  <a:pt x="0" y="954"/>
+                  <a:pt x="129" y="1172"/>
+                  <a:pt x="323" y="1298"/>
+                </a:cubicBezTo>
+                <a:cubicBezTo>
+                  <a:pt x="1090" y="1298"/>
+                  <a:pt x="1090" y="1298"/>
+                  <a:pt x="1090" y="1298"/>
+                </a:cubicBezTo>
+                <a:cubicBezTo>
+                  <a:pt x="1193" y="1232"/>
+                  <a:pt x="1276" y="1140"/>
+                  <a:pt x="1333" y="1031"/>
+                </a:cubicBezTo>
+                <a:close/>
+              </a:path>
+            </a:pathLst>
+          </a:custGeom>
+          <a:solidFill>
+            <a:schemeClr val="bg1">
+              <a:alpha val="70000"/>
+            </a:schemeClr>
+          </a:solidFill>
+          <a:ln w="50800" cap="sq" cmpd="dbl">
+            <a:noFill/>
+            <a:miter lim="800000"/>
+          </a:ln>
+          <a:effectLst/>
+        </p:spPr>
+        <p:txBody>
+          <a:bodyPr vert="horz" lIns="91440" tIns="45720" rIns="91440" bIns="45720" rtlCol="0" anchor="t">
+            <a:normAutofit/>
+          </a:bodyPr>
+          <a:lstStyle/>
+          <a:p>
+            <a:pPr algn="ctr">
+              <a:spcAft>
+                <a:spcPts val="1000"/>
+              </a:spcAft>
+              <a:buClr>
+                <a:schemeClr val="tx1"/>
+              </a:buClr>
+              <a:buSzPct val="100000"/>
+              <a:buFont typeface="Arial"/>
+              <a:buNone/>
+            </a:pPr>
+            <a:endParaRPr lang="en-US" sz="1600" cap="all"/>
+          </a:p>
+        </p:txBody>
+      </p:sp>
+      <p:sp>
+        <p:nvSpPr>
+          <p:cNvPr id="2" name="Title 1">
+            <a:extLst>
+              <a:ext uri="{FF2B5EF4-FFF2-40B4-BE49-F238E27FC236}">
+                <a16:creationId xmlns:a16="http://schemas.microsoft.com/office/drawing/2014/main" id="{0C8C6AFF-E9A9-43B4-B517-975D08576E4B}"/>
+              </a:ext>
+            </a:extLst>
+          </p:cNvPr>
+          <p:cNvSpPr>
+            <a:spLocks noGrp="1"/>
+          </p:cNvSpPr>
+          <p:nvPr>
+            <p:ph type="title"/>
+          </p:nvPr>
+        </p:nvSpPr>
+        <p:spPr>
+          <a:xfrm>
+            <a:off x="8022021" y="3231931"/>
+            <a:ext cx="3852041" cy="1834056"/>
+          </a:xfrm>
+        </p:spPr>
+        <p:txBody>
+          <a:bodyPr vert="horz" lIns="91440" tIns="45720" rIns="91440" bIns="45720" rtlCol="0" anchor="b">
+            <a:normAutofit/>
+          </a:bodyPr>
+          <a:lstStyle/>
+          <a:p>
+            <a:pPr algn="ctr"/>
+            <a:r>
+              <a:rPr lang="en-US" sz="4000"/>
+              <a:t>PCB Renderings</a:t>
+            </a:r>
+          </a:p>
+        </p:txBody>
+      </p:sp>
+      <p:cxnSp>
+        <p:nvCxnSpPr>
+          <p:cNvPr id="42" name="Straight Connector 41">
+            <a:extLst>
+              <a:ext uri="{FF2B5EF4-FFF2-40B4-BE49-F238E27FC236}">
+                <a16:creationId xmlns:a16="http://schemas.microsoft.com/office/drawing/2014/main" id="{BCDAEC91-5BCE-4B55-9CC0-43EF94CB734B}"/>
+              </a:ext>
+              <a:ext uri="{C183D7F6-B498-43B3-948B-1728B52AA6E4}">
+                <adec:decorative xmlns:adec="http://schemas.microsoft.com/office/drawing/2017/decorative" val="1"/>
+              </a:ext>
+            </a:extLst>
+          </p:cNvPr>
+          <p:cNvCxnSpPr>
+            <a:cxnSpLocks noGrp="1" noRot="1" noChangeAspect="1" noMove="1" noResize="1" noEditPoints="1" noAdjustHandles="1" noChangeArrowheads="1" noChangeShapeType="1"/>
+          </p:cNvCxnSpPr>
+          <p:nvPr>
+            <p:extLst>
+              <p:ext uri="{386F3935-93C4-4BCD-93E2-E3B085C9AB24}">
+                <p16:designElem xmlns:p16="http://schemas.microsoft.com/office/powerpoint/2015/main" val="1"/>
+              </p:ext>
+            </p:extLst>
+          </p:nvPr>
+        </p:nvCxnSpPr>
+        <p:spPr>
+          <a:xfrm>
+            <a:off x="9480331" y="5123793"/>
+            <a:ext cx="935420" cy="0"/>
+          </a:xfrm>
+          <a:prstGeom prst="line">
+            <a:avLst/>
+          </a:prstGeom>
+          <a:ln w="25400" cap="sq">
+            <a:solidFill>
+              <a:schemeClr val="tx1">
+                <a:lumMod val="85000"/>
+                <a:lumOff val="15000"/>
+              </a:schemeClr>
+            </a:solidFill>
+            <a:bevel/>
+          </a:ln>
+        </p:spPr>
+        <p:style>
+          <a:lnRef idx="1">
+            <a:schemeClr val="accent1"/>
+          </a:lnRef>
+          <a:fillRef idx="0">
+            <a:schemeClr val="accent1"/>
+          </a:fillRef>
+          <a:effectRef idx="0">
+            <a:schemeClr val="accent1"/>
+          </a:effectRef>
+          <a:fontRef idx="minor">
+            <a:schemeClr val="tx1"/>
+          </a:fontRef>
+        </p:style>
+      </p:cxnSp>
+    </p:spTree>
+    <p:extLst>
+      <p:ext uri="{BB962C8B-B14F-4D97-AF65-F5344CB8AC3E}">
+        <p14:creationId xmlns:p14="http://schemas.microsoft.com/office/powerpoint/2010/main" val="1648650677"/>
+      </p:ext>
+    </p:extLst>
+  </p:cSld>
+  <p:clrMapOvr>
+    <a:masterClrMapping/>
+  </p:clrMapOvr>
+</p:sld>
+</file>
+
+<file path=ppt/slides/slide11.xml><?xml version="1.0" encoding="utf-8"?>
+<p:sld xmlns:a="http://schemas.openxmlformats.org/drawingml/2006/main" xmlns:r="http://schemas.openxmlformats.org/officeDocument/2006/relationships" xmlns:p="http://schemas.openxmlformats.org/presentationml/2006/main">
+  <p:cSld>
+    <p:bg>
+      <p:bgPr>
+        <a:solidFill>
+          <a:schemeClr val="bg1"/>
+        </a:solidFill>
+        <a:effectLst/>
+      </p:bgPr>
+    </p:bg>
+    <p:spTree>
+      <p:nvGrpSpPr>
+        <p:cNvPr id="1" name=""/>
+        <p:cNvGrpSpPr/>
+        <p:nvPr/>
+      </p:nvGrpSpPr>
+      <p:grpSpPr>
+        <a:xfrm>
+          <a:off x="0" y="0"/>
+          <a:ext cx="0" cy="0"/>
+          <a:chOff x="0" y="0"/>
+          <a:chExt cx="0" cy="0"/>
+        </a:xfrm>
+      </p:grpSpPr>
+      <p:pic>
+        <p:nvPicPr>
+          <p:cNvPr id="20" name="Picture 19">
+            <a:extLst>
+              <a:ext uri="{FF2B5EF4-FFF2-40B4-BE49-F238E27FC236}">
+                <a16:creationId xmlns:a16="http://schemas.microsoft.com/office/drawing/2014/main" id="{C9C5D536-A808-4F4E-BCB0-453064106D48}"/>
+              </a:ext>
+            </a:extLst>
+          </p:cNvPr>
+          <p:cNvPicPr>
+            <a:picLocks noChangeAspect="1"/>
+          </p:cNvPicPr>
+          <p:nvPr/>
+        </p:nvPicPr>
+        <p:blipFill>
+          <a:blip r:embed="rId2"/>
+          <a:stretch>
+            <a:fillRect/>
+          </a:stretch>
+        </p:blipFill>
+        <p:spPr>
+          <a:xfrm>
+            <a:off x="457202" y="865336"/>
+            <a:ext cx="5426764" cy="1817965"/>
+          </a:xfrm>
+          <a:prstGeom prst="rect">
+            <a:avLst/>
+          </a:prstGeom>
+        </p:spPr>
+      </p:pic>
+      <p:sp>
+        <p:nvSpPr>
+          <p:cNvPr id="37" name="Rectangle 33">
+            <a:extLst>
+              <a:ext uri="{FF2B5EF4-FFF2-40B4-BE49-F238E27FC236}">
+                <a16:creationId xmlns:a16="http://schemas.microsoft.com/office/drawing/2014/main" id="{417CDA24-35F8-4540-8C52-3096D6D94949}"/>
+              </a:ext>
+              <a:ext uri="{C183D7F6-B498-43B3-948B-1728B52AA6E4}">
+                <adec:decorative xmlns:adec="http://schemas.microsoft.com/office/drawing/2017/decorative" val="1"/>
+              </a:ext>
+            </a:extLst>
+          </p:cNvPr>
+          <p:cNvSpPr>
+            <a:spLocks noGrp="1" noRot="1" noChangeAspect="1" noMove="1" noResize="1" noEditPoints="1" noAdjustHandles="1" noChangeArrowheads="1" noChangeShapeType="1" noTextEdit="1"/>
+          </p:cNvSpPr>
+          <p:nvPr>
+            <p:extLst>
+              <p:ext uri="{386F3935-93C4-4BCD-93E2-E3B085C9AB24}">
+                <p16:designElem xmlns:p16="http://schemas.microsoft.com/office/powerpoint/2015/main" val="1"/>
+              </p:ext>
+            </p:extLst>
+          </p:nvPr>
+        </p:nvSpPr>
+        <p:spPr>
+          <a:xfrm>
+            <a:off x="6050280" y="0"/>
+            <a:ext cx="91440" cy="6858000"/>
+          </a:xfrm>
+          <a:prstGeom prst="rect">
+            <a:avLst/>
+          </a:prstGeom>
+          <a:solidFill>
+            <a:schemeClr val="tx1">
+              <a:lumMod val="75000"/>
+              <a:lumOff val="25000"/>
+            </a:schemeClr>
+          </a:solidFill>
+          <a:ln>
+            <a:noFill/>
+          </a:ln>
+        </p:spPr>
+        <p:style>
+          <a:lnRef idx="2">
+            <a:schemeClr val="accent1">
+              <a:shade val="50000"/>
+            </a:schemeClr>
+          </a:lnRef>
+          <a:fillRef idx="1">
+            <a:schemeClr val="accent1"/>
+          </a:fillRef>
+          <a:effectRef idx="0">
+            <a:schemeClr val="accent1"/>
+          </a:effectRef>
+          <a:fontRef idx="minor">
+            <a:schemeClr val="lt1"/>
+          </a:fontRef>
+        </p:style>
+        <p:txBody>
+          <a:bodyPr rtlCol="0" anchor="ctr"/>
+          <a:lstStyle/>
+          <a:p>
+            <a:pPr algn="ctr"/>
+            <a:endParaRPr lang="en-US"/>
+          </a:p>
+        </p:txBody>
+      </p:sp>
+      <p:pic>
+        <p:nvPicPr>
+          <p:cNvPr id="9" name="Content Placeholder 8">
+            <a:extLst>
+              <a:ext uri="{FF2B5EF4-FFF2-40B4-BE49-F238E27FC236}">
+                <a16:creationId xmlns:a16="http://schemas.microsoft.com/office/drawing/2014/main" id="{E2A0AC08-26FE-4F55-B424-97D6957CB076}"/>
+              </a:ext>
+            </a:extLst>
+          </p:cNvPr>
+          <p:cNvPicPr>
+            <a:picLocks noGrp="1" noChangeAspect="1"/>
+          </p:cNvPicPr>
+          <p:nvPr>
+            <p:ph idx="1"/>
+          </p:nvPr>
+        </p:nvPicPr>
+        <p:blipFill rotWithShape="1">
+          <a:blip r:embed="rId3"/>
+          <a:srcRect t="1765"/>
+          <a:stretch/>
+        </p:blipFill>
+        <p:spPr>
+          <a:xfrm>
+            <a:off x="6308034" y="336669"/>
+            <a:ext cx="5112595" cy="2875300"/>
+          </a:xfrm>
+          <a:prstGeom prst="rect">
+            <a:avLst/>
+          </a:prstGeom>
+        </p:spPr>
+      </p:pic>
+      <p:sp>
+        <p:nvSpPr>
+          <p:cNvPr id="36" name="Rectangle 35">
+            <a:extLst>
+              <a:ext uri="{FF2B5EF4-FFF2-40B4-BE49-F238E27FC236}">
+                <a16:creationId xmlns:a16="http://schemas.microsoft.com/office/drawing/2014/main" id="{8658BFE0-4E65-4174-9C75-687C94E88273}"/>
+              </a:ext>
+              <a:ext uri="{C183D7F6-B498-43B3-948B-1728B52AA6E4}">
+                <adec:decorative xmlns:adec="http://schemas.microsoft.com/office/drawing/2017/decorative" val="1"/>
+              </a:ext>
+            </a:extLst>
+          </p:cNvPr>
+          <p:cNvSpPr>
+            <a:spLocks noGrp="1" noRot="1" noChangeAspect="1" noMove="1" noResize="1" noEditPoints="1" noAdjustHandles="1" noChangeArrowheads="1" noChangeShapeType="1" noTextEdit="1"/>
+          </p:cNvSpPr>
+          <p:nvPr>
+            <p:extLst>
+              <p:ext uri="{386F3935-93C4-4BCD-93E2-E3B085C9AB24}">
+                <p16:designElem xmlns:p16="http://schemas.microsoft.com/office/powerpoint/2015/main" val="1"/>
+              </p:ext>
+            </p:extLst>
+          </p:nvPr>
+        </p:nvSpPr>
+        <p:spPr>
+          <a:xfrm>
+            <a:off x="0" y="3383280"/>
+            <a:ext cx="6126480" cy="91440"/>
+          </a:xfrm>
+          <a:prstGeom prst="rect">
+            <a:avLst/>
+          </a:prstGeom>
+          <a:solidFill>
+            <a:schemeClr val="tx1">
+              <a:lumMod val="75000"/>
+              <a:lumOff val="25000"/>
+            </a:schemeClr>
+          </a:solidFill>
+          <a:ln>
+            <a:noFill/>
+          </a:ln>
+        </p:spPr>
+        <p:style>
+          <a:lnRef idx="2">
+            <a:schemeClr val="accent1">
+              <a:shade val="50000"/>
+            </a:schemeClr>
+          </a:lnRef>
+          <a:fillRef idx="1">
+            <a:schemeClr val="accent1"/>
+          </a:fillRef>
+          <a:effectRef idx="0">
+            <a:schemeClr val="accent1"/>
+          </a:effectRef>
+          <a:fontRef idx="minor">
+            <a:schemeClr val="lt1"/>
+          </a:fontRef>
+        </p:style>
+        <p:txBody>
+          <a:bodyPr rtlCol="0" anchor="ctr"/>
+          <a:lstStyle/>
+          <a:p>
+            <a:pPr algn="ctr"/>
+            <a:endParaRPr lang="en-US"/>
+          </a:p>
+        </p:txBody>
+      </p:sp>
+      <p:sp>
+        <p:nvSpPr>
+          <p:cNvPr id="38" name="Rectangle 37">
+            <a:extLst>
+              <a:ext uri="{FF2B5EF4-FFF2-40B4-BE49-F238E27FC236}">
+                <a16:creationId xmlns:a16="http://schemas.microsoft.com/office/drawing/2014/main" id="{FA75DFED-A0C1-4A83-BE1D-0271C1826EF6}"/>
+              </a:ext>
+              <a:ext uri="{C183D7F6-B498-43B3-948B-1728B52AA6E4}">
+                <adec:decorative xmlns:adec="http://schemas.microsoft.com/office/drawing/2017/decorative" val="1"/>
+              </a:ext>
+            </a:extLst>
+          </p:cNvPr>
+          <p:cNvSpPr>
+            <a:spLocks noGrp="1" noRot="1" noChangeAspect="1" noMove="1" noResize="1" noEditPoints="1" noAdjustHandles="1" noChangeArrowheads="1" noChangeShapeType="1" noTextEdit="1"/>
+          </p:cNvSpPr>
+          <p:nvPr>
+            <p:extLst>
+              <p:ext uri="{386F3935-93C4-4BCD-93E2-E3B085C9AB24}">
+                <p16:designElem xmlns:p16="http://schemas.microsoft.com/office/powerpoint/2015/main" val="1"/>
+              </p:ext>
+            </p:extLst>
+          </p:nvPr>
+        </p:nvSpPr>
+        <p:spPr>
+          <a:xfrm>
+            <a:off x="6065520" y="3383280"/>
+            <a:ext cx="6126480" cy="91440"/>
+          </a:xfrm>
+          <a:prstGeom prst="rect">
+            <a:avLst/>
+          </a:prstGeom>
+          <a:solidFill>
+            <a:schemeClr val="tx1">
+              <a:lumMod val="75000"/>
+              <a:lumOff val="25000"/>
+            </a:schemeClr>
+          </a:solidFill>
+          <a:ln>
+            <a:noFill/>
+          </a:ln>
+        </p:spPr>
+        <p:style>
+          <a:lnRef idx="2">
+            <a:schemeClr val="accent1">
+              <a:shade val="50000"/>
+            </a:schemeClr>
+          </a:lnRef>
+          <a:fillRef idx="1">
+            <a:schemeClr val="accent1"/>
+          </a:fillRef>
+          <a:effectRef idx="0">
+            <a:schemeClr val="accent1"/>
+          </a:effectRef>
+          <a:fontRef idx="minor">
+            <a:schemeClr val="lt1"/>
+          </a:fontRef>
+        </p:style>
+        <p:txBody>
+          <a:bodyPr rtlCol="0" anchor="ctr"/>
+          <a:lstStyle/>
+          <a:p>
+            <a:pPr algn="ctr"/>
+            <a:endParaRPr lang="en-US"/>
+          </a:p>
+        </p:txBody>
+      </p:sp>
+      <p:pic>
+        <p:nvPicPr>
+          <p:cNvPr id="18" name="Picture 17">
+            <a:extLst>
+              <a:ext uri="{FF2B5EF4-FFF2-40B4-BE49-F238E27FC236}">
+                <a16:creationId xmlns:a16="http://schemas.microsoft.com/office/drawing/2014/main" id="{559FEB88-047A-4626-910A-A7AC46B2F198}"/>
+              </a:ext>
+            </a:extLst>
+          </p:cNvPr>
+          <p:cNvPicPr>
+            <a:picLocks noChangeAspect="1"/>
+          </p:cNvPicPr>
+          <p:nvPr/>
+        </p:nvPicPr>
+        <p:blipFill>
+          <a:blip r:embed="rId4"/>
+          <a:stretch>
+            <a:fillRect/>
+          </a:stretch>
+        </p:blipFill>
+        <p:spPr>
+          <a:xfrm>
+            <a:off x="457201" y="4522967"/>
+            <a:ext cx="5426764" cy="976817"/>
+          </a:xfrm>
+          <a:prstGeom prst="rect">
+            <a:avLst/>
+          </a:prstGeom>
+        </p:spPr>
+      </p:pic>
+      <p:pic>
+        <p:nvPicPr>
+          <p:cNvPr id="15" name="Picture 14">
+            <a:extLst>
+              <a:ext uri="{FF2B5EF4-FFF2-40B4-BE49-F238E27FC236}">
+                <a16:creationId xmlns:a16="http://schemas.microsoft.com/office/drawing/2014/main" id="{978A62CB-7651-4156-8C47-4B928A5B8594}"/>
+              </a:ext>
+            </a:extLst>
+          </p:cNvPr>
+          <p:cNvPicPr>
+            <a:picLocks noChangeAspect="1"/>
+          </p:cNvPicPr>
+          <p:nvPr/>
+        </p:nvPicPr>
+        <p:blipFill>
+          <a:blip r:embed="rId5"/>
+          <a:stretch>
+            <a:fillRect/>
+          </a:stretch>
+        </p:blipFill>
+        <p:spPr>
+          <a:xfrm>
+            <a:off x="6308034" y="4001639"/>
+            <a:ext cx="5112595" cy="2019474"/>
+          </a:xfrm>
+          <a:prstGeom prst="rect">
+            <a:avLst/>
+          </a:prstGeom>
+        </p:spPr>
+      </p:pic>
+    </p:spTree>
+    <p:extLst>
+      <p:ext uri="{BB962C8B-B14F-4D97-AF65-F5344CB8AC3E}">
+        <p14:creationId xmlns:p14="http://schemas.microsoft.com/office/powerpoint/2010/main" val="1631153373"/>
+      </p:ext>
+    </p:extLst>
+  </p:cSld>
+  <p:clrMapOvr>
+    <a:masterClrMapping/>
+  </p:clrMapOvr>
+</p:sld>
+</file>
+
 <file path=ppt/slides/slide2.xml><?xml version="1.0" encoding="utf-8"?>
 <p:sld xmlns:a="http://schemas.openxmlformats.org/drawingml/2006/main" xmlns:r="http://schemas.openxmlformats.org/officeDocument/2006/relationships" xmlns:p="http://schemas.openxmlformats.org/presentationml/2006/main">
   <p:cSld>
@@ -10961,10 +11975,10 @@
       </p:grpSpPr>
       <p:sp useBgFill="1">
         <p:nvSpPr>
-          <p:cNvPr id="24" name="Rectangle 23">
-            <a:extLst>
-              <a:ext uri="{FF2B5EF4-FFF2-40B4-BE49-F238E27FC236}">
-                <a16:creationId xmlns:a16="http://schemas.microsoft.com/office/drawing/2014/main" id="{90D01200-0224-43C5-AB38-FB4D16B73FB7}"/>
+          <p:cNvPr id="12" name="Rectangle 11">
+            <a:extLst>
+              <a:ext uri="{FF2B5EF4-FFF2-40B4-BE49-F238E27FC236}">
+                <a16:creationId xmlns:a16="http://schemas.microsoft.com/office/drawing/2014/main" id="{69D47016-023F-44BD-981C-50E7A10A6609}"/>
               </a:ext>
               <a:ext uri="{C183D7F6-B498-43B3-948B-1728B52AA6E4}">
                 <adec:decorative xmlns:adec="http://schemas.microsoft.com/office/drawing/2017/decorative" val="1"/>
@@ -10985,7 +11999,7 @@
         <p:spPr>
           <a:xfrm>
             <a:off x="0" y="0"/>
-            <a:ext cx="12192000" cy="6858000"/>
+            <a:ext cx="12188952" cy="6858000"/>
           </a:xfrm>
           <a:prstGeom prst="rect">
             <a:avLst/>
@@ -11015,7 +12029,7 @@
           <a:lstStyle/>
           <a:p>
             <a:pPr algn="ctr"/>
-            <a:endParaRPr lang="en-US"/>
+            <a:endParaRPr lang="en-US" dirty="0"/>
           </a:p>
         </p:txBody>
       </p:sp>
@@ -11024,7 +12038,7 @@
           <p:cNvPr id="2" name="Title 1">
             <a:extLst>
               <a:ext uri="{FF2B5EF4-FFF2-40B4-BE49-F238E27FC236}">
-                <a16:creationId xmlns:a16="http://schemas.microsoft.com/office/drawing/2014/main" id="{0C8C6AFF-E9A9-43B4-B517-975D08576E4B}"/>
+                <a16:creationId xmlns:a16="http://schemas.microsoft.com/office/drawing/2014/main" id="{91ED5298-EE2D-4474-B0CE-C9D6184ABAB1}"/>
               </a:ext>
             </a:extLst>
           </p:cNvPr>
@@ -11037,29 +12051,29 @@
         </p:nvSpPr>
         <p:spPr>
           <a:xfrm>
-            <a:off x="612648" y="1078992"/>
-            <a:ext cx="6268770" cy="1536192"/>
+            <a:off x="630936" y="457200"/>
+            <a:ext cx="4343400" cy="1929384"/>
           </a:xfrm>
         </p:spPr>
         <p:txBody>
-          <a:bodyPr anchor="b">
+          <a:bodyPr anchor="ctr">
             <a:normAutofit/>
           </a:bodyPr>
           <a:lstStyle/>
           <a:p>
             <a:r>
-              <a:rPr lang="en-US" sz="5200" dirty="0"/>
-              <a:t>PCB Renderings</a:t>
+              <a:rPr lang="en-US" sz="4800" dirty="0"/>
+              <a:t>Improved LEDs</a:t>
             </a:r>
           </a:p>
         </p:txBody>
       </p:sp>
       <p:sp>
         <p:nvSpPr>
-          <p:cNvPr id="26" name="Rectangle 25">
-            <a:extLst>
-              <a:ext uri="{FF2B5EF4-FFF2-40B4-BE49-F238E27FC236}">
-                <a16:creationId xmlns:a16="http://schemas.microsoft.com/office/drawing/2014/main" id="{728A44A4-A002-4A88-9FC9-1D0566C97A47}"/>
+          <p:cNvPr id="14" name="sketchy line">
+            <a:extLst>
+              <a:ext uri="{FF2B5EF4-FFF2-40B4-BE49-F238E27FC236}">
+                <a16:creationId xmlns:a16="http://schemas.microsoft.com/office/drawing/2014/main" id="{6D8B37B0-0682-433E-BC8D-498C04ABD9A7}"/>
               </a:ext>
               <a:ext uri="{C183D7F6-B498-43B3-948B-1728B52AA6E4}">
                 <adec:decorative xmlns:adec="http://schemas.microsoft.com/office/drawing/2017/decorative" val="1"/>
@@ -11079,17 +12093,177 @@
         </p:nvSpPr>
         <p:spPr>
           <a:xfrm rot="5400000">
-            <a:off x="853202" y="363389"/>
-            <a:ext cx="73152" cy="548640"/>
+            <a:off x="4471415" y="1412748"/>
+            <a:ext cx="1554480" cy="18288"/>
           </a:xfrm>
-          <a:prstGeom prst="rect">
+          <a:custGeom>
             <a:avLst/>
-          </a:prstGeom>
+            <a:gdLst>
+              <a:gd name="connsiteX0" fmla="*/ 0 w 1554480"/>
+              <a:gd name="connsiteY0" fmla="*/ 0 h 18288"/>
+              <a:gd name="connsiteX1" fmla="*/ 549250 w 1554480"/>
+              <a:gd name="connsiteY1" fmla="*/ 0 h 18288"/>
+              <a:gd name="connsiteX2" fmla="*/ 1082954 w 1554480"/>
+              <a:gd name="connsiteY2" fmla="*/ 0 h 18288"/>
+              <a:gd name="connsiteX3" fmla="*/ 1554480 w 1554480"/>
+              <a:gd name="connsiteY3" fmla="*/ 0 h 18288"/>
+              <a:gd name="connsiteX4" fmla="*/ 1554480 w 1554480"/>
+              <a:gd name="connsiteY4" fmla="*/ 18288 h 18288"/>
+              <a:gd name="connsiteX5" fmla="*/ 1067410 w 1554480"/>
+              <a:gd name="connsiteY5" fmla="*/ 18288 h 18288"/>
+              <a:gd name="connsiteX6" fmla="*/ 549250 w 1554480"/>
+              <a:gd name="connsiteY6" fmla="*/ 18288 h 18288"/>
+              <a:gd name="connsiteX7" fmla="*/ 0 w 1554480"/>
+              <a:gd name="connsiteY7" fmla="*/ 18288 h 18288"/>
+              <a:gd name="connsiteX8" fmla="*/ 0 w 1554480"/>
+              <a:gd name="connsiteY8" fmla="*/ 0 h 18288"/>
+            </a:gdLst>
+            <a:ahLst/>
+            <a:cxnLst>
+              <a:cxn ang="0">
+                <a:pos x="connsiteX0" y="connsiteY0"/>
+              </a:cxn>
+              <a:cxn ang="0">
+                <a:pos x="connsiteX1" y="connsiteY1"/>
+              </a:cxn>
+              <a:cxn ang="0">
+                <a:pos x="connsiteX2" y="connsiteY2"/>
+              </a:cxn>
+              <a:cxn ang="0">
+                <a:pos x="connsiteX3" y="connsiteY3"/>
+              </a:cxn>
+              <a:cxn ang="0">
+                <a:pos x="connsiteX4" y="connsiteY4"/>
+              </a:cxn>
+              <a:cxn ang="0">
+                <a:pos x="connsiteX5" y="connsiteY5"/>
+              </a:cxn>
+              <a:cxn ang="0">
+                <a:pos x="connsiteX6" y="connsiteY6"/>
+              </a:cxn>
+              <a:cxn ang="0">
+                <a:pos x="connsiteX7" y="connsiteY7"/>
+              </a:cxn>
+              <a:cxn ang="0">
+                <a:pos x="connsiteX8" y="connsiteY8"/>
+              </a:cxn>
+            </a:cxnLst>
+            <a:rect l="l" t="t" r="r" b="b"/>
+            <a:pathLst>
+              <a:path w="1554480" h="18288" fill="none" extrusionOk="0">
+                <a:moveTo>
+                  <a:pt x="0" y="0"/>
+                </a:moveTo>
+                <a:cubicBezTo>
+                  <a:pt x="114141" y="-19864"/>
+                  <a:pt x="345055" y="-1657"/>
+                  <a:pt x="549250" y="0"/>
+                </a:cubicBezTo>
+                <a:cubicBezTo>
+                  <a:pt x="753445" y="1657"/>
+                  <a:pt x="862292" y="-5674"/>
+                  <a:pt x="1082954" y="0"/>
+                </a:cubicBezTo>
+                <a:cubicBezTo>
+                  <a:pt x="1303616" y="5674"/>
+                  <a:pt x="1363530" y="4537"/>
+                  <a:pt x="1554480" y="0"/>
+                </a:cubicBezTo>
+                <a:cubicBezTo>
+                  <a:pt x="1554963" y="7176"/>
+                  <a:pt x="1553909" y="13682"/>
+                  <a:pt x="1554480" y="18288"/>
+                </a:cubicBezTo>
+                <a:cubicBezTo>
+                  <a:pt x="1338847" y="6127"/>
+                  <a:pt x="1215066" y="37851"/>
+                  <a:pt x="1067410" y="18288"/>
+                </a:cubicBezTo>
+                <a:cubicBezTo>
+                  <a:pt x="919754" y="-1275"/>
+                  <a:pt x="800465" y="3080"/>
+                  <a:pt x="549250" y="18288"/>
+                </a:cubicBezTo>
+                <a:cubicBezTo>
+                  <a:pt x="298035" y="33496"/>
+                  <a:pt x="158868" y="22769"/>
+                  <a:pt x="0" y="18288"/>
+                </a:cubicBezTo>
+                <a:cubicBezTo>
+                  <a:pt x="-655" y="13237"/>
+                  <a:pt x="709" y="4645"/>
+                  <a:pt x="0" y="0"/>
+                </a:cubicBezTo>
+                <a:close/>
+              </a:path>
+              <a:path w="1554480" h="18288" stroke="0" extrusionOk="0">
+                <a:moveTo>
+                  <a:pt x="0" y="0"/>
+                </a:moveTo>
+                <a:cubicBezTo>
+                  <a:pt x="249941" y="-58"/>
+                  <a:pt x="367334" y="23448"/>
+                  <a:pt x="502615" y="0"/>
+                </a:cubicBezTo>
+                <a:cubicBezTo>
+                  <a:pt x="637897" y="-23448"/>
+                  <a:pt x="813653" y="-20418"/>
+                  <a:pt x="974141" y="0"/>
+                </a:cubicBezTo>
+                <a:cubicBezTo>
+                  <a:pt x="1134629" y="20418"/>
+                  <a:pt x="1268772" y="6288"/>
+                  <a:pt x="1554480" y="0"/>
+                </a:cubicBezTo>
+                <a:cubicBezTo>
+                  <a:pt x="1554917" y="7222"/>
+                  <a:pt x="1555359" y="13299"/>
+                  <a:pt x="1554480" y="18288"/>
+                </a:cubicBezTo>
+                <a:cubicBezTo>
+                  <a:pt x="1336087" y="12172"/>
+                  <a:pt x="1310024" y="19759"/>
+                  <a:pt x="1067410" y="18288"/>
+                </a:cubicBezTo>
+                <a:cubicBezTo>
+                  <a:pt x="824796" y="16818"/>
+                  <a:pt x="787902" y="34647"/>
+                  <a:pt x="518160" y="18288"/>
+                </a:cubicBezTo>
+                <a:cubicBezTo>
+                  <a:pt x="248418" y="1930"/>
+                  <a:pt x="133160" y="9205"/>
+                  <a:pt x="0" y="18288"/>
+                </a:cubicBezTo>
+                <a:cubicBezTo>
+                  <a:pt x="-643" y="9451"/>
+                  <a:pt x="-340" y="7114"/>
+                  <a:pt x="0" y="0"/>
+                </a:cubicBezTo>
+                <a:close/>
+              </a:path>
+            </a:pathLst>
+          </a:custGeom>
           <a:solidFill>
             <a:schemeClr val="accent2"/>
           </a:solidFill>
-          <a:ln>
-            <a:noFill/>
+          <a:ln w="41275" cap="rnd">
+            <a:solidFill>
+              <a:schemeClr val="accent2"/>
+            </a:solidFill>
+            <a:round/>
+            <a:extLst>
+              <a:ext uri="{C807C97D-BFC1-408E-A445-0C87EB9F89A2}">
+                <ask:lineSketchStyleProps xmlns:ask="http://schemas.microsoft.com/office/drawing/2018/sketchyshapes" sd="1219033472">
+                  <a:prstGeom prst="rect">
+                    <a:avLst/>
+                  </a:prstGeom>
+                  <ask:type>
+                    <ask:lineSketchFreehand/>
+                  </ask:type>
+                </ask:lineSketchStyleProps>
+              </a:ext>
+            </a:extLst>
           </a:ln>
         </p:spPr>
         <p:style>
@@ -11113,90 +12287,16 @@
           <a:lstStyle/>
           <a:p>
             <a:pPr algn="ctr"/>
-            <a:endParaRPr lang="en-US">
-              <a:solidFill>
-                <a:prstClr val="white"/>
-              </a:solidFill>
-              <a:latin typeface="Calibri" panose="020F0502020204030204"/>
-            </a:endParaRPr>
+            <a:endParaRPr lang="en-US"/>
           </a:p>
         </p:txBody>
       </p:sp>
       <p:sp>
         <p:nvSpPr>
-          <p:cNvPr id="28" name="Rectangle 27">
-            <a:extLst>
-              <a:ext uri="{FF2B5EF4-FFF2-40B4-BE49-F238E27FC236}">
-                <a16:creationId xmlns:a16="http://schemas.microsoft.com/office/drawing/2014/main" id="{3E7D5C7B-DD16-401B-85CE-4AAA2A4F5136}"/>
-              </a:ext>
-              <a:ext uri="{C183D7F6-B498-43B3-948B-1728B52AA6E4}">
-                <adec:decorative xmlns:adec="http://schemas.microsoft.com/office/drawing/2017/decorative" val="1"/>
-              </a:ext>
-            </a:extLst>
-          </p:cNvPr>
-          <p:cNvSpPr>
-            <a:spLocks noGrp="1" noRot="1" noChangeAspect="1" noMove="1" noResize="1" noEditPoints="1" noAdjustHandles="1" noChangeArrowheads="1" noChangeShapeType="1" noTextEdit="1"/>
-          </p:cNvSpPr>
-          <p:nvPr>
-            <p:extLst>
-              <p:ext uri="{386F3935-93C4-4BCD-93E2-E3B085C9AB24}">
-                <p16:designElem xmlns:p16="http://schemas.microsoft.com/office/powerpoint/2015/main" val="1"/>
-              </p:ext>
-            </p:extLst>
-          </p:nvPr>
-        </p:nvSpPr>
-        <p:spPr>
-          <a:xfrm>
-            <a:off x="618506" y="2935541"/>
-            <a:ext cx="6217920" cy="18288"/>
-          </a:xfrm>
-          <a:prstGeom prst="rect">
-            <a:avLst/>
-          </a:prstGeom>
-          <a:solidFill>
-            <a:srgbClr val="D5D5D5"/>
-          </a:solidFill>
-          <a:ln w="3175">
-            <a:noFill/>
-          </a:ln>
-          <a:effectLst/>
-        </p:spPr>
-        <p:style>
-          <a:lnRef idx="2">
-            <a:schemeClr val="accent1">
-              <a:shade val="50000"/>
-            </a:schemeClr>
-          </a:lnRef>
-          <a:fillRef idx="1">
-            <a:schemeClr val="accent1"/>
-          </a:fillRef>
-          <a:effectRef idx="0">
-            <a:schemeClr val="accent1"/>
-          </a:effectRef>
-          <a:fontRef idx="minor">
-            <a:schemeClr val="lt1"/>
-          </a:fontRef>
-        </p:style>
-        <p:txBody>
-          <a:bodyPr rtlCol="0" anchor="ctr"/>
-          <a:lstStyle/>
-          <a:p>
-            <a:pPr algn="ctr"/>
-            <a:endParaRPr lang="en-US">
-              <a:solidFill>
-                <a:prstClr val="white"/>
-              </a:solidFill>
-              <a:latin typeface="Calibri" panose="020F0502020204030204"/>
-            </a:endParaRPr>
-          </a:p>
-        </p:txBody>
-      </p:sp>
-      <p:sp>
-        <p:nvSpPr>
-          <p:cNvPr id="4" name="Content Placeholder 3">
-            <a:extLst>
-              <a:ext uri="{FF2B5EF4-FFF2-40B4-BE49-F238E27FC236}">
-                <a16:creationId xmlns:a16="http://schemas.microsoft.com/office/drawing/2014/main" id="{525F938D-EDFD-46DD-B9BD-C5FD7067385A}"/>
+          <p:cNvPr id="3" name="Content Placeholder 2">
+            <a:extLst>
+              <a:ext uri="{FF2B5EF4-FFF2-40B4-BE49-F238E27FC236}">
+                <a16:creationId xmlns:a16="http://schemas.microsoft.com/office/drawing/2014/main" id="{C42388D0-60F3-49C8-960F-2885898BB8E1}"/>
               </a:ext>
             </a:extLst>
           </p:cNvPr>
@@ -11207,19 +12307,185 @@
             <p:ph idx="1"/>
           </p:nvPr>
         </p:nvSpPr>
-        <p:spPr/>
+        <p:spPr>
+          <a:xfrm>
+            <a:off x="5541263" y="457200"/>
+            <a:ext cx="6007608" cy="1929384"/>
+          </a:xfrm>
+        </p:spPr>
         <p:txBody>
-          <a:bodyPr/>
+          <a:bodyPr anchor="ctr">
+            <a:normAutofit/>
+          </a:bodyPr>
           <a:lstStyle/>
           <a:p>
-            <a:endParaRPr lang="en-US"/>
+            <a:r>
+              <a:rPr lang="en-US" sz="2400" dirty="0"/>
+              <a:t>Moved off data lines, connected directly to Raspberry Pi</a:t>
+            </a:r>
+            <a:endParaRPr lang="en-US" sz="2200" dirty="0"/>
+          </a:p>
+          <a:p>
+            <a:r>
+              <a:rPr lang="en-US" sz="2200" dirty="0"/>
+              <a:t>Will be controlled in software, just like Ethernet status LEDs</a:t>
+            </a:r>
+          </a:p>
+          <a:p>
+            <a:r>
+              <a:rPr lang="en-US" sz="2200" dirty="0"/>
+              <a:t>Labeled</a:t>
+            </a:r>
+            <a:endParaRPr lang="en-US" sz="2400" dirty="0"/>
+          </a:p>
+        </p:txBody>
+      </p:sp>
+      <p:pic>
+        <p:nvPicPr>
+          <p:cNvPr id="5" name="Picture 4">
+            <a:extLst>
+              <a:ext uri="{FF2B5EF4-FFF2-40B4-BE49-F238E27FC236}">
+                <a16:creationId xmlns:a16="http://schemas.microsoft.com/office/drawing/2014/main" id="{921EE931-8A56-46CA-B0E5-2B8948A9DFFD}"/>
+              </a:ext>
+            </a:extLst>
+          </p:cNvPr>
+          <p:cNvPicPr>
+            <a:picLocks noChangeAspect="1"/>
+          </p:cNvPicPr>
+          <p:nvPr/>
+        </p:nvPicPr>
+        <p:blipFill>
+          <a:blip r:embed="rId2">
+            <a:extLst>
+              <a:ext uri="{28A0092B-C50C-407E-A947-70E740481C1C}">
+                <a14:useLocalDpi xmlns:a14="http://schemas.microsoft.com/office/drawing/2010/main" val="0"/>
+              </a:ext>
+            </a:extLst>
+          </a:blip>
+          <a:srcRect/>
+          <a:stretch/>
+        </p:blipFill>
+        <p:spPr>
+          <a:xfrm>
+            <a:off x="1369974" y="2978497"/>
+            <a:ext cx="3604362" cy="3678936"/>
+          </a:xfrm>
+          <a:prstGeom prst="rect">
+            <a:avLst/>
+          </a:prstGeom>
+        </p:spPr>
+      </p:pic>
+      <p:pic>
+        <p:nvPicPr>
+          <p:cNvPr id="7" name="Picture 6">
+            <a:extLst>
+              <a:ext uri="{FF2B5EF4-FFF2-40B4-BE49-F238E27FC236}">
+                <a16:creationId xmlns:a16="http://schemas.microsoft.com/office/drawing/2014/main" id="{77DDF01B-7D49-41BC-8DF8-BA8868DD9613}"/>
+              </a:ext>
+            </a:extLst>
+          </p:cNvPr>
+          <p:cNvPicPr>
+            <a:picLocks noChangeAspect="1"/>
+          </p:cNvPicPr>
+          <p:nvPr/>
+        </p:nvPicPr>
+        <p:blipFill>
+          <a:blip r:embed="rId3">
+            <a:extLst>
+              <a:ext uri="{28A0092B-C50C-407E-A947-70E740481C1C}">
+                <a14:useLocalDpi xmlns:a14="http://schemas.microsoft.com/office/drawing/2010/main" val="0"/>
+              </a:ext>
+            </a:extLst>
+          </a:blip>
+          <a:srcRect/>
+          <a:stretch/>
+        </p:blipFill>
+        <p:spPr>
+          <a:xfrm>
+            <a:off x="6254496" y="2976188"/>
+            <a:ext cx="5468112" cy="3124101"/>
+          </a:xfrm>
+          <a:prstGeom prst="rect">
+            <a:avLst/>
+          </a:prstGeom>
+        </p:spPr>
+      </p:pic>
+      <p:sp>
+        <p:nvSpPr>
+          <p:cNvPr id="8" name="TextBox 7">
+            <a:extLst>
+              <a:ext uri="{FF2B5EF4-FFF2-40B4-BE49-F238E27FC236}">
+                <a16:creationId xmlns:a16="http://schemas.microsoft.com/office/drawing/2014/main" id="{A753FAB0-C4D3-40D4-99D1-69335929C7D2}"/>
+              </a:ext>
+            </a:extLst>
+          </p:cNvPr>
+          <p:cNvSpPr txBox="1"/>
+          <p:nvPr/>
+        </p:nvSpPr>
+        <p:spPr>
+          <a:xfrm>
+            <a:off x="1369974" y="2452968"/>
+            <a:ext cx="3604362" cy="523220"/>
+          </a:xfrm>
+          <a:prstGeom prst="rect">
+            <a:avLst/>
+          </a:prstGeom>
+          <a:noFill/>
+        </p:spPr>
+        <p:txBody>
+          <a:bodyPr wrap="square" rtlCol="0">
+            <a:spAutoFit/>
+          </a:bodyPr>
+          <a:lstStyle/>
+          <a:p>
+            <a:pPr algn="ctr"/>
+            <a:r>
+              <a:rPr lang="en-US" sz="2800" dirty="0"/>
+              <a:t>Old Layout</a:t>
+            </a:r>
+          </a:p>
+        </p:txBody>
+      </p:sp>
+      <p:sp>
+        <p:nvSpPr>
+          <p:cNvPr id="11" name="TextBox 10">
+            <a:extLst>
+              <a:ext uri="{FF2B5EF4-FFF2-40B4-BE49-F238E27FC236}">
+                <a16:creationId xmlns:a16="http://schemas.microsoft.com/office/drawing/2014/main" id="{D6D04500-1B39-4580-9DEE-C666CF09804F}"/>
+              </a:ext>
+            </a:extLst>
+          </p:cNvPr>
+          <p:cNvSpPr txBox="1"/>
+          <p:nvPr/>
+        </p:nvSpPr>
+        <p:spPr>
+          <a:xfrm>
+            <a:off x="6254495" y="2452968"/>
+            <a:ext cx="5468111" cy="523220"/>
+          </a:xfrm>
+          <a:prstGeom prst="rect">
+            <a:avLst/>
+          </a:prstGeom>
+          <a:noFill/>
+        </p:spPr>
+        <p:txBody>
+          <a:bodyPr wrap="square" rtlCol="0">
+            <a:spAutoFit/>
+          </a:bodyPr>
+          <a:lstStyle/>
+          <a:p>
+            <a:pPr algn="ctr"/>
+            <a:r>
+              <a:rPr lang="en-US" sz="2800" dirty="0"/>
+              <a:t>New Layout</a:t>
+            </a:r>
           </a:p>
         </p:txBody>
       </p:sp>
     </p:spTree>
     <p:extLst>
       <p:ext uri="{BB962C8B-B14F-4D97-AF65-F5344CB8AC3E}">
-        <p14:creationId xmlns:p14="http://schemas.microsoft.com/office/powerpoint/2010/main" val="1648650677"/>
+        <p14:creationId xmlns:p14="http://schemas.microsoft.com/office/powerpoint/2010/main" val="1280141223"/>
       </p:ext>
     </p:extLst>
   </p:cSld>
@@ -11522,4 +12788,299 @@
     </a:ext>
   </a:extLst>
 </a:theme>
+</file>
+
+<file path=ppt/theme/theme2.xml><?xml version="1.0" encoding="utf-8"?>
+<a:theme xmlns:a="http://schemas.openxmlformats.org/drawingml/2006/main" name="Office Theme">
+  <a:themeElements>
+    <a:clrScheme name="Office">
+      <a:dk1>
+        <a:sysClr val="windowText" lastClr="000000"/>
+      </a:dk1>
+      <a:lt1>
+        <a:sysClr val="window" lastClr="FFFFFF"/>
+      </a:lt1>
+      <a:dk2>
+        <a:srgbClr val="44546A"/>
+      </a:dk2>
+      <a:lt2>
+        <a:srgbClr val="E7E6E6"/>
+      </a:lt2>
+      <a:accent1>
+        <a:srgbClr val="4472C4"/>
+      </a:accent1>
+      <a:accent2>
+        <a:srgbClr val="ED7D31"/>
+      </a:accent2>
+      <a:accent3>
+        <a:srgbClr val="A5A5A5"/>
+      </a:accent3>
+      <a:accent4>
+        <a:srgbClr val="FFC000"/>
+      </a:accent4>
+      <a:accent5>
+        <a:srgbClr val="5B9BD5"/>
+      </a:accent5>
+      <a:accent6>
+        <a:srgbClr val="70AD47"/>
+      </a:accent6>
+      <a:hlink>
+        <a:srgbClr val="0563C1"/>
+      </a:hlink>
+      <a:folHlink>
+        <a:srgbClr val="954F72"/>
+      </a:folHlink>
+    </a:clrScheme>
+    <a:fontScheme name="Office">
+      <a:majorFont>
+        <a:latin typeface="Calibri Light" panose="020F0302020204030204"/>
+        <a:ea typeface=""/>
+        <a:cs typeface=""/>
+        <a:font script="Jpan" typeface="游ゴシック Light"/>
+        <a:font script="Hang" typeface="맑은 고딕"/>
+        <a:font script="Hans" typeface="等线 Light"/>
+        <a:font script="Hant" typeface="新細明體"/>
+        <a:font script="Arab" typeface="Times New Roman"/>
+        <a:font script="Hebr" typeface="Times New Roman"/>
+        <a:font script="Thai" typeface="Angsana New"/>
+        <a:font script="Ethi" typeface="Nyala"/>
+        <a:font script="Beng" typeface="Vrinda"/>
+        <a:font script="Gujr" typeface="Shruti"/>
+        <a:font script="Khmr" typeface="MoolBoran"/>
+        <a:font script="Knda" typeface="Tunga"/>
+        <a:font script="Guru" typeface="Raavi"/>
+        <a:font script="Cans" typeface="Euphemia"/>
+        <a:font script="Cher" typeface="Plantagenet Cherokee"/>
+        <a:font script="Yiii" typeface="Microsoft Yi Baiti"/>
+        <a:font script="Tibt" typeface="Microsoft Himalaya"/>
+        <a:font script="Thaa" typeface="MV Boli"/>
+        <a:font script="Deva" typeface="Mangal"/>
+        <a:font script="Telu" typeface="Gautami"/>
+        <a:font script="Taml" typeface="Latha"/>
+        <a:font script="Syrc" typeface="Estrangelo Edessa"/>
+        <a:font script="Orya" typeface="Kalinga"/>
+        <a:font script="Mlym" typeface="Kartika"/>
+        <a:font script="Laoo" typeface="DokChampa"/>
+        <a:font script="Sinh" typeface="Iskoola Pota"/>
+        <a:font script="Mong" typeface="Mongolian Baiti"/>
+        <a:font script="Viet" typeface="Times New Roman"/>
+        <a:font script="Uigh" typeface="Microsoft Uighur"/>
+        <a:font script="Geor" typeface="Sylfaen"/>
+        <a:font script="Armn" typeface="Arial"/>
+        <a:font script="Bugi" typeface="Leelawadee UI"/>
+        <a:font script="Bopo" typeface="Microsoft JhengHei"/>
+        <a:font script="Java" typeface="Javanese Text"/>
+        <a:font script="Lisu" typeface="Segoe UI"/>
+        <a:font script="Mymr" typeface="Myanmar Text"/>
+        <a:font script="Nkoo" typeface="Ebrima"/>
+        <a:font script="Olck" typeface="Nirmala UI"/>
+        <a:font script="Osma" typeface="Ebrima"/>
+        <a:font script="Phag" typeface="Phagspa"/>
+        <a:font script="Syrn" typeface="Estrangelo Edessa"/>
+        <a:font script="Syrj" typeface="Estrangelo Edessa"/>
+        <a:font script="Syre" typeface="Estrangelo Edessa"/>
+        <a:font script="Sora" typeface="Nirmala UI"/>
+        <a:font script="Tale" typeface="Microsoft Tai Le"/>
+        <a:font script="Talu" typeface="Microsoft New Tai Lue"/>
+        <a:font script="Tfng" typeface="Ebrima"/>
+      </a:majorFont>
+      <a:minorFont>
+        <a:latin typeface="Calibri" panose="020F0502020204030204"/>
+        <a:ea typeface=""/>
+        <a:cs typeface=""/>
+        <a:font script="Jpan" typeface="游ゴシック"/>
+        <a:font script="Hang" typeface="맑은 고딕"/>
+        <a:font script="Hans" typeface="等线"/>
+        <a:font script="Hant" typeface="新細明體"/>
+        <a:font script="Arab" typeface="Arial"/>
+        <a:font script="Hebr" typeface="Arial"/>
+        <a:font script="Thai" typeface="Cordia New"/>
+        <a:font script="Ethi" typeface="Nyala"/>
+        <a:font script="Beng" typeface="Vrinda"/>
+        <a:font script="Gujr" typeface="Shruti"/>
+        <a:font script="Khmr" typeface="DaunPenh"/>
+        <a:font script="Knda" typeface="Tunga"/>
+        <a:font script="Guru" typeface="Raavi"/>
+        <a:font script="Cans" typeface="Euphemia"/>
+        <a:font script="Cher" typeface="Plantagenet Cherokee"/>
+        <a:font script="Yiii" typeface="Microsoft Yi Baiti"/>
+        <a:font script="Tibt" typeface="Microsoft Himalaya"/>
+        <a:font script="Thaa" typeface="MV Boli"/>
+        <a:font script="Deva" typeface="Mangal"/>
+        <a:font script="Telu" typeface="Gautami"/>
+        <a:font script="Taml" typeface="Latha"/>
+        <a:font script="Syrc" typeface="Estrangelo Edessa"/>
+        <a:font script="Orya" typeface="Kalinga"/>
+        <a:font script="Mlym" typeface="Kartika"/>
+        <a:font script="Laoo" typeface="DokChampa"/>
+        <a:font script="Sinh" typeface="Iskoola Pota"/>
+        <a:font script="Mong" typeface="Mongolian Baiti"/>
+        <a:font script="Viet" typeface="Arial"/>
+        <a:font script="Uigh" typeface="Microsoft Uighur"/>
+        <a:font script="Geor" typeface="Sylfaen"/>
+        <a:font script="Armn" typeface="Arial"/>
+        <a:font script="Bugi" typeface="Leelawadee UI"/>
+        <a:font script="Bopo" typeface="Microsoft JhengHei"/>
+        <a:font script="Java" typeface="Javanese Text"/>
+        <a:font script="Lisu" typeface="Segoe UI"/>
+        <a:font script="Mymr" typeface="Myanmar Text"/>
+        <a:font script="Nkoo" typeface="Ebrima"/>
+        <a:font script="Olck" typeface="Nirmala UI"/>
+        <a:font script="Osma" typeface="Ebrima"/>
+        <a:font script="Phag" typeface="Phagspa"/>
+        <a:font script="Syrn" typeface="Estrangelo Edessa"/>
+        <a:font script="Syrj" typeface="Estrangelo Edessa"/>
+        <a:font script="Syre" typeface="Estrangelo Edessa"/>
+        <a:font script="Sora" typeface="Nirmala UI"/>
+        <a:font script="Tale" typeface="Microsoft Tai Le"/>
+        <a:font script="Talu" typeface="Microsoft New Tai Lue"/>
+        <a:font script="Tfng" typeface="Ebrima"/>
+      </a:minorFont>
+    </a:fontScheme>
+    <a:fmtScheme name="Office">
+      <a:fillStyleLst>
+        <a:solidFill>
+          <a:schemeClr val="phClr"/>
+        </a:solidFill>
+        <a:gradFill rotWithShape="1">
+          <a:gsLst>
+            <a:gs pos="0">
+              <a:schemeClr val="phClr">
+                <a:lumMod val="110000"/>
+                <a:satMod val="105000"/>
+                <a:tint val="67000"/>
+              </a:schemeClr>
+            </a:gs>
+            <a:gs pos="50000">
+              <a:schemeClr val="phClr">
+                <a:lumMod val="105000"/>
+                <a:satMod val="103000"/>
+                <a:tint val="73000"/>
+              </a:schemeClr>
+            </a:gs>
+            <a:gs pos="100000">
+              <a:schemeClr val="phClr">
+                <a:lumMod val="105000"/>
+                <a:satMod val="109000"/>
+                <a:tint val="81000"/>
+              </a:schemeClr>
+            </a:gs>
+          </a:gsLst>
+          <a:lin ang="5400000" scaled="0"/>
+        </a:gradFill>
+        <a:gradFill rotWithShape="1">
+          <a:gsLst>
+            <a:gs pos="0">
+              <a:schemeClr val="phClr">
+                <a:satMod val="103000"/>
+                <a:lumMod val="102000"/>
+                <a:tint val="94000"/>
+              </a:schemeClr>
+            </a:gs>
+            <a:gs pos="50000">
+              <a:schemeClr val="phClr">
+                <a:satMod val="110000"/>
+                <a:lumMod val="100000"/>
+                <a:shade val="100000"/>
+              </a:schemeClr>
+            </a:gs>
+            <a:gs pos="100000">
+              <a:schemeClr val="phClr">
+                <a:lumMod val="99000"/>
+                <a:satMod val="120000"/>
+                <a:shade val="78000"/>
+              </a:schemeClr>
+            </a:gs>
+          </a:gsLst>
+          <a:lin ang="5400000" scaled="0"/>
+        </a:gradFill>
+      </a:fillStyleLst>
+      <a:lnStyleLst>
+        <a:ln w="6350" cap="flat" cmpd="sng" algn="ctr">
+          <a:solidFill>
+            <a:schemeClr val="phClr"/>
+          </a:solidFill>
+          <a:prstDash val="solid"/>
+          <a:miter lim="800000"/>
+        </a:ln>
+        <a:ln w="12700" cap="flat" cmpd="sng" algn="ctr">
+          <a:solidFill>
+            <a:schemeClr val="phClr"/>
+          </a:solidFill>
+          <a:prstDash val="solid"/>
+          <a:miter lim="800000"/>
+        </a:ln>
+        <a:ln w="19050" cap="flat" cmpd="sng" algn="ctr">
+          <a:solidFill>
+            <a:schemeClr val="phClr"/>
+          </a:solidFill>
+          <a:prstDash val="solid"/>
+          <a:miter lim="800000"/>
+        </a:ln>
+      </a:lnStyleLst>
+      <a:effectStyleLst>
+        <a:effectStyle>
+          <a:effectLst/>
+        </a:effectStyle>
+        <a:effectStyle>
+          <a:effectLst/>
+        </a:effectStyle>
+        <a:effectStyle>
+          <a:effectLst>
+            <a:outerShdw blurRad="57150" dist="19050" dir="5400000" algn="ctr" rotWithShape="0">
+              <a:srgbClr val="000000">
+                <a:alpha val="63000"/>
+              </a:srgbClr>
+            </a:outerShdw>
+          </a:effectLst>
+        </a:effectStyle>
+      </a:effectStyleLst>
+      <a:bgFillStyleLst>
+        <a:solidFill>
+          <a:schemeClr val="phClr"/>
+        </a:solidFill>
+        <a:solidFill>
+          <a:schemeClr val="phClr">
+            <a:tint val="95000"/>
+            <a:satMod val="170000"/>
+          </a:schemeClr>
+        </a:solidFill>
+        <a:gradFill rotWithShape="1">
+          <a:gsLst>
+            <a:gs pos="0">
+              <a:schemeClr val="phClr">
+                <a:tint val="93000"/>
+                <a:satMod val="150000"/>
+                <a:shade val="98000"/>
+                <a:lumMod val="102000"/>
+              </a:schemeClr>
+            </a:gs>
+            <a:gs pos="50000">
+              <a:schemeClr val="phClr">
+                <a:tint val="98000"/>
+                <a:satMod val="130000"/>
+                <a:shade val="90000"/>
+                <a:lumMod val="103000"/>
+              </a:schemeClr>
+            </a:gs>
+            <a:gs pos="100000">
+              <a:schemeClr val="phClr">
+                <a:shade val="63000"/>
+                <a:satMod val="120000"/>
+              </a:schemeClr>
+            </a:gs>
+          </a:gsLst>
+          <a:lin ang="5400000" scaled="0"/>
+        </a:gradFill>
+      </a:bgFillStyleLst>
+    </a:fmtScheme>
+  </a:themeElements>
+  <a:objectDefaults/>
+  <a:extraClrSchemeLst/>
+  <a:extLst>
+    <a:ext uri="{05A4C25C-085E-4340-85A3-A5531E510DB2}">
+      <thm15:themeFamily xmlns:thm15="http://schemas.microsoft.com/office/thememl/2012/main" name="Office Theme" id="{62F939B6-93AF-4DB8-9C6B-D6C7DFDC589F}" vid="{4A3C46E8-61CC-4603-A589-7422A47A8E4A}"/>
+    </a:ext>
+  </a:extLst>
+</a:theme>
 </file>
</xml_diff>

<commit_message>
Corrected accelerometer regulator capacitors
</commit_message>
<xml_diff>
--- a/Documentation/Schematic Review 1.pptx
+++ b/Documentation/Schematic Review 1.pptx
@@ -6656,14 +6656,13 @@
               </a:ext>
             </a:extLst>
           </a:blip>
-          <a:stretch>
-            <a:fillRect/>
-          </a:stretch>
+          <a:srcRect/>
+          <a:stretch/>
         </p:blipFill>
         <p:spPr>
           <a:xfrm>
             <a:off x="4437610" y="687688"/>
-            <a:ext cx="7754390" cy="5482623"/>
+            <a:ext cx="7754389" cy="5482623"/>
           </a:xfrm>
           <a:prstGeom prst="rect">
             <a:avLst/>
@@ -7132,15 +7131,20 @@
           <p:nvPr/>
         </p:nvPicPr>
         <p:blipFill>
-          <a:blip r:embed="rId2"/>
-          <a:stretch>
-            <a:fillRect/>
-          </a:stretch>
+          <a:blip r:embed="rId2">
+            <a:extLst>
+              <a:ext uri="{28A0092B-C50C-407E-A947-70E740481C1C}">
+                <a14:useLocalDpi xmlns:a14="http://schemas.microsoft.com/office/drawing/2010/main" val="0"/>
+              </a:ext>
+            </a:extLst>
+          </a:blip>
+          <a:srcRect/>
+          <a:stretch/>
         </p:blipFill>
         <p:spPr>
           <a:xfrm>
-            <a:off x="1291651" y="2729397"/>
-            <a:ext cx="4013772" cy="3483864"/>
+            <a:off x="1364715" y="2729397"/>
+            <a:ext cx="3867643" cy="3483864"/>
           </a:xfrm>
           <a:prstGeom prst="rect">
             <a:avLst/>
@@ -7162,15 +7166,20 @@
           <p:nvPr/>
         </p:nvPicPr>
         <p:blipFill>
-          <a:blip r:embed="rId3"/>
-          <a:stretch>
-            <a:fillRect/>
-          </a:stretch>
+          <a:blip r:embed="rId3">
+            <a:extLst>
+              <a:ext uri="{28A0092B-C50C-407E-A947-70E740481C1C}">
+                <a14:useLocalDpi xmlns:a14="http://schemas.microsoft.com/office/drawing/2010/main" val="0"/>
+              </a:ext>
+            </a:extLst>
+          </a:blip>
+          <a:srcRect/>
+          <a:stretch/>
         </p:blipFill>
         <p:spPr>
           <a:xfrm>
-            <a:off x="6829518" y="2729397"/>
-            <a:ext cx="4261607" cy="3483864"/>
+            <a:off x="6865856" y="2729397"/>
+            <a:ext cx="4188931" cy="3483864"/>
           </a:xfrm>
           <a:prstGeom prst="rect">
             <a:avLst/>
@@ -7620,15 +7629,20 @@
           <p:nvPr/>
         </p:nvPicPr>
         <p:blipFill>
-          <a:blip r:embed="rId2"/>
-          <a:stretch>
-            <a:fillRect/>
-          </a:stretch>
+          <a:blip r:embed="rId2">
+            <a:extLst>
+              <a:ext uri="{28A0092B-C50C-407E-A947-70E740481C1C}">
+                <a14:useLocalDpi xmlns:a14="http://schemas.microsoft.com/office/drawing/2010/main" val="0"/>
+              </a:ext>
+            </a:extLst>
+          </a:blip>
+          <a:srcRect/>
+          <a:stretch/>
         </p:blipFill>
         <p:spPr>
           <a:xfrm>
-            <a:off x="557783" y="2785765"/>
-            <a:ext cx="5481509" cy="3371127"/>
+            <a:off x="557783" y="2849249"/>
+            <a:ext cx="5481509" cy="3244158"/>
           </a:xfrm>
           <a:prstGeom prst="rect">
             <a:avLst/>
@@ -7650,15 +7664,20 @@
           <p:nvPr/>
         </p:nvPicPr>
         <p:blipFill>
-          <a:blip r:embed="rId3"/>
-          <a:stretch>
-            <a:fillRect/>
-          </a:stretch>
+          <a:blip r:embed="rId3">
+            <a:extLst>
+              <a:ext uri="{28A0092B-C50C-407E-A947-70E740481C1C}">
+                <a14:useLocalDpi xmlns:a14="http://schemas.microsoft.com/office/drawing/2010/main" val="0"/>
+              </a:ext>
+            </a:extLst>
+          </a:blip>
+          <a:srcRect/>
+          <a:stretch/>
         </p:blipFill>
         <p:spPr>
           <a:xfrm>
-            <a:off x="6198781" y="2807501"/>
-            <a:ext cx="5523082" cy="3327656"/>
+            <a:off x="6198781" y="2851521"/>
+            <a:ext cx="5523082" cy="3239616"/>
           </a:xfrm>
           <a:prstGeom prst="rect">
             <a:avLst/>
@@ -11810,7 +11829,7 @@
               </a:ext>
             </a:extLst>
           </a:blip>
-          <a:srcRect t="775" b="775"/>
+          <a:srcRect t="3398" b="3398"/>
           <a:stretch/>
         </p:blipFill>
         <p:spPr>
@@ -12370,44 +12389,33 @@
             <a:off x="1369974" y="2978497"/>
             <a:ext cx="3604362" cy="3678936"/>
           </a:xfrm>
-          <a:prstGeom prst="rect">
-            <a:avLst/>
+          <a:prstGeom prst="roundRect">
+            <a:avLst>
+              <a:gd name="adj" fmla="val 16667"/>
+            </a:avLst>
           </a:prstGeom>
-        </p:spPr>
-      </p:pic>
-      <p:pic>
-        <p:nvPicPr>
-          <p:cNvPr id="7" name="Picture 6">
-            <a:extLst>
-              <a:ext uri="{FF2B5EF4-FFF2-40B4-BE49-F238E27FC236}">
-                <a16:creationId xmlns:a16="http://schemas.microsoft.com/office/drawing/2014/main" id="{77DDF01B-7D49-41BC-8DF8-BA8868DD9613}"/>
-              </a:ext>
-            </a:extLst>
-          </p:cNvPr>
-          <p:cNvPicPr>
-            <a:picLocks noChangeAspect="1"/>
-          </p:cNvPicPr>
-          <p:nvPr/>
-        </p:nvPicPr>
-        <p:blipFill>
-          <a:blip r:embed="rId3">
-            <a:extLst>
-              <a:ext uri="{28A0092B-C50C-407E-A947-70E740481C1C}">
-                <a14:useLocalDpi xmlns:a14="http://schemas.microsoft.com/office/drawing/2010/main" val="0"/>
-              </a:ext>
-            </a:extLst>
-          </a:blip>
-          <a:srcRect/>
-          <a:stretch/>
-        </p:blipFill>
-        <p:spPr>
-          <a:xfrm>
-            <a:off x="6254496" y="2976188"/>
-            <a:ext cx="5468112" cy="3124101"/>
-          </a:xfrm>
-          <a:prstGeom prst="rect">
-            <a:avLst/>
-          </a:prstGeom>
+          <a:ln>
+            <a:noFill/>
+          </a:ln>
+          <a:effectLst>
+            <a:outerShdw blurRad="76200" dist="38100" dir="7800000" algn="tl" rotWithShape="0">
+              <a:srgbClr val="000000">
+                <a:alpha val="40000"/>
+              </a:srgbClr>
+            </a:outerShdw>
+          </a:effectLst>
+          <a:scene3d>
+            <a:camera prst="orthographicFront"/>
+            <a:lightRig rig="contrasting" dir="t">
+              <a:rot lat="0" lon="0" rev="4200000"/>
+            </a:lightRig>
+          </a:scene3d>
+          <a:sp3d prstMaterial="plastic">
+            <a:bevelT w="381000" h="114300" prst="relaxedInset"/>
+            <a:contourClr>
+              <a:srgbClr val="969696"/>
+            </a:contourClr>
+          </a:sp3d>
         </p:spPr>
       </p:pic>
       <p:sp>
@@ -12482,6 +12490,60 @@
           </a:p>
         </p:txBody>
       </p:sp>
+      <p:pic>
+        <p:nvPicPr>
+          <p:cNvPr id="6" name="Picture 5">
+            <a:extLst>
+              <a:ext uri="{FF2B5EF4-FFF2-40B4-BE49-F238E27FC236}">
+                <a16:creationId xmlns:a16="http://schemas.microsoft.com/office/drawing/2014/main" id="{BFC5FAA2-3D0A-49BC-96DC-E401506BD1C6}"/>
+              </a:ext>
+            </a:extLst>
+          </p:cNvPr>
+          <p:cNvPicPr>
+            <a:picLocks noChangeAspect="1"/>
+          </p:cNvPicPr>
+          <p:nvPr/>
+        </p:nvPicPr>
+        <p:blipFill>
+          <a:blip r:embed="rId3"/>
+          <a:stretch>
+            <a:fillRect/>
+          </a:stretch>
+        </p:blipFill>
+        <p:spPr>
+          <a:xfrm>
+            <a:off x="7601527" y="2974154"/>
+            <a:ext cx="2779365" cy="3678936"/>
+          </a:xfrm>
+          <a:prstGeom prst="roundRect">
+            <a:avLst>
+              <a:gd name="adj" fmla="val 16667"/>
+            </a:avLst>
+          </a:prstGeom>
+          <a:ln>
+            <a:noFill/>
+          </a:ln>
+          <a:effectLst>
+            <a:outerShdw blurRad="76200" dist="38100" dir="7800000" algn="tl" rotWithShape="0">
+              <a:srgbClr val="000000">
+                <a:alpha val="40000"/>
+              </a:srgbClr>
+            </a:outerShdw>
+          </a:effectLst>
+          <a:scene3d>
+            <a:camera prst="orthographicFront"/>
+            <a:lightRig rig="contrasting" dir="t">
+              <a:rot lat="0" lon="0" rev="4200000"/>
+            </a:lightRig>
+          </a:scene3d>
+          <a:sp3d prstMaterial="plastic">
+            <a:bevelT w="381000" h="114300" prst="relaxedInset"/>
+            <a:contourClr>
+              <a:srgbClr val="969696"/>
+            </a:contourClr>
+          </a:sp3d>
+        </p:spPr>
+      </p:pic>
     </p:spTree>
     <p:extLst>
       <p:ext uri="{BB962C8B-B14F-4D97-AF65-F5344CB8AC3E}">

</xml_diff>

<commit_message>
Added signatures to pcb silkscreen
</commit_message>
<xml_diff>
--- a/Documentation/Schematic Review 1.pptx
+++ b/Documentation/Schematic Review 1.pptx
@@ -4588,10 +4588,10 @@
       </p:grpSpPr>
       <p:pic>
         <p:nvPicPr>
-          <p:cNvPr id="9" name="Content Placeholder 8">
+          <p:cNvPr id="6" name="Content Placeholder 5">
             <a:extLst>
               <a:ext uri="{FF2B5EF4-FFF2-40B4-BE49-F238E27FC236}">
-                <a16:creationId xmlns:a16="http://schemas.microsoft.com/office/drawing/2014/main" id="{F0A8748D-4CB6-4455-A14E-2E95BAC520C9}"/>
+                <a16:creationId xmlns:a16="http://schemas.microsoft.com/office/drawing/2014/main" id="{3196B069-73F5-45CB-827D-82F91EA86F07}"/>
               </a:ext>
             </a:extLst>
           </p:cNvPr>
@@ -4604,7 +4604,7 @@
         </p:nvPicPr>
         <p:blipFill rotWithShape="1">
           <a:blip r:embed="rId2"/>
-          <a:srcRect l="3192" r="2585"/>
+          <a:srcRect l="4687" r="4203" b="1"/>
           <a:stretch/>
         </p:blipFill>
         <p:spPr>
@@ -4619,7 +4619,7 @@
       </p:pic>
       <p:sp>
         <p:nvSpPr>
-          <p:cNvPr id="40" name="Freeform 5">
+          <p:cNvPr id="47" name="Freeform 5">
             <a:extLst>
               <a:ext uri="{FF2B5EF4-FFF2-40B4-BE49-F238E27FC236}">
                 <a16:creationId xmlns:a16="http://schemas.microsoft.com/office/drawing/2014/main" id="{87CC2527-562A-4F69-B487-4371E5B243E7}"/>
@@ -4797,7 +4797,7 @@
       </p:sp>
       <p:cxnSp>
         <p:nvCxnSpPr>
-          <p:cNvPr id="42" name="Straight Connector 41">
+          <p:cNvPr id="49" name="Straight Connector 48">
             <a:extLst>
               <a:ext uri="{FF2B5EF4-FFF2-40B4-BE49-F238E27FC236}">
                 <a16:creationId xmlns:a16="http://schemas.microsoft.com/office/drawing/2014/main" id="{BCDAEC91-5BCE-4B55-9CC0-43EF94CB734B}"/>
@@ -4904,15 +4904,20 @@
           <p:nvPr/>
         </p:nvPicPr>
         <p:blipFill>
-          <a:blip r:embed="rId2"/>
-          <a:stretch>
-            <a:fillRect/>
-          </a:stretch>
+          <a:blip r:embed="rId2">
+            <a:extLst>
+              <a:ext uri="{28A0092B-C50C-407E-A947-70E740481C1C}">
+                <a14:useLocalDpi xmlns:a14="http://schemas.microsoft.com/office/drawing/2010/main" val="0"/>
+              </a:ext>
+            </a:extLst>
+          </a:blip>
+          <a:srcRect/>
+          <a:stretch/>
         </p:blipFill>
         <p:spPr>
           <a:xfrm>
-            <a:off x="457202" y="865336"/>
-            <a:ext cx="5426764" cy="1817965"/>
+            <a:off x="1115888" y="865336"/>
+            <a:ext cx="4109389" cy="1817965"/>
           </a:xfrm>
           <a:prstGeom prst="rect">
             <a:avLst/>
@@ -5002,13 +5007,19 @@
           </p:nvPr>
         </p:nvPicPr>
         <p:blipFill rotWithShape="1">
-          <a:blip r:embed="rId3"/>
-          <a:srcRect t="1765"/>
+          <a:blip r:embed="rId3">
+            <a:extLst>
+              <a:ext uri="{28A0092B-C50C-407E-A947-70E740481C1C}">
+                <a14:useLocalDpi xmlns:a14="http://schemas.microsoft.com/office/drawing/2010/main" val="0"/>
+              </a:ext>
+            </a:extLst>
+          </a:blip>
+          <a:srcRect t="1192" b="1192"/>
           <a:stretch/>
         </p:blipFill>
         <p:spPr>
           <a:xfrm>
-            <a:off x="6308034" y="336669"/>
+            <a:off x="6572461" y="336668"/>
             <a:ext cx="5112595" cy="2875300"/>
           </a:xfrm>
           <a:prstGeom prst="rect">
@@ -5193,15 +5204,20 @@
           <p:nvPr/>
         </p:nvPicPr>
         <p:blipFill>
-          <a:blip r:embed="rId5"/>
-          <a:stretch>
-            <a:fillRect/>
-          </a:stretch>
+          <a:blip r:embed="rId5">
+            <a:extLst>
+              <a:ext uri="{28A0092B-C50C-407E-A947-70E740481C1C}">
+                <a14:useLocalDpi xmlns:a14="http://schemas.microsoft.com/office/drawing/2010/main" val="0"/>
+              </a:ext>
+            </a:extLst>
+          </a:blip>
+          <a:srcRect/>
+          <a:stretch/>
         </p:blipFill>
         <p:spPr>
           <a:xfrm>
-            <a:off x="6308034" y="4001639"/>
-            <a:ext cx="5112595" cy="2019474"/>
+            <a:off x="7134455" y="4001638"/>
+            <a:ext cx="3988609" cy="2019474"/>
           </a:xfrm>
           <a:prstGeom prst="rect">
             <a:avLst/>
@@ -5669,13 +5685,13 @@
         </p:nvSpPr>
         <p:spPr>
           <a:xfrm>
-            <a:off x="1139635" y="2546161"/>
-            <a:ext cx="3200451" cy="3097257"/>
+            <a:off x="1138123" y="2196606"/>
+            <a:ext cx="3200451" cy="3349867"/>
           </a:xfrm>
         </p:spPr>
         <p:txBody>
           <a:bodyPr anchor="t">
-            <a:normAutofit fontScale="92500"/>
+            <a:normAutofit fontScale="92500" lnSpcReduction="10000"/>
           </a:bodyPr>
           <a:lstStyle/>
           <a:p>
@@ -5716,7 +5732,7 @@
                   <a:srgbClr val="FEFFFF"/>
                 </a:solidFill>
               </a:rPr>
-              <a:t>BOM is same from previous board, consult documentation to order</a:t>
+              <a:t>BOM is same from previous board, consult previous documentation to order new components</a:t>
             </a:r>
           </a:p>
         </p:txBody>

</xml_diff>